<commit_message>
Removed change of address line length
Removed change to length address lines, and references to USPS Publication 28.  It just complicates matters without adding anything of value.
</commit_message>
<xml_diff>
--- a/Triggers & Refactoring.pptx
+++ b/Triggers & Refactoring.pptx
@@ -319,7 +319,7 @@
           <a:p>
             <a:fld id="{ECD19FB2-3AAB-4D03-B13A-2960828C78E3}" type="datetimeFigureOut">
               <a:rPr lang="en-US" dirty="0"/>
-              <a:t>2/16/2016</a:t>
+              <a:t>2/18/2016</a:t>
             </a:fld>
             <a:endParaRPr lang="en-US" dirty="0"/>
           </a:p>
@@ -596,7 +596,7 @@
           <a:p>
             <a:fld id="{1B80C674-7DFC-42FE-B9CD-82963CDB1557}" type="datetimeFigureOut">
               <a:rPr lang="en-US" dirty="0"/>
-              <a:t>2/16/2016</a:t>
+              <a:t>2/18/2016</a:t>
             </a:fld>
             <a:endParaRPr lang="en-US" dirty="0"/>
           </a:p>
@@ -783,7 +783,7 @@
           <a:p>
             <a:fld id="{2076456F-F47D-4F25-8053-2A695DA0CA7D}" type="datetimeFigureOut">
               <a:rPr lang="en-US" dirty="0"/>
-              <a:t>2/16/2016</a:t>
+              <a:t>2/18/2016</a:t>
             </a:fld>
             <a:endParaRPr lang="en-US" dirty="0"/>
           </a:p>
@@ -1039,7 +1039,7 @@
           <a:p>
             <a:fld id="{5D6C7379-69CC-4837-9905-BEBA22830C8A}" type="datetimeFigureOut">
               <a:rPr lang="en-US" dirty="0"/>
-              <a:t>2/16/2016</a:t>
+              <a:t>2/18/2016</a:t>
             </a:fld>
             <a:endParaRPr lang="en-US" dirty="0"/>
           </a:p>
@@ -1460,7 +1460,7 @@
           <a:p>
             <a:fld id="{49EB8B7E-8AEE-4F10-BFEE-C999AD004D36}" type="datetimeFigureOut">
               <a:rPr lang="en-US" dirty="0"/>
-              <a:t>2/16/2016</a:t>
+              <a:t>2/18/2016</a:t>
             </a:fld>
             <a:endParaRPr lang="en-US" dirty="0"/>
           </a:p>
@@ -2001,7 +2001,7 @@
           <a:p>
             <a:fld id="{8668F3F9-58BC-440B-B37B-805B9055EF92}" type="datetimeFigureOut">
               <a:rPr lang="en-US" dirty="0"/>
-              <a:t>2/16/2016</a:t>
+              <a:t>2/18/2016</a:t>
             </a:fld>
             <a:endParaRPr lang="en-US" dirty="0"/>
           </a:p>
@@ -2827,7 +2827,7 @@
           <a:p>
             <a:fld id="{0D5A53AF-48EA-489D-8260-9DCAB666386A}" type="datetimeFigureOut">
               <a:rPr lang="en-US" dirty="0"/>
-              <a:t>2/16/2016</a:t>
+              <a:t>2/18/2016</a:t>
             </a:fld>
             <a:endParaRPr lang="en-US" dirty="0"/>
           </a:p>
@@ -2992,7 +2992,7 @@
           <a:p>
             <a:fld id="{0DED02AE-B9A4-47BD-AF8E-97E16144138B}" type="datetimeFigureOut">
               <a:rPr lang="en-US" dirty="0"/>
-              <a:t>2/16/2016</a:t>
+              <a:t>2/18/2016</a:t>
             </a:fld>
             <a:endParaRPr lang="en-US" dirty="0"/>
           </a:p>
@@ -3167,7 +3167,7 @@
           <a:p>
             <a:fld id="{CF0FD78B-DB02-4362-BCDC-98A55456977C}" type="datetimeFigureOut">
               <a:rPr lang="en-US" dirty="0"/>
-              <a:t>2/16/2016</a:t>
+              <a:t>2/18/2016</a:t>
             </a:fld>
             <a:endParaRPr lang="en-US" dirty="0"/>
           </a:p>
@@ -3332,7 +3332,7 @@
           <a:p>
             <a:fld id="{99916976-5D93-46E4-A98A-FAD63E4D0EA8}" type="datetimeFigureOut">
               <a:rPr lang="en-US" dirty="0"/>
-              <a:t>2/16/2016</a:t>
+              <a:t>2/18/2016</a:t>
             </a:fld>
             <a:endParaRPr lang="en-US" dirty="0"/>
           </a:p>
@@ -3584,7 +3584,7 @@
           <a:p>
             <a:fld id="{0F39F4F5-F4D2-4D2A-AB60-88D37ADCB869}" type="datetimeFigureOut">
               <a:rPr lang="en-US" dirty="0"/>
-              <a:t>2/16/2016</a:t>
+              <a:t>2/18/2016</a:t>
             </a:fld>
             <a:endParaRPr lang="en-US" dirty="0"/>
           </a:p>
@@ -3811,7 +3811,7 @@
           <a:p>
             <a:fld id="{D23BC6CE-6D1E-47E5-8859-F31AC5380EB2}" type="datetimeFigureOut">
               <a:rPr lang="en-US" dirty="0"/>
-              <a:t>2/16/2016</a:t>
+              <a:t>2/18/2016</a:t>
             </a:fld>
             <a:endParaRPr lang="en-US" dirty="0"/>
           </a:p>
@@ -4199,7 +4199,7 @@
           <a:p>
             <a:fld id="{B1B4E7C4-4DA4-404D-9965-B13F2DD7D8BF}" type="datetimeFigureOut">
               <a:rPr lang="en-US" dirty="0"/>
-              <a:t>2/16/2016</a:t>
+              <a:t>2/18/2016</a:t>
             </a:fld>
             <a:endParaRPr lang="en-US" dirty="0"/>
           </a:p>
@@ -4312,7 +4312,7 @@
           <a:p>
             <a:fld id="{476FB7AA-4A53-424F-AD41-70827B6504BA}" type="datetimeFigureOut">
               <a:rPr lang="en-US" dirty="0"/>
-              <a:t>2/16/2016</a:t>
+              <a:t>2/18/2016</a:t>
             </a:fld>
             <a:endParaRPr lang="en-US" dirty="0"/>
           </a:p>
@@ -4402,7 +4402,7 @@
           <a:p>
             <a:fld id="{E7884882-FB12-4BC8-9960-9AD8104D7FAE}" type="datetimeFigureOut">
               <a:rPr lang="en-US" dirty="0"/>
-              <a:t>2/16/2016</a:t>
+              <a:t>2/18/2016</a:t>
             </a:fld>
             <a:endParaRPr lang="en-US" dirty="0"/>
           </a:p>
@@ -4670,7 +4670,7 @@
           <a:p>
             <a:fld id="{F7D1BD23-6E54-4D9D-AD88-A2813C73CC25}" type="datetimeFigureOut">
               <a:rPr lang="en-US" dirty="0"/>
-              <a:t>2/16/2016</a:t>
+              <a:t>2/18/2016</a:t>
             </a:fld>
             <a:endParaRPr lang="en-US" dirty="0"/>
           </a:p>
@@ -4946,7 +4946,7 @@
           <a:p>
             <a:fld id="{1471A834-4F3C-4AF9-9C74-05EC35A0F292}" type="datetimeFigureOut">
               <a:rPr lang="en-US" dirty="0"/>
-              <a:t>2/16/2016</a:t>
+              <a:t>2/18/2016</a:t>
             </a:fld>
             <a:endParaRPr lang="en-US" dirty="0"/>
           </a:p>
@@ -5181,7 +5181,7 @@
           <a:p>
             <a:fld id="{51CF1133-3259-4C45-BABA-5B62D9C6F78D}" type="datetimeFigureOut">
               <a:rPr lang="en-US" dirty="0"/>
-              <a:t>2/16/2016</a:t>
+              <a:t>2/18/2016</a:t>
             </a:fld>
             <a:endParaRPr lang="en-US" dirty="0"/>
           </a:p>
@@ -5966,7 +5966,7 @@
         <p:spPr/>
         <p:txBody>
           <a:bodyPr>
-            <a:normAutofit lnSpcReduction="10000"/>
+            <a:normAutofit/>
           </a:bodyPr>
           <a:lstStyle/>
           <a:p>
@@ -6034,40 +6034,9 @@
             </a:r>
           </a:p>
           <a:p>
-            <a:endParaRPr lang="en-US" dirty="0"/>
-          </a:p>
-          <a:p>
-            <a:r>
-              <a:rPr lang="en-US" dirty="0" smtClean="0"/>
-              <a:t>USPS </a:t>
-            </a:r>
-            <a:r>
-              <a:rPr lang="en-US" dirty="0"/>
-              <a:t>Publication 28 - Postal Addressing </a:t>
-            </a:r>
-            <a:r>
-              <a:rPr lang="en-US" dirty="0" smtClean="0"/>
-              <a:t>Standards -- </a:t>
-            </a:r>
-            <a:r>
-              <a:rPr lang="en-US" dirty="0"/>
-              <a:t>Section 2.1.1   </a:t>
-            </a:r>
-            <a:r>
-              <a:rPr lang="en-US" dirty="0">
-                <a:hlinkClick r:id="rId4"/>
-              </a:rPr>
-              <a:t>http://</a:t>
-            </a:r>
-            <a:r>
-              <a:rPr lang="en-US" dirty="0" smtClean="0">
-                <a:hlinkClick r:id="rId4"/>
-              </a:rPr>
-              <a:t>pe.usps.gov/text/pub28/28c2_001.htm</a:t>
-            </a:r>
-            <a:endParaRPr lang="en-US" dirty="0" smtClean="0"/>
-          </a:p>
-          <a:p>
+            <a:pPr marL="0" indent="0">
+              <a:buNone/>
+            </a:pPr>
             <a:endParaRPr lang="en-US" dirty="0"/>
           </a:p>
           <a:p>
@@ -6481,11 +6450,7 @@
           <a:p>
             <a:r>
               <a:rPr lang="en-US" dirty="0" smtClean="0"/>
-              <a:t>Triggers are stored procedures that run after or instead of </a:t>
-            </a:r>
-            <a:r>
-              <a:rPr lang="en-US" dirty="0" smtClean="0"/>
-              <a:t>DML or DDL.</a:t>
+              <a:t>Triggers are stored procedures that run after or instead of DML or DDL.</a:t>
             </a:r>
           </a:p>
           <a:p>

</xml_diff>

<commit_message>
Deleted "Who am I?" slide.
After watching a mini-talk in February, I decided to delete the "Who am I" and "What are Triggers?" slides. "Who am I?" probably not necessary for a mini-talk. I suspect most people there know what triggers are.
</commit_message>
<xml_diff>
--- a/Triggers & Refactoring.pptx
+++ b/Triggers & Refactoring.pptx
@@ -6,17 +6,16 @@
   </p:sldMasterIdLst>
   <p:sldIdLst>
     <p:sldId id="256" r:id="rId2"/>
-    <p:sldId id="257" r:id="rId3"/>
-    <p:sldId id="268" r:id="rId4"/>
-    <p:sldId id="258" r:id="rId5"/>
-    <p:sldId id="264" r:id="rId6"/>
-    <p:sldId id="265" r:id="rId7"/>
-    <p:sldId id="267" r:id="rId8"/>
-    <p:sldId id="266" r:id="rId9"/>
-    <p:sldId id="260" r:id="rId10"/>
-    <p:sldId id="261" r:id="rId11"/>
-    <p:sldId id="262" r:id="rId12"/>
-    <p:sldId id="263" r:id="rId13"/>
+    <p:sldId id="268" r:id="rId3"/>
+    <p:sldId id="258" r:id="rId4"/>
+    <p:sldId id="264" r:id="rId5"/>
+    <p:sldId id="265" r:id="rId6"/>
+    <p:sldId id="267" r:id="rId7"/>
+    <p:sldId id="266" r:id="rId8"/>
+    <p:sldId id="260" r:id="rId9"/>
+    <p:sldId id="261" r:id="rId10"/>
+    <p:sldId id="262" r:id="rId11"/>
+    <p:sldId id="263" r:id="rId12"/>
   </p:sldIdLst>
   <p:sldSz cx="12192000" cy="6858000"/>
   <p:notesSz cx="6858000" cy="9144000"/>
@@ -5840,7 +5839,7 @@
           <a:p>
             <a:r>
               <a:rPr lang="en-US" dirty="0" smtClean="0"/>
-              <a:t>Lessons Learned</a:t>
+              <a:t>References</a:t>
             </a:r>
             <a:endParaRPr lang="en-US" dirty="0"/>
           </a:p>
@@ -5858,35 +5857,79 @@
         </p:nvSpPr>
         <p:spPr/>
         <p:txBody>
-          <a:bodyPr/>
-          <a:lstStyle/>
-          <a:p>
+          <a:bodyPr>
+            <a:normAutofit/>
+          </a:bodyPr>
+          <a:lstStyle/>
+          <a:p>
+            <a:r>
+              <a:rPr lang="en-US" dirty="0" smtClean="0"/>
+              <a:t>Evolutionary </a:t>
+            </a:r>
             <a:r>
               <a:rPr lang="en-US" dirty="0"/>
-              <a:t>SET </a:t>
+              <a:t>Database Design: </a:t>
+            </a:r>
+            <a:r>
+              <a:rPr lang="en-US" dirty="0">
+                <a:hlinkClick r:id="rId2"/>
+              </a:rPr>
+              <a:t>http://</a:t>
+            </a:r>
+            <a:r>
+              <a:rPr lang="en-US" dirty="0" smtClean="0">
+                <a:hlinkClick r:id="rId2"/>
+              </a:rPr>
+              <a:t>martinfowler.com/articles/evodb.html</a:t>
             </a:r>
             <a:r>
               <a:rPr lang="en-US" dirty="0" smtClean="0"/>
-              <a:t>RECURSIVE_TRIGGERS OFF/ON</a:t>
-            </a:r>
+              <a:t> </a:t>
+            </a:r>
+          </a:p>
+          <a:p>
+            <a:endParaRPr lang="en-US" dirty="0" smtClean="0"/>
           </a:p>
           <a:p>
             <a:r>
               <a:rPr lang="en-US" dirty="0" smtClean="0"/>
-              <a:t>Triggers execute even if table contents doesn’t change</a:t>
-            </a:r>
-          </a:p>
-          <a:p>
+              <a:t>Expand/Contract pattern: </a:t>
+            </a:r>
+            <a:r>
+              <a:rPr lang="en-US" dirty="0">
+                <a:hlinkClick r:id="rId3"/>
+              </a:rPr>
+              <a:t>http://</a:t>
+            </a:r>
+            <a:r>
+              <a:rPr lang="en-US" dirty="0" smtClean="0">
+                <a:hlinkClick r:id="rId3"/>
+              </a:rPr>
+              <a:t>martinfowler.com/bliki/ParallelChange.html</a:t>
+            </a:r>
             <a:r>
               <a:rPr lang="en-US" dirty="0" smtClean="0"/>
-              <a:t>Testing is painful, especially setup, so…</a:t>
-            </a:r>
+              <a:t> </a:t>
+            </a:r>
+          </a:p>
+          <a:p>
+            <a:endParaRPr lang="en-US" dirty="0" smtClean="0"/>
           </a:p>
           <a:p>
             <a:r>
               <a:rPr lang="en-US" dirty="0" smtClean="0"/>
-              <a:t>Have a test script</a:t>
-            </a:r>
+              <a:t>Refactoring </a:t>
+            </a:r>
+            <a:r>
+              <a:rPr lang="en-US" dirty="0"/>
+              <a:t>Databases book</a:t>
+            </a:r>
+          </a:p>
+          <a:p>
+            <a:pPr marL="0" indent="0">
+              <a:buNone/>
+            </a:pPr>
+            <a:endParaRPr lang="en-US" dirty="0"/>
           </a:p>
           <a:p>
             <a:endParaRPr lang="en-US" dirty="0"/>
@@ -5896,7 +5939,7 @@
     </p:spTree>
     <p:extLst>
       <p:ext uri="{BB962C8B-B14F-4D97-AF65-F5344CB8AC3E}">
-        <p14:creationId xmlns:p14="http://schemas.microsoft.com/office/powerpoint/2010/main" val="3523844589"/>
+        <p14:creationId xmlns:p14="http://schemas.microsoft.com/office/powerpoint/2010/main" val="2258765297"/>
       </p:ext>
     </p:extLst>
   </p:cSld>
@@ -5947,157 +5990,6 @@
           <a:p>
             <a:r>
               <a:rPr lang="en-US" dirty="0" smtClean="0"/>
-              <a:t>References</a:t>
-            </a:r>
-            <a:endParaRPr lang="en-US" dirty="0"/>
-          </a:p>
-        </p:txBody>
-      </p:sp>
-      <p:sp>
-        <p:nvSpPr>
-          <p:cNvPr id="3" name="Content Placeholder 2"/>
-          <p:cNvSpPr>
-            <a:spLocks noGrp="1"/>
-          </p:cNvSpPr>
-          <p:nvPr>
-            <p:ph idx="1"/>
-          </p:nvPr>
-        </p:nvSpPr>
-        <p:spPr/>
-        <p:txBody>
-          <a:bodyPr>
-            <a:normAutofit/>
-          </a:bodyPr>
-          <a:lstStyle/>
-          <a:p>
-            <a:r>
-              <a:rPr lang="en-US" dirty="0" smtClean="0"/>
-              <a:t>Evolutionary </a:t>
-            </a:r>
-            <a:r>
-              <a:rPr lang="en-US" dirty="0"/>
-              <a:t>Database Design: </a:t>
-            </a:r>
-            <a:r>
-              <a:rPr lang="en-US" dirty="0">
-                <a:hlinkClick r:id="rId2"/>
-              </a:rPr>
-              <a:t>http://</a:t>
-            </a:r>
-            <a:r>
-              <a:rPr lang="en-US" dirty="0" smtClean="0">
-                <a:hlinkClick r:id="rId2"/>
-              </a:rPr>
-              <a:t>martinfowler.com/articles/evodb.html</a:t>
-            </a:r>
-            <a:r>
-              <a:rPr lang="en-US" dirty="0" smtClean="0"/>
-              <a:t> </a:t>
-            </a:r>
-          </a:p>
-          <a:p>
-            <a:endParaRPr lang="en-US" dirty="0" smtClean="0"/>
-          </a:p>
-          <a:p>
-            <a:r>
-              <a:rPr lang="en-US" dirty="0" smtClean="0"/>
-              <a:t>Expand/Contract pattern: </a:t>
-            </a:r>
-            <a:r>
-              <a:rPr lang="en-US" dirty="0">
-                <a:hlinkClick r:id="rId3"/>
-              </a:rPr>
-              <a:t>http://</a:t>
-            </a:r>
-            <a:r>
-              <a:rPr lang="en-US" dirty="0" smtClean="0">
-                <a:hlinkClick r:id="rId3"/>
-              </a:rPr>
-              <a:t>martinfowler.com/bliki/ParallelChange.html</a:t>
-            </a:r>
-            <a:r>
-              <a:rPr lang="en-US" dirty="0" smtClean="0"/>
-              <a:t> </a:t>
-            </a:r>
-          </a:p>
-          <a:p>
-            <a:endParaRPr lang="en-US" dirty="0" smtClean="0"/>
-          </a:p>
-          <a:p>
-            <a:r>
-              <a:rPr lang="en-US" dirty="0" smtClean="0"/>
-              <a:t>Refactoring </a:t>
-            </a:r>
-            <a:r>
-              <a:rPr lang="en-US" dirty="0"/>
-              <a:t>Databases book</a:t>
-            </a:r>
-          </a:p>
-          <a:p>
-            <a:pPr marL="0" indent="0">
-              <a:buNone/>
-            </a:pPr>
-            <a:endParaRPr lang="en-US" dirty="0"/>
-          </a:p>
-          <a:p>
-            <a:endParaRPr lang="en-US" dirty="0"/>
-          </a:p>
-        </p:txBody>
-      </p:sp>
-    </p:spTree>
-    <p:extLst>
-      <p:ext uri="{BB962C8B-B14F-4D97-AF65-F5344CB8AC3E}">
-        <p14:creationId xmlns:p14="http://schemas.microsoft.com/office/powerpoint/2010/main" val="2258765297"/>
-      </p:ext>
-    </p:extLst>
-  </p:cSld>
-  <p:clrMapOvr>
-    <a:masterClrMapping/>
-  </p:clrMapOvr>
-  <p:timing>
-    <p:tnLst>
-      <p:par>
-        <p:cTn id="1" dur="indefinite" restart="never" nodeType="tmRoot"/>
-      </p:par>
-    </p:tnLst>
-  </p:timing>
-</p:sld>
-</file>
-
-<file path=ppt/slides/slide12.xml><?xml version="1.0" encoding="utf-8"?>
-<p:sld xmlns:a="http://schemas.openxmlformats.org/drawingml/2006/main" xmlns:r="http://schemas.openxmlformats.org/officeDocument/2006/relationships" xmlns:p="http://schemas.openxmlformats.org/presentationml/2006/main">
-  <p:cSld>
-    <p:spTree>
-      <p:nvGrpSpPr>
-        <p:cNvPr id="1" name=""/>
-        <p:cNvGrpSpPr/>
-        <p:nvPr/>
-      </p:nvGrpSpPr>
-      <p:grpSpPr>
-        <a:xfrm>
-          <a:off x="0" y="0"/>
-          <a:ext cx="0" cy="0"/>
-          <a:chOff x="0" y="0"/>
-          <a:chExt cx="0" cy="0"/>
-        </a:xfrm>
-      </p:grpSpPr>
-      <p:sp>
-        <p:nvSpPr>
-          <p:cNvPr id="2" name="Title 1"/>
-          <p:cNvSpPr>
-            <a:spLocks noGrp="1"/>
-          </p:cNvSpPr>
-          <p:nvPr>
-            <p:ph type="title"/>
-          </p:nvPr>
-        </p:nvSpPr>
-        <p:spPr/>
-        <p:txBody>
-          <a:bodyPr/>
-          <a:lstStyle/>
-          <a:p>
-            <a:r>
-              <a:rPr lang="en-US" dirty="0" smtClean="0"/>
               <a:t>Questions?</a:t>
             </a:r>
             <a:endParaRPr lang="en-US" dirty="0"/>
@@ -6153,151 +6045,6 @@
 </file>
 
 <file path=ppt/slides/slide2.xml><?xml version="1.0" encoding="utf-8"?>
-<p:sld xmlns:a="http://schemas.openxmlformats.org/drawingml/2006/main" xmlns:r="http://schemas.openxmlformats.org/officeDocument/2006/relationships" xmlns:p="http://schemas.openxmlformats.org/presentationml/2006/main">
-  <p:cSld>
-    <p:spTree>
-      <p:nvGrpSpPr>
-        <p:cNvPr id="1" name=""/>
-        <p:cNvGrpSpPr/>
-        <p:nvPr/>
-      </p:nvGrpSpPr>
-      <p:grpSpPr>
-        <a:xfrm>
-          <a:off x="0" y="0"/>
-          <a:ext cx="0" cy="0"/>
-          <a:chOff x="0" y="0"/>
-          <a:chExt cx="0" cy="0"/>
-        </a:xfrm>
-      </p:grpSpPr>
-      <p:sp>
-        <p:nvSpPr>
-          <p:cNvPr id="2" name="Title 1"/>
-          <p:cNvSpPr>
-            <a:spLocks noGrp="1"/>
-          </p:cNvSpPr>
-          <p:nvPr>
-            <p:ph type="title"/>
-          </p:nvPr>
-        </p:nvSpPr>
-        <p:spPr/>
-        <p:txBody>
-          <a:bodyPr/>
-          <a:lstStyle/>
-          <a:p>
-            <a:r>
-              <a:rPr lang="en-US" dirty="0" smtClean="0"/>
-              <a:t>Who am I?</a:t>
-            </a:r>
-            <a:endParaRPr lang="en-US" dirty="0"/>
-          </a:p>
-        </p:txBody>
-      </p:sp>
-      <p:sp>
-        <p:nvSpPr>
-          <p:cNvPr id="3" name="Content Placeholder 2"/>
-          <p:cNvSpPr>
-            <a:spLocks noGrp="1"/>
-          </p:cNvSpPr>
-          <p:nvPr>
-            <p:ph idx="1"/>
-          </p:nvPr>
-        </p:nvSpPr>
-        <p:spPr/>
-        <p:txBody>
-          <a:bodyPr/>
-          <a:lstStyle/>
-          <a:p>
-            <a:r>
-              <a:rPr lang="en-US" dirty="0" smtClean="0"/>
-              <a:t>Rob Vatz</a:t>
-            </a:r>
-          </a:p>
-          <a:p>
-            <a:r>
-              <a:rPr lang="en-US" dirty="0" smtClean="0"/>
-              <a:t>Email: </a:t>
-            </a:r>
-            <a:r>
-              <a:rPr lang="en-US" dirty="0" smtClean="0">
-                <a:hlinkClick r:id="rId2"/>
-              </a:rPr>
-              <a:t>rob.vatz@sceneralabs.com</a:t>
-            </a:r>
-            <a:endParaRPr lang="en-US" dirty="0" smtClean="0"/>
-          </a:p>
-          <a:p>
-            <a:r>
-              <a:rPr lang="en-US" dirty="0" smtClean="0"/>
-              <a:t>Twitter @</a:t>
-            </a:r>
-            <a:r>
-              <a:rPr lang="en-US" dirty="0" err="1" smtClean="0"/>
-              <a:t>robvatz</a:t>
-            </a:r>
-            <a:endParaRPr lang="en-US" dirty="0" smtClean="0"/>
-          </a:p>
-          <a:p>
-            <a:r>
-              <a:rPr lang="en-US" dirty="0" smtClean="0"/>
-              <a:t>Hobbies: Hammered Dulcimer, Aikido</a:t>
-            </a:r>
-          </a:p>
-          <a:p>
-            <a:endParaRPr lang="en-US" dirty="0" smtClean="0"/>
-          </a:p>
-        </p:txBody>
-      </p:sp>
-      <p:pic>
-        <p:nvPicPr>
-          <p:cNvPr id="4" name="Picture 3"/>
-          <p:cNvPicPr>
-            <a:picLocks noChangeAspect="1"/>
-          </p:cNvPicPr>
-          <p:nvPr/>
-        </p:nvPicPr>
-        <p:blipFill>
-          <a:blip r:embed="rId3">
-            <a:extLst>
-              <a:ext uri="{28A0092B-C50C-407E-A947-70E740481C1C}">
-                <a14:useLocalDpi xmlns:a14="http://schemas.microsoft.com/office/drawing/2010/main" val="0"/>
-              </a:ext>
-            </a:extLst>
-          </a:blip>
-          <a:stretch>
-            <a:fillRect/>
-          </a:stretch>
-        </p:blipFill>
-        <p:spPr>
-          <a:xfrm>
-            <a:off x="3617585" y="4278350"/>
-            <a:ext cx="2381582" cy="1790950"/>
-          </a:xfrm>
-          <a:prstGeom prst="rect">
-            <a:avLst/>
-          </a:prstGeom>
-        </p:spPr>
-      </p:pic>
-    </p:spTree>
-    <p:extLst>
-      <p:ext uri="{BB962C8B-B14F-4D97-AF65-F5344CB8AC3E}">
-        <p14:creationId xmlns:p14="http://schemas.microsoft.com/office/powerpoint/2010/main" val="1762188595"/>
-      </p:ext>
-    </p:extLst>
-  </p:cSld>
-  <p:clrMapOvr>
-    <a:masterClrMapping/>
-  </p:clrMapOvr>
-  <p:timing>
-    <p:tnLst>
-      <p:par>
-        <p:cTn id="1" dur="indefinite" restart="never" nodeType="tmRoot"/>
-      </p:par>
-    </p:tnLst>
-  </p:timing>
-</p:sld>
-</file>
-
-<file path=ppt/slides/slide3.xml><?xml version="1.0" encoding="utf-8"?>
 <p:sld xmlns:a="http://schemas.openxmlformats.org/drawingml/2006/main" xmlns:r="http://schemas.openxmlformats.org/officeDocument/2006/relationships" xmlns:p="http://schemas.openxmlformats.org/presentationml/2006/main">
   <p:cSld>
     <p:spTree>
@@ -6393,6 +6140,112 @@
 </p:sld>
 </file>
 
+<file path=ppt/slides/slide3.xml><?xml version="1.0" encoding="utf-8"?>
+<p:sld xmlns:a="http://schemas.openxmlformats.org/drawingml/2006/main" xmlns:r="http://schemas.openxmlformats.org/officeDocument/2006/relationships" xmlns:p="http://schemas.openxmlformats.org/presentationml/2006/main">
+  <p:cSld>
+    <p:spTree>
+      <p:nvGrpSpPr>
+        <p:cNvPr id="1" name=""/>
+        <p:cNvGrpSpPr/>
+        <p:nvPr/>
+      </p:nvGrpSpPr>
+      <p:grpSpPr>
+        <a:xfrm>
+          <a:off x="0" y="0"/>
+          <a:ext cx="0" cy="0"/>
+          <a:chOff x="0" y="0"/>
+          <a:chExt cx="0" cy="0"/>
+        </a:xfrm>
+      </p:grpSpPr>
+      <p:sp>
+        <p:nvSpPr>
+          <p:cNvPr id="2" name="Title 1"/>
+          <p:cNvSpPr>
+            <a:spLocks noGrp="1"/>
+          </p:cNvSpPr>
+          <p:nvPr>
+            <p:ph type="title"/>
+          </p:nvPr>
+        </p:nvSpPr>
+        <p:spPr/>
+        <p:txBody>
+          <a:bodyPr/>
+          <a:lstStyle/>
+          <a:p>
+            <a:r>
+              <a:rPr lang="en-US" dirty="0" smtClean="0"/>
+              <a:t>Triggers: what and why</a:t>
+            </a:r>
+            <a:endParaRPr lang="en-US" dirty="0"/>
+          </a:p>
+        </p:txBody>
+      </p:sp>
+      <p:sp>
+        <p:nvSpPr>
+          <p:cNvPr id="3" name="Content Placeholder 2"/>
+          <p:cNvSpPr>
+            <a:spLocks noGrp="1"/>
+          </p:cNvSpPr>
+          <p:nvPr>
+            <p:ph idx="1"/>
+          </p:nvPr>
+        </p:nvSpPr>
+        <p:spPr/>
+        <p:txBody>
+          <a:bodyPr/>
+          <a:lstStyle/>
+          <a:p>
+            <a:r>
+              <a:rPr lang="en-US" dirty="0" smtClean="0"/>
+              <a:t>Triggers are stored procedures that run after or instead of DML or DDL.</a:t>
+            </a:r>
+          </a:p>
+          <a:p>
+            <a:r>
+              <a:rPr lang="en-US" dirty="0" smtClean="0"/>
+              <a:t>Why? Refactoring databases, updatable views</a:t>
+            </a:r>
+            <a:r>
+              <a:rPr lang="en-US" dirty="0"/>
+              <a:t>.</a:t>
+            </a:r>
+            <a:endParaRPr lang="en-US" dirty="0" smtClean="0"/>
+          </a:p>
+          <a:p>
+            <a:r>
+              <a:rPr lang="en-US" dirty="0"/>
+              <a:t>Why not? Hidden performance problems</a:t>
+            </a:r>
+            <a:endParaRPr lang="en-US" dirty="0" smtClean="0"/>
+          </a:p>
+          <a:p>
+            <a:pPr marL="0" indent="0">
+              <a:buNone/>
+            </a:pPr>
+            <a:endParaRPr lang="en-US" dirty="0"/>
+          </a:p>
+        </p:txBody>
+      </p:sp>
+    </p:spTree>
+    <p:extLst>
+      <p:ext uri="{BB962C8B-B14F-4D97-AF65-F5344CB8AC3E}">
+        <p14:creationId xmlns:p14="http://schemas.microsoft.com/office/powerpoint/2010/main" val="530568018"/>
+      </p:ext>
+    </p:extLst>
+  </p:cSld>
+  <p:clrMapOvr>
+    <a:masterClrMapping/>
+  </p:clrMapOvr>
+  <p:timing>
+    <p:tnLst>
+      <p:par>
+        <p:cTn id="1" dur="indefinite" restart="never" nodeType="tmRoot"/>
+      </p:par>
+    </p:tnLst>
+  </p:timing>
+</p:sld>
+</file>
+
 <file path=ppt/slides/slide4.xml><?xml version="1.0" encoding="utf-8"?>
 <p:sld xmlns:a="http://schemas.openxmlformats.org/drawingml/2006/main" xmlns:r="http://schemas.openxmlformats.org/officeDocument/2006/relationships" xmlns:p="http://schemas.openxmlformats.org/presentationml/2006/main">
   <p:cSld>
@@ -6427,7 +6280,7 @@
           <a:p>
             <a:r>
               <a:rPr lang="en-US" dirty="0" smtClean="0"/>
-              <a:t>Triggers: what and why</a:t>
+              <a:t>Refactoring Database</a:t>
             </a:r>
             <a:endParaRPr lang="en-US" dirty="0"/>
           </a:p>
@@ -6450,31 +6303,37 @@
           <a:p>
             <a:r>
               <a:rPr lang="en-US" dirty="0" smtClean="0"/>
-              <a:t>Triggers are stored procedures that run after or instead of DML or DDL.</a:t>
+              <a:t>Expand</a:t>
             </a:r>
           </a:p>
           <a:p>
             <a:r>
               <a:rPr lang="en-US" dirty="0" smtClean="0"/>
-              <a:t>Why? Refactoring databases, updatable views</a:t>
-            </a:r>
-            <a:r>
-              <a:rPr lang="en-US" dirty="0"/>
-              <a:t>.</a:t>
-            </a:r>
-            <a:endParaRPr lang="en-US" dirty="0" smtClean="0"/>
-          </a:p>
-          <a:p>
-            <a:r>
-              <a:rPr lang="en-US" dirty="0"/>
-              <a:t>Why not? Hidden performance problems</a:t>
-            </a:r>
-            <a:endParaRPr lang="en-US" dirty="0" smtClean="0"/>
-          </a:p>
-          <a:p>
-            <a:pPr marL="0" indent="0">
-              <a:buNone/>
-            </a:pPr>
+              <a:t>Convert/copy data and add triggers</a:t>
+            </a:r>
+          </a:p>
+          <a:p>
+            <a:r>
+              <a:rPr lang="en-US" dirty="0" smtClean="0"/>
+              <a:t>Migrate</a:t>
+            </a:r>
+          </a:p>
+          <a:p>
+            <a:r>
+              <a:rPr lang="en-US" dirty="0" smtClean="0"/>
+              <a:t>Remove triggers</a:t>
+            </a:r>
+          </a:p>
+          <a:p>
+            <a:r>
+              <a:rPr lang="en-US" dirty="0" smtClean="0"/>
+              <a:t>Contract</a:t>
+            </a:r>
+          </a:p>
+          <a:p>
+            <a:endParaRPr lang="en-US"/>
+          </a:p>
+          <a:p>
             <a:endParaRPr lang="en-US" dirty="0"/>
           </a:p>
         </p:txBody>
@@ -6482,7 +6341,7 @@
     </p:spTree>
     <p:extLst>
       <p:ext uri="{BB962C8B-B14F-4D97-AF65-F5344CB8AC3E}">
-        <p14:creationId xmlns:p14="http://schemas.microsoft.com/office/powerpoint/2010/main" val="530568018"/>
+        <p14:creationId xmlns:p14="http://schemas.microsoft.com/office/powerpoint/2010/main" val="1522652689"/>
       </p:ext>
     </p:extLst>
   </p:cSld>
@@ -6533,7 +6392,7 @@
           <a:p>
             <a:r>
               <a:rPr lang="en-US" dirty="0" smtClean="0"/>
-              <a:t>Refactoring Database</a:t>
+              <a:t>Expand</a:t>
             </a:r>
             <a:endParaRPr lang="en-US" dirty="0"/>
           </a:p>
@@ -6556,37 +6415,32 @@
           <a:p>
             <a:r>
               <a:rPr lang="en-US" dirty="0" smtClean="0"/>
-              <a:t>Expand</a:t>
+              <a:t>Add tables</a:t>
             </a:r>
           </a:p>
           <a:p>
             <a:r>
               <a:rPr lang="en-US" dirty="0" smtClean="0"/>
-              <a:t>Convert/copy data and add triggers</a:t>
+              <a:t>Add columns</a:t>
             </a:r>
           </a:p>
           <a:p>
             <a:r>
               <a:rPr lang="en-US" dirty="0" smtClean="0"/>
-              <a:t>Migrate</a:t>
+              <a:t>Add DEFAULT constraints</a:t>
             </a:r>
           </a:p>
           <a:p>
             <a:r>
               <a:rPr lang="en-US" dirty="0" smtClean="0"/>
-              <a:t>Remove triggers</a:t>
+              <a:t>Remove UNIQUE, FOREIGN KEY, PRIMARY KEY constraints</a:t>
             </a:r>
           </a:p>
           <a:p>
             <a:r>
               <a:rPr lang="en-US" dirty="0" smtClean="0"/>
-              <a:t>Contract</a:t>
-            </a:r>
-          </a:p>
-          <a:p>
-            <a:endParaRPr lang="en-US"/>
-          </a:p>
-          <a:p>
+              <a:t>Remove CHECK constraints</a:t>
+            </a:r>
             <a:endParaRPr lang="en-US" dirty="0"/>
           </a:p>
         </p:txBody>
@@ -6594,7 +6448,7 @@
     </p:spTree>
     <p:extLst>
       <p:ext uri="{BB962C8B-B14F-4D97-AF65-F5344CB8AC3E}">
-        <p14:creationId xmlns:p14="http://schemas.microsoft.com/office/powerpoint/2010/main" val="1522652689"/>
+        <p14:creationId xmlns:p14="http://schemas.microsoft.com/office/powerpoint/2010/main" val="3997596963"/>
       </p:ext>
     </p:extLst>
   </p:cSld>
@@ -6645,7 +6499,7 @@
           <a:p>
             <a:r>
               <a:rPr lang="en-US" dirty="0" smtClean="0"/>
-              <a:t>Expand</a:t>
+              <a:t>Migrate</a:t>
             </a:r>
             <a:endParaRPr lang="en-US" dirty="0"/>
           </a:p>
@@ -6668,31 +6522,13 @@
           <a:p>
             <a:r>
               <a:rPr lang="en-US" dirty="0" smtClean="0"/>
-              <a:t>Add tables</a:t>
+              <a:t>Change stored procedures and functions to use new version</a:t>
             </a:r>
           </a:p>
           <a:p>
             <a:r>
               <a:rPr lang="en-US" dirty="0" smtClean="0"/>
-              <a:t>Add columns</a:t>
-            </a:r>
-          </a:p>
-          <a:p>
-            <a:r>
-              <a:rPr lang="en-US" dirty="0" smtClean="0"/>
-              <a:t>Add DEFAULT constraints</a:t>
-            </a:r>
-          </a:p>
-          <a:p>
-            <a:r>
-              <a:rPr lang="en-US" dirty="0" smtClean="0"/>
-              <a:t>Remove UNIQUE, FOREIGN KEY, PRIMARY KEY constraints</a:t>
-            </a:r>
-          </a:p>
-          <a:p>
-            <a:r>
-              <a:rPr lang="en-US" dirty="0" smtClean="0"/>
-              <a:t>Remove CHECK constraints</a:t>
+              <a:t>Developers change code to use new version</a:t>
             </a:r>
             <a:endParaRPr lang="en-US" dirty="0"/>
           </a:p>
@@ -6701,7 +6537,7 @@
     </p:spTree>
     <p:extLst>
       <p:ext uri="{BB962C8B-B14F-4D97-AF65-F5344CB8AC3E}">
-        <p14:creationId xmlns:p14="http://schemas.microsoft.com/office/powerpoint/2010/main" val="3997596963"/>
+        <p14:creationId xmlns:p14="http://schemas.microsoft.com/office/powerpoint/2010/main" val="4089960077"/>
       </p:ext>
     </p:extLst>
   </p:cSld>
@@ -6752,7 +6588,7 @@
           <a:p>
             <a:r>
               <a:rPr lang="en-US" dirty="0" smtClean="0"/>
-              <a:t>Migrate</a:t>
+              <a:t>Contract</a:t>
             </a:r>
             <a:endParaRPr lang="en-US" dirty="0"/>
           </a:p>
@@ -6775,13 +6611,37 @@
           <a:p>
             <a:r>
               <a:rPr lang="en-US" dirty="0" smtClean="0"/>
-              <a:t>Change stored procedures and functions to use new version</a:t>
+              <a:t>Remove tables</a:t>
             </a:r>
           </a:p>
           <a:p>
             <a:r>
               <a:rPr lang="en-US" dirty="0" smtClean="0"/>
-              <a:t>Developers change code to use new version</a:t>
+              <a:t>Remove columns</a:t>
+            </a:r>
+          </a:p>
+          <a:p>
+            <a:r>
+              <a:rPr lang="en-US" dirty="0" smtClean="0"/>
+              <a:t>Remove stored procedures, functions</a:t>
+            </a:r>
+          </a:p>
+          <a:p>
+            <a:r>
+              <a:rPr lang="en-US" dirty="0" smtClean="0"/>
+              <a:t>Remove DEFAULT constraints</a:t>
+            </a:r>
+          </a:p>
+          <a:p>
+            <a:r>
+              <a:rPr lang="en-US" dirty="0" smtClean="0"/>
+              <a:t>Add UNIQUE, FOREIGN KEY, PRIMARY KEY constraints</a:t>
+            </a:r>
+          </a:p>
+          <a:p>
+            <a:r>
+              <a:rPr lang="en-US" dirty="0" smtClean="0"/>
+              <a:t>Add CHECK constraints</a:t>
             </a:r>
             <a:endParaRPr lang="en-US" dirty="0"/>
           </a:p>
@@ -6790,7 +6650,7 @@
     </p:spTree>
     <p:extLst>
       <p:ext uri="{BB962C8B-B14F-4D97-AF65-F5344CB8AC3E}">
-        <p14:creationId xmlns:p14="http://schemas.microsoft.com/office/powerpoint/2010/main" val="4089960077"/>
+        <p14:creationId xmlns:p14="http://schemas.microsoft.com/office/powerpoint/2010/main" val="144908857"/>
       </p:ext>
     </p:extLst>
   </p:cSld>
@@ -6841,7 +6701,7 @@
           <a:p>
             <a:r>
               <a:rPr lang="en-US" dirty="0" smtClean="0"/>
-              <a:t>Contract</a:t>
+              <a:t>Demo</a:t>
             </a:r>
             <a:endParaRPr lang="en-US" dirty="0"/>
           </a:p>
@@ -6862,40 +6722,6 @@
           <a:bodyPr/>
           <a:lstStyle/>
           <a:p>
-            <a:r>
-              <a:rPr lang="en-US" dirty="0" smtClean="0"/>
-              <a:t>Remove tables</a:t>
-            </a:r>
-          </a:p>
-          <a:p>
-            <a:r>
-              <a:rPr lang="en-US" dirty="0" smtClean="0"/>
-              <a:t>Remove columns</a:t>
-            </a:r>
-          </a:p>
-          <a:p>
-            <a:r>
-              <a:rPr lang="en-US" dirty="0" smtClean="0"/>
-              <a:t>Remove stored procedures, functions</a:t>
-            </a:r>
-          </a:p>
-          <a:p>
-            <a:r>
-              <a:rPr lang="en-US" dirty="0" smtClean="0"/>
-              <a:t>Remove DEFAULT constraints</a:t>
-            </a:r>
-          </a:p>
-          <a:p>
-            <a:r>
-              <a:rPr lang="en-US" dirty="0" smtClean="0"/>
-              <a:t>Add UNIQUE, FOREIGN KEY, PRIMARY KEY constraints</a:t>
-            </a:r>
-          </a:p>
-          <a:p>
-            <a:r>
-              <a:rPr lang="en-US" dirty="0" smtClean="0"/>
-              <a:t>Add CHECK constraints</a:t>
-            </a:r>
             <a:endParaRPr lang="en-US" dirty="0"/>
           </a:p>
         </p:txBody>
@@ -6903,7 +6729,7 @@
     </p:spTree>
     <p:extLst>
       <p:ext uri="{BB962C8B-B14F-4D97-AF65-F5344CB8AC3E}">
-        <p14:creationId xmlns:p14="http://schemas.microsoft.com/office/powerpoint/2010/main" val="144908857"/>
+        <p14:creationId xmlns:p14="http://schemas.microsoft.com/office/powerpoint/2010/main" val="609649797"/>
       </p:ext>
     </p:extLst>
   </p:cSld>
@@ -6954,7 +6780,7 @@
           <a:p>
             <a:r>
               <a:rPr lang="en-US" dirty="0" smtClean="0"/>
-              <a:t>Demo</a:t>
+              <a:t>Lessons Learned</a:t>
             </a:r>
             <a:endParaRPr lang="en-US" dirty="0"/>
           </a:p>
@@ -6974,6 +6800,34 @@
         <p:txBody>
           <a:bodyPr/>
           <a:lstStyle/>
+          <a:p>
+            <a:r>
+              <a:rPr lang="en-US" dirty="0"/>
+              <a:t>SET </a:t>
+            </a:r>
+            <a:r>
+              <a:rPr lang="en-US" dirty="0" smtClean="0"/>
+              <a:t>RECURSIVE_TRIGGERS OFF/ON</a:t>
+            </a:r>
+          </a:p>
+          <a:p>
+            <a:r>
+              <a:rPr lang="en-US" dirty="0" smtClean="0"/>
+              <a:t>Triggers execute even if table contents doesn’t change</a:t>
+            </a:r>
+          </a:p>
+          <a:p>
+            <a:r>
+              <a:rPr lang="en-US" dirty="0" smtClean="0"/>
+              <a:t>Testing is painful, especially setup, so…</a:t>
+            </a:r>
+          </a:p>
+          <a:p>
+            <a:r>
+              <a:rPr lang="en-US" dirty="0" smtClean="0"/>
+              <a:t>Have a test script</a:t>
+            </a:r>
+          </a:p>
           <a:p>
             <a:endParaRPr lang="en-US" dirty="0"/>
           </a:p>
@@ -6982,7 +6836,7 @@
     </p:spTree>
     <p:extLst>
       <p:ext uri="{BB962C8B-B14F-4D97-AF65-F5344CB8AC3E}">
-        <p14:creationId xmlns:p14="http://schemas.microsoft.com/office/powerpoint/2010/main" val="609649797"/>
+        <p14:creationId xmlns:p14="http://schemas.microsoft.com/office/powerpoint/2010/main" val="3523844589"/>
       </p:ext>
     </p:extLst>
   </p:cSld>

</xml_diff>

<commit_message>
Fixed bugs found during first run-through
Did a dry run through the entire presentation and found several flaws:
* Need to add a DEFAULT contraint during expansion
* Steps were misnumbered
* Deleted the feature flag stuff - it's not relevant
* Merged slides in powerpoint presentation to simplify (and reduce time). For example, I eliminated the "Who am I?" slide as unnecessary and merged the what and why for triggers - I assume people at the meeting know what a trigger is.
* Rebuilt Slides.docx from the original Powerpoint file
</commit_message>
<xml_diff>
--- a/Triggers & Refactoring.pptx
+++ b/Triggers & Refactoring.pptx
@@ -4,18 +4,21 @@
   <p:sldMasterIdLst>
     <p:sldMasterId id="2147483648" r:id="rId1"/>
   </p:sldMasterIdLst>
+  <p:notesMasterIdLst>
+    <p:notesMasterId r:id="rId13"/>
+  </p:notesMasterIdLst>
   <p:sldIdLst>
-    <p:sldId id="256" r:id="rId2"/>
+    <p:sldId id="269" r:id="rId2"/>
     <p:sldId id="268" r:id="rId3"/>
-    <p:sldId id="258" r:id="rId4"/>
-    <p:sldId id="264" r:id="rId5"/>
-    <p:sldId id="265" r:id="rId6"/>
-    <p:sldId id="267" r:id="rId7"/>
-    <p:sldId id="266" r:id="rId8"/>
-    <p:sldId id="260" r:id="rId9"/>
-    <p:sldId id="261" r:id="rId10"/>
-    <p:sldId id="262" r:id="rId11"/>
-    <p:sldId id="263" r:id="rId12"/>
+    <p:sldId id="264" r:id="rId4"/>
+    <p:sldId id="265" r:id="rId5"/>
+    <p:sldId id="267" r:id="rId6"/>
+    <p:sldId id="266" r:id="rId7"/>
+    <p:sldId id="260" r:id="rId8"/>
+    <p:sldId id="261" r:id="rId9"/>
+    <p:sldId id="262" r:id="rId10"/>
+    <p:sldId id="263" r:id="rId11"/>
+    <p:sldId id="270" r:id="rId12"/>
   </p:sldIdLst>
   <p:sldSz cx="12192000" cy="6858000"/>
   <p:notesSz cx="6858000" cy="9144000"/>
@@ -122,6 +125,1472 @@
 </p:presentation>
 </file>
 
+<file path=ppt/notesMasters/notesMaster1.xml><?xml version="1.0" encoding="utf-8"?>
+<p:notesMaster xmlns:a="http://schemas.openxmlformats.org/drawingml/2006/main" xmlns:r="http://schemas.openxmlformats.org/officeDocument/2006/relationships" xmlns:p="http://schemas.openxmlformats.org/presentationml/2006/main">
+  <p:cSld>
+    <p:bg>
+      <p:bgRef idx="1001">
+        <a:schemeClr val="bg1"/>
+      </p:bgRef>
+    </p:bg>
+    <p:spTree>
+      <p:nvGrpSpPr>
+        <p:cNvPr id="1" name=""/>
+        <p:cNvGrpSpPr/>
+        <p:nvPr/>
+      </p:nvGrpSpPr>
+      <p:grpSpPr>
+        <a:xfrm>
+          <a:off x="0" y="0"/>
+          <a:ext cx="0" cy="0"/>
+          <a:chOff x="0" y="0"/>
+          <a:chExt cx="0" cy="0"/>
+        </a:xfrm>
+      </p:grpSpPr>
+      <p:sp>
+        <p:nvSpPr>
+          <p:cNvPr id="2" name="Header Placeholder 1"/>
+          <p:cNvSpPr>
+            <a:spLocks noGrp="1"/>
+          </p:cNvSpPr>
+          <p:nvPr>
+            <p:ph type="hdr" sz="quarter"/>
+          </p:nvPr>
+        </p:nvSpPr>
+        <p:spPr>
+          <a:xfrm>
+            <a:off x="0" y="0"/>
+            <a:ext cx="2971800" cy="458788"/>
+          </a:xfrm>
+          <a:prstGeom prst="rect">
+            <a:avLst/>
+          </a:prstGeom>
+        </p:spPr>
+        <p:txBody>
+          <a:bodyPr vert="horz" lIns="91440" tIns="45720" rIns="91440" bIns="45720" rtlCol="0"/>
+          <a:lstStyle>
+            <a:lvl1pPr algn="l">
+              <a:defRPr sz="1200"/>
+            </a:lvl1pPr>
+          </a:lstStyle>
+          <a:p>
+            <a:endParaRPr lang="en-US"/>
+          </a:p>
+        </p:txBody>
+      </p:sp>
+      <p:sp>
+        <p:nvSpPr>
+          <p:cNvPr id="3" name="Date Placeholder 2"/>
+          <p:cNvSpPr>
+            <a:spLocks noGrp="1"/>
+          </p:cNvSpPr>
+          <p:nvPr>
+            <p:ph type="dt" idx="1"/>
+          </p:nvPr>
+        </p:nvSpPr>
+        <p:spPr>
+          <a:xfrm>
+            <a:off x="3884613" y="0"/>
+            <a:ext cx="2971800" cy="458788"/>
+          </a:xfrm>
+          <a:prstGeom prst="rect">
+            <a:avLst/>
+          </a:prstGeom>
+        </p:spPr>
+        <p:txBody>
+          <a:bodyPr vert="horz" lIns="91440" tIns="45720" rIns="91440" bIns="45720" rtlCol="0"/>
+          <a:lstStyle>
+            <a:lvl1pPr algn="r">
+              <a:defRPr sz="1200"/>
+            </a:lvl1pPr>
+          </a:lstStyle>
+          <a:p>
+            <a:fld id="{64842430-D212-4A2D-9268-FB7D9B780FC0}" type="datetimeFigureOut">
+              <a:rPr lang="en-US" smtClean="0"/>
+              <a:t>2/22/2016</a:t>
+            </a:fld>
+            <a:endParaRPr lang="en-US"/>
+          </a:p>
+        </p:txBody>
+      </p:sp>
+      <p:sp>
+        <p:nvSpPr>
+          <p:cNvPr id="4" name="Slide Image Placeholder 3"/>
+          <p:cNvSpPr>
+            <a:spLocks noGrp="1" noRot="1" noChangeAspect="1"/>
+          </p:cNvSpPr>
+          <p:nvPr>
+            <p:ph type="sldImg" idx="2"/>
+          </p:nvPr>
+        </p:nvSpPr>
+        <p:spPr>
+          <a:xfrm>
+            <a:off x="685800" y="1143000"/>
+            <a:ext cx="5486400" cy="3086100"/>
+          </a:xfrm>
+          <a:prstGeom prst="rect">
+            <a:avLst/>
+          </a:prstGeom>
+          <a:noFill/>
+          <a:ln w="12700">
+            <a:solidFill>
+              <a:prstClr val="black"/>
+            </a:solidFill>
+          </a:ln>
+        </p:spPr>
+        <p:txBody>
+          <a:bodyPr vert="horz" lIns="91440" tIns="45720" rIns="91440" bIns="45720" rtlCol="0" anchor="ctr"/>
+          <a:lstStyle/>
+          <a:p>
+            <a:endParaRPr lang="en-US"/>
+          </a:p>
+        </p:txBody>
+      </p:sp>
+      <p:sp>
+        <p:nvSpPr>
+          <p:cNvPr id="5" name="Notes Placeholder 4"/>
+          <p:cNvSpPr>
+            <a:spLocks noGrp="1"/>
+          </p:cNvSpPr>
+          <p:nvPr>
+            <p:ph type="body" sz="quarter" idx="3"/>
+          </p:nvPr>
+        </p:nvSpPr>
+        <p:spPr>
+          <a:xfrm>
+            <a:off x="685800" y="4400550"/>
+            <a:ext cx="5486400" cy="3600450"/>
+          </a:xfrm>
+          <a:prstGeom prst="rect">
+            <a:avLst/>
+          </a:prstGeom>
+        </p:spPr>
+        <p:txBody>
+          <a:bodyPr vert="horz" lIns="91440" tIns="45720" rIns="91440" bIns="45720" rtlCol="0"/>
+          <a:lstStyle/>
+          <a:p>
+            <a:pPr lvl="0"/>
+            <a:r>
+              <a:rPr lang="en-US" smtClean="0"/>
+              <a:t>Click to edit Master text styles</a:t>
+            </a:r>
+          </a:p>
+          <a:p>
+            <a:pPr lvl="1"/>
+            <a:r>
+              <a:rPr lang="en-US" smtClean="0"/>
+              <a:t>Second level</a:t>
+            </a:r>
+          </a:p>
+          <a:p>
+            <a:pPr lvl="2"/>
+            <a:r>
+              <a:rPr lang="en-US" smtClean="0"/>
+              <a:t>Third level</a:t>
+            </a:r>
+          </a:p>
+          <a:p>
+            <a:pPr lvl="3"/>
+            <a:r>
+              <a:rPr lang="en-US" smtClean="0"/>
+              <a:t>Fourth level</a:t>
+            </a:r>
+          </a:p>
+          <a:p>
+            <a:pPr lvl="4"/>
+            <a:r>
+              <a:rPr lang="en-US" smtClean="0"/>
+              <a:t>Fifth level</a:t>
+            </a:r>
+            <a:endParaRPr lang="en-US"/>
+          </a:p>
+        </p:txBody>
+      </p:sp>
+      <p:sp>
+        <p:nvSpPr>
+          <p:cNvPr id="6" name="Footer Placeholder 5"/>
+          <p:cNvSpPr>
+            <a:spLocks noGrp="1"/>
+          </p:cNvSpPr>
+          <p:nvPr>
+            <p:ph type="ftr" sz="quarter" idx="4"/>
+          </p:nvPr>
+        </p:nvSpPr>
+        <p:spPr>
+          <a:xfrm>
+            <a:off x="0" y="8685213"/>
+            <a:ext cx="2971800" cy="458787"/>
+          </a:xfrm>
+          <a:prstGeom prst="rect">
+            <a:avLst/>
+          </a:prstGeom>
+        </p:spPr>
+        <p:txBody>
+          <a:bodyPr vert="horz" lIns="91440" tIns="45720" rIns="91440" bIns="45720" rtlCol="0" anchor="b"/>
+          <a:lstStyle>
+            <a:lvl1pPr algn="l">
+              <a:defRPr sz="1200"/>
+            </a:lvl1pPr>
+          </a:lstStyle>
+          <a:p>
+            <a:endParaRPr lang="en-US"/>
+          </a:p>
+        </p:txBody>
+      </p:sp>
+      <p:sp>
+        <p:nvSpPr>
+          <p:cNvPr id="7" name="Slide Number Placeholder 6"/>
+          <p:cNvSpPr>
+            <a:spLocks noGrp="1"/>
+          </p:cNvSpPr>
+          <p:nvPr>
+            <p:ph type="sldNum" sz="quarter" idx="5"/>
+          </p:nvPr>
+        </p:nvSpPr>
+        <p:spPr>
+          <a:xfrm>
+            <a:off x="3884613" y="8685213"/>
+            <a:ext cx="2971800" cy="458787"/>
+          </a:xfrm>
+          <a:prstGeom prst="rect">
+            <a:avLst/>
+          </a:prstGeom>
+        </p:spPr>
+        <p:txBody>
+          <a:bodyPr vert="horz" lIns="91440" tIns="45720" rIns="91440" bIns="45720" rtlCol="0" anchor="b"/>
+          <a:lstStyle>
+            <a:lvl1pPr algn="r">
+              <a:defRPr sz="1200"/>
+            </a:lvl1pPr>
+          </a:lstStyle>
+          <a:p>
+            <a:fld id="{76E59958-3B60-4691-AE17-C513178CB0BF}" type="slidenum">
+              <a:rPr lang="en-US" smtClean="0"/>
+              <a:t>‹#›</a:t>
+            </a:fld>
+            <a:endParaRPr lang="en-US"/>
+          </a:p>
+        </p:txBody>
+      </p:sp>
+    </p:spTree>
+    <p:extLst>
+      <p:ext uri="{BB962C8B-B14F-4D97-AF65-F5344CB8AC3E}">
+        <p14:creationId xmlns:p14="http://schemas.microsoft.com/office/powerpoint/2010/main" val="4121657838"/>
+      </p:ext>
+    </p:extLst>
+  </p:cSld>
+  <p:clrMap bg1="lt1" tx1="dk1" bg2="lt2" tx2="dk2" accent1="accent1" accent2="accent2" accent3="accent3" accent4="accent4" accent5="accent5" accent6="accent6" hlink="hlink" folHlink="folHlink"/>
+  <p:notesStyle>
+    <a:lvl1pPr marL="0" algn="l" defTabSz="914400" rtl="0" eaLnBrk="1" latinLnBrk="0" hangingPunct="1">
+      <a:defRPr sz="1200" kern="1200">
+        <a:solidFill>
+          <a:schemeClr val="tx1"/>
+        </a:solidFill>
+        <a:latin typeface="+mn-lt"/>
+        <a:ea typeface="+mn-ea"/>
+        <a:cs typeface="+mn-cs"/>
+      </a:defRPr>
+    </a:lvl1pPr>
+    <a:lvl2pPr marL="457200" algn="l" defTabSz="914400" rtl="0" eaLnBrk="1" latinLnBrk="0" hangingPunct="1">
+      <a:defRPr sz="1200" kern="1200">
+        <a:solidFill>
+          <a:schemeClr val="tx1"/>
+        </a:solidFill>
+        <a:latin typeface="+mn-lt"/>
+        <a:ea typeface="+mn-ea"/>
+        <a:cs typeface="+mn-cs"/>
+      </a:defRPr>
+    </a:lvl2pPr>
+    <a:lvl3pPr marL="914400" algn="l" defTabSz="914400" rtl="0" eaLnBrk="1" latinLnBrk="0" hangingPunct="1">
+      <a:defRPr sz="1200" kern="1200">
+        <a:solidFill>
+          <a:schemeClr val="tx1"/>
+        </a:solidFill>
+        <a:latin typeface="+mn-lt"/>
+        <a:ea typeface="+mn-ea"/>
+        <a:cs typeface="+mn-cs"/>
+      </a:defRPr>
+    </a:lvl3pPr>
+    <a:lvl4pPr marL="1371600" algn="l" defTabSz="914400" rtl="0" eaLnBrk="1" latinLnBrk="0" hangingPunct="1">
+      <a:defRPr sz="1200" kern="1200">
+        <a:solidFill>
+          <a:schemeClr val="tx1"/>
+        </a:solidFill>
+        <a:latin typeface="+mn-lt"/>
+        <a:ea typeface="+mn-ea"/>
+        <a:cs typeface="+mn-cs"/>
+      </a:defRPr>
+    </a:lvl4pPr>
+    <a:lvl5pPr marL="1828800" algn="l" defTabSz="914400" rtl="0" eaLnBrk="1" latinLnBrk="0" hangingPunct="1">
+      <a:defRPr sz="1200" kern="1200">
+        <a:solidFill>
+          <a:schemeClr val="tx1"/>
+        </a:solidFill>
+        <a:latin typeface="+mn-lt"/>
+        <a:ea typeface="+mn-ea"/>
+        <a:cs typeface="+mn-cs"/>
+      </a:defRPr>
+    </a:lvl5pPr>
+    <a:lvl6pPr marL="2286000" algn="l" defTabSz="914400" rtl="0" eaLnBrk="1" latinLnBrk="0" hangingPunct="1">
+      <a:defRPr sz="1200" kern="1200">
+        <a:solidFill>
+          <a:schemeClr val="tx1"/>
+        </a:solidFill>
+        <a:latin typeface="+mn-lt"/>
+        <a:ea typeface="+mn-ea"/>
+        <a:cs typeface="+mn-cs"/>
+      </a:defRPr>
+    </a:lvl6pPr>
+    <a:lvl7pPr marL="2743200" algn="l" defTabSz="914400" rtl="0" eaLnBrk="1" latinLnBrk="0" hangingPunct="1">
+      <a:defRPr sz="1200" kern="1200">
+        <a:solidFill>
+          <a:schemeClr val="tx1"/>
+        </a:solidFill>
+        <a:latin typeface="+mn-lt"/>
+        <a:ea typeface="+mn-ea"/>
+        <a:cs typeface="+mn-cs"/>
+      </a:defRPr>
+    </a:lvl7pPr>
+    <a:lvl8pPr marL="3200400" algn="l" defTabSz="914400" rtl="0" eaLnBrk="1" latinLnBrk="0" hangingPunct="1">
+      <a:defRPr sz="1200" kern="1200">
+        <a:solidFill>
+          <a:schemeClr val="tx1"/>
+        </a:solidFill>
+        <a:latin typeface="+mn-lt"/>
+        <a:ea typeface="+mn-ea"/>
+        <a:cs typeface="+mn-cs"/>
+      </a:defRPr>
+    </a:lvl8pPr>
+    <a:lvl9pPr marL="3657600" algn="l" defTabSz="914400" rtl="0" eaLnBrk="1" latinLnBrk="0" hangingPunct="1">
+      <a:defRPr sz="1200" kern="1200">
+        <a:solidFill>
+          <a:schemeClr val="tx1"/>
+        </a:solidFill>
+        <a:latin typeface="+mn-lt"/>
+        <a:ea typeface="+mn-ea"/>
+        <a:cs typeface="+mn-cs"/>
+      </a:defRPr>
+    </a:lvl9pPr>
+  </p:notesStyle>
+</p:notesMaster>
+</file>
+
+<file path=ppt/notesSlides/notesSlide1.xml><?xml version="1.0" encoding="utf-8"?>
+<p:notes xmlns:a="http://schemas.openxmlformats.org/drawingml/2006/main" xmlns:r="http://schemas.openxmlformats.org/officeDocument/2006/relationships" xmlns:p="http://schemas.openxmlformats.org/presentationml/2006/main">
+  <p:cSld>
+    <p:spTree>
+      <p:nvGrpSpPr>
+        <p:cNvPr id="1" name=""/>
+        <p:cNvGrpSpPr/>
+        <p:nvPr/>
+      </p:nvGrpSpPr>
+      <p:grpSpPr>
+        <a:xfrm>
+          <a:off x="0" y="0"/>
+          <a:ext cx="0" cy="0"/>
+          <a:chOff x="0" y="0"/>
+          <a:chExt cx="0" cy="0"/>
+        </a:xfrm>
+      </p:grpSpPr>
+      <p:sp>
+        <p:nvSpPr>
+          <p:cNvPr id="2" name="Slide Image Placeholder 1"/>
+          <p:cNvSpPr>
+            <a:spLocks noGrp="1" noRot="1" noChangeAspect="1"/>
+          </p:cNvSpPr>
+          <p:nvPr>
+            <p:ph type="sldImg"/>
+          </p:nvPr>
+        </p:nvSpPr>
+        <p:spPr/>
+      </p:sp>
+      <p:sp>
+        <p:nvSpPr>
+          <p:cNvPr id="3" name="Notes Placeholder 2"/>
+          <p:cNvSpPr>
+            <a:spLocks noGrp="1"/>
+          </p:cNvSpPr>
+          <p:nvPr>
+            <p:ph type="body" idx="1"/>
+          </p:nvPr>
+        </p:nvSpPr>
+        <p:spPr/>
+        <p:txBody>
+          <a:bodyPr/>
+          <a:lstStyle/>
+          <a:p>
+            <a:r>
+              <a:rPr lang="en-US" sz="1200" kern="1200" dirty="0" smtClean="0">
+                <a:solidFill>
+                  <a:schemeClr val="tx1"/>
+                </a:solidFill>
+                <a:effectLst/>
+                <a:latin typeface="+mn-lt"/>
+                <a:ea typeface="+mn-ea"/>
+                <a:cs typeface="+mn-cs"/>
+              </a:rPr>
+              <a:t>I’ve been exploring the idea of refactoring a database.  To do so, I realized I needed to learn about triggers.  I’d thought I’d share what I’ve learned.</a:t>
+            </a:r>
+            <a:endParaRPr lang="en-US" dirty="0"/>
+          </a:p>
+        </p:txBody>
+      </p:sp>
+      <p:sp>
+        <p:nvSpPr>
+          <p:cNvPr id="4" name="Slide Number Placeholder 3"/>
+          <p:cNvSpPr>
+            <a:spLocks noGrp="1"/>
+          </p:cNvSpPr>
+          <p:nvPr>
+            <p:ph type="sldNum" sz="quarter" idx="10"/>
+          </p:nvPr>
+        </p:nvSpPr>
+        <p:spPr/>
+        <p:txBody>
+          <a:bodyPr/>
+          <a:lstStyle/>
+          <a:p>
+            <a:fld id="{76E59958-3B60-4691-AE17-C513178CB0BF}" type="slidenum">
+              <a:rPr lang="en-US" smtClean="0"/>
+              <a:t>1</a:t>
+            </a:fld>
+            <a:endParaRPr lang="en-US"/>
+          </a:p>
+        </p:txBody>
+      </p:sp>
+    </p:spTree>
+    <p:extLst>
+      <p:ext uri="{BB962C8B-B14F-4D97-AF65-F5344CB8AC3E}">
+        <p14:creationId xmlns:p14="http://schemas.microsoft.com/office/powerpoint/2010/main" val="61188415"/>
+      </p:ext>
+    </p:extLst>
+  </p:cSld>
+  <p:clrMapOvr>
+    <a:masterClrMapping/>
+  </p:clrMapOvr>
+</p:notes>
+</file>
+
+<file path=ppt/notesSlides/notesSlide2.xml><?xml version="1.0" encoding="utf-8"?>
+<p:notes xmlns:a="http://schemas.openxmlformats.org/drawingml/2006/main" xmlns:r="http://schemas.openxmlformats.org/officeDocument/2006/relationships" xmlns:p="http://schemas.openxmlformats.org/presentationml/2006/main">
+  <p:cSld>
+    <p:spTree>
+      <p:nvGrpSpPr>
+        <p:cNvPr id="1" name=""/>
+        <p:cNvGrpSpPr/>
+        <p:nvPr/>
+      </p:nvGrpSpPr>
+      <p:grpSpPr>
+        <a:xfrm>
+          <a:off x="0" y="0"/>
+          <a:ext cx="0" cy="0"/>
+          <a:chOff x="0" y="0"/>
+          <a:chExt cx="0" cy="0"/>
+        </a:xfrm>
+      </p:grpSpPr>
+      <p:sp>
+        <p:nvSpPr>
+          <p:cNvPr id="2" name="Slide Image Placeholder 1"/>
+          <p:cNvSpPr>
+            <a:spLocks noGrp="1" noRot="1" noChangeAspect="1"/>
+          </p:cNvSpPr>
+          <p:nvPr>
+            <p:ph type="sldImg"/>
+          </p:nvPr>
+        </p:nvSpPr>
+        <p:spPr/>
+      </p:sp>
+      <p:sp>
+        <p:nvSpPr>
+          <p:cNvPr id="3" name="Notes Placeholder 2"/>
+          <p:cNvSpPr>
+            <a:spLocks noGrp="1"/>
+          </p:cNvSpPr>
+          <p:nvPr>
+            <p:ph type="body" idx="1"/>
+          </p:nvPr>
+        </p:nvSpPr>
+        <p:spPr/>
+        <p:txBody>
+          <a:bodyPr/>
+          <a:lstStyle/>
+          <a:p>
+            <a:pPr marL="0" marR="0" indent="0" algn="l" defTabSz="914400" rtl="0" eaLnBrk="1" fontAlgn="auto" latinLnBrk="0" hangingPunct="1">
+              <a:lnSpc>
+                <a:spcPct val="100000"/>
+              </a:lnSpc>
+              <a:spcBef>
+                <a:spcPts val="0"/>
+              </a:spcBef>
+              <a:spcAft>
+                <a:spcPts val="0"/>
+              </a:spcAft>
+              <a:buClrTx/>
+              <a:buSzTx/>
+              <a:buFontTx/>
+              <a:buNone/>
+              <a:tabLst/>
+              <a:defRPr/>
+            </a:pPr>
+            <a:r>
+              <a:rPr lang="en-US" sz="1200" kern="1200" dirty="0" smtClean="0">
+                <a:solidFill>
+                  <a:schemeClr val="tx1"/>
+                </a:solidFill>
+                <a:effectLst/>
+                <a:latin typeface="+mn-lt"/>
+                <a:ea typeface="+mn-ea"/>
+                <a:cs typeface="+mn-cs"/>
+              </a:rPr>
+              <a:t>This is the idea of gradually</a:t>
+            </a:r>
+            <a:r>
+              <a:rPr lang="en-US" sz="1200" kern="1200" baseline="0" dirty="0" smtClean="0">
+                <a:solidFill>
+                  <a:schemeClr val="tx1"/>
+                </a:solidFill>
+                <a:effectLst/>
+                <a:latin typeface="+mn-lt"/>
+                <a:ea typeface="+mn-ea"/>
+                <a:cs typeface="+mn-cs"/>
+              </a:rPr>
+              <a:t> changing your database design as you learn requirements . It </a:t>
+            </a:r>
+            <a:r>
+              <a:rPr lang="en-US" sz="1200" kern="1200" dirty="0" smtClean="0">
+                <a:solidFill>
+                  <a:schemeClr val="tx1"/>
+                </a:solidFill>
+                <a:effectLst/>
+                <a:latin typeface="+mn-lt"/>
+                <a:ea typeface="+mn-ea"/>
+                <a:cs typeface="+mn-cs"/>
+              </a:rPr>
+              <a:t>fits in well with current programming trends such as Agile and Lean, which emphasize Minimum Viable Product, and experimentation</a:t>
+            </a:r>
+            <a:endParaRPr lang="en-US" dirty="0" smtClean="0"/>
+          </a:p>
+          <a:p>
+            <a:endParaRPr lang="en-US" dirty="0"/>
+          </a:p>
+        </p:txBody>
+      </p:sp>
+      <p:sp>
+        <p:nvSpPr>
+          <p:cNvPr id="4" name="Slide Number Placeholder 3"/>
+          <p:cNvSpPr>
+            <a:spLocks noGrp="1"/>
+          </p:cNvSpPr>
+          <p:nvPr>
+            <p:ph type="sldNum" sz="quarter" idx="10"/>
+          </p:nvPr>
+        </p:nvSpPr>
+        <p:spPr/>
+        <p:txBody>
+          <a:bodyPr/>
+          <a:lstStyle/>
+          <a:p>
+            <a:fld id="{76E59958-3B60-4691-AE17-C513178CB0BF}" type="slidenum">
+              <a:rPr lang="en-US" smtClean="0"/>
+              <a:t>2</a:t>
+            </a:fld>
+            <a:endParaRPr lang="en-US"/>
+          </a:p>
+        </p:txBody>
+      </p:sp>
+    </p:spTree>
+    <p:extLst>
+      <p:ext uri="{BB962C8B-B14F-4D97-AF65-F5344CB8AC3E}">
+        <p14:creationId xmlns:p14="http://schemas.microsoft.com/office/powerpoint/2010/main" val="4216211782"/>
+      </p:ext>
+    </p:extLst>
+  </p:cSld>
+  <p:clrMapOvr>
+    <a:masterClrMapping/>
+  </p:clrMapOvr>
+</p:notes>
+</file>
+
+<file path=ppt/notesSlides/notesSlide3.xml><?xml version="1.0" encoding="utf-8"?>
+<p:notes xmlns:a="http://schemas.openxmlformats.org/drawingml/2006/main" xmlns:r="http://schemas.openxmlformats.org/officeDocument/2006/relationships" xmlns:p="http://schemas.openxmlformats.org/presentationml/2006/main">
+  <p:cSld>
+    <p:spTree>
+      <p:nvGrpSpPr>
+        <p:cNvPr id="1" name=""/>
+        <p:cNvGrpSpPr/>
+        <p:nvPr/>
+      </p:nvGrpSpPr>
+      <p:grpSpPr>
+        <a:xfrm>
+          <a:off x="0" y="0"/>
+          <a:ext cx="0" cy="0"/>
+          <a:chOff x="0" y="0"/>
+          <a:chExt cx="0" cy="0"/>
+        </a:xfrm>
+      </p:grpSpPr>
+      <p:sp>
+        <p:nvSpPr>
+          <p:cNvPr id="2" name="Slide Image Placeholder 1"/>
+          <p:cNvSpPr>
+            <a:spLocks noGrp="1" noRot="1" noChangeAspect="1"/>
+          </p:cNvSpPr>
+          <p:nvPr>
+            <p:ph type="sldImg"/>
+          </p:nvPr>
+        </p:nvSpPr>
+        <p:spPr/>
+      </p:sp>
+      <p:sp>
+        <p:nvSpPr>
+          <p:cNvPr id="3" name="Notes Placeholder 2"/>
+          <p:cNvSpPr>
+            <a:spLocks noGrp="1"/>
+          </p:cNvSpPr>
+          <p:nvPr>
+            <p:ph type="body" idx="1"/>
+          </p:nvPr>
+        </p:nvSpPr>
+        <p:spPr/>
+        <p:txBody>
+          <a:bodyPr/>
+          <a:lstStyle/>
+          <a:p>
+            <a:r>
+              <a:rPr lang="en-US" sz="1200" kern="1200" dirty="0" smtClean="0">
+                <a:solidFill>
+                  <a:schemeClr val="tx1"/>
+                </a:solidFill>
+                <a:effectLst/>
+                <a:latin typeface="+mn-lt"/>
+                <a:ea typeface="+mn-ea"/>
+                <a:cs typeface="+mn-cs"/>
+              </a:rPr>
+              <a:t>Refactoring a database consists of essentially 3 steps: expand, migrate, and contract.</a:t>
+            </a:r>
+          </a:p>
+        </p:txBody>
+      </p:sp>
+      <p:sp>
+        <p:nvSpPr>
+          <p:cNvPr id="4" name="Slide Number Placeholder 3"/>
+          <p:cNvSpPr>
+            <a:spLocks noGrp="1"/>
+          </p:cNvSpPr>
+          <p:nvPr>
+            <p:ph type="sldNum" sz="quarter" idx="10"/>
+          </p:nvPr>
+        </p:nvSpPr>
+        <p:spPr/>
+        <p:txBody>
+          <a:bodyPr/>
+          <a:lstStyle/>
+          <a:p>
+            <a:fld id="{76E59958-3B60-4691-AE17-C513178CB0BF}" type="slidenum">
+              <a:rPr lang="en-US" smtClean="0"/>
+              <a:t>3</a:t>
+            </a:fld>
+            <a:endParaRPr lang="en-US"/>
+          </a:p>
+        </p:txBody>
+      </p:sp>
+    </p:spTree>
+    <p:extLst>
+      <p:ext uri="{BB962C8B-B14F-4D97-AF65-F5344CB8AC3E}">
+        <p14:creationId xmlns:p14="http://schemas.microsoft.com/office/powerpoint/2010/main" val="392170317"/>
+      </p:ext>
+    </p:extLst>
+  </p:cSld>
+  <p:clrMapOvr>
+    <a:masterClrMapping/>
+  </p:clrMapOvr>
+</p:notes>
+</file>
+
+<file path=ppt/notesSlides/notesSlide4.xml><?xml version="1.0" encoding="utf-8"?>
+<p:notes xmlns:a="http://schemas.openxmlformats.org/drawingml/2006/main" xmlns:r="http://schemas.openxmlformats.org/officeDocument/2006/relationships" xmlns:p="http://schemas.openxmlformats.org/presentationml/2006/main">
+  <p:cSld>
+    <p:spTree>
+      <p:nvGrpSpPr>
+        <p:cNvPr id="1" name=""/>
+        <p:cNvGrpSpPr/>
+        <p:nvPr/>
+      </p:nvGrpSpPr>
+      <p:grpSpPr>
+        <a:xfrm>
+          <a:off x="0" y="0"/>
+          <a:ext cx="0" cy="0"/>
+          <a:chOff x="0" y="0"/>
+          <a:chExt cx="0" cy="0"/>
+        </a:xfrm>
+      </p:grpSpPr>
+      <p:sp>
+        <p:nvSpPr>
+          <p:cNvPr id="2" name="Slide Image Placeholder 1"/>
+          <p:cNvSpPr>
+            <a:spLocks noGrp="1" noRot="1" noChangeAspect="1"/>
+          </p:cNvSpPr>
+          <p:nvPr>
+            <p:ph type="sldImg"/>
+          </p:nvPr>
+        </p:nvSpPr>
+        <p:spPr/>
+      </p:sp>
+      <p:sp>
+        <p:nvSpPr>
+          <p:cNvPr id="3" name="Notes Placeholder 2"/>
+          <p:cNvSpPr>
+            <a:spLocks noGrp="1"/>
+          </p:cNvSpPr>
+          <p:nvPr>
+            <p:ph type="body" idx="1"/>
+          </p:nvPr>
+        </p:nvSpPr>
+        <p:spPr/>
+        <p:txBody>
+          <a:bodyPr/>
+          <a:lstStyle/>
+          <a:p>
+            <a:r>
+              <a:rPr lang="en-US" dirty="0" smtClean="0"/>
+              <a:t>optional</a:t>
+            </a:r>
+            <a:endParaRPr lang="en-US" dirty="0"/>
+          </a:p>
+        </p:txBody>
+      </p:sp>
+      <p:sp>
+        <p:nvSpPr>
+          <p:cNvPr id="4" name="Slide Number Placeholder 3"/>
+          <p:cNvSpPr>
+            <a:spLocks noGrp="1"/>
+          </p:cNvSpPr>
+          <p:nvPr>
+            <p:ph type="sldNum" sz="quarter" idx="10"/>
+          </p:nvPr>
+        </p:nvSpPr>
+        <p:spPr/>
+        <p:txBody>
+          <a:bodyPr/>
+          <a:lstStyle/>
+          <a:p>
+            <a:fld id="{76E59958-3B60-4691-AE17-C513178CB0BF}" type="slidenum">
+              <a:rPr lang="en-US" smtClean="0"/>
+              <a:t>4</a:t>
+            </a:fld>
+            <a:endParaRPr lang="en-US"/>
+          </a:p>
+        </p:txBody>
+      </p:sp>
+    </p:spTree>
+    <p:extLst>
+      <p:ext uri="{BB962C8B-B14F-4D97-AF65-F5344CB8AC3E}">
+        <p14:creationId xmlns:p14="http://schemas.microsoft.com/office/powerpoint/2010/main" val="3746180344"/>
+      </p:ext>
+    </p:extLst>
+  </p:cSld>
+  <p:clrMapOvr>
+    <a:masterClrMapping/>
+  </p:clrMapOvr>
+</p:notes>
+</file>
+
+<file path=ppt/notesSlides/notesSlide5.xml><?xml version="1.0" encoding="utf-8"?>
+<p:notes xmlns:a="http://schemas.openxmlformats.org/drawingml/2006/main" xmlns:r="http://schemas.openxmlformats.org/officeDocument/2006/relationships" xmlns:p="http://schemas.openxmlformats.org/presentationml/2006/main">
+  <p:cSld>
+    <p:spTree>
+      <p:nvGrpSpPr>
+        <p:cNvPr id="1" name=""/>
+        <p:cNvGrpSpPr/>
+        <p:nvPr/>
+      </p:nvGrpSpPr>
+      <p:grpSpPr>
+        <a:xfrm>
+          <a:off x="0" y="0"/>
+          <a:ext cx="0" cy="0"/>
+          <a:chOff x="0" y="0"/>
+          <a:chExt cx="0" cy="0"/>
+        </a:xfrm>
+      </p:grpSpPr>
+      <p:sp>
+        <p:nvSpPr>
+          <p:cNvPr id="2" name="Slide Image Placeholder 1"/>
+          <p:cNvSpPr>
+            <a:spLocks noGrp="1" noRot="1" noChangeAspect="1"/>
+          </p:cNvSpPr>
+          <p:nvPr>
+            <p:ph type="sldImg"/>
+          </p:nvPr>
+        </p:nvSpPr>
+        <p:spPr/>
+      </p:sp>
+      <p:sp>
+        <p:nvSpPr>
+          <p:cNvPr id="3" name="Notes Placeholder 2"/>
+          <p:cNvSpPr>
+            <a:spLocks noGrp="1"/>
+          </p:cNvSpPr>
+          <p:nvPr>
+            <p:ph type="body" idx="1"/>
+          </p:nvPr>
+        </p:nvSpPr>
+        <p:spPr/>
+        <p:txBody>
+          <a:bodyPr/>
+          <a:lstStyle/>
+          <a:p>
+            <a:r>
+              <a:rPr lang="en-US" dirty="0" smtClean="0"/>
+              <a:t>The</a:t>
+            </a:r>
+            <a:r>
+              <a:rPr lang="en-US" baseline="0" dirty="0" smtClean="0"/>
+              <a:t> triggers keep the two versions in sync.</a:t>
+            </a:r>
+            <a:endParaRPr lang="en-US" dirty="0"/>
+          </a:p>
+        </p:txBody>
+      </p:sp>
+      <p:sp>
+        <p:nvSpPr>
+          <p:cNvPr id="4" name="Slide Number Placeholder 3"/>
+          <p:cNvSpPr>
+            <a:spLocks noGrp="1"/>
+          </p:cNvSpPr>
+          <p:nvPr>
+            <p:ph type="sldNum" sz="quarter" idx="10"/>
+          </p:nvPr>
+        </p:nvSpPr>
+        <p:spPr/>
+        <p:txBody>
+          <a:bodyPr/>
+          <a:lstStyle/>
+          <a:p>
+            <a:fld id="{76E59958-3B60-4691-AE17-C513178CB0BF}" type="slidenum">
+              <a:rPr lang="en-US" smtClean="0"/>
+              <a:t>5</a:t>
+            </a:fld>
+            <a:endParaRPr lang="en-US"/>
+          </a:p>
+        </p:txBody>
+      </p:sp>
+    </p:spTree>
+    <p:extLst>
+      <p:ext uri="{BB962C8B-B14F-4D97-AF65-F5344CB8AC3E}">
+        <p14:creationId xmlns:p14="http://schemas.microsoft.com/office/powerpoint/2010/main" val="2033570768"/>
+      </p:ext>
+    </p:extLst>
+  </p:cSld>
+  <p:clrMapOvr>
+    <a:masterClrMapping/>
+  </p:clrMapOvr>
+</p:notes>
+</file>
+
+<file path=ppt/notesSlides/notesSlide6.xml><?xml version="1.0" encoding="utf-8"?>
+<p:notes xmlns:a="http://schemas.openxmlformats.org/drawingml/2006/main" xmlns:r="http://schemas.openxmlformats.org/officeDocument/2006/relationships" xmlns:p="http://schemas.openxmlformats.org/presentationml/2006/main">
+  <p:cSld>
+    <p:spTree>
+      <p:nvGrpSpPr>
+        <p:cNvPr id="1" name=""/>
+        <p:cNvGrpSpPr/>
+        <p:nvPr/>
+      </p:nvGrpSpPr>
+      <p:grpSpPr>
+        <a:xfrm>
+          <a:off x="0" y="0"/>
+          <a:ext cx="0" cy="0"/>
+          <a:chOff x="0" y="0"/>
+          <a:chExt cx="0" cy="0"/>
+        </a:xfrm>
+      </p:grpSpPr>
+      <p:sp>
+        <p:nvSpPr>
+          <p:cNvPr id="2" name="Slide Image Placeholder 1"/>
+          <p:cNvSpPr>
+            <a:spLocks noGrp="1" noRot="1" noChangeAspect="1"/>
+          </p:cNvSpPr>
+          <p:nvPr>
+            <p:ph type="sldImg"/>
+          </p:nvPr>
+        </p:nvSpPr>
+        <p:spPr/>
+      </p:sp>
+      <p:sp>
+        <p:nvSpPr>
+          <p:cNvPr id="3" name="Notes Placeholder 2"/>
+          <p:cNvSpPr>
+            <a:spLocks noGrp="1"/>
+          </p:cNvSpPr>
+          <p:nvPr>
+            <p:ph type="body" idx="1"/>
+          </p:nvPr>
+        </p:nvSpPr>
+        <p:spPr/>
+        <p:txBody>
+          <a:bodyPr/>
+          <a:lstStyle/>
+          <a:p>
+            <a:r>
+              <a:rPr lang="en-US" sz="1200" kern="1200" dirty="0" smtClean="0">
+                <a:solidFill>
+                  <a:schemeClr val="tx1"/>
+                </a:solidFill>
+                <a:effectLst/>
+                <a:latin typeface="+mn-lt"/>
+                <a:ea typeface="+mn-ea"/>
+                <a:cs typeface="+mn-cs"/>
+              </a:rPr>
+              <a:t>Contract (optional) – the opposite of expand.  (Rename instead of drop if you’re really cautious.)</a:t>
+            </a:r>
+            <a:endParaRPr lang="en-US" dirty="0"/>
+          </a:p>
+        </p:txBody>
+      </p:sp>
+      <p:sp>
+        <p:nvSpPr>
+          <p:cNvPr id="4" name="Slide Number Placeholder 3"/>
+          <p:cNvSpPr>
+            <a:spLocks noGrp="1"/>
+          </p:cNvSpPr>
+          <p:nvPr>
+            <p:ph type="sldNum" sz="quarter" idx="10"/>
+          </p:nvPr>
+        </p:nvSpPr>
+        <p:spPr/>
+        <p:txBody>
+          <a:bodyPr/>
+          <a:lstStyle/>
+          <a:p>
+            <a:fld id="{76E59958-3B60-4691-AE17-C513178CB0BF}" type="slidenum">
+              <a:rPr lang="en-US" smtClean="0"/>
+              <a:t>6</a:t>
+            </a:fld>
+            <a:endParaRPr lang="en-US"/>
+          </a:p>
+        </p:txBody>
+      </p:sp>
+    </p:spTree>
+    <p:extLst>
+      <p:ext uri="{BB962C8B-B14F-4D97-AF65-F5344CB8AC3E}">
+        <p14:creationId xmlns:p14="http://schemas.microsoft.com/office/powerpoint/2010/main" val="853532486"/>
+      </p:ext>
+    </p:extLst>
+  </p:cSld>
+  <p:clrMapOvr>
+    <a:masterClrMapping/>
+  </p:clrMapOvr>
+</p:notes>
+</file>
+
+<file path=ppt/notesSlides/notesSlide7.xml><?xml version="1.0" encoding="utf-8"?>
+<p:notes xmlns:a="http://schemas.openxmlformats.org/drawingml/2006/main" xmlns:r="http://schemas.openxmlformats.org/officeDocument/2006/relationships" xmlns:p="http://schemas.openxmlformats.org/presentationml/2006/main">
+  <p:cSld>
+    <p:spTree>
+      <p:nvGrpSpPr>
+        <p:cNvPr id="1" name=""/>
+        <p:cNvGrpSpPr/>
+        <p:nvPr/>
+      </p:nvGrpSpPr>
+      <p:grpSpPr>
+        <a:xfrm>
+          <a:off x="0" y="0"/>
+          <a:ext cx="0" cy="0"/>
+          <a:chOff x="0" y="0"/>
+          <a:chExt cx="0" cy="0"/>
+        </a:xfrm>
+      </p:grpSpPr>
+      <p:sp>
+        <p:nvSpPr>
+          <p:cNvPr id="2" name="Slide Image Placeholder 1"/>
+          <p:cNvSpPr>
+            <a:spLocks noGrp="1" noRot="1" noChangeAspect="1"/>
+          </p:cNvSpPr>
+          <p:nvPr>
+            <p:ph type="sldImg"/>
+          </p:nvPr>
+        </p:nvSpPr>
+        <p:spPr/>
+      </p:sp>
+      <p:sp>
+        <p:nvSpPr>
+          <p:cNvPr id="3" name="Notes Placeholder 2"/>
+          <p:cNvSpPr>
+            <a:spLocks noGrp="1"/>
+          </p:cNvSpPr>
+          <p:nvPr>
+            <p:ph type="body" idx="1"/>
+          </p:nvPr>
+        </p:nvSpPr>
+        <p:spPr/>
+        <p:txBody>
+          <a:bodyPr/>
+          <a:lstStyle/>
+          <a:p>
+            <a:pPr marL="228600" indent="-228600">
+              <a:buAutoNum type="arabicPeriod"/>
+            </a:pPr>
+            <a:r>
+              <a:rPr lang="en-US" dirty="0" smtClean="0"/>
+              <a:t>Setup, show OLD table</a:t>
+            </a:r>
+          </a:p>
+          <a:p>
+            <a:pPr marL="228600" indent="-228600">
+              <a:buAutoNum type="arabicPeriod"/>
+            </a:pPr>
+            <a:r>
+              <a:rPr lang="en-US" dirty="0" smtClean="0"/>
+              <a:t>Show</a:t>
+            </a:r>
+            <a:r>
+              <a:rPr lang="en-US" baseline="0" dirty="0" smtClean="0"/>
+              <a:t> goals </a:t>
+            </a:r>
+            <a:r>
+              <a:rPr lang="en-US" baseline="0" smtClean="0"/>
+              <a:t>of refactor</a:t>
+            </a:r>
+          </a:p>
+          <a:p>
+            <a:pPr marL="228600" indent="-228600">
+              <a:buAutoNum type="arabicPeriod"/>
+            </a:pPr>
+            <a:endParaRPr lang="en-US"/>
+          </a:p>
+        </p:txBody>
+      </p:sp>
+      <p:sp>
+        <p:nvSpPr>
+          <p:cNvPr id="4" name="Slide Number Placeholder 3"/>
+          <p:cNvSpPr>
+            <a:spLocks noGrp="1"/>
+          </p:cNvSpPr>
+          <p:nvPr>
+            <p:ph type="sldNum" sz="quarter" idx="10"/>
+          </p:nvPr>
+        </p:nvSpPr>
+        <p:spPr/>
+        <p:txBody>
+          <a:bodyPr/>
+          <a:lstStyle/>
+          <a:p>
+            <a:fld id="{76E59958-3B60-4691-AE17-C513178CB0BF}" type="slidenum">
+              <a:rPr lang="en-US" smtClean="0"/>
+              <a:t>7</a:t>
+            </a:fld>
+            <a:endParaRPr lang="en-US"/>
+          </a:p>
+        </p:txBody>
+      </p:sp>
+    </p:spTree>
+    <p:extLst>
+      <p:ext uri="{BB962C8B-B14F-4D97-AF65-F5344CB8AC3E}">
+        <p14:creationId xmlns:p14="http://schemas.microsoft.com/office/powerpoint/2010/main" val="1832093265"/>
+      </p:ext>
+    </p:extLst>
+  </p:cSld>
+  <p:clrMapOvr>
+    <a:masterClrMapping/>
+  </p:clrMapOvr>
+</p:notes>
+</file>
+
+<file path=ppt/notesSlides/notesSlide8.xml><?xml version="1.0" encoding="utf-8"?>
+<p:notes xmlns:a="http://schemas.openxmlformats.org/drawingml/2006/main" xmlns:r="http://schemas.openxmlformats.org/officeDocument/2006/relationships" xmlns:p="http://schemas.openxmlformats.org/presentationml/2006/main">
+  <p:cSld>
+    <p:spTree>
+      <p:nvGrpSpPr>
+        <p:cNvPr id="1" name=""/>
+        <p:cNvGrpSpPr/>
+        <p:nvPr/>
+      </p:nvGrpSpPr>
+      <p:grpSpPr>
+        <a:xfrm>
+          <a:off x="0" y="0"/>
+          <a:ext cx="0" cy="0"/>
+          <a:chOff x="0" y="0"/>
+          <a:chExt cx="0" cy="0"/>
+        </a:xfrm>
+      </p:grpSpPr>
+      <p:sp>
+        <p:nvSpPr>
+          <p:cNvPr id="2" name="Slide Image Placeholder 1"/>
+          <p:cNvSpPr>
+            <a:spLocks noGrp="1" noRot="1" noChangeAspect="1"/>
+          </p:cNvSpPr>
+          <p:nvPr>
+            <p:ph type="sldImg"/>
+          </p:nvPr>
+        </p:nvSpPr>
+        <p:spPr/>
+      </p:sp>
+      <p:sp>
+        <p:nvSpPr>
+          <p:cNvPr id="3" name="Notes Placeholder 2"/>
+          <p:cNvSpPr>
+            <a:spLocks noGrp="1"/>
+          </p:cNvSpPr>
+          <p:nvPr>
+            <p:ph type="body" idx="1"/>
+          </p:nvPr>
+        </p:nvSpPr>
+        <p:spPr/>
+        <p:txBody>
+          <a:bodyPr/>
+          <a:lstStyle/>
+          <a:p>
+            <a:r>
+              <a:rPr lang="en-US" sz="1200" kern="1200" dirty="0" smtClean="0">
+                <a:solidFill>
+                  <a:schemeClr val="tx1"/>
+                </a:solidFill>
+                <a:effectLst/>
+                <a:latin typeface="+mn-lt"/>
+                <a:ea typeface="+mn-ea"/>
+                <a:cs typeface="+mn-cs"/>
+              </a:rPr>
+              <a:t>Lessons learned</a:t>
+            </a:r>
+          </a:p>
+          <a:p>
+            <a:r>
+              <a:rPr lang="en-US" sz="1200" kern="1200" dirty="0" smtClean="0">
+                <a:solidFill>
+                  <a:schemeClr val="tx1"/>
+                </a:solidFill>
+                <a:effectLst/>
+                <a:latin typeface="+mn-lt"/>
+                <a:ea typeface="+mn-ea"/>
+                <a:cs typeface="+mn-cs"/>
+              </a:rPr>
+              <a:t>Discovered the RECURSIVE_TRIGGER option. By default, It’s off. Learned what happens when it’s on, namely…</a:t>
+            </a:r>
+          </a:p>
+          <a:p>
+            <a:r>
+              <a:rPr lang="en-US" sz="1200" kern="1200" dirty="0" smtClean="0">
+                <a:solidFill>
+                  <a:schemeClr val="tx1"/>
+                </a:solidFill>
+                <a:effectLst/>
+                <a:latin typeface="+mn-lt"/>
+                <a:ea typeface="+mn-ea"/>
+                <a:cs typeface="+mn-cs"/>
+              </a:rPr>
+              <a:t>Triggers execute even if no rows are changed.</a:t>
+            </a:r>
+          </a:p>
+          <a:p>
+            <a:r>
+              <a:rPr lang="en-US" sz="1200" kern="1200" dirty="0" smtClean="0">
+                <a:solidFill>
+                  <a:schemeClr val="tx1"/>
+                </a:solidFill>
+                <a:effectLst/>
+                <a:latin typeface="+mn-lt"/>
+                <a:ea typeface="+mn-ea"/>
+                <a:cs typeface="+mn-cs"/>
+              </a:rPr>
+              <a:t>Setting up a test is a lot of work, so have a test script.</a:t>
+            </a:r>
+          </a:p>
+          <a:p>
+            <a:r>
+              <a:rPr lang="en-US" sz="1200" kern="1200" dirty="0" smtClean="0">
+                <a:solidFill>
+                  <a:schemeClr val="tx1"/>
+                </a:solidFill>
+                <a:latin typeface="+mn-lt"/>
+                <a:ea typeface="+mn-ea"/>
+                <a:cs typeface="+mn-cs"/>
+              </a:rPr>
+              <a:t>--   Lessons learned:</a:t>
+            </a:r>
+          </a:p>
+          <a:p>
+            <a:r>
+              <a:rPr lang="en-US" sz="1200" kern="1200" dirty="0" smtClean="0">
+                <a:solidFill>
+                  <a:schemeClr val="tx1"/>
+                </a:solidFill>
+                <a:latin typeface="+mn-lt"/>
+                <a:ea typeface="+mn-ea"/>
+                <a:cs typeface="+mn-cs"/>
+              </a:rPr>
+              <a:t>--   1. Automated unit tests is a good idea: you back up and start all over a lot</a:t>
+            </a:r>
+          </a:p>
+          <a:p>
+            <a:r>
+              <a:rPr lang="en-US" sz="1200" kern="1200" dirty="0" smtClean="0">
+                <a:solidFill>
+                  <a:schemeClr val="tx1"/>
+                </a:solidFill>
+                <a:latin typeface="+mn-lt"/>
+                <a:ea typeface="+mn-ea"/>
+                <a:cs typeface="+mn-cs"/>
+              </a:rPr>
+              <a:t>--      You need to cover all cases: INSERT/UPDATE; old/new.</a:t>
+            </a:r>
+          </a:p>
+          <a:p>
+            <a:r>
+              <a:rPr lang="en-US" sz="1200" kern="1200" dirty="0" smtClean="0">
+                <a:solidFill>
+                  <a:schemeClr val="tx1"/>
+                </a:solidFill>
+                <a:latin typeface="+mn-lt"/>
+                <a:ea typeface="+mn-ea"/>
+                <a:cs typeface="+mn-cs"/>
+              </a:rPr>
+              <a:t>--   2. Because of lesson #1, version control is probably a good idea</a:t>
+            </a:r>
+          </a:p>
+          <a:p>
+            <a:r>
+              <a:rPr lang="en-US" sz="1200" kern="1200" dirty="0" smtClean="0">
+                <a:solidFill>
+                  <a:schemeClr val="tx1"/>
+                </a:solidFill>
+                <a:latin typeface="+mn-lt"/>
+                <a:ea typeface="+mn-ea"/>
+                <a:cs typeface="+mn-cs"/>
+              </a:rPr>
+              <a:t>--   3. Changelog table was a good debugging tool</a:t>
+            </a:r>
+          </a:p>
+          <a:p>
+            <a:r>
+              <a:rPr lang="en-US" sz="1200" kern="1200" dirty="0" smtClean="0">
+                <a:solidFill>
+                  <a:schemeClr val="tx1"/>
+                </a:solidFill>
+                <a:latin typeface="+mn-lt"/>
+                <a:ea typeface="+mn-ea"/>
+                <a:cs typeface="+mn-cs"/>
+              </a:rPr>
+              <a:t>--   4. Need "WHERE </a:t>
+            </a:r>
+            <a:r>
+              <a:rPr lang="en-US" sz="1200" kern="1200" dirty="0" err="1" smtClean="0">
+                <a:solidFill>
+                  <a:schemeClr val="tx1"/>
+                </a:solidFill>
+                <a:latin typeface="+mn-lt"/>
+                <a:ea typeface="+mn-ea"/>
+                <a:cs typeface="+mn-cs"/>
+              </a:rPr>
+              <a:t>Customer.CustomerId</a:t>
+            </a:r>
+            <a:r>
+              <a:rPr lang="en-US" sz="1200" kern="1200" dirty="0" smtClean="0">
+                <a:solidFill>
+                  <a:schemeClr val="tx1"/>
+                </a:solidFill>
+                <a:latin typeface="+mn-lt"/>
+                <a:ea typeface="+mn-ea"/>
+                <a:cs typeface="+mn-cs"/>
+              </a:rPr>
+              <a:t> = </a:t>
+            </a:r>
+            <a:r>
+              <a:rPr lang="en-US" sz="1200" kern="1200" dirty="0" err="1" smtClean="0">
+                <a:solidFill>
+                  <a:schemeClr val="tx1"/>
+                </a:solidFill>
+                <a:latin typeface="+mn-lt"/>
+                <a:ea typeface="+mn-ea"/>
+                <a:cs typeface="+mn-cs"/>
+              </a:rPr>
+              <a:t>inserted.CustomerId</a:t>
+            </a:r>
+            <a:r>
+              <a:rPr lang="en-US" sz="1200" kern="1200" dirty="0" smtClean="0">
+                <a:solidFill>
+                  <a:schemeClr val="tx1"/>
+                </a:solidFill>
+                <a:latin typeface="+mn-lt"/>
+                <a:ea typeface="+mn-ea"/>
+                <a:cs typeface="+mn-cs"/>
+              </a:rPr>
+              <a:t>" clause to keep from</a:t>
+            </a:r>
+          </a:p>
+          <a:p>
+            <a:r>
+              <a:rPr lang="en-US" sz="1200" kern="1200" dirty="0" smtClean="0">
+                <a:solidFill>
+                  <a:schemeClr val="tx1"/>
+                </a:solidFill>
+                <a:latin typeface="+mn-lt"/>
+                <a:ea typeface="+mn-ea"/>
+                <a:cs typeface="+mn-cs"/>
+              </a:rPr>
+              <a:t>--      from changing every row.  Tests probably need to verify all rows.</a:t>
+            </a:r>
+          </a:p>
+          <a:p>
+            <a:r>
+              <a:rPr lang="en-US" sz="1200" kern="1200" dirty="0" smtClean="0">
+                <a:solidFill>
+                  <a:schemeClr val="tx1"/>
+                </a:solidFill>
+                <a:latin typeface="+mn-lt"/>
+                <a:ea typeface="+mn-ea"/>
+                <a:cs typeface="+mn-cs"/>
+              </a:rPr>
+              <a:t>--   5. LEFT OUTER JOIN needed, so ISNULL(</a:t>
+            </a:r>
+            <a:r>
+              <a:rPr lang="en-US" sz="1200" kern="1200" dirty="0" err="1" smtClean="0">
+                <a:solidFill>
+                  <a:schemeClr val="tx1"/>
+                </a:solidFill>
+                <a:latin typeface="+mn-lt"/>
+                <a:ea typeface="+mn-ea"/>
+                <a:cs typeface="+mn-cs"/>
+              </a:rPr>
+              <a:t>deleted.column</a:t>
+            </a:r>
+            <a:r>
+              <a:rPr lang="en-US" sz="1200" kern="1200" dirty="0" smtClean="0">
+                <a:solidFill>
+                  <a:schemeClr val="tx1"/>
+                </a:solidFill>
+                <a:latin typeface="+mn-lt"/>
+                <a:ea typeface="+mn-ea"/>
+                <a:cs typeface="+mn-cs"/>
+              </a:rPr>
+              <a:t>,...) needed in WHERE clauses.</a:t>
+            </a:r>
+          </a:p>
+          <a:p>
+            <a:r>
+              <a:rPr lang="en-US" sz="1200" kern="1200" dirty="0" smtClean="0">
+                <a:solidFill>
+                  <a:schemeClr val="tx1"/>
+                </a:solidFill>
+                <a:latin typeface="+mn-lt"/>
+                <a:ea typeface="+mn-ea"/>
+                <a:cs typeface="+mn-cs"/>
+              </a:rPr>
+              <a:t>--      Both needed to handle INSERT situation.</a:t>
+            </a:r>
+          </a:p>
+          <a:p>
+            <a:r>
+              <a:rPr lang="en-US" sz="1200" kern="1200" dirty="0" smtClean="0">
+                <a:solidFill>
+                  <a:schemeClr val="tx1"/>
+                </a:solidFill>
+                <a:latin typeface="+mn-lt"/>
+                <a:ea typeface="+mn-ea"/>
+                <a:cs typeface="+mn-cs"/>
+              </a:rPr>
+              <a:t>--   6. An UPDATE that changes no rows still invokes the trigger. Without an IF at the</a:t>
+            </a:r>
+          </a:p>
+          <a:p>
+            <a:r>
+              <a:rPr lang="en-US" sz="1200" kern="1200" dirty="0" smtClean="0">
+                <a:solidFill>
+                  <a:schemeClr val="tx1"/>
+                </a:solidFill>
+                <a:latin typeface="+mn-lt"/>
+                <a:ea typeface="+mn-ea"/>
+                <a:cs typeface="+mn-cs"/>
+              </a:rPr>
+              <a:t>--      top, the trigger will go into infinite recursion.  Alternatively, setting the</a:t>
+            </a:r>
+          </a:p>
+          <a:p>
+            <a:r>
+              <a:rPr lang="en-US" sz="1200" kern="1200" dirty="0" smtClean="0">
+                <a:solidFill>
+                  <a:schemeClr val="tx1"/>
+                </a:solidFill>
+                <a:latin typeface="+mn-lt"/>
+                <a:ea typeface="+mn-ea"/>
+                <a:cs typeface="+mn-cs"/>
+              </a:rPr>
+              <a:t>--      database "ALTER DATABASE Demo1 SET RECURSIVE_TRIGGERS OFF" also works.  (OFF</a:t>
+            </a:r>
+          </a:p>
+          <a:p>
+            <a:r>
+              <a:rPr lang="en-US" sz="1200" kern="1200" dirty="0" smtClean="0">
+                <a:solidFill>
+                  <a:schemeClr val="tx1"/>
+                </a:solidFill>
+                <a:latin typeface="+mn-lt"/>
+                <a:ea typeface="+mn-ea"/>
+                <a:cs typeface="+mn-cs"/>
+              </a:rPr>
+              <a:t>--      is the default setting.)</a:t>
+            </a:r>
+          </a:p>
+          <a:p>
+            <a:endParaRPr lang="en-US" sz="1200" kern="1200" dirty="0" smtClean="0">
+              <a:solidFill>
+                <a:schemeClr val="tx1"/>
+              </a:solidFill>
+              <a:latin typeface="+mn-lt"/>
+              <a:ea typeface="+mn-ea"/>
+              <a:cs typeface="+mn-cs"/>
+            </a:endParaRPr>
+          </a:p>
+          <a:p>
+            <a:endParaRPr lang="en-US" sz="1200" kern="1200" dirty="0" smtClean="0">
+              <a:solidFill>
+                <a:schemeClr val="tx1"/>
+              </a:solidFill>
+              <a:effectLst/>
+              <a:latin typeface="+mn-lt"/>
+              <a:ea typeface="+mn-ea"/>
+              <a:cs typeface="+mn-cs"/>
+            </a:endParaRPr>
+          </a:p>
+          <a:p>
+            <a:endParaRPr lang="en-US" dirty="0"/>
+          </a:p>
+        </p:txBody>
+      </p:sp>
+      <p:sp>
+        <p:nvSpPr>
+          <p:cNvPr id="4" name="Slide Number Placeholder 3"/>
+          <p:cNvSpPr>
+            <a:spLocks noGrp="1"/>
+          </p:cNvSpPr>
+          <p:nvPr>
+            <p:ph type="sldNum" sz="quarter" idx="10"/>
+          </p:nvPr>
+        </p:nvSpPr>
+        <p:spPr/>
+        <p:txBody>
+          <a:bodyPr/>
+          <a:lstStyle/>
+          <a:p>
+            <a:fld id="{76E59958-3B60-4691-AE17-C513178CB0BF}" type="slidenum">
+              <a:rPr lang="en-US" smtClean="0"/>
+              <a:t>8</a:t>
+            </a:fld>
+            <a:endParaRPr lang="en-US"/>
+          </a:p>
+        </p:txBody>
+      </p:sp>
+    </p:spTree>
+    <p:extLst>
+      <p:ext uri="{BB962C8B-B14F-4D97-AF65-F5344CB8AC3E}">
+        <p14:creationId xmlns:p14="http://schemas.microsoft.com/office/powerpoint/2010/main" val="3980707626"/>
+      </p:ext>
+    </p:extLst>
+  </p:cSld>
+  <p:clrMapOvr>
+    <a:masterClrMapping/>
+  </p:clrMapOvr>
+</p:notes>
+</file>
+
 <file path=ppt/slideLayouts/slideLayout1.xml><?xml version="1.0" encoding="utf-8"?>
 <p:sldLayout xmlns:a="http://schemas.openxmlformats.org/drawingml/2006/main" xmlns:r="http://schemas.openxmlformats.org/officeDocument/2006/relationships" xmlns:p="http://schemas.openxmlformats.org/presentationml/2006/main" type="title" preserve="1">
   <p:cSld name="Title Slide">
@@ -318,7 +1787,7 @@
           <a:p>
             <a:fld id="{ECD19FB2-3AAB-4D03-B13A-2960828C78E3}" type="datetimeFigureOut">
               <a:rPr lang="en-US" dirty="0"/>
-              <a:t>2/18/2016</a:t>
+              <a:t>2/22/2016</a:t>
             </a:fld>
             <a:endParaRPr lang="en-US" dirty="0"/>
           </a:p>
@@ -595,7 +2064,7 @@
           <a:p>
             <a:fld id="{1B80C674-7DFC-42FE-B9CD-82963CDB1557}" type="datetimeFigureOut">
               <a:rPr lang="en-US" dirty="0"/>
-              <a:t>2/18/2016</a:t>
+              <a:t>2/22/2016</a:t>
             </a:fld>
             <a:endParaRPr lang="en-US" dirty="0"/>
           </a:p>
@@ -782,7 +2251,7 @@
           <a:p>
             <a:fld id="{2076456F-F47D-4F25-8053-2A695DA0CA7D}" type="datetimeFigureOut">
               <a:rPr lang="en-US" dirty="0"/>
-              <a:t>2/18/2016</a:t>
+              <a:t>2/22/2016</a:t>
             </a:fld>
             <a:endParaRPr lang="en-US" dirty="0"/>
           </a:p>
@@ -1038,7 +2507,7 @@
           <a:p>
             <a:fld id="{5D6C7379-69CC-4837-9905-BEBA22830C8A}" type="datetimeFigureOut">
               <a:rPr lang="en-US" dirty="0"/>
-              <a:t>2/18/2016</a:t>
+              <a:t>2/22/2016</a:t>
             </a:fld>
             <a:endParaRPr lang="en-US" dirty="0"/>
           </a:p>
@@ -1459,7 +2928,7 @@
           <a:p>
             <a:fld id="{49EB8B7E-8AEE-4F10-BFEE-C999AD004D36}" type="datetimeFigureOut">
               <a:rPr lang="en-US" dirty="0"/>
-              <a:t>2/18/2016</a:t>
+              <a:t>2/22/2016</a:t>
             </a:fld>
             <a:endParaRPr lang="en-US" dirty="0"/>
           </a:p>
@@ -2000,7 +3469,7 @@
           <a:p>
             <a:fld id="{8668F3F9-58BC-440B-B37B-805B9055EF92}" type="datetimeFigureOut">
               <a:rPr lang="en-US" dirty="0"/>
-              <a:t>2/18/2016</a:t>
+              <a:t>2/22/2016</a:t>
             </a:fld>
             <a:endParaRPr lang="en-US" dirty="0"/>
           </a:p>
@@ -2826,7 +4295,7 @@
           <a:p>
             <a:fld id="{0D5A53AF-48EA-489D-8260-9DCAB666386A}" type="datetimeFigureOut">
               <a:rPr lang="en-US" dirty="0"/>
-              <a:t>2/18/2016</a:t>
+              <a:t>2/22/2016</a:t>
             </a:fld>
             <a:endParaRPr lang="en-US" dirty="0"/>
           </a:p>
@@ -2991,7 +4460,7 @@
           <a:p>
             <a:fld id="{0DED02AE-B9A4-47BD-AF8E-97E16144138B}" type="datetimeFigureOut">
               <a:rPr lang="en-US" dirty="0"/>
-              <a:t>2/18/2016</a:t>
+              <a:t>2/22/2016</a:t>
             </a:fld>
             <a:endParaRPr lang="en-US" dirty="0"/>
           </a:p>
@@ -3166,7 +4635,7 @@
           <a:p>
             <a:fld id="{CF0FD78B-DB02-4362-BCDC-98A55456977C}" type="datetimeFigureOut">
               <a:rPr lang="en-US" dirty="0"/>
-              <a:t>2/18/2016</a:t>
+              <a:t>2/22/2016</a:t>
             </a:fld>
             <a:endParaRPr lang="en-US" dirty="0"/>
           </a:p>
@@ -3331,7 +4800,7 @@
           <a:p>
             <a:fld id="{99916976-5D93-46E4-A98A-FAD63E4D0EA8}" type="datetimeFigureOut">
               <a:rPr lang="en-US" dirty="0"/>
-              <a:t>2/18/2016</a:t>
+              <a:t>2/22/2016</a:t>
             </a:fld>
             <a:endParaRPr lang="en-US" dirty="0"/>
           </a:p>
@@ -3583,7 +5052,7 @@
           <a:p>
             <a:fld id="{0F39F4F5-F4D2-4D2A-AB60-88D37ADCB869}" type="datetimeFigureOut">
               <a:rPr lang="en-US" dirty="0"/>
-              <a:t>2/18/2016</a:t>
+              <a:t>2/22/2016</a:t>
             </a:fld>
             <a:endParaRPr lang="en-US" dirty="0"/>
           </a:p>
@@ -3810,7 +5279,7 @@
           <a:p>
             <a:fld id="{D23BC6CE-6D1E-47E5-8859-F31AC5380EB2}" type="datetimeFigureOut">
               <a:rPr lang="en-US" dirty="0"/>
-              <a:t>2/18/2016</a:t>
+              <a:t>2/22/2016</a:t>
             </a:fld>
             <a:endParaRPr lang="en-US" dirty="0"/>
           </a:p>
@@ -4198,7 +5667,7 @@
           <a:p>
             <a:fld id="{B1B4E7C4-4DA4-404D-9965-B13F2DD7D8BF}" type="datetimeFigureOut">
               <a:rPr lang="en-US" dirty="0"/>
-              <a:t>2/18/2016</a:t>
+              <a:t>2/22/2016</a:t>
             </a:fld>
             <a:endParaRPr lang="en-US" dirty="0"/>
           </a:p>
@@ -4311,7 +5780,7 @@
           <a:p>
             <a:fld id="{476FB7AA-4A53-424F-AD41-70827B6504BA}" type="datetimeFigureOut">
               <a:rPr lang="en-US" dirty="0"/>
-              <a:t>2/18/2016</a:t>
+              <a:t>2/22/2016</a:t>
             </a:fld>
             <a:endParaRPr lang="en-US" dirty="0"/>
           </a:p>
@@ -4401,7 +5870,7 @@
           <a:p>
             <a:fld id="{E7884882-FB12-4BC8-9960-9AD8104D7FAE}" type="datetimeFigureOut">
               <a:rPr lang="en-US" dirty="0"/>
-              <a:t>2/18/2016</a:t>
+              <a:t>2/22/2016</a:t>
             </a:fld>
             <a:endParaRPr lang="en-US" dirty="0"/>
           </a:p>
@@ -4669,7 +6138,7 @@
           <a:p>
             <a:fld id="{F7D1BD23-6E54-4D9D-AD88-A2813C73CC25}" type="datetimeFigureOut">
               <a:rPr lang="en-US" dirty="0"/>
-              <a:t>2/18/2016</a:t>
+              <a:t>2/22/2016</a:t>
             </a:fld>
             <a:endParaRPr lang="en-US" dirty="0"/>
           </a:p>
@@ -4945,7 +6414,7 @@
           <a:p>
             <a:fld id="{1471A834-4F3C-4AF9-9C74-05EC35A0F292}" type="datetimeFigureOut">
               <a:rPr lang="en-US" dirty="0"/>
-              <a:t>2/18/2016</a:t>
+              <a:t>2/22/2016</a:t>
             </a:fld>
             <a:endParaRPr lang="en-US" dirty="0"/>
           </a:p>
@@ -5180,7 +6649,7 @@
           <a:p>
             <a:fld id="{51CF1133-3259-4C45-BABA-5B62D9C6F78D}" type="datetimeFigureOut">
               <a:rPr lang="en-US" dirty="0"/>
-              <a:t>2/18/2016</a:t>
+              <a:t>2/22/2016</a:t>
             </a:fld>
             <a:endParaRPr lang="en-US" dirty="0"/>
           </a:p>
@@ -5746,7 +7215,31 @@
             <a:spLocks noGrp="1"/>
           </p:cNvSpPr>
           <p:nvPr>
-            <p:ph type="ctrTitle"/>
+            <p:ph type="title"/>
+          </p:nvPr>
+        </p:nvSpPr>
+        <p:spPr/>
+        <p:txBody>
+          <a:bodyPr>
+            <a:normAutofit/>
+          </a:bodyPr>
+          <a:lstStyle/>
+          <a:p>
+            <a:r>
+              <a:rPr lang="en-US" sz="6000" dirty="0"/>
+              <a:t>Triggers &amp; Refactoring</a:t>
+            </a:r>
+          </a:p>
+        </p:txBody>
+      </p:sp>
+      <p:sp>
+        <p:nvSpPr>
+          <p:cNvPr id="3" name="Content Placeholder 2"/>
+          <p:cNvSpPr>
+            <a:spLocks noGrp="1"/>
+          </p:cNvSpPr>
+          <p:nvPr>
+            <p:ph idx="1"/>
           </p:nvPr>
         </p:nvSpPr>
         <p:spPr/>
@@ -5756,31 +7249,23 @@
           <a:p>
             <a:r>
               <a:rPr lang="en-US" dirty="0" smtClean="0"/>
-              <a:t>Triggers &amp; Refactoring</a:t>
-            </a:r>
-            <a:endParaRPr lang="en-US" dirty="0"/>
-          </a:p>
-        </p:txBody>
-      </p:sp>
-      <p:sp>
-        <p:nvSpPr>
-          <p:cNvPr id="3" name="Subtitle 2"/>
-          <p:cNvSpPr>
-            <a:spLocks noGrp="1"/>
-          </p:cNvSpPr>
-          <p:nvPr>
-            <p:ph type="subTitle" idx="1"/>
-          </p:nvPr>
-        </p:nvSpPr>
-        <p:spPr/>
-        <p:txBody>
-          <a:bodyPr/>
-          <a:lstStyle/>
+              <a:t>Rob Vatz</a:t>
+            </a:r>
+          </a:p>
           <a:p>
             <a:r>
               <a:rPr lang="en-US" dirty="0" smtClean="0"/>
-              <a:t> </a:t>
-            </a:r>
+              <a:t>Email : </a:t>
+            </a:r>
+            <a:r>
+              <a:rPr lang="en-US" dirty="0" smtClean="0">
+                <a:hlinkClick r:id="rId3"/>
+              </a:rPr>
+              <a:t>rob.vatz@sceneralabs.com</a:t>
+            </a:r>
+            <a:endParaRPr lang="en-US" dirty="0" smtClean="0"/>
+          </a:p>
+          <a:p>
             <a:endParaRPr lang="en-US" dirty="0"/>
           </a:p>
         </p:txBody>
@@ -5788,7 +7273,7 @@
     </p:spTree>
     <p:extLst>
       <p:ext uri="{BB962C8B-B14F-4D97-AF65-F5344CB8AC3E}">
-        <p14:creationId xmlns:p14="http://schemas.microsoft.com/office/powerpoint/2010/main" val="3193906844"/>
+        <p14:creationId xmlns:p14="http://schemas.microsoft.com/office/powerpoint/2010/main" val="705854090"/>
       </p:ext>
     </p:extLst>
   </p:cSld>
@@ -5839,7 +7324,7 @@
           <a:p>
             <a:r>
               <a:rPr lang="en-US" dirty="0" smtClean="0"/>
-              <a:t>References</a:t>
+              <a:t>Questions?</a:t>
             </a:r>
             <a:endParaRPr lang="en-US" dirty="0"/>
           </a:p>
@@ -5857,74 +7342,8 @@
         </p:nvSpPr>
         <p:spPr/>
         <p:txBody>
-          <a:bodyPr>
-            <a:normAutofit/>
-          </a:bodyPr>
-          <a:lstStyle/>
-          <a:p>
-            <a:r>
-              <a:rPr lang="en-US" dirty="0" smtClean="0"/>
-              <a:t>Evolutionary </a:t>
-            </a:r>
-            <a:r>
-              <a:rPr lang="en-US" dirty="0"/>
-              <a:t>Database Design: </a:t>
-            </a:r>
-            <a:r>
-              <a:rPr lang="en-US" dirty="0">
-                <a:hlinkClick r:id="rId2"/>
-              </a:rPr>
-              <a:t>http://</a:t>
-            </a:r>
-            <a:r>
-              <a:rPr lang="en-US" dirty="0" smtClean="0">
-                <a:hlinkClick r:id="rId2"/>
-              </a:rPr>
-              <a:t>martinfowler.com/articles/evodb.html</a:t>
-            </a:r>
-            <a:r>
-              <a:rPr lang="en-US" dirty="0" smtClean="0"/>
-              <a:t> </a:t>
-            </a:r>
-          </a:p>
-          <a:p>
-            <a:endParaRPr lang="en-US" dirty="0" smtClean="0"/>
-          </a:p>
-          <a:p>
-            <a:r>
-              <a:rPr lang="en-US" dirty="0" smtClean="0"/>
-              <a:t>Expand/Contract pattern: </a:t>
-            </a:r>
-            <a:r>
-              <a:rPr lang="en-US" dirty="0">
-                <a:hlinkClick r:id="rId3"/>
-              </a:rPr>
-              <a:t>http://</a:t>
-            </a:r>
-            <a:r>
-              <a:rPr lang="en-US" dirty="0" smtClean="0">
-                <a:hlinkClick r:id="rId3"/>
-              </a:rPr>
-              <a:t>martinfowler.com/bliki/ParallelChange.html</a:t>
-            </a:r>
-            <a:r>
-              <a:rPr lang="en-US" dirty="0" smtClean="0"/>
-              <a:t> </a:t>
-            </a:r>
-          </a:p>
-          <a:p>
-            <a:endParaRPr lang="en-US" dirty="0" smtClean="0"/>
-          </a:p>
-          <a:p>
-            <a:r>
-              <a:rPr lang="en-US" dirty="0" smtClean="0"/>
-              <a:t>Refactoring </a:t>
-            </a:r>
-            <a:r>
-              <a:rPr lang="en-US" dirty="0"/>
-              <a:t>Databases book</a:t>
-            </a:r>
-          </a:p>
+          <a:bodyPr/>
+          <a:lstStyle/>
           <a:p>
             <a:pPr marL="0" indent="0">
               <a:buNone/>
@@ -5932,6 +7351,9 @@
             <a:endParaRPr lang="en-US" dirty="0"/>
           </a:p>
           <a:p>
+            <a:pPr marL="0" indent="0">
+              <a:buNone/>
+            </a:pPr>
             <a:endParaRPr lang="en-US" dirty="0"/>
           </a:p>
         </p:txBody>
@@ -5939,7 +7361,7 @@
     </p:spTree>
     <p:extLst>
       <p:ext uri="{BB962C8B-B14F-4D97-AF65-F5344CB8AC3E}">
-        <p14:creationId xmlns:p14="http://schemas.microsoft.com/office/powerpoint/2010/main" val="2258765297"/>
+        <p14:creationId xmlns:p14="http://schemas.microsoft.com/office/powerpoint/2010/main" val="3067436373"/>
       </p:ext>
     </p:extLst>
   </p:cSld>
@@ -5990,7 +7412,7 @@
           <a:p>
             <a:r>
               <a:rPr lang="en-US" dirty="0" smtClean="0"/>
-              <a:t>Questions?</a:t>
+              <a:t>(Expected screens)</a:t>
             </a:r>
             <a:endParaRPr lang="en-US" dirty="0"/>
           </a:p>
@@ -6011,15 +7433,56 @@
           <a:bodyPr/>
           <a:lstStyle/>
           <a:p>
-            <a:pPr marL="0" indent="0">
-              <a:buNone/>
-            </a:pPr>
-            <a:endParaRPr lang="en-US" dirty="0"/>
-          </a:p>
-          <a:p>
-            <a:pPr marL="0" indent="0">
-              <a:buNone/>
-            </a:pPr>
+            <a:r>
+              <a:rPr lang="en-US" b="1" dirty="0" smtClean="0"/>
+              <a:t>Extra </a:t>
+            </a:r>
+            <a:r>
+              <a:rPr lang="en-US" b="1" dirty="0"/>
+              <a:t>slides in case SQL Server </a:t>
+            </a:r>
+            <a:r>
+              <a:rPr lang="en-US" b="1" dirty="0" smtClean="0"/>
+              <a:t>fails during demo.</a:t>
+            </a:r>
+            <a:endParaRPr lang="en-US" dirty="0"/>
+          </a:p>
+          <a:p>
+            <a:pPr lvl="0"/>
+            <a:r>
+              <a:rPr lang="en-US" dirty="0"/>
+              <a:t>Snapshot of old query results BEFORE change. (results and messages)</a:t>
+            </a:r>
+          </a:p>
+          <a:p>
+            <a:pPr lvl="0"/>
+            <a:r>
+              <a:rPr lang="en-US" dirty="0"/>
+              <a:t>Test results from test script for trigger.</a:t>
+            </a:r>
+          </a:p>
+          <a:p>
+            <a:pPr lvl="0"/>
+            <a:r>
+              <a:rPr lang="en-US" dirty="0"/>
+              <a:t>Snapshot of old query results after adding trigger. (results and messages)</a:t>
+            </a:r>
+          </a:p>
+          <a:p>
+            <a:pPr lvl="0"/>
+            <a:r>
+              <a:rPr lang="en-US" dirty="0"/>
+              <a:t>Snapshot of new query results with trigger. (results and messages)</a:t>
+            </a:r>
+          </a:p>
+          <a:p>
+            <a:pPr lvl="0"/>
+            <a:r>
+              <a:rPr lang="en-US" dirty="0"/>
+              <a:t>Snapshot of new query results after trigger. (results and messages)</a:t>
+            </a:r>
+          </a:p>
+          <a:p>
             <a:endParaRPr lang="en-US" dirty="0"/>
           </a:p>
         </p:txBody>
@@ -6027,7 +7490,7 @@
     </p:spTree>
     <p:extLst>
       <p:ext uri="{BB962C8B-B14F-4D97-AF65-F5344CB8AC3E}">
-        <p14:creationId xmlns:p14="http://schemas.microsoft.com/office/powerpoint/2010/main" val="3067436373"/>
+        <p14:creationId xmlns:p14="http://schemas.microsoft.com/office/powerpoint/2010/main" val="3169779886"/>
       </p:ext>
     </p:extLst>
   </p:cSld>
@@ -6095,7 +7558,7 @@
           </p:nvPr>
         </p:nvPicPr>
         <p:blipFill>
-          <a:blip r:embed="rId2">
+          <a:blip r:embed="rId3">
             <a:extLst>
               <a:ext uri="{28A0092B-C50C-407E-A947-70E740481C1C}">
                 <a14:useLocalDpi xmlns:a14="http://schemas.microsoft.com/office/drawing/2010/main" val="0"/>
@@ -6137,6 +7600,13 @@
   <p:clrMapOvr>
     <a:masterClrMapping/>
   </p:clrMapOvr>
+  <p:timing>
+    <p:tnLst>
+      <p:par>
+        <p:cTn id="1" dur="indefinite" restart="never" nodeType="tmRoot"/>
+      </p:par>
+    </p:tnLst>
+  </p:timing>
 </p:sld>
 </file>
 
@@ -6174,7 +7644,7 @@
           <a:p>
             <a:r>
               <a:rPr lang="en-US" dirty="0" smtClean="0"/>
-              <a:t>Triggers: what and why</a:t>
+              <a:t>Refactoring Database</a:t>
             </a:r>
             <a:endParaRPr lang="en-US" dirty="0"/>
           </a:p>
@@ -6197,31 +7667,37 @@
           <a:p>
             <a:r>
               <a:rPr lang="en-US" dirty="0" smtClean="0"/>
-              <a:t>Triggers are stored procedures that run after or instead of DML or DDL.</a:t>
+              <a:t>Expand</a:t>
             </a:r>
           </a:p>
           <a:p>
             <a:r>
               <a:rPr lang="en-US" dirty="0" smtClean="0"/>
-              <a:t>Why? Refactoring databases, updatable views</a:t>
-            </a:r>
-            <a:r>
-              <a:rPr lang="en-US" dirty="0"/>
-              <a:t>.</a:t>
-            </a:r>
-            <a:endParaRPr lang="en-US" dirty="0" smtClean="0"/>
-          </a:p>
-          <a:p>
-            <a:r>
-              <a:rPr lang="en-US" dirty="0"/>
-              <a:t>Why not? Hidden performance problems</a:t>
-            </a:r>
-            <a:endParaRPr lang="en-US" dirty="0" smtClean="0"/>
-          </a:p>
-          <a:p>
-            <a:pPr marL="0" indent="0">
-              <a:buNone/>
-            </a:pPr>
+              <a:t>Convert/copy data and add triggers</a:t>
+            </a:r>
+          </a:p>
+          <a:p>
+            <a:r>
+              <a:rPr lang="en-US" dirty="0" smtClean="0"/>
+              <a:t>Migrate</a:t>
+            </a:r>
+          </a:p>
+          <a:p>
+            <a:r>
+              <a:rPr lang="en-US" dirty="0" smtClean="0"/>
+              <a:t>Remove triggers</a:t>
+            </a:r>
+          </a:p>
+          <a:p>
+            <a:r>
+              <a:rPr lang="en-US" dirty="0" smtClean="0"/>
+              <a:t>Contract</a:t>
+            </a:r>
+          </a:p>
+          <a:p>
+            <a:endParaRPr lang="en-US"/>
+          </a:p>
+          <a:p>
             <a:endParaRPr lang="en-US" dirty="0"/>
           </a:p>
         </p:txBody>
@@ -6229,7 +7705,7 @@
     </p:spTree>
     <p:extLst>
       <p:ext uri="{BB962C8B-B14F-4D97-AF65-F5344CB8AC3E}">
-        <p14:creationId xmlns:p14="http://schemas.microsoft.com/office/powerpoint/2010/main" val="530568018"/>
+        <p14:creationId xmlns:p14="http://schemas.microsoft.com/office/powerpoint/2010/main" val="1522652689"/>
       </p:ext>
     </p:extLst>
   </p:cSld>
@@ -6280,7 +7756,7 @@
           <a:p>
             <a:r>
               <a:rPr lang="en-US" dirty="0" smtClean="0"/>
-              <a:t>Refactoring Database</a:t>
+              <a:t>Expand</a:t>
             </a:r>
             <a:endParaRPr lang="en-US" dirty="0"/>
           </a:p>
@@ -6303,37 +7779,32 @@
           <a:p>
             <a:r>
               <a:rPr lang="en-US" dirty="0" smtClean="0"/>
-              <a:t>Expand</a:t>
+              <a:t>Add tables</a:t>
             </a:r>
           </a:p>
           <a:p>
             <a:r>
               <a:rPr lang="en-US" dirty="0" smtClean="0"/>
-              <a:t>Convert/copy data and add triggers</a:t>
+              <a:t>Add columns</a:t>
             </a:r>
           </a:p>
           <a:p>
             <a:r>
               <a:rPr lang="en-US" dirty="0" smtClean="0"/>
-              <a:t>Migrate</a:t>
+              <a:t>Add DEFAULT constraints</a:t>
             </a:r>
           </a:p>
           <a:p>
             <a:r>
               <a:rPr lang="en-US" dirty="0" smtClean="0"/>
-              <a:t>Remove triggers</a:t>
+              <a:t>Remove UNIQUE, FOREIGN KEY, PRIMARY KEY constraints</a:t>
             </a:r>
           </a:p>
           <a:p>
             <a:r>
               <a:rPr lang="en-US" dirty="0" smtClean="0"/>
-              <a:t>Contract</a:t>
-            </a:r>
-          </a:p>
-          <a:p>
-            <a:endParaRPr lang="en-US"/>
-          </a:p>
-          <a:p>
+              <a:t>Remove CHECK constraints</a:t>
+            </a:r>
             <a:endParaRPr lang="en-US" dirty="0"/>
           </a:p>
         </p:txBody>
@@ -6341,7 +7812,7 @@
     </p:spTree>
     <p:extLst>
       <p:ext uri="{BB962C8B-B14F-4D97-AF65-F5344CB8AC3E}">
-        <p14:creationId xmlns:p14="http://schemas.microsoft.com/office/powerpoint/2010/main" val="1522652689"/>
+        <p14:creationId xmlns:p14="http://schemas.microsoft.com/office/powerpoint/2010/main" val="3997596963"/>
       </p:ext>
     </p:extLst>
   </p:cSld>
@@ -6392,7 +7863,7 @@
           <a:p>
             <a:r>
               <a:rPr lang="en-US" dirty="0" smtClean="0"/>
-              <a:t>Expand</a:t>
+              <a:t>Migrate</a:t>
             </a:r>
             <a:endParaRPr lang="en-US" dirty="0"/>
           </a:p>
@@ -6415,31 +7886,13 @@
           <a:p>
             <a:r>
               <a:rPr lang="en-US" dirty="0" smtClean="0"/>
-              <a:t>Add tables</a:t>
+              <a:t>Change stored procedures and functions to use new version</a:t>
             </a:r>
           </a:p>
           <a:p>
             <a:r>
               <a:rPr lang="en-US" dirty="0" smtClean="0"/>
-              <a:t>Add columns</a:t>
-            </a:r>
-          </a:p>
-          <a:p>
-            <a:r>
-              <a:rPr lang="en-US" dirty="0" smtClean="0"/>
-              <a:t>Add DEFAULT constraints</a:t>
-            </a:r>
-          </a:p>
-          <a:p>
-            <a:r>
-              <a:rPr lang="en-US" dirty="0" smtClean="0"/>
-              <a:t>Remove UNIQUE, FOREIGN KEY, PRIMARY KEY constraints</a:t>
-            </a:r>
-          </a:p>
-          <a:p>
-            <a:r>
-              <a:rPr lang="en-US" dirty="0" smtClean="0"/>
-              <a:t>Remove CHECK constraints</a:t>
+              <a:t>Developers change code to use new version</a:t>
             </a:r>
             <a:endParaRPr lang="en-US" dirty="0"/>
           </a:p>
@@ -6448,7 +7901,7 @@
     </p:spTree>
     <p:extLst>
       <p:ext uri="{BB962C8B-B14F-4D97-AF65-F5344CB8AC3E}">
-        <p14:creationId xmlns:p14="http://schemas.microsoft.com/office/powerpoint/2010/main" val="3997596963"/>
+        <p14:creationId xmlns:p14="http://schemas.microsoft.com/office/powerpoint/2010/main" val="4089960077"/>
       </p:ext>
     </p:extLst>
   </p:cSld>
@@ -6499,7 +7952,7 @@
           <a:p>
             <a:r>
               <a:rPr lang="en-US" dirty="0" smtClean="0"/>
-              <a:t>Migrate</a:t>
+              <a:t>Contract</a:t>
             </a:r>
             <a:endParaRPr lang="en-US" dirty="0"/>
           </a:p>
@@ -6522,13 +7975,37 @@
           <a:p>
             <a:r>
               <a:rPr lang="en-US" dirty="0" smtClean="0"/>
-              <a:t>Change stored procedures and functions to use new version</a:t>
+              <a:t>Remove tables</a:t>
             </a:r>
           </a:p>
           <a:p>
             <a:r>
               <a:rPr lang="en-US" dirty="0" smtClean="0"/>
-              <a:t>Developers change code to use new version</a:t>
+              <a:t>Remove columns</a:t>
+            </a:r>
+          </a:p>
+          <a:p>
+            <a:r>
+              <a:rPr lang="en-US" dirty="0" smtClean="0"/>
+              <a:t>Remove stored procedures, functions</a:t>
+            </a:r>
+          </a:p>
+          <a:p>
+            <a:r>
+              <a:rPr lang="en-US" dirty="0" smtClean="0"/>
+              <a:t>Remove DEFAULT constraints</a:t>
+            </a:r>
+          </a:p>
+          <a:p>
+            <a:r>
+              <a:rPr lang="en-US" dirty="0" smtClean="0"/>
+              <a:t>Add UNIQUE, FOREIGN KEY, PRIMARY KEY constraints</a:t>
+            </a:r>
+          </a:p>
+          <a:p>
+            <a:r>
+              <a:rPr lang="en-US" dirty="0" smtClean="0"/>
+              <a:t>Add CHECK constraints</a:t>
             </a:r>
             <a:endParaRPr lang="en-US" dirty="0"/>
           </a:p>
@@ -6537,7 +8014,7 @@
     </p:spTree>
     <p:extLst>
       <p:ext uri="{BB962C8B-B14F-4D97-AF65-F5344CB8AC3E}">
-        <p14:creationId xmlns:p14="http://schemas.microsoft.com/office/powerpoint/2010/main" val="4089960077"/>
+        <p14:creationId xmlns:p14="http://schemas.microsoft.com/office/powerpoint/2010/main" val="144908857"/>
       </p:ext>
     </p:extLst>
   </p:cSld>
@@ -6588,7 +8065,7 @@
           <a:p>
             <a:r>
               <a:rPr lang="en-US" dirty="0" smtClean="0"/>
-              <a:t>Contract</a:t>
+              <a:t>Demo</a:t>
             </a:r>
             <a:endParaRPr lang="en-US" dirty="0"/>
           </a:p>
@@ -6609,40 +8086,6 @@
           <a:bodyPr/>
           <a:lstStyle/>
           <a:p>
-            <a:r>
-              <a:rPr lang="en-US" dirty="0" smtClean="0"/>
-              <a:t>Remove tables</a:t>
-            </a:r>
-          </a:p>
-          <a:p>
-            <a:r>
-              <a:rPr lang="en-US" dirty="0" smtClean="0"/>
-              <a:t>Remove columns</a:t>
-            </a:r>
-          </a:p>
-          <a:p>
-            <a:r>
-              <a:rPr lang="en-US" dirty="0" smtClean="0"/>
-              <a:t>Remove stored procedures, functions</a:t>
-            </a:r>
-          </a:p>
-          <a:p>
-            <a:r>
-              <a:rPr lang="en-US" dirty="0" smtClean="0"/>
-              <a:t>Remove DEFAULT constraints</a:t>
-            </a:r>
-          </a:p>
-          <a:p>
-            <a:r>
-              <a:rPr lang="en-US" dirty="0" smtClean="0"/>
-              <a:t>Add UNIQUE, FOREIGN KEY, PRIMARY KEY constraints</a:t>
-            </a:r>
-          </a:p>
-          <a:p>
-            <a:r>
-              <a:rPr lang="en-US" dirty="0" smtClean="0"/>
-              <a:t>Add CHECK constraints</a:t>
-            </a:r>
             <a:endParaRPr lang="en-US" dirty="0"/>
           </a:p>
         </p:txBody>
@@ -6650,7 +8093,7 @@
     </p:spTree>
     <p:extLst>
       <p:ext uri="{BB962C8B-B14F-4D97-AF65-F5344CB8AC3E}">
-        <p14:creationId xmlns:p14="http://schemas.microsoft.com/office/powerpoint/2010/main" val="144908857"/>
+        <p14:creationId xmlns:p14="http://schemas.microsoft.com/office/powerpoint/2010/main" val="609649797"/>
       </p:ext>
     </p:extLst>
   </p:cSld>
@@ -6701,7 +8144,7 @@
           <a:p>
             <a:r>
               <a:rPr lang="en-US" dirty="0" smtClean="0"/>
-              <a:t>Demo</a:t>
+              <a:t>Lessons Learned</a:t>
             </a:r>
             <a:endParaRPr lang="en-US" dirty="0"/>
           </a:p>
@@ -6721,6 +8164,45 @@
         <p:txBody>
           <a:bodyPr/>
           <a:lstStyle/>
+          <a:p>
+            <a:r>
+              <a:rPr lang="en-US" dirty="0"/>
+              <a:t>SET </a:t>
+            </a:r>
+            <a:r>
+              <a:rPr lang="en-US" dirty="0" smtClean="0"/>
+              <a:t>RECURSIVE_TRIGGERS OFF/ON</a:t>
+            </a:r>
+          </a:p>
+          <a:p>
+            <a:r>
+              <a:rPr lang="en-US" dirty="0" smtClean="0"/>
+              <a:t>Triggers execute even if table contents doesn’t change</a:t>
+            </a:r>
+          </a:p>
+          <a:p>
+            <a:r>
+              <a:rPr lang="en-US" dirty="0" smtClean="0"/>
+              <a:t>Testing is painful, especially setup, so…</a:t>
+            </a:r>
+          </a:p>
+          <a:p>
+            <a:r>
+              <a:rPr lang="en-US" dirty="0" smtClean="0"/>
+              <a:t>Have a test </a:t>
+            </a:r>
+            <a:r>
+              <a:rPr lang="en-US" dirty="0" smtClean="0"/>
+              <a:t>script</a:t>
+            </a:r>
+          </a:p>
+          <a:p>
+            <a:r>
+              <a:rPr lang="en-US" dirty="0" smtClean="0"/>
+              <a:t>Use version control</a:t>
+            </a:r>
+            <a:endParaRPr lang="en-US" dirty="0" smtClean="0"/>
+          </a:p>
           <a:p>
             <a:endParaRPr lang="en-US" dirty="0"/>
           </a:p>
@@ -6729,7 +8211,7 @@
     </p:spTree>
     <p:extLst>
       <p:ext uri="{BB962C8B-B14F-4D97-AF65-F5344CB8AC3E}">
-        <p14:creationId xmlns:p14="http://schemas.microsoft.com/office/powerpoint/2010/main" val="609649797"/>
+        <p14:creationId xmlns:p14="http://schemas.microsoft.com/office/powerpoint/2010/main" val="3523844589"/>
       </p:ext>
     </p:extLst>
   </p:cSld>
@@ -6780,7 +8262,7 @@
           <a:p>
             <a:r>
               <a:rPr lang="en-US" dirty="0" smtClean="0"/>
-              <a:t>Lessons Learned</a:t>
+              <a:t>References</a:t>
             </a:r>
             <a:endParaRPr lang="en-US" dirty="0"/>
           </a:p>
@@ -6798,35 +8280,79 @@
         </p:nvSpPr>
         <p:spPr/>
         <p:txBody>
-          <a:bodyPr/>
-          <a:lstStyle/>
-          <a:p>
+          <a:bodyPr>
+            <a:normAutofit/>
+          </a:bodyPr>
+          <a:lstStyle/>
+          <a:p>
+            <a:r>
+              <a:rPr lang="en-US" dirty="0" smtClean="0"/>
+              <a:t>Evolutionary </a:t>
+            </a:r>
             <a:r>
               <a:rPr lang="en-US" dirty="0"/>
-              <a:t>SET </a:t>
+              <a:t>Database Design: </a:t>
+            </a:r>
+            <a:r>
+              <a:rPr lang="en-US" dirty="0">
+                <a:hlinkClick r:id="rId2"/>
+              </a:rPr>
+              <a:t>http://</a:t>
+            </a:r>
+            <a:r>
+              <a:rPr lang="en-US" dirty="0" smtClean="0">
+                <a:hlinkClick r:id="rId2"/>
+              </a:rPr>
+              <a:t>martinfowler.com/articles/evodb.html</a:t>
             </a:r>
             <a:r>
               <a:rPr lang="en-US" dirty="0" smtClean="0"/>
-              <a:t>RECURSIVE_TRIGGERS OFF/ON</a:t>
-            </a:r>
+              <a:t> </a:t>
+            </a:r>
+          </a:p>
+          <a:p>
+            <a:endParaRPr lang="en-US" dirty="0" smtClean="0"/>
           </a:p>
           <a:p>
             <a:r>
               <a:rPr lang="en-US" dirty="0" smtClean="0"/>
-              <a:t>Triggers execute even if table contents doesn’t change</a:t>
-            </a:r>
-          </a:p>
-          <a:p>
+              <a:t>Expand/Contract pattern: </a:t>
+            </a:r>
+            <a:r>
+              <a:rPr lang="en-US" dirty="0">
+                <a:hlinkClick r:id="rId3"/>
+              </a:rPr>
+              <a:t>http://</a:t>
+            </a:r>
+            <a:r>
+              <a:rPr lang="en-US" dirty="0" smtClean="0">
+                <a:hlinkClick r:id="rId3"/>
+              </a:rPr>
+              <a:t>martinfowler.com/bliki/ParallelChange.html</a:t>
+            </a:r>
             <a:r>
               <a:rPr lang="en-US" dirty="0" smtClean="0"/>
-              <a:t>Testing is painful, especially setup, so…</a:t>
-            </a:r>
+              <a:t> </a:t>
+            </a:r>
+          </a:p>
+          <a:p>
+            <a:endParaRPr lang="en-US" dirty="0" smtClean="0"/>
           </a:p>
           <a:p>
             <a:r>
               <a:rPr lang="en-US" dirty="0" smtClean="0"/>
-              <a:t>Have a test script</a:t>
-            </a:r>
+              <a:t>Refactoring </a:t>
+            </a:r>
+            <a:r>
+              <a:rPr lang="en-US" dirty="0"/>
+              <a:t>Databases book</a:t>
+            </a:r>
+          </a:p>
+          <a:p>
+            <a:pPr marL="0" indent="0">
+              <a:buNone/>
+            </a:pPr>
+            <a:endParaRPr lang="en-US" dirty="0"/>
           </a:p>
           <a:p>
             <a:endParaRPr lang="en-US" dirty="0"/>
@@ -6836,7 +8362,7 @@
     </p:spTree>
     <p:extLst>
       <p:ext uri="{BB962C8B-B14F-4D97-AF65-F5344CB8AC3E}">
-        <p14:creationId xmlns:p14="http://schemas.microsoft.com/office/powerpoint/2010/main" val="3523844589"/>
+        <p14:creationId xmlns:p14="http://schemas.microsoft.com/office/powerpoint/2010/main" val="2258765297"/>
       </p:ext>
     </p:extLst>
   </p:cSld>
@@ -7112,4 +8638,265 @@
     </a:ext>
   </a:extLst>
 </a:theme>
+</file>
+
+<file path=ppt/theme/theme2.xml><?xml version="1.0" encoding="utf-8"?>
+<a:theme xmlns:a="http://schemas.openxmlformats.org/drawingml/2006/main" name="Office Theme">
+  <a:themeElements>
+    <a:clrScheme name="Office">
+      <a:dk1>
+        <a:sysClr val="windowText" lastClr="000000"/>
+      </a:dk1>
+      <a:lt1>
+        <a:sysClr val="window" lastClr="FFFFFF"/>
+      </a:lt1>
+      <a:dk2>
+        <a:srgbClr val="44546A"/>
+      </a:dk2>
+      <a:lt2>
+        <a:srgbClr val="E7E6E6"/>
+      </a:lt2>
+      <a:accent1>
+        <a:srgbClr val="5B9BD5"/>
+      </a:accent1>
+      <a:accent2>
+        <a:srgbClr val="ED7D31"/>
+      </a:accent2>
+      <a:accent3>
+        <a:srgbClr val="A5A5A5"/>
+      </a:accent3>
+      <a:accent4>
+        <a:srgbClr val="FFC000"/>
+      </a:accent4>
+      <a:accent5>
+        <a:srgbClr val="4472C4"/>
+      </a:accent5>
+      <a:accent6>
+        <a:srgbClr val="70AD47"/>
+      </a:accent6>
+      <a:hlink>
+        <a:srgbClr val="0563C1"/>
+      </a:hlink>
+      <a:folHlink>
+        <a:srgbClr val="954F72"/>
+      </a:folHlink>
+    </a:clrScheme>
+    <a:fontScheme name="Office">
+      <a:majorFont>
+        <a:latin typeface="Calibri Light" panose="020F0302020204030204"/>
+        <a:ea typeface=""/>
+        <a:cs typeface=""/>
+        <a:font script="Jpan" typeface="ＭＳ Ｐゴシック"/>
+        <a:font script="Hang" typeface="맑은 고딕"/>
+        <a:font script="Hans" typeface="宋体"/>
+        <a:font script="Hant" typeface="新細明體"/>
+        <a:font script="Arab" typeface="Times New Roman"/>
+        <a:font script="Hebr" typeface="Times New Roman"/>
+        <a:font script="Thai" typeface="Angsana New"/>
+        <a:font script="Ethi" typeface="Nyala"/>
+        <a:font script="Beng" typeface="Vrinda"/>
+        <a:font script="Gujr" typeface="Shruti"/>
+        <a:font script="Khmr" typeface="MoolBoran"/>
+        <a:font script="Knda" typeface="Tunga"/>
+        <a:font script="Guru" typeface="Raavi"/>
+        <a:font script="Cans" typeface="Euphemia"/>
+        <a:font script="Cher" typeface="Plantagenet Cherokee"/>
+        <a:font script="Yiii" typeface="Microsoft Yi Baiti"/>
+        <a:font script="Tibt" typeface="Microsoft Himalaya"/>
+        <a:font script="Thaa" typeface="MV Boli"/>
+        <a:font script="Deva" typeface="Mangal"/>
+        <a:font script="Telu" typeface="Gautami"/>
+        <a:font script="Taml" typeface="Latha"/>
+        <a:font script="Syrc" typeface="Estrangelo Edessa"/>
+        <a:font script="Orya" typeface="Kalinga"/>
+        <a:font script="Mlym" typeface="Kartika"/>
+        <a:font script="Laoo" typeface="DokChampa"/>
+        <a:font script="Sinh" typeface="Iskoola Pota"/>
+        <a:font script="Mong" typeface="Mongolian Baiti"/>
+        <a:font script="Viet" typeface="Times New Roman"/>
+        <a:font script="Uigh" typeface="Microsoft Uighur"/>
+        <a:font script="Geor" typeface="Sylfaen"/>
+      </a:majorFont>
+      <a:minorFont>
+        <a:latin typeface="Calibri" panose="020F0502020204030204"/>
+        <a:ea typeface=""/>
+        <a:cs typeface=""/>
+        <a:font script="Jpan" typeface="ＭＳ Ｐゴシック"/>
+        <a:font script="Hang" typeface="맑은 고딕"/>
+        <a:font script="Hans" typeface="宋体"/>
+        <a:font script="Hant" typeface="新細明體"/>
+        <a:font script="Arab" typeface="Arial"/>
+        <a:font script="Hebr" typeface="Arial"/>
+        <a:font script="Thai" typeface="Cordia New"/>
+        <a:font script="Ethi" typeface="Nyala"/>
+        <a:font script="Beng" typeface="Vrinda"/>
+        <a:font script="Gujr" typeface="Shruti"/>
+        <a:font script="Khmr" typeface="DaunPenh"/>
+        <a:font script="Knda" typeface="Tunga"/>
+        <a:font script="Guru" typeface="Raavi"/>
+        <a:font script="Cans" typeface="Euphemia"/>
+        <a:font script="Cher" typeface="Plantagenet Cherokee"/>
+        <a:font script="Yiii" typeface="Microsoft Yi Baiti"/>
+        <a:font script="Tibt" typeface="Microsoft Himalaya"/>
+        <a:font script="Thaa" typeface="MV Boli"/>
+        <a:font script="Deva" typeface="Mangal"/>
+        <a:font script="Telu" typeface="Gautami"/>
+        <a:font script="Taml" typeface="Latha"/>
+        <a:font script="Syrc" typeface="Estrangelo Edessa"/>
+        <a:font script="Orya" typeface="Kalinga"/>
+        <a:font script="Mlym" typeface="Kartika"/>
+        <a:font script="Laoo" typeface="DokChampa"/>
+        <a:font script="Sinh" typeface="Iskoola Pota"/>
+        <a:font script="Mong" typeface="Mongolian Baiti"/>
+        <a:font script="Viet" typeface="Arial"/>
+        <a:font script="Uigh" typeface="Microsoft Uighur"/>
+        <a:font script="Geor" typeface="Sylfaen"/>
+      </a:minorFont>
+    </a:fontScheme>
+    <a:fmtScheme name="Office">
+      <a:fillStyleLst>
+        <a:solidFill>
+          <a:schemeClr val="phClr"/>
+        </a:solidFill>
+        <a:gradFill rotWithShape="1">
+          <a:gsLst>
+            <a:gs pos="0">
+              <a:schemeClr val="phClr">
+                <a:lumMod val="110000"/>
+                <a:satMod val="105000"/>
+                <a:tint val="67000"/>
+              </a:schemeClr>
+            </a:gs>
+            <a:gs pos="50000">
+              <a:schemeClr val="phClr">
+                <a:lumMod val="105000"/>
+                <a:satMod val="103000"/>
+                <a:tint val="73000"/>
+              </a:schemeClr>
+            </a:gs>
+            <a:gs pos="100000">
+              <a:schemeClr val="phClr">
+                <a:lumMod val="105000"/>
+                <a:satMod val="109000"/>
+                <a:tint val="81000"/>
+              </a:schemeClr>
+            </a:gs>
+          </a:gsLst>
+          <a:lin ang="5400000" scaled="0"/>
+        </a:gradFill>
+        <a:gradFill rotWithShape="1">
+          <a:gsLst>
+            <a:gs pos="0">
+              <a:schemeClr val="phClr">
+                <a:satMod val="103000"/>
+                <a:lumMod val="102000"/>
+                <a:tint val="94000"/>
+              </a:schemeClr>
+            </a:gs>
+            <a:gs pos="50000">
+              <a:schemeClr val="phClr">
+                <a:satMod val="110000"/>
+                <a:lumMod val="100000"/>
+                <a:shade val="100000"/>
+              </a:schemeClr>
+            </a:gs>
+            <a:gs pos="100000">
+              <a:schemeClr val="phClr">
+                <a:lumMod val="99000"/>
+                <a:satMod val="120000"/>
+                <a:shade val="78000"/>
+              </a:schemeClr>
+            </a:gs>
+          </a:gsLst>
+          <a:lin ang="5400000" scaled="0"/>
+        </a:gradFill>
+      </a:fillStyleLst>
+      <a:lnStyleLst>
+        <a:ln w="6350" cap="flat" cmpd="sng" algn="ctr">
+          <a:solidFill>
+            <a:schemeClr val="phClr"/>
+          </a:solidFill>
+          <a:prstDash val="solid"/>
+          <a:miter lim="800000"/>
+        </a:ln>
+        <a:ln w="12700" cap="flat" cmpd="sng" algn="ctr">
+          <a:solidFill>
+            <a:schemeClr val="phClr"/>
+          </a:solidFill>
+          <a:prstDash val="solid"/>
+          <a:miter lim="800000"/>
+        </a:ln>
+        <a:ln w="19050" cap="flat" cmpd="sng" algn="ctr">
+          <a:solidFill>
+            <a:schemeClr val="phClr"/>
+          </a:solidFill>
+          <a:prstDash val="solid"/>
+          <a:miter lim="800000"/>
+        </a:ln>
+      </a:lnStyleLst>
+      <a:effectStyleLst>
+        <a:effectStyle>
+          <a:effectLst/>
+        </a:effectStyle>
+        <a:effectStyle>
+          <a:effectLst/>
+        </a:effectStyle>
+        <a:effectStyle>
+          <a:effectLst>
+            <a:outerShdw blurRad="57150" dist="19050" dir="5400000" algn="ctr" rotWithShape="0">
+              <a:srgbClr val="000000">
+                <a:alpha val="63000"/>
+              </a:srgbClr>
+            </a:outerShdw>
+          </a:effectLst>
+        </a:effectStyle>
+      </a:effectStyleLst>
+      <a:bgFillStyleLst>
+        <a:solidFill>
+          <a:schemeClr val="phClr"/>
+        </a:solidFill>
+        <a:solidFill>
+          <a:schemeClr val="phClr">
+            <a:tint val="95000"/>
+            <a:satMod val="170000"/>
+          </a:schemeClr>
+        </a:solidFill>
+        <a:gradFill rotWithShape="1">
+          <a:gsLst>
+            <a:gs pos="0">
+              <a:schemeClr val="phClr">
+                <a:tint val="93000"/>
+                <a:satMod val="150000"/>
+                <a:shade val="98000"/>
+                <a:lumMod val="102000"/>
+              </a:schemeClr>
+            </a:gs>
+            <a:gs pos="50000">
+              <a:schemeClr val="phClr">
+                <a:tint val="98000"/>
+                <a:satMod val="130000"/>
+                <a:shade val="90000"/>
+                <a:lumMod val="103000"/>
+              </a:schemeClr>
+            </a:gs>
+            <a:gs pos="100000">
+              <a:schemeClr val="phClr">
+                <a:shade val="63000"/>
+                <a:satMod val="120000"/>
+              </a:schemeClr>
+            </a:gs>
+          </a:gsLst>
+          <a:lin ang="5400000" scaled="0"/>
+        </a:gradFill>
+      </a:bgFillStyleLst>
+    </a:fmtScheme>
+  </a:themeElements>
+  <a:objectDefaults/>
+  <a:extraClrSchemeLst/>
+  <a:extLst>
+    <a:ext uri="{05A4C25C-085E-4340-85A3-A5531E510DB2}">
+      <thm15:themeFamily xmlns:thm15="http://schemas.microsoft.com/office/thememl/2012/main" name="Office Theme" id="{62F939B6-93AF-4DB8-9C6B-D6C7DFDC589F}" vid="{4A3C46E8-61CC-4603-A589-7422A47A8E4A}"/>
+    </a:ext>
+  </a:extLst>
+</a:theme>
 </file>
</xml_diff>

<commit_message>
Various refinements to slides after practice
Stripped out DevOps overview to save time
Added Setup hints
Moved notes around for greater clarity
Added comments about old values before UPDATE commands
</commit_message>
<xml_diff>
--- a/Triggers & Refactoring.pptx
+++ b/Triggers & Refactoring.pptx
@@ -5,19 +5,15 @@
     <p:sldMasterId id="2147483648" r:id="rId1"/>
   </p:sldMasterIdLst>
   <p:notesMasterIdLst>
-    <p:notesMasterId r:id="rId12"/>
+    <p:notesMasterId r:id="rId8"/>
   </p:notesMasterIdLst>
   <p:sldIdLst>
     <p:sldId id="269" r:id="rId2"/>
     <p:sldId id="268" r:id="rId3"/>
-    <p:sldId id="264" r:id="rId4"/>
-    <p:sldId id="265" r:id="rId5"/>
-    <p:sldId id="267" r:id="rId6"/>
-    <p:sldId id="266" r:id="rId7"/>
-    <p:sldId id="260" r:id="rId8"/>
-    <p:sldId id="261" r:id="rId9"/>
-    <p:sldId id="262" r:id="rId10"/>
-    <p:sldId id="263" r:id="rId11"/>
+    <p:sldId id="260" r:id="rId4"/>
+    <p:sldId id="261" r:id="rId5"/>
+    <p:sldId id="262" r:id="rId6"/>
+    <p:sldId id="263" r:id="rId7"/>
   </p:sldIdLst>
   <p:sldSz cx="12192000" cy="6858000"/>
   <p:notesSz cx="6858000" cy="9144000"/>
@@ -120,6 +116,9 @@
     <p:ext uri="{EFAFB233-063F-42B5-8137-9DF3F51BA10A}">
       <p15:sldGuideLst xmlns:p15="http://schemas.microsoft.com/office/powerpoint/2012/main"/>
     </p:ext>
+    <p:ext uri="{2D200454-40CA-4A62-9FC3-DE9A4176ACB9}">
+      <p15:notesGuideLst xmlns:p15="http://schemas.microsoft.com/office/powerpoint/2012/main"/>
+    </p:ext>
   </p:extLst>
 </p:presentation>
 </file>
@@ -206,7 +205,7 @@
           <a:p>
             <a:fld id="{64842430-D212-4A2D-9268-FB7D9B780FC0}" type="datetimeFigureOut">
               <a:rPr lang="en-US" smtClean="0"/>
-              <a:t>2/22/2016</a:t>
+              <a:t>3/1/2016</a:t>
             </a:fld>
             <a:endParaRPr lang="en-US"/>
           </a:p>
@@ -519,16 +518,38 @@
           <a:lstStyle/>
           <a:p>
             <a:r>
-              <a:rPr lang="en-US" sz="1200" kern="1200" dirty="0" smtClean="0">
-                <a:solidFill>
-                  <a:schemeClr val="tx1"/>
-                </a:solidFill>
-                <a:effectLst/>
-                <a:latin typeface="+mn-lt"/>
-                <a:ea typeface="+mn-ea"/>
-                <a:cs typeface="+mn-cs"/>
-              </a:rPr>
-              <a:t>I’ve been exploring the idea of refactoring a database.  To do so, I realized I needed to learn about triggers.  I’d thought I’d share what I’ve learned.</a:t>
+              <a:rPr lang="en-US" dirty="0" smtClean="0"/>
+              <a:t>Setup: 1.</a:t>
+            </a:r>
+            <a:r>
+              <a:rPr lang="en-US" baseline="0" dirty="0" smtClean="0"/>
+              <a:t> Bring up document folder, 2. SSMS connected with scripts 2,3,4,5, 3. USE Demo1, 4. Have PowerPoint up,  have slides share mode</a:t>
+            </a:r>
+          </a:p>
+          <a:p>
+            <a:endParaRPr lang="en-US" dirty="0" smtClean="0"/>
+          </a:p>
+          <a:p>
+            <a:r>
+              <a:rPr lang="en-US" dirty="0" smtClean="0"/>
+              <a:t>I’m Rob Vatz of Scenera Research. This</a:t>
+            </a:r>
+            <a:r>
+              <a:rPr lang="en-US" baseline="0" dirty="0" smtClean="0"/>
+              <a:t> mini-talk is about triggers in the context of refactoring a database.</a:t>
+            </a:r>
+          </a:p>
+          <a:p>
+            <a:endParaRPr lang="en-US" baseline="0" dirty="0" smtClean="0"/>
+          </a:p>
+          <a:p>
+            <a:r>
+              <a:rPr lang="en-US" dirty="0" smtClean="0"/>
+              <a:t>I’ve run into</a:t>
+            </a:r>
+            <a:r>
+              <a:rPr lang="en-US" baseline="0" dirty="0" smtClean="0"/>
+              <a:t> a situation at work where I needed to change tables in a production database that has a lot of code referring to it. S</a:t>
             </a:r>
             <a:endParaRPr lang="en-US" dirty="0"/>
           </a:p>
@@ -614,62 +635,10 @@
           <a:bodyPr/>
           <a:lstStyle/>
           <a:p>
-            <a:pPr marL="0" marR="0" indent="0" algn="l" defTabSz="914400" rtl="0" eaLnBrk="1" fontAlgn="auto" latinLnBrk="0" hangingPunct="1">
-              <a:lnSpc>
-                <a:spcPct val="100000"/>
-              </a:lnSpc>
-              <a:spcBef>
-                <a:spcPts val="0"/>
-              </a:spcBef>
-              <a:spcAft>
-                <a:spcPts val="0"/>
-              </a:spcAft>
-              <a:buClrTx/>
-              <a:buSzTx/>
-              <a:buFontTx/>
-              <a:buNone/>
-              <a:tabLst/>
-              <a:defRPr/>
-            </a:pPr>
-            <a:r>
-              <a:rPr lang="en-US" sz="1200" kern="1200" dirty="0" smtClean="0">
-                <a:solidFill>
-                  <a:schemeClr val="tx1"/>
-                </a:solidFill>
-                <a:effectLst/>
-                <a:latin typeface="+mn-lt"/>
-                <a:ea typeface="+mn-ea"/>
-                <a:cs typeface="+mn-cs"/>
-              </a:rPr>
-              <a:t>This is the idea of gradually</a:t>
-            </a:r>
-            <a:r>
-              <a:rPr lang="en-US" sz="1200" kern="1200" baseline="0" dirty="0" smtClean="0">
-                <a:solidFill>
-                  <a:schemeClr val="tx1"/>
-                </a:solidFill>
-                <a:effectLst/>
-                <a:latin typeface="+mn-lt"/>
-                <a:ea typeface="+mn-ea"/>
-                <a:cs typeface="+mn-cs"/>
-              </a:rPr>
-              <a:t> changing your database design as you learn requirements . It </a:t>
-            </a:r>
-            <a:r>
-              <a:rPr lang="en-US" sz="1200" kern="1200" dirty="0" smtClean="0">
-                <a:solidFill>
-                  <a:schemeClr val="tx1"/>
-                </a:solidFill>
-                <a:effectLst/>
-                <a:latin typeface="+mn-lt"/>
-                <a:ea typeface="+mn-ea"/>
-                <a:cs typeface="+mn-cs"/>
-              </a:rPr>
-              <a:t>fits in well with current programming trends such as Agile and Lean, which emphasize Minimum Viable Product, and experimentation</a:t>
-            </a:r>
-            <a:endParaRPr lang="en-US" dirty="0" smtClean="0"/>
-          </a:p>
-          <a:p>
+            <a:r>
+              <a:rPr lang="en-US" baseline="0" dirty="0" smtClean="0"/>
+              <a:t>So I looked at this book, Refactoring Databases. I learned from reading it that I was going to have to learn about triggers, You need triggers to keep the old version and the new version of the data in sync. I hadn’t used triggers before, so I created a test database to learn the concepts. </a:t>
+            </a:r>
             <a:endParaRPr lang="en-US" dirty="0"/>
           </a:p>
         </p:txBody>
@@ -755,6 +724,59 @@
           <a:lstStyle/>
           <a:p>
             <a:r>
+              <a:rPr lang="en-US" dirty="0" smtClean="0"/>
+              <a:t>Run Setup, show OLD table,</a:t>
+            </a:r>
+            <a:r>
+              <a:rPr lang="en-US" baseline="0" dirty="0" smtClean="0"/>
+              <a:t> </a:t>
+            </a:r>
+            <a:r>
+              <a:rPr lang="en-US" dirty="0" smtClean="0"/>
+              <a:t>Show</a:t>
+            </a:r>
+            <a:r>
+              <a:rPr lang="en-US" baseline="0" dirty="0" smtClean="0"/>
+              <a:t> goals of refactor, </a:t>
+            </a:r>
+          </a:p>
+          <a:p>
+            <a:r>
+              <a:rPr lang="en-US" sz="1200" kern="1200" baseline="0" dirty="0" smtClean="0">
+                <a:solidFill>
+                  <a:schemeClr val="tx1"/>
+                </a:solidFill>
+                <a:effectLst/>
+                <a:latin typeface="+mn-lt"/>
+                <a:ea typeface="+mn-ea"/>
+                <a:cs typeface="+mn-cs"/>
+              </a:rPr>
+              <a:t>Trigger </a:t>
+            </a:r>
+            <a:r>
+              <a:rPr lang="en-US" sz="1200" kern="1200" baseline="0" dirty="0" err="1" smtClean="0">
+                <a:solidFill>
+                  <a:schemeClr val="tx1"/>
+                </a:solidFill>
+                <a:effectLst/>
+                <a:latin typeface="+mn-lt"/>
+                <a:ea typeface="+mn-ea"/>
+                <a:cs typeface="+mn-cs"/>
+              </a:rPr>
+              <a:t>featueres</a:t>
+            </a:r>
+            <a:endParaRPr lang="en-US" sz="1200" kern="1200" dirty="0" smtClean="0">
+              <a:solidFill>
+                <a:schemeClr val="tx1"/>
+              </a:solidFill>
+              <a:effectLst/>
+              <a:latin typeface="+mn-lt"/>
+              <a:ea typeface="+mn-ea"/>
+              <a:cs typeface="+mn-cs"/>
+            </a:endParaRPr>
+          </a:p>
+          <a:p>
+            <a:r>
               <a:rPr lang="en-US" sz="1200" kern="1200" dirty="0" smtClean="0">
                 <a:solidFill>
                   <a:schemeClr val="tx1"/>
@@ -764,8 +786,187 @@
                 <a:ea typeface="+mn-ea"/>
                 <a:cs typeface="+mn-cs"/>
               </a:rPr>
-              <a:t>Refactoring a database consists of essentially 3 steps: expand, migrate, and contract.</a:t>
-            </a:r>
+              <a:t>(Will talk about code at top of trigger later.)</a:t>
+            </a:r>
+          </a:p>
+          <a:p>
+            <a:endParaRPr lang="en-US" sz="1200" kern="1200" dirty="0" smtClean="0">
+              <a:solidFill>
+                <a:schemeClr val="tx1"/>
+              </a:solidFill>
+              <a:effectLst/>
+              <a:latin typeface="+mn-lt"/>
+              <a:ea typeface="+mn-ea"/>
+              <a:cs typeface="+mn-cs"/>
+            </a:endParaRPr>
+          </a:p>
+          <a:p>
+            <a:r>
+              <a:rPr lang="en-US" sz="1200" kern="1200" dirty="0" smtClean="0">
+                <a:solidFill>
+                  <a:schemeClr val="tx1"/>
+                </a:solidFill>
+                <a:effectLst/>
+                <a:latin typeface="+mn-lt"/>
+                <a:ea typeface="+mn-ea"/>
+                <a:cs typeface="+mn-cs"/>
+              </a:rPr>
+              <a:t>UPDATE(column),</a:t>
+            </a:r>
+            <a:r>
+              <a:rPr lang="en-US" sz="1200" kern="1200" baseline="0" dirty="0" smtClean="0">
+                <a:solidFill>
+                  <a:schemeClr val="tx1"/>
+                </a:solidFill>
+                <a:effectLst/>
+                <a:latin typeface="+mn-lt"/>
+                <a:ea typeface="+mn-ea"/>
+                <a:cs typeface="+mn-cs"/>
+              </a:rPr>
+              <a:t> inserted pseudo-table, deleted pseudo-table</a:t>
+            </a:r>
+          </a:p>
+          <a:p>
+            <a:endParaRPr lang="en-US" sz="1200" kern="1200" dirty="0" smtClean="0">
+              <a:solidFill>
+                <a:schemeClr val="tx1"/>
+              </a:solidFill>
+              <a:effectLst/>
+              <a:latin typeface="+mn-lt"/>
+              <a:ea typeface="+mn-ea"/>
+              <a:cs typeface="+mn-cs"/>
+            </a:endParaRPr>
+          </a:p>
+          <a:p>
+            <a:r>
+              <a:rPr lang="en-US" sz="1200" kern="1200" dirty="0" smtClean="0">
+                <a:solidFill>
+                  <a:schemeClr val="tx1"/>
+                </a:solidFill>
+                <a:latin typeface="+mn-lt"/>
+                <a:ea typeface="+mn-ea"/>
+                <a:cs typeface="+mn-cs"/>
+              </a:rPr>
+              <a:t>"WHERE </a:t>
+            </a:r>
+            <a:r>
+              <a:rPr lang="en-US" sz="1200" kern="1200" dirty="0" err="1" smtClean="0">
+                <a:solidFill>
+                  <a:schemeClr val="tx1"/>
+                </a:solidFill>
+                <a:latin typeface="+mn-lt"/>
+                <a:ea typeface="+mn-ea"/>
+                <a:cs typeface="+mn-cs"/>
+              </a:rPr>
+              <a:t>Customer.CustomerId</a:t>
+            </a:r>
+            <a:r>
+              <a:rPr lang="en-US" sz="1200" kern="1200" dirty="0" smtClean="0">
+                <a:solidFill>
+                  <a:schemeClr val="tx1"/>
+                </a:solidFill>
+                <a:latin typeface="+mn-lt"/>
+                <a:ea typeface="+mn-ea"/>
+                <a:cs typeface="+mn-cs"/>
+              </a:rPr>
+              <a:t> = </a:t>
+            </a:r>
+            <a:r>
+              <a:rPr lang="en-US" sz="1200" kern="1200" dirty="0" err="1" smtClean="0">
+                <a:solidFill>
+                  <a:schemeClr val="tx1"/>
+                </a:solidFill>
+                <a:latin typeface="+mn-lt"/>
+                <a:ea typeface="+mn-ea"/>
+                <a:cs typeface="+mn-cs"/>
+              </a:rPr>
+              <a:t>inserted.CustomerId</a:t>
+            </a:r>
+            <a:r>
+              <a:rPr lang="en-US" sz="1200" kern="1200" dirty="0" smtClean="0">
+                <a:solidFill>
+                  <a:schemeClr val="tx1"/>
+                </a:solidFill>
+                <a:latin typeface="+mn-lt"/>
+                <a:ea typeface="+mn-ea"/>
+                <a:cs typeface="+mn-cs"/>
+              </a:rPr>
+              <a:t>" clause to keep from changing every row. </a:t>
+            </a:r>
+          </a:p>
+          <a:p>
+            <a:endParaRPr lang="en-US" sz="1200" kern="1200" dirty="0" smtClean="0">
+              <a:solidFill>
+                <a:schemeClr val="tx1"/>
+              </a:solidFill>
+              <a:latin typeface="+mn-lt"/>
+              <a:ea typeface="+mn-ea"/>
+              <a:cs typeface="+mn-cs"/>
+            </a:endParaRPr>
+          </a:p>
+          <a:p>
+            <a:r>
+              <a:rPr lang="en-US" sz="1200" kern="1200" dirty="0" smtClean="0">
+                <a:solidFill>
+                  <a:schemeClr val="tx1"/>
+                </a:solidFill>
+                <a:latin typeface="+mn-lt"/>
+                <a:ea typeface="+mn-ea"/>
+                <a:cs typeface="+mn-cs"/>
+              </a:rPr>
+              <a:t>LEFT OUTER JOIN needed, so ISNULL(</a:t>
+            </a:r>
+            <a:r>
+              <a:rPr lang="en-US" sz="1200" kern="1200" dirty="0" err="1" smtClean="0">
+                <a:solidFill>
+                  <a:schemeClr val="tx1"/>
+                </a:solidFill>
+                <a:latin typeface="+mn-lt"/>
+                <a:ea typeface="+mn-ea"/>
+                <a:cs typeface="+mn-cs"/>
+              </a:rPr>
+              <a:t>deleted.column</a:t>
+            </a:r>
+            <a:r>
+              <a:rPr lang="en-US" sz="1200" kern="1200" dirty="0" smtClean="0">
+                <a:solidFill>
+                  <a:schemeClr val="tx1"/>
+                </a:solidFill>
+                <a:latin typeface="+mn-lt"/>
+                <a:ea typeface="+mn-ea"/>
+                <a:cs typeface="+mn-cs"/>
+              </a:rPr>
+              <a:t>,...) needed in WHERE clauses.</a:t>
+            </a:r>
+          </a:p>
+          <a:p>
+            <a:endParaRPr lang="en-US" sz="1200" kern="1200" dirty="0" smtClean="0">
+              <a:solidFill>
+                <a:schemeClr val="tx1"/>
+              </a:solidFill>
+              <a:latin typeface="+mn-lt"/>
+              <a:ea typeface="+mn-ea"/>
+              <a:cs typeface="+mn-cs"/>
+            </a:endParaRPr>
+          </a:p>
+          <a:p>
+            <a:r>
+              <a:rPr lang="en-US" sz="1200" kern="1200" dirty="0" smtClean="0">
+                <a:solidFill>
+                  <a:schemeClr val="tx1"/>
+                </a:solidFill>
+                <a:latin typeface="+mn-lt"/>
+                <a:ea typeface="+mn-ea"/>
+                <a:cs typeface="+mn-cs"/>
+              </a:rPr>
+              <a:t>Both needed to handle INSERT situation.</a:t>
+            </a:r>
+          </a:p>
+          <a:p>
+            <a:pPr marL="0" indent="0">
+              <a:buNone/>
+            </a:pPr>
+            <a:endParaRPr lang="en-US" baseline="0" dirty="0" smtClean="0"/>
           </a:p>
         </p:txBody>
       </p:sp>
@@ -795,7 +996,7 @@
     </p:spTree>
     <p:extLst>
       <p:ext uri="{BB962C8B-B14F-4D97-AF65-F5344CB8AC3E}">
-        <p14:creationId xmlns:p14="http://schemas.microsoft.com/office/powerpoint/2010/main" val="392170317"/>
+        <p14:creationId xmlns:p14="http://schemas.microsoft.com/office/powerpoint/2010/main" val="1832093265"/>
       </p:ext>
     </p:extLst>
   </p:cSld>
@@ -849,10 +1050,263 @@
           <a:bodyPr/>
           <a:lstStyle/>
           <a:p>
+            <a:pPr marL="171450" indent="-171450">
+              <a:buFont typeface="Arial" panose="020B0604020202020204" pitchFamily="34" charset="0"/>
+              <a:buChar char="•"/>
+            </a:pPr>
+            <a:r>
+              <a:rPr lang="en-US" sz="1200" kern="1200" dirty="0" smtClean="0">
+                <a:solidFill>
+                  <a:schemeClr val="tx1"/>
+                </a:solidFill>
+                <a:effectLst/>
+                <a:latin typeface="+mn-lt"/>
+                <a:ea typeface="+mn-ea"/>
+                <a:cs typeface="+mn-cs"/>
+              </a:rPr>
+              <a:t>Discovered the RECURSIVE_TRIGGER option. By default, It’s off. Learned what happens when it’s on, namely…</a:t>
+            </a:r>
+          </a:p>
+          <a:p>
+            <a:pPr marL="171450" indent="-171450">
+              <a:buFont typeface="Arial" panose="020B0604020202020204" pitchFamily="34" charset="0"/>
+              <a:buChar char="•"/>
+            </a:pPr>
+            <a:r>
+              <a:rPr lang="en-US" sz="1200" kern="1200" dirty="0" smtClean="0">
+                <a:solidFill>
+                  <a:schemeClr val="tx1"/>
+                </a:solidFill>
+                <a:effectLst/>
+                <a:latin typeface="+mn-lt"/>
+                <a:ea typeface="+mn-ea"/>
+                <a:cs typeface="+mn-cs"/>
+              </a:rPr>
+              <a:t>Triggers execute even if no rows are changed.</a:t>
+            </a:r>
+          </a:p>
+          <a:p>
+            <a:pPr marL="171450" indent="-171450">
+              <a:buFont typeface="Arial" panose="020B0604020202020204" pitchFamily="34" charset="0"/>
+              <a:buChar char="•"/>
+            </a:pPr>
+            <a:r>
+              <a:rPr lang="en-US" sz="1200" kern="1200" dirty="0" smtClean="0">
+                <a:solidFill>
+                  <a:schemeClr val="tx1"/>
+                </a:solidFill>
+                <a:effectLst/>
+                <a:latin typeface="+mn-lt"/>
+                <a:ea typeface="+mn-ea"/>
+                <a:cs typeface="+mn-cs"/>
+              </a:rPr>
+              <a:t>Setting up a test is a lot of work, so have a test script.</a:t>
+            </a:r>
+          </a:p>
+          <a:p>
+            <a:pPr marL="171450" indent="-171450">
+              <a:buFont typeface="Arial" panose="020B0604020202020204" pitchFamily="34" charset="0"/>
+              <a:buChar char="•"/>
+            </a:pPr>
+            <a:r>
+              <a:rPr lang="en-US" sz="1200" kern="1200" dirty="0" smtClean="0">
+                <a:solidFill>
+                  <a:schemeClr val="tx1"/>
+                </a:solidFill>
+                <a:latin typeface="+mn-lt"/>
+                <a:ea typeface="+mn-ea"/>
+                <a:cs typeface="+mn-cs"/>
+              </a:rPr>
+              <a:t>Automated unit tests is a good idea: you back up and start all over a lot. You need to cover all cases: INSERT/UPDATE; old/new.</a:t>
+            </a:r>
+          </a:p>
+          <a:p>
+            <a:pPr marL="171450" indent="-171450">
+              <a:buFont typeface="Arial" panose="020B0604020202020204" pitchFamily="34" charset="0"/>
+              <a:buChar char="•"/>
+            </a:pPr>
+            <a:r>
+              <a:rPr lang="en-US" sz="1200" kern="1200" dirty="0" smtClean="0">
+                <a:solidFill>
+                  <a:schemeClr val="tx1"/>
+                </a:solidFill>
+                <a:latin typeface="+mn-lt"/>
+                <a:ea typeface="+mn-ea"/>
+                <a:cs typeface="+mn-cs"/>
+              </a:rPr>
+              <a:t>Because of lesson #1, version control is probably a good idea</a:t>
+            </a:r>
+          </a:p>
+          <a:p>
+            <a:pPr marL="171450" indent="-171450">
+              <a:buFont typeface="Arial" panose="020B0604020202020204" pitchFamily="34" charset="0"/>
+              <a:buChar char="•"/>
+            </a:pPr>
+            <a:r>
+              <a:rPr lang="en-US" sz="1200" kern="1200" dirty="0" smtClean="0">
+                <a:solidFill>
+                  <a:schemeClr val="tx1"/>
+                </a:solidFill>
+                <a:latin typeface="+mn-lt"/>
+                <a:ea typeface="+mn-ea"/>
+                <a:cs typeface="+mn-cs"/>
+              </a:rPr>
+              <a:t>Changelog table was a good debugging tool</a:t>
+            </a:r>
+          </a:p>
+          <a:p>
             <a:r>
               <a:rPr lang="en-US" dirty="0" smtClean="0"/>
-              <a:t>optional</a:t>
-            </a:r>
+              <a:t>=======</a:t>
+            </a:r>
+            <a:endParaRPr lang="en-US" sz="1200" kern="1200" dirty="0" smtClean="0">
+              <a:solidFill>
+                <a:schemeClr val="tx1"/>
+              </a:solidFill>
+              <a:latin typeface="+mn-lt"/>
+              <a:ea typeface="+mn-ea"/>
+              <a:cs typeface="+mn-cs"/>
+            </a:endParaRPr>
+          </a:p>
+          <a:p>
+            <a:pPr marL="171450" indent="-171450">
+              <a:buFont typeface="Arial" panose="020B0604020202020204" pitchFamily="34" charset="0"/>
+              <a:buChar char="•"/>
+            </a:pPr>
+            <a:r>
+              <a:rPr lang="en-US" sz="1200" kern="1200" dirty="0" smtClean="0">
+                <a:solidFill>
+                  <a:schemeClr val="tx1"/>
+                </a:solidFill>
+                <a:latin typeface="+mn-lt"/>
+                <a:ea typeface="+mn-ea"/>
+                <a:cs typeface="+mn-cs"/>
+              </a:rPr>
+              <a:t>Need "WHERE </a:t>
+            </a:r>
+            <a:r>
+              <a:rPr lang="en-US" sz="1200" kern="1200" dirty="0" err="1" smtClean="0">
+                <a:solidFill>
+                  <a:schemeClr val="tx1"/>
+                </a:solidFill>
+                <a:latin typeface="+mn-lt"/>
+                <a:ea typeface="+mn-ea"/>
+                <a:cs typeface="+mn-cs"/>
+              </a:rPr>
+              <a:t>Customer.CustomerId</a:t>
+            </a:r>
+            <a:r>
+              <a:rPr lang="en-US" sz="1200" kern="1200" dirty="0" smtClean="0">
+                <a:solidFill>
+                  <a:schemeClr val="tx1"/>
+                </a:solidFill>
+                <a:latin typeface="+mn-lt"/>
+                <a:ea typeface="+mn-ea"/>
+                <a:cs typeface="+mn-cs"/>
+              </a:rPr>
+              <a:t> = </a:t>
+            </a:r>
+            <a:r>
+              <a:rPr lang="en-US" sz="1200" kern="1200" dirty="0" err="1" smtClean="0">
+                <a:solidFill>
+                  <a:schemeClr val="tx1"/>
+                </a:solidFill>
+                <a:latin typeface="+mn-lt"/>
+                <a:ea typeface="+mn-ea"/>
+                <a:cs typeface="+mn-cs"/>
+              </a:rPr>
+              <a:t>inserted.CustomerId</a:t>
+            </a:r>
+            <a:r>
+              <a:rPr lang="en-US" sz="1200" kern="1200" dirty="0" smtClean="0">
+                <a:solidFill>
+                  <a:schemeClr val="tx1"/>
+                </a:solidFill>
+                <a:latin typeface="+mn-lt"/>
+                <a:ea typeface="+mn-ea"/>
+                <a:cs typeface="+mn-cs"/>
+              </a:rPr>
+              <a:t>" clause to keep from changing every row.  Tests probably need to verify all rows.</a:t>
+            </a:r>
+          </a:p>
+          <a:p>
+            <a:pPr marL="171450" indent="-171450">
+              <a:buFont typeface="Arial" panose="020B0604020202020204" pitchFamily="34" charset="0"/>
+              <a:buChar char="•"/>
+            </a:pPr>
+            <a:r>
+              <a:rPr lang="en-US" sz="1200" kern="1200" dirty="0" smtClean="0">
+                <a:solidFill>
+                  <a:schemeClr val="tx1"/>
+                </a:solidFill>
+                <a:latin typeface="+mn-lt"/>
+                <a:ea typeface="+mn-ea"/>
+                <a:cs typeface="+mn-cs"/>
+              </a:rPr>
+              <a:t>LEFT OUTER JOIN needed, so ISNULL(</a:t>
+            </a:r>
+            <a:r>
+              <a:rPr lang="en-US" sz="1200" kern="1200" dirty="0" err="1" smtClean="0">
+                <a:solidFill>
+                  <a:schemeClr val="tx1"/>
+                </a:solidFill>
+                <a:latin typeface="+mn-lt"/>
+                <a:ea typeface="+mn-ea"/>
+                <a:cs typeface="+mn-cs"/>
+              </a:rPr>
+              <a:t>deleted.column</a:t>
+            </a:r>
+            <a:r>
+              <a:rPr lang="en-US" sz="1200" kern="1200" dirty="0" smtClean="0">
+                <a:solidFill>
+                  <a:schemeClr val="tx1"/>
+                </a:solidFill>
+                <a:latin typeface="+mn-lt"/>
+                <a:ea typeface="+mn-ea"/>
+                <a:cs typeface="+mn-cs"/>
+              </a:rPr>
+              <a:t>,...) needed in WHERE clauses.</a:t>
+            </a:r>
+          </a:p>
+          <a:p>
+            <a:pPr marL="171450" indent="-171450">
+              <a:buFont typeface="Arial" panose="020B0604020202020204" pitchFamily="34" charset="0"/>
+              <a:buChar char="•"/>
+            </a:pPr>
+            <a:r>
+              <a:rPr lang="en-US" sz="1200" kern="1200" dirty="0" smtClean="0">
+                <a:solidFill>
+                  <a:schemeClr val="tx1"/>
+                </a:solidFill>
+                <a:latin typeface="+mn-lt"/>
+                <a:ea typeface="+mn-ea"/>
+                <a:cs typeface="+mn-cs"/>
+              </a:rPr>
+              <a:t>Both needed to handle INSERT situation.</a:t>
+            </a:r>
+          </a:p>
+          <a:p>
+            <a:endParaRPr lang="en-US" sz="1200" kern="1200" dirty="0" smtClean="0">
+              <a:solidFill>
+                <a:schemeClr val="tx1"/>
+              </a:solidFill>
+              <a:latin typeface="+mn-lt"/>
+              <a:ea typeface="+mn-ea"/>
+              <a:cs typeface="+mn-cs"/>
+            </a:endParaRPr>
+          </a:p>
+          <a:p>
+            <a:endParaRPr lang="en-US" sz="1200" kern="1200" dirty="0" smtClean="0">
+              <a:solidFill>
+                <a:schemeClr val="tx1"/>
+              </a:solidFill>
+              <a:effectLst/>
+              <a:latin typeface="+mn-lt"/>
+              <a:ea typeface="+mn-ea"/>
+              <a:cs typeface="+mn-cs"/>
+            </a:endParaRPr>
+          </a:p>
+          <a:p>
             <a:endParaRPr lang="en-US" dirty="0"/>
           </a:p>
         </p:txBody>
@@ -883,7 +1337,7 @@
     </p:spTree>
     <p:extLst>
       <p:ext uri="{BB962C8B-B14F-4D97-AF65-F5344CB8AC3E}">
-        <p14:creationId xmlns:p14="http://schemas.microsoft.com/office/powerpoint/2010/main" val="3746180344"/>
+        <p14:creationId xmlns:p14="http://schemas.microsoft.com/office/powerpoint/2010/main" val="3980707626"/>
       </p:ext>
     </p:extLst>
   </p:cSld>
@@ -937,15 +1391,7 @@
           <a:bodyPr/>
           <a:lstStyle/>
           <a:p>
-            <a:r>
-              <a:rPr lang="en-US" dirty="0" smtClean="0"/>
-              <a:t>The</a:t>
-            </a:r>
-            <a:r>
-              <a:rPr lang="en-US" baseline="0" dirty="0" smtClean="0"/>
-              <a:t> triggers keep the two versions in sync.</a:t>
-            </a:r>
-            <a:endParaRPr lang="en-US" dirty="0"/>
+            <a:endParaRPr lang="en-US"/>
           </a:p>
         </p:txBody>
       </p:sp>
@@ -975,7 +1421,7 @@
     </p:spTree>
     <p:extLst>
       <p:ext uri="{BB962C8B-B14F-4D97-AF65-F5344CB8AC3E}">
-        <p14:creationId xmlns:p14="http://schemas.microsoft.com/office/powerpoint/2010/main" val="2033570768"/>
+        <p14:creationId xmlns:p14="http://schemas.microsoft.com/office/powerpoint/2010/main" val="3316172763"/>
       </p:ext>
     </p:extLst>
   </p:cSld>
@@ -1029,19 +1475,7 @@
           <a:bodyPr/>
           <a:lstStyle/>
           <a:p>
-            <a:r>
-              <a:rPr lang="en-US" sz="1200" kern="1200" dirty="0" smtClean="0">
-                <a:solidFill>
-                  <a:schemeClr val="tx1"/>
-                </a:solidFill>
-                <a:effectLst/>
-                <a:latin typeface="+mn-lt"/>
-                <a:ea typeface="+mn-ea"/>
-                <a:cs typeface="+mn-cs"/>
-              </a:rPr>
-              <a:t>Contract (optional) – the opposite of expand.  (Rename instead of drop if you’re really cautious.)</a:t>
-            </a:r>
-            <a:endParaRPr lang="en-US" dirty="0"/>
+            <a:endParaRPr lang="en-US"/>
           </a:p>
         </p:txBody>
       </p:sp>
@@ -1071,516 +1505,7 @@
     </p:spTree>
     <p:extLst>
       <p:ext uri="{BB962C8B-B14F-4D97-AF65-F5344CB8AC3E}">
-        <p14:creationId xmlns:p14="http://schemas.microsoft.com/office/powerpoint/2010/main" val="853532486"/>
-      </p:ext>
-    </p:extLst>
-  </p:cSld>
-  <p:clrMapOvr>
-    <a:masterClrMapping/>
-  </p:clrMapOvr>
-</p:notes>
-</file>
-
-<file path=ppt/notesSlides/notesSlide7.xml><?xml version="1.0" encoding="utf-8"?>
-<p:notes xmlns:a="http://schemas.openxmlformats.org/drawingml/2006/main" xmlns:r="http://schemas.openxmlformats.org/officeDocument/2006/relationships" xmlns:p="http://schemas.openxmlformats.org/presentationml/2006/main">
-  <p:cSld>
-    <p:spTree>
-      <p:nvGrpSpPr>
-        <p:cNvPr id="1" name=""/>
-        <p:cNvGrpSpPr/>
-        <p:nvPr/>
-      </p:nvGrpSpPr>
-      <p:grpSpPr>
-        <a:xfrm>
-          <a:off x="0" y="0"/>
-          <a:ext cx="0" cy="0"/>
-          <a:chOff x="0" y="0"/>
-          <a:chExt cx="0" cy="0"/>
-        </a:xfrm>
-      </p:grpSpPr>
-      <p:sp>
-        <p:nvSpPr>
-          <p:cNvPr id="2" name="Slide Image Placeholder 1"/>
-          <p:cNvSpPr>
-            <a:spLocks noGrp="1" noRot="1" noChangeAspect="1"/>
-          </p:cNvSpPr>
-          <p:nvPr>
-            <p:ph type="sldImg"/>
-          </p:nvPr>
-        </p:nvSpPr>
-        <p:spPr/>
-      </p:sp>
-      <p:sp>
-        <p:nvSpPr>
-          <p:cNvPr id="3" name="Notes Placeholder 2"/>
-          <p:cNvSpPr>
-            <a:spLocks noGrp="1"/>
-          </p:cNvSpPr>
-          <p:nvPr>
-            <p:ph type="body" idx="1"/>
-          </p:nvPr>
-        </p:nvSpPr>
-        <p:spPr/>
-        <p:txBody>
-          <a:bodyPr/>
-          <a:lstStyle/>
-          <a:p>
-            <a:pPr marL="228600" indent="-228600">
-              <a:buAutoNum type="arabicPeriod"/>
-            </a:pPr>
-            <a:r>
-              <a:rPr lang="en-US" dirty="0" smtClean="0"/>
-              <a:t>Setup, show OLD table</a:t>
-            </a:r>
-          </a:p>
-          <a:p>
-            <a:pPr marL="228600" indent="-228600">
-              <a:buAutoNum type="arabicPeriod"/>
-            </a:pPr>
-            <a:r>
-              <a:rPr lang="en-US" dirty="0" smtClean="0"/>
-              <a:t>Show</a:t>
-            </a:r>
-            <a:r>
-              <a:rPr lang="en-US" baseline="0" dirty="0" smtClean="0"/>
-              <a:t> goals </a:t>
-            </a:r>
-            <a:r>
-              <a:rPr lang="en-US" baseline="0" smtClean="0"/>
-              <a:t>of refactor</a:t>
-            </a:r>
-          </a:p>
-          <a:p>
-            <a:pPr marL="228600" indent="-228600">
-              <a:buAutoNum type="arabicPeriod"/>
-            </a:pPr>
-            <a:endParaRPr lang="en-US"/>
-          </a:p>
-        </p:txBody>
-      </p:sp>
-      <p:sp>
-        <p:nvSpPr>
-          <p:cNvPr id="4" name="Slide Number Placeholder 3"/>
-          <p:cNvSpPr>
-            <a:spLocks noGrp="1"/>
-          </p:cNvSpPr>
-          <p:nvPr>
-            <p:ph type="sldNum" sz="quarter" idx="10"/>
-          </p:nvPr>
-        </p:nvSpPr>
-        <p:spPr/>
-        <p:txBody>
-          <a:bodyPr/>
-          <a:lstStyle/>
-          <a:p>
-            <a:fld id="{76E59958-3B60-4691-AE17-C513178CB0BF}" type="slidenum">
-              <a:rPr lang="en-US" smtClean="0"/>
-              <a:t>7</a:t>
-            </a:fld>
-            <a:endParaRPr lang="en-US"/>
-          </a:p>
-        </p:txBody>
-      </p:sp>
-    </p:spTree>
-    <p:extLst>
-      <p:ext uri="{BB962C8B-B14F-4D97-AF65-F5344CB8AC3E}">
-        <p14:creationId xmlns:p14="http://schemas.microsoft.com/office/powerpoint/2010/main" val="1832093265"/>
-      </p:ext>
-    </p:extLst>
-  </p:cSld>
-  <p:clrMapOvr>
-    <a:masterClrMapping/>
-  </p:clrMapOvr>
-</p:notes>
-</file>
-
-<file path=ppt/notesSlides/notesSlide8.xml><?xml version="1.0" encoding="utf-8"?>
-<p:notes xmlns:a="http://schemas.openxmlformats.org/drawingml/2006/main" xmlns:r="http://schemas.openxmlformats.org/officeDocument/2006/relationships" xmlns:p="http://schemas.openxmlformats.org/presentationml/2006/main">
-  <p:cSld>
-    <p:spTree>
-      <p:nvGrpSpPr>
-        <p:cNvPr id="1" name=""/>
-        <p:cNvGrpSpPr/>
-        <p:nvPr/>
-      </p:nvGrpSpPr>
-      <p:grpSpPr>
-        <a:xfrm>
-          <a:off x="0" y="0"/>
-          <a:ext cx="0" cy="0"/>
-          <a:chOff x="0" y="0"/>
-          <a:chExt cx="0" cy="0"/>
-        </a:xfrm>
-      </p:grpSpPr>
-      <p:sp>
-        <p:nvSpPr>
-          <p:cNvPr id="2" name="Slide Image Placeholder 1"/>
-          <p:cNvSpPr>
-            <a:spLocks noGrp="1" noRot="1" noChangeAspect="1"/>
-          </p:cNvSpPr>
-          <p:nvPr>
-            <p:ph type="sldImg"/>
-          </p:nvPr>
-        </p:nvSpPr>
-        <p:spPr/>
-      </p:sp>
-      <p:sp>
-        <p:nvSpPr>
-          <p:cNvPr id="3" name="Notes Placeholder 2"/>
-          <p:cNvSpPr>
-            <a:spLocks noGrp="1"/>
-          </p:cNvSpPr>
-          <p:nvPr>
-            <p:ph type="body" idx="1"/>
-          </p:nvPr>
-        </p:nvSpPr>
-        <p:spPr/>
-        <p:txBody>
-          <a:bodyPr/>
-          <a:lstStyle/>
-          <a:p>
-            <a:r>
-              <a:rPr lang="en-US" sz="1200" kern="1200" dirty="0" smtClean="0">
-                <a:solidFill>
-                  <a:schemeClr val="tx1"/>
-                </a:solidFill>
-                <a:effectLst/>
-                <a:latin typeface="+mn-lt"/>
-                <a:ea typeface="+mn-ea"/>
-                <a:cs typeface="+mn-cs"/>
-              </a:rPr>
-              <a:t>Lessons learned</a:t>
-            </a:r>
-          </a:p>
-          <a:p>
-            <a:r>
-              <a:rPr lang="en-US" sz="1200" kern="1200" dirty="0" smtClean="0">
-                <a:solidFill>
-                  <a:schemeClr val="tx1"/>
-                </a:solidFill>
-                <a:effectLst/>
-                <a:latin typeface="+mn-lt"/>
-                <a:ea typeface="+mn-ea"/>
-                <a:cs typeface="+mn-cs"/>
-              </a:rPr>
-              <a:t>Discovered the RECURSIVE_TRIGGER option. By default, It’s off. Learned what happens when it’s on, namely…</a:t>
-            </a:r>
-          </a:p>
-          <a:p>
-            <a:r>
-              <a:rPr lang="en-US" sz="1200" kern="1200" dirty="0" smtClean="0">
-                <a:solidFill>
-                  <a:schemeClr val="tx1"/>
-                </a:solidFill>
-                <a:effectLst/>
-                <a:latin typeface="+mn-lt"/>
-                <a:ea typeface="+mn-ea"/>
-                <a:cs typeface="+mn-cs"/>
-              </a:rPr>
-              <a:t>Triggers execute even if no rows are changed.</a:t>
-            </a:r>
-          </a:p>
-          <a:p>
-            <a:r>
-              <a:rPr lang="en-US" sz="1200" kern="1200" dirty="0" smtClean="0">
-                <a:solidFill>
-                  <a:schemeClr val="tx1"/>
-                </a:solidFill>
-                <a:effectLst/>
-                <a:latin typeface="+mn-lt"/>
-                <a:ea typeface="+mn-ea"/>
-                <a:cs typeface="+mn-cs"/>
-              </a:rPr>
-              <a:t>Setting up a test is a lot of work, so have a test script.</a:t>
-            </a:r>
-          </a:p>
-          <a:p>
-            <a:r>
-              <a:rPr lang="en-US" sz="1200" kern="1200" dirty="0" smtClean="0">
-                <a:solidFill>
-                  <a:schemeClr val="tx1"/>
-                </a:solidFill>
-                <a:latin typeface="+mn-lt"/>
-                <a:ea typeface="+mn-ea"/>
-                <a:cs typeface="+mn-cs"/>
-              </a:rPr>
-              <a:t>--   Lessons learned:</a:t>
-            </a:r>
-          </a:p>
-          <a:p>
-            <a:r>
-              <a:rPr lang="en-US" sz="1200" kern="1200" dirty="0" smtClean="0">
-                <a:solidFill>
-                  <a:schemeClr val="tx1"/>
-                </a:solidFill>
-                <a:latin typeface="+mn-lt"/>
-                <a:ea typeface="+mn-ea"/>
-                <a:cs typeface="+mn-cs"/>
-              </a:rPr>
-              <a:t>--   1. Automated unit tests is a good idea: you back up and start all over a lot</a:t>
-            </a:r>
-          </a:p>
-          <a:p>
-            <a:r>
-              <a:rPr lang="en-US" sz="1200" kern="1200" dirty="0" smtClean="0">
-                <a:solidFill>
-                  <a:schemeClr val="tx1"/>
-                </a:solidFill>
-                <a:latin typeface="+mn-lt"/>
-                <a:ea typeface="+mn-ea"/>
-                <a:cs typeface="+mn-cs"/>
-              </a:rPr>
-              <a:t>--      You need to cover all cases: INSERT/UPDATE; old/new.</a:t>
-            </a:r>
-          </a:p>
-          <a:p>
-            <a:r>
-              <a:rPr lang="en-US" sz="1200" kern="1200" dirty="0" smtClean="0">
-                <a:solidFill>
-                  <a:schemeClr val="tx1"/>
-                </a:solidFill>
-                <a:latin typeface="+mn-lt"/>
-                <a:ea typeface="+mn-ea"/>
-                <a:cs typeface="+mn-cs"/>
-              </a:rPr>
-              <a:t>--   2. Because of lesson #1, version control is probably a good idea</a:t>
-            </a:r>
-          </a:p>
-          <a:p>
-            <a:r>
-              <a:rPr lang="en-US" sz="1200" kern="1200" dirty="0" smtClean="0">
-                <a:solidFill>
-                  <a:schemeClr val="tx1"/>
-                </a:solidFill>
-                <a:latin typeface="+mn-lt"/>
-                <a:ea typeface="+mn-ea"/>
-                <a:cs typeface="+mn-cs"/>
-              </a:rPr>
-              <a:t>--   3. Changelog table was a good debugging tool</a:t>
-            </a:r>
-          </a:p>
-          <a:p>
-            <a:r>
-              <a:rPr lang="en-US" sz="1200" kern="1200" dirty="0" smtClean="0">
-                <a:solidFill>
-                  <a:schemeClr val="tx1"/>
-                </a:solidFill>
-                <a:latin typeface="+mn-lt"/>
-                <a:ea typeface="+mn-ea"/>
-                <a:cs typeface="+mn-cs"/>
-              </a:rPr>
-              <a:t>--   4. Need "WHERE </a:t>
-            </a:r>
-            <a:r>
-              <a:rPr lang="en-US" sz="1200" kern="1200" dirty="0" err="1" smtClean="0">
-                <a:solidFill>
-                  <a:schemeClr val="tx1"/>
-                </a:solidFill>
-                <a:latin typeface="+mn-lt"/>
-                <a:ea typeface="+mn-ea"/>
-                <a:cs typeface="+mn-cs"/>
-              </a:rPr>
-              <a:t>Customer.CustomerId</a:t>
-            </a:r>
-            <a:r>
-              <a:rPr lang="en-US" sz="1200" kern="1200" dirty="0" smtClean="0">
-                <a:solidFill>
-                  <a:schemeClr val="tx1"/>
-                </a:solidFill>
-                <a:latin typeface="+mn-lt"/>
-                <a:ea typeface="+mn-ea"/>
-                <a:cs typeface="+mn-cs"/>
-              </a:rPr>
-              <a:t> = </a:t>
-            </a:r>
-            <a:r>
-              <a:rPr lang="en-US" sz="1200" kern="1200" dirty="0" err="1" smtClean="0">
-                <a:solidFill>
-                  <a:schemeClr val="tx1"/>
-                </a:solidFill>
-                <a:latin typeface="+mn-lt"/>
-                <a:ea typeface="+mn-ea"/>
-                <a:cs typeface="+mn-cs"/>
-              </a:rPr>
-              <a:t>inserted.CustomerId</a:t>
-            </a:r>
-            <a:r>
-              <a:rPr lang="en-US" sz="1200" kern="1200" dirty="0" smtClean="0">
-                <a:solidFill>
-                  <a:schemeClr val="tx1"/>
-                </a:solidFill>
-                <a:latin typeface="+mn-lt"/>
-                <a:ea typeface="+mn-ea"/>
-                <a:cs typeface="+mn-cs"/>
-              </a:rPr>
-              <a:t>" clause to keep from</a:t>
-            </a:r>
-          </a:p>
-          <a:p>
-            <a:r>
-              <a:rPr lang="en-US" sz="1200" kern="1200" dirty="0" smtClean="0">
-                <a:solidFill>
-                  <a:schemeClr val="tx1"/>
-                </a:solidFill>
-                <a:latin typeface="+mn-lt"/>
-                <a:ea typeface="+mn-ea"/>
-                <a:cs typeface="+mn-cs"/>
-              </a:rPr>
-              <a:t>--      from changing every row.  Tests probably need to verify all rows.</a:t>
-            </a:r>
-          </a:p>
-          <a:p>
-            <a:r>
-              <a:rPr lang="en-US" sz="1200" kern="1200" dirty="0" smtClean="0">
-                <a:solidFill>
-                  <a:schemeClr val="tx1"/>
-                </a:solidFill>
-                <a:latin typeface="+mn-lt"/>
-                <a:ea typeface="+mn-ea"/>
-                <a:cs typeface="+mn-cs"/>
-              </a:rPr>
-              <a:t>--   5. LEFT OUTER JOIN needed, so ISNULL(</a:t>
-            </a:r>
-            <a:r>
-              <a:rPr lang="en-US" sz="1200" kern="1200" dirty="0" err="1" smtClean="0">
-                <a:solidFill>
-                  <a:schemeClr val="tx1"/>
-                </a:solidFill>
-                <a:latin typeface="+mn-lt"/>
-                <a:ea typeface="+mn-ea"/>
-                <a:cs typeface="+mn-cs"/>
-              </a:rPr>
-              <a:t>deleted.column</a:t>
-            </a:r>
-            <a:r>
-              <a:rPr lang="en-US" sz="1200" kern="1200" dirty="0" smtClean="0">
-                <a:solidFill>
-                  <a:schemeClr val="tx1"/>
-                </a:solidFill>
-                <a:latin typeface="+mn-lt"/>
-                <a:ea typeface="+mn-ea"/>
-                <a:cs typeface="+mn-cs"/>
-              </a:rPr>
-              <a:t>,...) needed in WHERE clauses.</a:t>
-            </a:r>
-          </a:p>
-          <a:p>
-            <a:r>
-              <a:rPr lang="en-US" sz="1200" kern="1200" dirty="0" smtClean="0">
-                <a:solidFill>
-                  <a:schemeClr val="tx1"/>
-                </a:solidFill>
-                <a:latin typeface="+mn-lt"/>
-                <a:ea typeface="+mn-ea"/>
-                <a:cs typeface="+mn-cs"/>
-              </a:rPr>
-              <a:t>--      Both needed to handle INSERT situation.</a:t>
-            </a:r>
-          </a:p>
-          <a:p>
-            <a:r>
-              <a:rPr lang="en-US" sz="1200" kern="1200" dirty="0" smtClean="0">
-                <a:solidFill>
-                  <a:schemeClr val="tx1"/>
-                </a:solidFill>
-                <a:latin typeface="+mn-lt"/>
-                <a:ea typeface="+mn-ea"/>
-                <a:cs typeface="+mn-cs"/>
-              </a:rPr>
-              <a:t>--   6. An UPDATE that changes no rows still invokes the trigger. Without an IF at the</a:t>
-            </a:r>
-          </a:p>
-          <a:p>
-            <a:r>
-              <a:rPr lang="en-US" sz="1200" kern="1200" dirty="0" smtClean="0">
-                <a:solidFill>
-                  <a:schemeClr val="tx1"/>
-                </a:solidFill>
-                <a:latin typeface="+mn-lt"/>
-                <a:ea typeface="+mn-ea"/>
-                <a:cs typeface="+mn-cs"/>
-              </a:rPr>
-              <a:t>--      top, the trigger will go into infinite recursion.  Alternatively, setting the</a:t>
-            </a:r>
-          </a:p>
-          <a:p>
-            <a:r>
-              <a:rPr lang="en-US" sz="1200" kern="1200" dirty="0" smtClean="0">
-                <a:solidFill>
-                  <a:schemeClr val="tx1"/>
-                </a:solidFill>
-                <a:latin typeface="+mn-lt"/>
-                <a:ea typeface="+mn-ea"/>
-                <a:cs typeface="+mn-cs"/>
-              </a:rPr>
-              <a:t>--      database "ALTER DATABASE Demo1 SET RECURSIVE_TRIGGERS OFF" also works.  (OFF</a:t>
-            </a:r>
-          </a:p>
-          <a:p>
-            <a:r>
-              <a:rPr lang="en-US" sz="1200" kern="1200" dirty="0" smtClean="0">
-                <a:solidFill>
-                  <a:schemeClr val="tx1"/>
-                </a:solidFill>
-                <a:latin typeface="+mn-lt"/>
-                <a:ea typeface="+mn-ea"/>
-                <a:cs typeface="+mn-cs"/>
-              </a:rPr>
-              <a:t>--      is the default setting.)</a:t>
-            </a:r>
-          </a:p>
-          <a:p>
-            <a:endParaRPr lang="en-US" sz="1200" kern="1200" dirty="0" smtClean="0">
-              <a:solidFill>
-                <a:schemeClr val="tx1"/>
-              </a:solidFill>
-              <a:latin typeface="+mn-lt"/>
-              <a:ea typeface="+mn-ea"/>
-              <a:cs typeface="+mn-cs"/>
-            </a:endParaRPr>
-          </a:p>
-          <a:p>
-            <a:endParaRPr lang="en-US" sz="1200" kern="1200" dirty="0" smtClean="0">
-              <a:solidFill>
-                <a:schemeClr val="tx1"/>
-              </a:solidFill>
-              <a:effectLst/>
-              <a:latin typeface="+mn-lt"/>
-              <a:ea typeface="+mn-ea"/>
-              <a:cs typeface="+mn-cs"/>
-            </a:endParaRPr>
-          </a:p>
-          <a:p>
-            <a:endParaRPr lang="en-US" dirty="0"/>
-          </a:p>
-        </p:txBody>
-      </p:sp>
-      <p:sp>
-        <p:nvSpPr>
-          <p:cNvPr id="4" name="Slide Number Placeholder 3"/>
-          <p:cNvSpPr>
-            <a:spLocks noGrp="1"/>
-          </p:cNvSpPr>
-          <p:nvPr>
-            <p:ph type="sldNum" sz="quarter" idx="10"/>
-          </p:nvPr>
-        </p:nvSpPr>
-        <p:spPr/>
-        <p:txBody>
-          <a:bodyPr/>
-          <a:lstStyle/>
-          <a:p>
-            <a:fld id="{76E59958-3B60-4691-AE17-C513178CB0BF}" type="slidenum">
-              <a:rPr lang="en-US" smtClean="0"/>
-              <a:t>8</a:t>
-            </a:fld>
-            <a:endParaRPr lang="en-US"/>
-          </a:p>
-        </p:txBody>
-      </p:sp>
-    </p:spTree>
-    <p:extLst>
-      <p:ext uri="{BB962C8B-B14F-4D97-AF65-F5344CB8AC3E}">
-        <p14:creationId xmlns:p14="http://schemas.microsoft.com/office/powerpoint/2010/main" val="3980707626"/>
+        <p14:creationId xmlns:p14="http://schemas.microsoft.com/office/powerpoint/2010/main" val="2070903453"/>
       </p:ext>
     </p:extLst>
   </p:cSld>
@@ -1786,7 +1711,7 @@
           <a:p>
             <a:fld id="{ECD19FB2-3AAB-4D03-B13A-2960828C78E3}" type="datetimeFigureOut">
               <a:rPr lang="en-US" dirty="0"/>
-              <a:t>2/22/2016</a:t>
+              <a:t>3/1/2016</a:t>
             </a:fld>
             <a:endParaRPr lang="en-US" dirty="0"/>
           </a:p>
@@ -2063,7 +1988,7 @@
           <a:p>
             <a:fld id="{1B80C674-7DFC-42FE-B9CD-82963CDB1557}" type="datetimeFigureOut">
               <a:rPr lang="en-US" dirty="0"/>
-              <a:t>2/22/2016</a:t>
+              <a:t>3/1/2016</a:t>
             </a:fld>
             <a:endParaRPr lang="en-US" dirty="0"/>
           </a:p>
@@ -2250,7 +2175,7 @@
           <a:p>
             <a:fld id="{2076456F-F47D-4F25-8053-2A695DA0CA7D}" type="datetimeFigureOut">
               <a:rPr lang="en-US" dirty="0"/>
-              <a:t>2/22/2016</a:t>
+              <a:t>3/1/2016</a:t>
             </a:fld>
             <a:endParaRPr lang="en-US" dirty="0"/>
           </a:p>
@@ -2506,7 +2431,7 @@
           <a:p>
             <a:fld id="{5D6C7379-69CC-4837-9905-BEBA22830C8A}" type="datetimeFigureOut">
               <a:rPr lang="en-US" dirty="0"/>
-              <a:t>2/22/2016</a:t>
+              <a:t>3/1/2016</a:t>
             </a:fld>
             <a:endParaRPr lang="en-US" dirty="0"/>
           </a:p>
@@ -2927,7 +2852,7 @@
           <a:p>
             <a:fld id="{49EB8B7E-8AEE-4F10-BFEE-C999AD004D36}" type="datetimeFigureOut">
               <a:rPr lang="en-US" dirty="0"/>
-              <a:t>2/22/2016</a:t>
+              <a:t>3/1/2016</a:t>
             </a:fld>
             <a:endParaRPr lang="en-US" dirty="0"/>
           </a:p>
@@ -3468,7 +3393,7 @@
           <a:p>
             <a:fld id="{8668F3F9-58BC-440B-B37B-805B9055EF92}" type="datetimeFigureOut">
               <a:rPr lang="en-US" dirty="0"/>
-              <a:t>2/22/2016</a:t>
+              <a:t>3/1/2016</a:t>
             </a:fld>
             <a:endParaRPr lang="en-US" dirty="0"/>
           </a:p>
@@ -4294,7 +4219,7 @@
           <a:p>
             <a:fld id="{0D5A53AF-48EA-489D-8260-9DCAB666386A}" type="datetimeFigureOut">
               <a:rPr lang="en-US" dirty="0"/>
-              <a:t>2/22/2016</a:t>
+              <a:t>3/1/2016</a:t>
             </a:fld>
             <a:endParaRPr lang="en-US" dirty="0"/>
           </a:p>
@@ -4459,7 +4384,7 @@
           <a:p>
             <a:fld id="{0DED02AE-B9A4-47BD-AF8E-97E16144138B}" type="datetimeFigureOut">
               <a:rPr lang="en-US" dirty="0"/>
-              <a:t>2/22/2016</a:t>
+              <a:t>3/1/2016</a:t>
             </a:fld>
             <a:endParaRPr lang="en-US" dirty="0"/>
           </a:p>
@@ -4634,7 +4559,7 @@
           <a:p>
             <a:fld id="{CF0FD78B-DB02-4362-BCDC-98A55456977C}" type="datetimeFigureOut">
               <a:rPr lang="en-US" dirty="0"/>
-              <a:t>2/22/2016</a:t>
+              <a:t>3/1/2016</a:t>
             </a:fld>
             <a:endParaRPr lang="en-US" dirty="0"/>
           </a:p>
@@ -4799,7 +4724,7 @@
           <a:p>
             <a:fld id="{99916976-5D93-46E4-A98A-FAD63E4D0EA8}" type="datetimeFigureOut">
               <a:rPr lang="en-US" dirty="0"/>
-              <a:t>2/22/2016</a:t>
+              <a:t>3/1/2016</a:t>
             </a:fld>
             <a:endParaRPr lang="en-US" dirty="0"/>
           </a:p>
@@ -5051,7 +4976,7 @@
           <a:p>
             <a:fld id="{0F39F4F5-F4D2-4D2A-AB60-88D37ADCB869}" type="datetimeFigureOut">
               <a:rPr lang="en-US" dirty="0"/>
-              <a:t>2/22/2016</a:t>
+              <a:t>3/1/2016</a:t>
             </a:fld>
             <a:endParaRPr lang="en-US" dirty="0"/>
           </a:p>
@@ -5278,7 +5203,7 @@
           <a:p>
             <a:fld id="{D23BC6CE-6D1E-47E5-8859-F31AC5380EB2}" type="datetimeFigureOut">
               <a:rPr lang="en-US" dirty="0"/>
-              <a:t>2/22/2016</a:t>
+              <a:t>3/1/2016</a:t>
             </a:fld>
             <a:endParaRPr lang="en-US" dirty="0"/>
           </a:p>
@@ -5666,7 +5591,7 @@
           <a:p>
             <a:fld id="{B1B4E7C4-4DA4-404D-9965-B13F2DD7D8BF}" type="datetimeFigureOut">
               <a:rPr lang="en-US" dirty="0"/>
-              <a:t>2/22/2016</a:t>
+              <a:t>3/1/2016</a:t>
             </a:fld>
             <a:endParaRPr lang="en-US" dirty="0"/>
           </a:p>
@@ -5779,7 +5704,7 @@
           <a:p>
             <a:fld id="{476FB7AA-4A53-424F-AD41-70827B6504BA}" type="datetimeFigureOut">
               <a:rPr lang="en-US" dirty="0"/>
-              <a:t>2/22/2016</a:t>
+              <a:t>3/1/2016</a:t>
             </a:fld>
             <a:endParaRPr lang="en-US" dirty="0"/>
           </a:p>
@@ -5869,7 +5794,7 @@
           <a:p>
             <a:fld id="{E7884882-FB12-4BC8-9960-9AD8104D7FAE}" type="datetimeFigureOut">
               <a:rPr lang="en-US" dirty="0"/>
-              <a:t>2/22/2016</a:t>
+              <a:t>3/1/2016</a:t>
             </a:fld>
             <a:endParaRPr lang="en-US" dirty="0"/>
           </a:p>
@@ -6137,7 +6062,7 @@
           <a:p>
             <a:fld id="{F7D1BD23-6E54-4D9D-AD88-A2813C73CC25}" type="datetimeFigureOut">
               <a:rPr lang="en-US" dirty="0"/>
-              <a:t>2/22/2016</a:t>
+              <a:t>3/1/2016</a:t>
             </a:fld>
             <a:endParaRPr lang="en-US" dirty="0"/>
           </a:p>
@@ -6413,7 +6338,7 @@
           <a:p>
             <a:fld id="{1471A834-4F3C-4AF9-9C74-05EC35A0F292}" type="datetimeFigureOut">
               <a:rPr lang="en-US" dirty="0"/>
-              <a:t>2/22/2016</a:t>
+              <a:t>3/1/2016</a:t>
             </a:fld>
             <a:endParaRPr lang="en-US" dirty="0"/>
           </a:p>
@@ -6648,7 +6573,7 @@
           <a:p>
             <a:fld id="{51CF1133-3259-4C45-BABA-5B62D9C6F78D}" type="datetimeFigureOut">
               <a:rPr lang="en-US" dirty="0"/>
-              <a:t>2/22/2016</a:t>
+              <a:t>3/1/2016</a:t>
             </a:fld>
             <a:endParaRPr lang="en-US" dirty="0"/>
           </a:p>
@@ -7289,94 +7214,6 @@
 </p:sld>
 </file>
 
-<file path=ppt/slides/slide10.xml><?xml version="1.0" encoding="utf-8"?>
-<p:sld xmlns:a="http://schemas.openxmlformats.org/drawingml/2006/main" xmlns:r="http://schemas.openxmlformats.org/officeDocument/2006/relationships" xmlns:p="http://schemas.openxmlformats.org/presentationml/2006/main">
-  <p:cSld>
-    <p:spTree>
-      <p:nvGrpSpPr>
-        <p:cNvPr id="1" name=""/>
-        <p:cNvGrpSpPr/>
-        <p:nvPr/>
-      </p:nvGrpSpPr>
-      <p:grpSpPr>
-        <a:xfrm>
-          <a:off x="0" y="0"/>
-          <a:ext cx="0" cy="0"/>
-          <a:chOff x="0" y="0"/>
-          <a:chExt cx="0" cy="0"/>
-        </a:xfrm>
-      </p:grpSpPr>
-      <p:sp>
-        <p:nvSpPr>
-          <p:cNvPr id="2" name="Title 1"/>
-          <p:cNvSpPr>
-            <a:spLocks noGrp="1"/>
-          </p:cNvSpPr>
-          <p:nvPr>
-            <p:ph type="title"/>
-          </p:nvPr>
-        </p:nvSpPr>
-        <p:spPr/>
-        <p:txBody>
-          <a:bodyPr/>
-          <a:lstStyle/>
-          <a:p>
-            <a:r>
-              <a:rPr lang="en-US" dirty="0" smtClean="0"/>
-              <a:t>Questions?</a:t>
-            </a:r>
-            <a:endParaRPr lang="en-US" dirty="0"/>
-          </a:p>
-        </p:txBody>
-      </p:sp>
-      <p:sp>
-        <p:nvSpPr>
-          <p:cNvPr id="3" name="Content Placeholder 2"/>
-          <p:cNvSpPr>
-            <a:spLocks noGrp="1"/>
-          </p:cNvSpPr>
-          <p:nvPr>
-            <p:ph idx="1"/>
-          </p:nvPr>
-        </p:nvSpPr>
-        <p:spPr/>
-        <p:txBody>
-          <a:bodyPr/>
-          <a:lstStyle/>
-          <a:p>
-            <a:pPr marL="0" indent="0">
-              <a:buNone/>
-            </a:pPr>
-            <a:endParaRPr lang="en-US" dirty="0"/>
-          </a:p>
-          <a:p>
-            <a:pPr marL="0" indent="0">
-              <a:buNone/>
-            </a:pPr>
-            <a:endParaRPr lang="en-US" dirty="0"/>
-          </a:p>
-        </p:txBody>
-      </p:sp>
-    </p:spTree>
-    <p:extLst>
-      <p:ext uri="{BB962C8B-B14F-4D97-AF65-F5344CB8AC3E}">
-        <p14:creationId xmlns:p14="http://schemas.microsoft.com/office/powerpoint/2010/main" val="3067436373"/>
-      </p:ext>
-    </p:extLst>
-  </p:cSld>
-  <p:clrMapOvr>
-    <a:masterClrMapping/>
-  </p:clrMapOvr>
-  <p:timing>
-    <p:tnLst>
-      <p:par>
-        <p:cTn id="1" dur="indefinite" restart="never" nodeType="tmRoot"/>
-      </p:par>
-    </p:tnLst>
-  </p:timing>
-</p:sld>
-</file>
-
 <file path=ppt/slides/slide2.xml><?xml version="1.0" encoding="utf-8"?>
 <p:sld xmlns:a="http://schemas.openxmlformats.org/drawingml/2006/main" xmlns:r="http://schemas.openxmlformats.org/officeDocument/2006/relationships" xmlns:p="http://schemas.openxmlformats.org/presentationml/2006/main">
   <p:cSld>
@@ -7514,7 +7351,7 @@
           <a:p>
             <a:r>
               <a:rPr lang="en-US" dirty="0" smtClean="0"/>
-              <a:t>Refactoring Database</a:t>
+              <a:t>Demo</a:t>
             </a:r>
             <a:endParaRPr lang="en-US" dirty="0"/>
           </a:p>
@@ -7534,39 +7371,6 @@
         <p:txBody>
           <a:bodyPr/>
           <a:lstStyle/>
-          <a:p>
-            <a:r>
-              <a:rPr lang="en-US" dirty="0" smtClean="0"/>
-              <a:t>Expand</a:t>
-            </a:r>
-          </a:p>
-          <a:p>
-            <a:r>
-              <a:rPr lang="en-US" dirty="0" smtClean="0"/>
-              <a:t>Convert/copy data and add triggers</a:t>
-            </a:r>
-          </a:p>
-          <a:p>
-            <a:r>
-              <a:rPr lang="en-US" dirty="0" smtClean="0"/>
-              <a:t>Migrate</a:t>
-            </a:r>
-          </a:p>
-          <a:p>
-            <a:r>
-              <a:rPr lang="en-US" dirty="0" smtClean="0"/>
-              <a:t>Remove triggers</a:t>
-            </a:r>
-          </a:p>
-          <a:p>
-            <a:r>
-              <a:rPr lang="en-US" dirty="0" smtClean="0"/>
-              <a:t>Contract</a:t>
-            </a:r>
-          </a:p>
-          <a:p>
-            <a:endParaRPr lang="en-US"/>
-          </a:p>
           <a:p>
             <a:endParaRPr lang="en-US" dirty="0"/>
           </a:p>
@@ -7575,7 +7379,7 @@
     </p:spTree>
     <p:extLst>
       <p:ext uri="{BB962C8B-B14F-4D97-AF65-F5344CB8AC3E}">
-        <p14:creationId xmlns:p14="http://schemas.microsoft.com/office/powerpoint/2010/main" val="1522652689"/>
+        <p14:creationId xmlns:p14="http://schemas.microsoft.com/office/powerpoint/2010/main" val="609649797"/>
       </p:ext>
     </p:extLst>
   </p:cSld>
@@ -7626,7 +7430,7 @@
           <a:p>
             <a:r>
               <a:rPr lang="en-US" dirty="0" smtClean="0"/>
-              <a:t>Expand</a:t>
+              <a:t>Lessons Learned</a:t>
             </a:r>
             <a:endParaRPr lang="en-US" dirty="0"/>
           </a:p>
@@ -7648,33 +7452,39 @@
           <a:lstStyle/>
           <a:p>
             <a:r>
+              <a:rPr lang="en-US" dirty="0"/>
+              <a:t>SET </a:t>
+            </a:r>
+            <a:r>
               <a:rPr lang="en-US" dirty="0" smtClean="0"/>
-              <a:t>Add tables</a:t>
+              <a:t>RECURSIVE_TRIGGERS OFF/ON</a:t>
             </a:r>
           </a:p>
           <a:p>
             <a:r>
               <a:rPr lang="en-US" dirty="0" smtClean="0"/>
-              <a:t>Add columns</a:t>
+              <a:t>Triggers execute even if table contents doesn’t change</a:t>
             </a:r>
           </a:p>
           <a:p>
             <a:r>
               <a:rPr lang="en-US" dirty="0" smtClean="0"/>
-              <a:t>Add DEFAULT constraints</a:t>
+              <a:t>Testing is painful, especially setup, so…</a:t>
             </a:r>
           </a:p>
           <a:p>
             <a:r>
               <a:rPr lang="en-US" dirty="0" smtClean="0"/>
-              <a:t>Remove UNIQUE, FOREIGN KEY, PRIMARY KEY constraints</a:t>
+              <a:t>Have a test script</a:t>
             </a:r>
           </a:p>
           <a:p>
             <a:r>
               <a:rPr lang="en-US" dirty="0" smtClean="0"/>
-              <a:t>Remove CHECK constraints</a:t>
-            </a:r>
+              <a:t>Use version control</a:t>
+            </a:r>
+          </a:p>
+          <a:p>
             <a:endParaRPr lang="en-US" dirty="0"/>
           </a:p>
         </p:txBody>
@@ -7682,7 +7492,7 @@
     </p:spTree>
     <p:extLst>
       <p:ext uri="{BB962C8B-B14F-4D97-AF65-F5344CB8AC3E}">
-        <p14:creationId xmlns:p14="http://schemas.microsoft.com/office/powerpoint/2010/main" val="3997596963"/>
+        <p14:creationId xmlns:p14="http://schemas.microsoft.com/office/powerpoint/2010/main" val="3523844589"/>
       </p:ext>
     </p:extLst>
   </p:cSld>
@@ -7733,7 +7543,7 @@
           <a:p>
             <a:r>
               <a:rPr lang="en-US" dirty="0" smtClean="0"/>
-              <a:t>Migrate</a:t>
+              <a:t>References</a:t>
             </a:r>
             <a:endParaRPr lang="en-US" dirty="0"/>
           </a:p>
@@ -7751,39 +7561,81 @@
         </p:nvSpPr>
         <p:spPr/>
         <p:txBody>
-          <a:bodyPr/>
+          <a:bodyPr>
+            <a:normAutofit/>
+          </a:bodyPr>
           <a:lstStyle/>
           <a:p>
             <a:r>
               <a:rPr lang="en-US" dirty="0" smtClean="0"/>
-              <a:t>Add/Change/Remove</a:t>
+              <a:t>Evolutionary </a:t>
+            </a:r>
+            <a:r>
+              <a:rPr lang="en-US" dirty="0"/>
+              <a:t>Database Design: </a:t>
+            </a:r>
+            <a:r>
+              <a:rPr lang="en-US" dirty="0">
+                <a:hlinkClick r:id="rId3"/>
+              </a:rPr>
+              <a:t>http://</a:t>
+            </a:r>
+            <a:r>
+              <a:rPr lang="en-US" dirty="0" smtClean="0">
+                <a:hlinkClick r:id="rId3"/>
+              </a:rPr>
+              <a:t>martinfowler.com/articles/evodb.html</a:t>
             </a:r>
             <a:r>
               <a:rPr lang="en-US" dirty="0" smtClean="0"/>
               <a:t> </a:t>
             </a:r>
+          </a:p>
+          <a:p>
+            <a:endParaRPr lang="en-US" dirty="0" smtClean="0"/>
+          </a:p>
+          <a:p>
             <a:r>
               <a:rPr lang="en-US" dirty="0" smtClean="0"/>
-              <a:t>stored procedures and functions to use new version</a:t>
-            </a:r>
-          </a:p>
-          <a:p>
+              <a:t>Expand/Contract pattern: </a:t>
+            </a:r>
+            <a:r>
+              <a:rPr lang="en-US" dirty="0">
+                <a:hlinkClick r:id="rId4"/>
+              </a:rPr>
+              <a:t>http://</a:t>
+            </a:r>
+            <a:r>
+              <a:rPr lang="en-US" dirty="0" smtClean="0">
+                <a:hlinkClick r:id="rId4"/>
+              </a:rPr>
+              <a:t>martinfowler.com/bliki/ParallelChange.html</a:t>
+            </a:r>
             <a:r>
               <a:rPr lang="en-US" dirty="0" smtClean="0"/>
-              <a:t>Developers </a:t>
-            </a:r>
-            <a:r>
-              <a:rPr lang="en-US" smtClean="0"/>
-              <a:t>change </a:t>
-            </a:r>
-            <a:r>
-              <a:rPr lang="en-US" smtClean="0"/>
-              <a:t>their code </a:t>
-            </a:r>
+              <a:t> </a:t>
+            </a:r>
+          </a:p>
+          <a:p>
+            <a:endParaRPr lang="en-US" dirty="0" smtClean="0"/>
+          </a:p>
+          <a:p>
             <a:r>
               <a:rPr lang="en-US" dirty="0" smtClean="0"/>
-              <a:t>to use new version</a:t>
-            </a:r>
+              <a:t>Refactoring </a:t>
+            </a:r>
+            <a:r>
+              <a:rPr lang="en-US" dirty="0"/>
+              <a:t>Databases book</a:t>
+            </a:r>
+          </a:p>
+          <a:p>
+            <a:pPr marL="0" indent="0">
+              <a:buNone/>
+            </a:pPr>
+            <a:endParaRPr lang="en-US" dirty="0"/>
+          </a:p>
+          <a:p>
             <a:endParaRPr lang="en-US" dirty="0"/>
           </a:p>
         </p:txBody>
@@ -7791,7 +7643,7 @@
     </p:spTree>
     <p:extLst>
       <p:ext uri="{BB962C8B-B14F-4D97-AF65-F5344CB8AC3E}">
-        <p14:creationId xmlns:p14="http://schemas.microsoft.com/office/powerpoint/2010/main" val="4089960077"/>
+        <p14:creationId xmlns:p14="http://schemas.microsoft.com/office/powerpoint/2010/main" val="2258765297"/>
       </p:ext>
     </p:extLst>
   </p:cSld>
@@ -7842,7 +7694,7 @@
           <a:p>
             <a:r>
               <a:rPr lang="en-US" dirty="0" smtClean="0"/>
-              <a:t>Contract</a:t>
+              <a:t>Questions?</a:t>
             </a:r>
             <a:endParaRPr lang="en-US" dirty="0"/>
           </a:p>
@@ -7863,38 +7715,15 @@
           <a:bodyPr/>
           <a:lstStyle/>
           <a:p>
-            <a:r>
-              <a:rPr lang="en-US" dirty="0" smtClean="0"/>
-              <a:t>Remove tables</a:t>
-            </a:r>
-          </a:p>
-          <a:p>
-            <a:r>
-              <a:rPr lang="en-US" dirty="0" smtClean="0"/>
-              <a:t>Remove columns</a:t>
-            </a:r>
-          </a:p>
-          <a:p>
-            <a:r>
-              <a:rPr lang="en-US" dirty="0" smtClean="0"/>
-              <a:t>Remove </a:t>
-            </a:r>
-            <a:r>
-              <a:rPr lang="en-US" dirty="0" smtClean="0"/>
-              <a:t>DEFAULT constraints</a:t>
-            </a:r>
-          </a:p>
-          <a:p>
-            <a:r>
-              <a:rPr lang="en-US" dirty="0" smtClean="0"/>
-              <a:t>Add UNIQUE, FOREIGN KEY, PRIMARY KEY constraints</a:t>
-            </a:r>
-          </a:p>
-          <a:p>
-            <a:r>
-              <a:rPr lang="en-US" dirty="0" smtClean="0"/>
-              <a:t>Add CHECK constraints</a:t>
-            </a:r>
+            <a:pPr marL="0" indent="0">
+              <a:buNone/>
+            </a:pPr>
+            <a:endParaRPr lang="en-US" dirty="0"/>
+          </a:p>
+          <a:p>
+            <a:pPr marL="0" indent="0">
+              <a:buNone/>
+            </a:pPr>
             <a:endParaRPr lang="en-US" dirty="0"/>
           </a:p>
         </p:txBody>
@@ -7902,350 +7731,7 @@
     </p:spTree>
     <p:extLst>
       <p:ext uri="{BB962C8B-B14F-4D97-AF65-F5344CB8AC3E}">
-        <p14:creationId xmlns:p14="http://schemas.microsoft.com/office/powerpoint/2010/main" val="144908857"/>
-      </p:ext>
-    </p:extLst>
-  </p:cSld>
-  <p:clrMapOvr>
-    <a:masterClrMapping/>
-  </p:clrMapOvr>
-  <p:timing>
-    <p:tnLst>
-      <p:par>
-        <p:cTn id="1" dur="indefinite" restart="never" nodeType="tmRoot"/>
-      </p:par>
-    </p:tnLst>
-  </p:timing>
-</p:sld>
-</file>
-
-<file path=ppt/slides/slide7.xml><?xml version="1.0" encoding="utf-8"?>
-<p:sld xmlns:a="http://schemas.openxmlformats.org/drawingml/2006/main" xmlns:r="http://schemas.openxmlformats.org/officeDocument/2006/relationships" xmlns:p="http://schemas.openxmlformats.org/presentationml/2006/main">
-  <p:cSld>
-    <p:spTree>
-      <p:nvGrpSpPr>
-        <p:cNvPr id="1" name=""/>
-        <p:cNvGrpSpPr/>
-        <p:nvPr/>
-      </p:nvGrpSpPr>
-      <p:grpSpPr>
-        <a:xfrm>
-          <a:off x="0" y="0"/>
-          <a:ext cx="0" cy="0"/>
-          <a:chOff x="0" y="0"/>
-          <a:chExt cx="0" cy="0"/>
-        </a:xfrm>
-      </p:grpSpPr>
-      <p:sp>
-        <p:nvSpPr>
-          <p:cNvPr id="2" name="Title 1"/>
-          <p:cNvSpPr>
-            <a:spLocks noGrp="1"/>
-          </p:cNvSpPr>
-          <p:nvPr>
-            <p:ph type="title"/>
-          </p:nvPr>
-        </p:nvSpPr>
-        <p:spPr/>
-        <p:txBody>
-          <a:bodyPr/>
-          <a:lstStyle/>
-          <a:p>
-            <a:r>
-              <a:rPr lang="en-US" dirty="0" smtClean="0"/>
-              <a:t>Demo</a:t>
-            </a:r>
-            <a:endParaRPr lang="en-US" dirty="0"/>
-          </a:p>
-        </p:txBody>
-      </p:sp>
-      <p:sp>
-        <p:nvSpPr>
-          <p:cNvPr id="3" name="Content Placeholder 2"/>
-          <p:cNvSpPr>
-            <a:spLocks noGrp="1"/>
-          </p:cNvSpPr>
-          <p:nvPr>
-            <p:ph idx="1"/>
-          </p:nvPr>
-        </p:nvSpPr>
-        <p:spPr/>
-        <p:txBody>
-          <a:bodyPr/>
-          <a:lstStyle/>
-          <a:p>
-            <a:endParaRPr lang="en-US" dirty="0"/>
-          </a:p>
-        </p:txBody>
-      </p:sp>
-    </p:spTree>
-    <p:extLst>
-      <p:ext uri="{BB962C8B-B14F-4D97-AF65-F5344CB8AC3E}">
-        <p14:creationId xmlns:p14="http://schemas.microsoft.com/office/powerpoint/2010/main" val="609649797"/>
-      </p:ext>
-    </p:extLst>
-  </p:cSld>
-  <p:clrMapOvr>
-    <a:masterClrMapping/>
-  </p:clrMapOvr>
-  <p:timing>
-    <p:tnLst>
-      <p:par>
-        <p:cTn id="1" dur="indefinite" restart="never" nodeType="tmRoot"/>
-      </p:par>
-    </p:tnLst>
-  </p:timing>
-</p:sld>
-</file>
-
-<file path=ppt/slides/slide8.xml><?xml version="1.0" encoding="utf-8"?>
-<p:sld xmlns:a="http://schemas.openxmlformats.org/drawingml/2006/main" xmlns:r="http://schemas.openxmlformats.org/officeDocument/2006/relationships" xmlns:p="http://schemas.openxmlformats.org/presentationml/2006/main">
-  <p:cSld>
-    <p:spTree>
-      <p:nvGrpSpPr>
-        <p:cNvPr id="1" name=""/>
-        <p:cNvGrpSpPr/>
-        <p:nvPr/>
-      </p:nvGrpSpPr>
-      <p:grpSpPr>
-        <a:xfrm>
-          <a:off x="0" y="0"/>
-          <a:ext cx="0" cy="0"/>
-          <a:chOff x="0" y="0"/>
-          <a:chExt cx="0" cy="0"/>
-        </a:xfrm>
-      </p:grpSpPr>
-      <p:sp>
-        <p:nvSpPr>
-          <p:cNvPr id="2" name="Title 1"/>
-          <p:cNvSpPr>
-            <a:spLocks noGrp="1"/>
-          </p:cNvSpPr>
-          <p:nvPr>
-            <p:ph type="title"/>
-          </p:nvPr>
-        </p:nvSpPr>
-        <p:spPr/>
-        <p:txBody>
-          <a:bodyPr/>
-          <a:lstStyle/>
-          <a:p>
-            <a:r>
-              <a:rPr lang="en-US" dirty="0" smtClean="0"/>
-              <a:t>Lessons Learned</a:t>
-            </a:r>
-            <a:endParaRPr lang="en-US" dirty="0"/>
-          </a:p>
-        </p:txBody>
-      </p:sp>
-      <p:sp>
-        <p:nvSpPr>
-          <p:cNvPr id="3" name="Content Placeholder 2"/>
-          <p:cNvSpPr>
-            <a:spLocks noGrp="1"/>
-          </p:cNvSpPr>
-          <p:nvPr>
-            <p:ph idx="1"/>
-          </p:nvPr>
-        </p:nvSpPr>
-        <p:spPr/>
-        <p:txBody>
-          <a:bodyPr/>
-          <a:lstStyle/>
-          <a:p>
-            <a:r>
-              <a:rPr lang="en-US" dirty="0"/>
-              <a:t>SET </a:t>
-            </a:r>
-            <a:r>
-              <a:rPr lang="en-US" dirty="0" smtClean="0"/>
-              <a:t>RECURSIVE_TRIGGERS OFF/ON</a:t>
-            </a:r>
-          </a:p>
-          <a:p>
-            <a:r>
-              <a:rPr lang="en-US" dirty="0" smtClean="0"/>
-              <a:t>Triggers execute even if table contents doesn’t change</a:t>
-            </a:r>
-          </a:p>
-          <a:p>
-            <a:r>
-              <a:rPr lang="en-US" dirty="0" smtClean="0"/>
-              <a:t>Testing is painful, especially setup, so…</a:t>
-            </a:r>
-          </a:p>
-          <a:p>
-            <a:r>
-              <a:rPr lang="en-US" dirty="0" smtClean="0"/>
-              <a:t>Have a test script</a:t>
-            </a:r>
-          </a:p>
-          <a:p>
-            <a:r>
-              <a:rPr lang="en-US" dirty="0" smtClean="0"/>
-              <a:t>Use version control</a:t>
-            </a:r>
-          </a:p>
-          <a:p>
-            <a:endParaRPr lang="en-US" dirty="0"/>
-          </a:p>
-        </p:txBody>
-      </p:sp>
-    </p:spTree>
-    <p:extLst>
-      <p:ext uri="{BB962C8B-B14F-4D97-AF65-F5344CB8AC3E}">
-        <p14:creationId xmlns:p14="http://schemas.microsoft.com/office/powerpoint/2010/main" val="3523844589"/>
-      </p:ext>
-    </p:extLst>
-  </p:cSld>
-  <p:clrMapOvr>
-    <a:masterClrMapping/>
-  </p:clrMapOvr>
-  <p:timing>
-    <p:tnLst>
-      <p:par>
-        <p:cTn id="1" dur="indefinite" restart="never" nodeType="tmRoot"/>
-      </p:par>
-    </p:tnLst>
-  </p:timing>
-</p:sld>
-</file>
-
-<file path=ppt/slides/slide9.xml><?xml version="1.0" encoding="utf-8"?>
-<p:sld xmlns:a="http://schemas.openxmlformats.org/drawingml/2006/main" xmlns:r="http://schemas.openxmlformats.org/officeDocument/2006/relationships" xmlns:p="http://schemas.openxmlformats.org/presentationml/2006/main">
-  <p:cSld>
-    <p:spTree>
-      <p:nvGrpSpPr>
-        <p:cNvPr id="1" name=""/>
-        <p:cNvGrpSpPr/>
-        <p:nvPr/>
-      </p:nvGrpSpPr>
-      <p:grpSpPr>
-        <a:xfrm>
-          <a:off x="0" y="0"/>
-          <a:ext cx="0" cy="0"/>
-          <a:chOff x="0" y="0"/>
-          <a:chExt cx="0" cy="0"/>
-        </a:xfrm>
-      </p:grpSpPr>
-      <p:sp>
-        <p:nvSpPr>
-          <p:cNvPr id="2" name="Title 1"/>
-          <p:cNvSpPr>
-            <a:spLocks noGrp="1"/>
-          </p:cNvSpPr>
-          <p:nvPr>
-            <p:ph type="title"/>
-          </p:nvPr>
-        </p:nvSpPr>
-        <p:spPr/>
-        <p:txBody>
-          <a:bodyPr/>
-          <a:lstStyle/>
-          <a:p>
-            <a:r>
-              <a:rPr lang="en-US" dirty="0" smtClean="0"/>
-              <a:t>References</a:t>
-            </a:r>
-            <a:endParaRPr lang="en-US" dirty="0"/>
-          </a:p>
-        </p:txBody>
-      </p:sp>
-      <p:sp>
-        <p:nvSpPr>
-          <p:cNvPr id="3" name="Content Placeholder 2"/>
-          <p:cNvSpPr>
-            <a:spLocks noGrp="1"/>
-          </p:cNvSpPr>
-          <p:nvPr>
-            <p:ph idx="1"/>
-          </p:nvPr>
-        </p:nvSpPr>
-        <p:spPr/>
-        <p:txBody>
-          <a:bodyPr>
-            <a:normAutofit/>
-          </a:bodyPr>
-          <a:lstStyle/>
-          <a:p>
-            <a:r>
-              <a:rPr lang="en-US" dirty="0" smtClean="0"/>
-              <a:t>Evolutionary </a:t>
-            </a:r>
-            <a:r>
-              <a:rPr lang="en-US" dirty="0"/>
-              <a:t>Database Design: </a:t>
-            </a:r>
-            <a:r>
-              <a:rPr lang="en-US" dirty="0">
-                <a:hlinkClick r:id="rId2"/>
-              </a:rPr>
-              <a:t>http://</a:t>
-            </a:r>
-            <a:r>
-              <a:rPr lang="en-US" dirty="0" smtClean="0">
-                <a:hlinkClick r:id="rId2"/>
-              </a:rPr>
-              <a:t>martinfowler.com/articles/evodb.html</a:t>
-            </a:r>
-            <a:r>
-              <a:rPr lang="en-US" dirty="0" smtClean="0"/>
-              <a:t> </a:t>
-            </a:r>
-          </a:p>
-          <a:p>
-            <a:endParaRPr lang="en-US" dirty="0" smtClean="0"/>
-          </a:p>
-          <a:p>
-            <a:r>
-              <a:rPr lang="en-US" dirty="0" smtClean="0"/>
-              <a:t>Expand/Contract pattern: </a:t>
-            </a:r>
-            <a:r>
-              <a:rPr lang="en-US" dirty="0">
-                <a:hlinkClick r:id="rId3"/>
-              </a:rPr>
-              <a:t>http://</a:t>
-            </a:r>
-            <a:r>
-              <a:rPr lang="en-US" dirty="0" smtClean="0">
-                <a:hlinkClick r:id="rId3"/>
-              </a:rPr>
-              <a:t>martinfowler.com/bliki/ParallelChange.html</a:t>
-            </a:r>
-            <a:r>
-              <a:rPr lang="en-US" dirty="0" smtClean="0"/>
-              <a:t> </a:t>
-            </a:r>
-          </a:p>
-          <a:p>
-            <a:endParaRPr lang="en-US" dirty="0" smtClean="0"/>
-          </a:p>
-          <a:p>
-            <a:r>
-              <a:rPr lang="en-US" dirty="0" smtClean="0"/>
-              <a:t>Refactoring </a:t>
-            </a:r>
-            <a:r>
-              <a:rPr lang="en-US" dirty="0"/>
-              <a:t>Databases book</a:t>
-            </a:r>
-          </a:p>
-          <a:p>
-            <a:pPr marL="0" indent="0">
-              <a:buNone/>
-            </a:pPr>
-            <a:endParaRPr lang="en-US" dirty="0"/>
-          </a:p>
-          <a:p>
-            <a:endParaRPr lang="en-US" dirty="0"/>
-          </a:p>
-        </p:txBody>
-      </p:sp>
-    </p:spTree>
-    <p:extLst>
-      <p:ext uri="{BB962C8B-B14F-4D97-AF65-F5344CB8AC3E}">
-        <p14:creationId xmlns:p14="http://schemas.microsoft.com/office/powerpoint/2010/main" val="2258765297"/>
+        <p14:creationId xmlns:p14="http://schemas.microsoft.com/office/powerpoint/2010/main" val="3067436373"/>
       </p:ext>
     </p:extLst>
   </p:cSld>

</xml_diff>

<commit_message>
Corrected spelling in notes
</commit_message>
<xml_diff>
--- a/Triggers & Refactoring.pptx
+++ b/Triggers & Refactoring.pptx
@@ -205,7 +205,7 @@
           <a:p>
             <a:fld id="{64842430-D212-4A2D-9268-FB7D9B780FC0}" type="datetimeFigureOut">
               <a:rPr lang="en-US" smtClean="0"/>
-              <a:t>3/1/2016</a:t>
+              <a:t>3/2/2016</a:t>
             </a:fld>
             <a:endParaRPr lang="en-US"/>
           </a:p>
@@ -549,7 +549,11 @@
             </a:r>
             <a:r>
               <a:rPr lang="en-US" baseline="0" dirty="0" smtClean="0"/>
-              <a:t> a situation at work where I needed to change tables in a production database that has a lot of code referring to it. S</a:t>
+              <a:t> a situation at work where I needed to change tables in a production database that has a lot of code referring to it</a:t>
+            </a:r>
+            <a:r>
+              <a:rPr lang="en-US" baseline="0" dirty="0" smtClean="0"/>
+              <a:t>.</a:t>
             </a:r>
             <a:endParaRPr lang="en-US" dirty="0"/>
           </a:p>
@@ -754,7 +758,7 @@
               <a:t>Trigger </a:t>
             </a:r>
             <a:r>
-              <a:rPr lang="en-US" sz="1200" kern="1200" baseline="0" dirty="0" err="1" smtClean="0">
+              <a:rPr lang="en-US" sz="1200" kern="1200" baseline="0" dirty="0" smtClean="0">
                 <a:solidFill>
                   <a:schemeClr val="tx1"/>
                 </a:solidFill>
@@ -763,7 +767,7 @@
                 <a:ea typeface="+mn-ea"/>
                 <a:cs typeface="+mn-cs"/>
               </a:rPr>
-              <a:t>featueres</a:t>
+              <a:t>features</a:t>
             </a:r>
             <a:endParaRPr lang="en-US" sz="1200" kern="1200" dirty="0" smtClean="0">
               <a:solidFill>
@@ -1711,7 +1715,7 @@
           <a:p>
             <a:fld id="{ECD19FB2-3AAB-4D03-B13A-2960828C78E3}" type="datetimeFigureOut">
               <a:rPr lang="en-US" dirty="0"/>
-              <a:t>3/1/2016</a:t>
+              <a:t>3/2/2016</a:t>
             </a:fld>
             <a:endParaRPr lang="en-US" dirty="0"/>
           </a:p>
@@ -1988,7 +1992,7 @@
           <a:p>
             <a:fld id="{1B80C674-7DFC-42FE-B9CD-82963CDB1557}" type="datetimeFigureOut">
               <a:rPr lang="en-US" dirty="0"/>
-              <a:t>3/1/2016</a:t>
+              <a:t>3/2/2016</a:t>
             </a:fld>
             <a:endParaRPr lang="en-US" dirty="0"/>
           </a:p>
@@ -2175,7 +2179,7 @@
           <a:p>
             <a:fld id="{2076456F-F47D-4F25-8053-2A695DA0CA7D}" type="datetimeFigureOut">
               <a:rPr lang="en-US" dirty="0"/>
-              <a:t>3/1/2016</a:t>
+              <a:t>3/2/2016</a:t>
             </a:fld>
             <a:endParaRPr lang="en-US" dirty="0"/>
           </a:p>
@@ -2431,7 +2435,7 @@
           <a:p>
             <a:fld id="{5D6C7379-69CC-4837-9905-BEBA22830C8A}" type="datetimeFigureOut">
               <a:rPr lang="en-US" dirty="0"/>
-              <a:t>3/1/2016</a:t>
+              <a:t>3/2/2016</a:t>
             </a:fld>
             <a:endParaRPr lang="en-US" dirty="0"/>
           </a:p>
@@ -2852,7 +2856,7 @@
           <a:p>
             <a:fld id="{49EB8B7E-8AEE-4F10-BFEE-C999AD004D36}" type="datetimeFigureOut">
               <a:rPr lang="en-US" dirty="0"/>
-              <a:t>3/1/2016</a:t>
+              <a:t>3/2/2016</a:t>
             </a:fld>
             <a:endParaRPr lang="en-US" dirty="0"/>
           </a:p>
@@ -3393,7 +3397,7 @@
           <a:p>
             <a:fld id="{8668F3F9-58BC-440B-B37B-805B9055EF92}" type="datetimeFigureOut">
               <a:rPr lang="en-US" dirty="0"/>
-              <a:t>3/1/2016</a:t>
+              <a:t>3/2/2016</a:t>
             </a:fld>
             <a:endParaRPr lang="en-US" dirty="0"/>
           </a:p>
@@ -4219,7 +4223,7 @@
           <a:p>
             <a:fld id="{0D5A53AF-48EA-489D-8260-9DCAB666386A}" type="datetimeFigureOut">
               <a:rPr lang="en-US" dirty="0"/>
-              <a:t>3/1/2016</a:t>
+              <a:t>3/2/2016</a:t>
             </a:fld>
             <a:endParaRPr lang="en-US" dirty="0"/>
           </a:p>
@@ -4384,7 +4388,7 @@
           <a:p>
             <a:fld id="{0DED02AE-B9A4-47BD-AF8E-97E16144138B}" type="datetimeFigureOut">
               <a:rPr lang="en-US" dirty="0"/>
-              <a:t>3/1/2016</a:t>
+              <a:t>3/2/2016</a:t>
             </a:fld>
             <a:endParaRPr lang="en-US" dirty="0"/>
           </a:p>
@@ -4559,7 +4563,7 @@
           <a:p>
             <a:fld id="{CF0FD78B-DB02-4362-BCDC-98A55456977C}" type="datetimeFigureOut">
               <a:rPr lang="en-US" dirty="0"/>
-              <a:t>3/1/2016</a:t>
+              <a:t>3/2/2016</a:t>
             </a:fld>
             <a:endParaRPr lang="en-US" dirty="0"/>
           </a:p>
@@ -4724,7 +4728,7 @@
           <a:p>
             <a:fld id="{99916976-5D93-46E4-A98A-FAD63E4D0EA8}" type="datetimeFigureOut">
               <a:rPr lang="en-US" dirty="0"/>
-              <a:t>3/1/2016</a:t>
+              <a:t>3/2/2016</a:t>
             </a:fld>
             <a:endParaRPr lang="en-US" dirty="0"/>
           </a:p>
@@ -4976,7 +4980,7 @@
           <a:p>
             <a:fld id="{0F39F4F5-F4D2-4D2A-AB60-88D37ADCB869}" type="datetimeFigureOut">
               <a:rPr lang="en-US" dirty="0"/>
-              <a:t>3/1/2016</a:t>
+              <a:t>3/2/2016</a:t>
             </a:fld>
             <a:endParaRPr lang="en-US" dirty="0"/>
           </a:p>
@@ -5203,7 +5207,7 @@
           <a:p>
             <a:fld id="{D23BC6CE-6D1E-47E5-8859-F31AC5380EB2}" type="datetimeFigureOut">
               <a:rPr lang="en-US" dirty="0"/>
-              <a:t>3/1/2016</a:t>
+              <a:t>3/2/2016</a:t>
             </a:fld>
             <a:endParaRPr lang="en-US" dirty="0"/>
           </a:p>
@@ -5591,7 +5595,7 @@
           <a:p>
             <a:fld id="{B1B4E7C4-4DA4-404D-9965-B13F2DD7D8BF}" type="datetimeFigureOut">
               <a:rPr lang="en-US" dirty="0"/>
-              <a:t>3/1/2016</a:t>
+              <a:t>3/2/2016</a:t>
             </a:fld>
             <a:endParaRPr lang="en-US" dirty="0"/>
           </a:p>
@@ -5704,7 +5708,7 @@
           <a:p>
             <a:fld id="{476FB7AA-4A53-424F-AD41-70827B6504BA}" type="datetimeFigureOut">
               <a:rPr lang="en-US" dirty="0"/>
-              <a:t>3/1/2016</a:t>
+              <a:t>3/2/2016</a:t>
             </a:fld>
             <a:endParaRPr lang="en-US" dirty="0"/>
           </a:p>
@@ -5794,7 +5798,7 @@
           <a:p>
             <a:fld id="{E7884882-FB12-4BC8-9960-9AD8104D7FAE}" type="datetimeFigureOut">
               <a:rPr lang="en-US" dirty="0"/>
-              <a:t>3/1/2016</a:t>
+              <a:t>3/2/2016</a:t>
             </a:fld>
             <a:endParaRPr lang="en-US" dirty="0"/>
           </a:p>
@@ -6062,7 +6066,7 @@
           <a:p>
             <a:fld id="{F7D1BD23-6E54-4D9D-AD88-A2813C73CC25}" type="datetimeFigureOut">
               <a:rPr lang="en-US" dirty="0"/>
-              <a:t>3/1/2016</a:t>
+              <a:t>3/2/2016</a:t>
             </a:fld>
             <a:endParaRPr lang="en-US" dirty="0"/>
           </a:p>
@@ -6338,7 +6342,7 @@
           <a:p>
             <a:fld id="{1471A834-4F3C-4AF9-9C74-05EC35A0F292}" type="datetimeFigureOut">
               <a:rPr lang="en-US" dirty="0"/>
-              <a:t>3/1/2016</a:t>
+              <a:t>3/2/2016</a:t>
             </a:fld>
             <a:endParaRPr lang="en-US" dirty="0"/>
           </a:p>
@@ -6573,7 +6577,7 @@
           <a:p>
             <a:fld id="{51CF1133-3259-4C45-BABA-5B62D9C6F78D}" type="datetimeFigureOut">
               <a:rPr lang="en-US" dirty="0"/>
-              <a:t>3/1/2016</a:t>
+              <a:t>3/2/2016</a:t>
             </a:fld>
             <a:endParaRPr lang="en-US" dirty="0"/>
           </a:p>

</xml_diff>

<commit_message>
Remove reference to "Expand/Contract"
Removed, on the next to last slide - the one labeled "References", the entry about Expand/Contract pattern.  It doesn't need to be there, and I need to keep this talk short.
</commit_message>
<xml_diff>
--- a/Triggers & Refactoring.pptx
+++ b/Triggers & Refactoring.pptx
@@ -205,7 +205,7 @@
           <a:p>
             <a:fld id="{64842430-D212-4A2D-9268-FB7D9B780FC0}" type="datetimeFigureOut">
               <a:rPr lang="en-US" smtClean="0"/>
-              <a:t>3/2/2016</a:t>
+              <a:t>3/16/2016</a:t>
             </a:fld>
             <a:endParaRPr lang="en-US"/>
           </a:p>
@@ -549,11 +549,7 @@
             </a:r>
             <a:r>
               <a:rPr lang="en-US" baseline="0" dirty="0" smtClean="0"/>
-              <a:t> a situation at work where I needed to change tables in a production database that has a lot of code referring to it</a:t>
-            </a:r>
-            <a:r>
-              <a:rPr lang="en-US" baseline="0" dirty="0" smtClean="0"/>
-              <a:t>.</a:t>
+              <a:t> a situation at work where I needed to change tables in a production database that has a lot of code referring to it.</a:t>
             </a:r>
             <a:endParaRPr lang="en-US" dirty="0"/>
           </a:p>
@@ -755,19 +751,7 @@
                 <a:ea typeface="+mn-ea"/>
                 <a:cs typeface="+mn-cs"/>
               </a:rPr>
-              <a:t>Trigger </a:t>
-            </a:r>
-            <a:r>
-              <a:rPr lang="en-US" sz="1200" kern="1200" baseline="0" dirty="0" smtClean="0">
-                <a:solidFill>
-                  <a:schemeClr val="tx1"/>
-                </a:solidFill>
-                <a:effectLst/>
-                <a:latin typeface="+mn-lt"/>
-                <a:ea typeface="+mn-ea"/>
-                <a:cs typeface="+mn-cs"/>
-              </a:rPr>
-              <a:t>features</a:t>
+              <a:t>Trigger features</a:t>
             </a:r>
             <a:endParaRPr lang="en-US" sz="1200" kern="1200" dirty="0" smtClean="0">
               <a:solidFill>
@@ -1715,7 +1699,7 @@
           <a:p>
             <a:fld id="{ECD19FB2-3AAB-4D03-B13A-2960828C78E3}" type="datetimeFigureOut">
               <a:rPr lang="en-US" dirty="0"/>
-              <a:t>3/2/2016</a:t>
+              <a:t>3/16/2016</a:t>
             </a:fld>
             <a:endParaRPr lang="en-US" dirty="0"/>
           </a:p>
@@ -1992,7 +1976,7 @@
           <a:p>
             <a:fld id="{1B80C674-7DFC-42FE-B9CD-82963CDB1557}" type="datetimeFigureOut">
               <a:rPr lang="en-US" dirty="0"/>
-              <a:t>3/2/2016</a:t>
+              <a:t>3/16/2016</a:t>
             </a:fld>
             <a:endParaRPr lang="en-US" dirty="0"/>
           </a:p>
@@ -2179,7 +2163,7 @@
           <a:p>
             <a:fld id="{2076456F-F47D-4F25-8053-2A695DA0CA7D}" type="datetimeFigureOut">
               <a:rPr lang="en-US" dirty="0"/>
-              <a:t>3/2/2016</a:t>
+              <a:t>3/16/2016</a:t>
             </a:fld>
             <a:endParaRPr lang="en-US" dirty="0"/>
           </a:p>
@@ -2435,7 +2419,7 @@
           <a:p>
             <a:fld id="{5D6C7379-69CC-4837-9905-BEBA22830C8A}" type="datetimeFigureOut">
               <a:rPr lang="en-US" dirty="0"/>
-              <a:t>3/2/2016</a:t>
+              <a:t>3/16/2016</a:t>
             </a:fld>
             <a:endParaRPr lang="en-US" dirty="0"/>
           </a:p>
@@ -2856,7 +2840,7 @@
           <a:p>
             <a:fld id="{49EB8B7E-8AEE-4F10-BFEE-C999AD004D36}" type="datetimeFigureOut">
               <a:rPr lang="en-US" dirty="0"/>
-              <a:t>3/2/2016</a:t>
+              <a:t>3/16/2016</a:t>
             </a:fld>
             <a:endParaRPr lang="en-US" dirty="0"/>
           </a:p>
@@ -3397,7 +3381,7 @@
           <a:p>
             <a:fld id="{8668F3F9-58BC-440B-B37B-805B9055EF92}" type="datetimeFigureOut">
               <a:rPr lang="en-US" dirty="0"/>
-              <a:t>3/2/2016</a:t>
+              <a:t>3/16/2016</a:t>
             </a:fld>
             <a:endParaRPr lang="en-US" dirty="0"/>
           </a:p>
@@ -4223,7 +4207,7 @@
           <a:p>
             <a:fld id="{0D5A53AF-48EA-489D-8260-9DCAB666386A}" type="datetimeFigureOut">
               <a:rPr lang="en-US" dirty="0"/>
-              <a:t>3/2/2016</a:t>
+              <a:t>3/16/2016</a:t>
             </a:fld>
             <a:endParaRPr lang="en-US" dirty="0"/>
           </a:p>
@@ -4388,7 +4372,7 @@
           <a:p>
             <a:fld id="{0DED02AE-B9A4-47BD-AF8E-97E16144138B}" type="datetimeFigureOut">
               <a:rPr lang="en-US" dirty="0"/>
-              <a:t>3/2/2016</a:t>
+              <a:t>3/16/2016</a:t>
             </a:fld>
             <a:endParaRPr lang="en-US" dirty="0"/>
           </a:p>
@@ -4563,7 +4547,7 @@
           <a:p>
             <a:fld id="{CF0FD78B-DB02-4362-BCDC-98A55456977C}" type="datetimeFigureOut">
               <a:rPr lang="en-US" dirty="0"/>
-              <a:t>3/2/2016</a:t>
+              <a:t>3/16/2016</a:t>
             </a:fld>
             <a:endParaRPr lang="en-US" dirty="0"/>
           </a:p>
@@ -4728,7 +4712,7 @@
           <a:p>
             <a:fld id="{99916976-5D93-46E4-A98A-FAD63E4D0EA8}" type="datetimeFigureOut">
               <a:rPr lang="en-US" dirty="0"/>
-              <a:t>3/2/2016</a:t>
+              <a:t>3/16/2016</a:t>
             </a:fld>
             <a:endParaRPr lang="en-US" dirty="0"/>
           </a:p>
@@ -4980,7 +4964,7 @@
           <a:p>
             <a:fld id="{0F39F4F5-F4D2-4D2A-AB60-88D37ADCB869}" type="datetimeFigureOut">
               <a:rPr lang="en-US" dirty="0"/>
-              <a:t>3/2/2016</a:t>
+              <a:t>3/16/2016</a:t>
             </a:fld>
             <a:endParaRPr lang="en-US" dirty="0"/>
           </a:p>
@@ -5207,7 +5191,7 @@
           <a:p>
             <a:fld id="{D23BC6CE-6D1E-47E5-8859-F31AC5380EB2}" type="datetimeFigureOut">
               <a:rPr lang="en-US" dirty="0"/>
-              <a:t>3/2/2016</a:t>
+              <a:t>3/16/2016</a:t>
             </a:fld>
             <a:endParaRPr lang="en-US" dirty="0"/>
           </a:p>
@@ -5595,7 +5579,7 @@
           <a:p>
             <a:fld id="{B1B4E7C4-4DA4-404D-9965-B13F2DD7D8BF}" type="datetimeFigureOut">
               <a:rPr lang="en-US" dirty="0"/>
-              <a:t>3/2/2016</a:t>
+              <a:t>3/16/2016</a:t>
             </a:fld>
             <a:endParaRPr lang="en-US" dirty="0"/>
           </a:p>
@@ -5708,7 +5692,7 @@
           <a:p>
             <a:fld id="{476FB7AA-4A53-424F-AD41-70827B6504BA}" type="datetimeFigureOut">
               <a:rPr lang="en-US" dirty="0"/>
-              <a:t>3/2/2016</a:t>
+              <a:t>3/16/2016</a:t>
             </a:fld>
             <a:endParaRPr lang="en-US" dirty="0"/>
           </a:p>
@@ -5798,7 +5782,7 @@
           <a:p>
             <a:fld id="{E7884882-FB12-4BC8-9960-9AD8104D7FAE}" type="datetimeFigureOut">
               <a:rPr lang="en-US" dirty="0"/>
-              <a:t>3/2/2016</a:t>
+              <a:t>3/16/2016</a:t>
             </a:fld>
             <a:endParaRPr lang="en-US" dirty="0"/>
           </a:p>
@@ -6066,7 +6050,7 @@
           <a:p>
             <a:fld id="{F7D1BD23-6E54-4D9D-AD88-A2813C73CC25}" type="datetimeFigureOut">
               <a:rPr lang="en-US" dirty="0"/>
-              <a:t>3/2/2016</a:t>
+              <a:t>3/16/2016</a:t>
             </a:fld>
             <a:endParaRPr lang="en-US" dirty="0"/>
           </a:p>
@@ -6342,7 +6326,7 @@
           <a:p>
             <a:fld id="{1471A834-4F3C-4AF9-9C74-05EC35A0F292}" type="datetimeFigureOut">
               <a:rPr lang="en-US" dirty="0"/>
-              <a:t>3/2/2016</a:t>
+              <a:t>3/16/2016</a:t>
             </a:fld>
             <a:endParaRPr lang="en-US" dirty="0"/>
           </a:p>
@@ -6577,7 +6561,7 @@
           <a:p>
             <a:fld id="{51CF1133-3259-4C45-BABA-5B62D9C6F78D}" type="datetimeFigureOut">
               <a:rPr lang="en-US" dirty="0"/>
-              <a:t>3/2/2016</a:t>
+              <a:t>3/16/2016</a:t>
             </a:fld>
             <a:endParaRPr lang="en-US" dirty="0"/>
           </a:p>
@@ -7589,31 +7573,6 @@
                 <a:hlinkClick r:id="rId3"/>
               </a:rPr>
               <a:t>martinfowler.com/articles/evodb.html</a:t>
-            </a:r>
-            <a:r>
-              <a:rPr lang="en-US" dirty="0" smtClean="0"/>
-              <a:t> </a:t>
-            </a:r>
-          </a:p>
-          <a:p>
-            <a:endParaRPr lang="en-US" dirty="0" smtClean="0"/>
-          </a:p>
-          <a:p>
-            <a:r>
-              <a:rPr lang="en-US" dirty="0" smtClean="0"/>
-              <a:t>Expand/Contract pattern: </a:t>
-            </a:r>
-            <a:r>
-              <a:rPr lang="en-US" dirty="0">
-                <a:hlinkClick r:id="rId4"/>
-              </a:rPr>
-              <a:t>http://</a:t>
-            </a:r>
-            <a:r>
-              <a:rPr lang="en-US" dirty="0" smtClean="0">
-                <a:hlinkClick r:id="rId4"/>
-              </a:rPr>
-              <a:t>martinfowler.com/bliki/ParallelChange.html</a:t>
             </a:r>
             <a:r>
               <a:rPr lang="en-US" dirty="0" smtClean="0"/>

</xml_diff>

<commit_message>
Expanded PowerPoint for full sized talk
Added slides to the "Triggers & Refactoring" file to make it a full sized talk.
Added comment to Refactor.sql file, warning that adding a NOT NULL with default column could be time consuming.  (Triggered by blog entry at SQL Sentry by "Phil Factor"

Need to create a similarly sized talk document.
</commit_message>
<xml_diff>
--- a/Triggers & Refactoring.pptx
+++ b/Triggers & Refactoring.pptx
@@ -5,15 +5,24 @@
     <p:sldMasterId id="2147483648" r:id="rId1"/>
   </p:sldMasterIdLst>
   <p:notesMasterIdLst>
-    <p:notesMasterId r:id="rId8"/>
+    <p:notesMasterId r:id="rId17"/>
   </p:notesMasterIdLst>
   <p:sldIdLst>
     <p:sldId id="269" r:id="rId2"/>
-    <p:sldId id="268" r:id="rId3"/>
-    <p:sldId id="260" r:id="rId4"/>
-    <p:sldId id="261" r:id="rId5"/>
-    <p:sldId id="262" r:id="rId6"/>
-    <p:sldId id="263" r:id="rId7"/>
+    <p:sldId id="270" r:id="rId3"/>
+    <p:sldId id="277" r:id="rId4"/>
+    <p:sldId id="278" r:id="rId5"/>
+    <p:sldId id="279" r:id="rId6"/>
+    <p:sldId id="268" r:id="rId7"/>
+    <p:sldId id="272" r:id="rId8"/>
+    <p:sldId id="273" r:id="rId9"/>
+    <p:sldId id="274" r:id="rId10"/>
+    <p:sldId id="275" r:id="rId11"/>
+    <p:sldId id="271" r:id="rId12"/>
+    <p:sldId id="260" r:id="rId13"/>
+    <p:sldId id="261" r:id="rId14"/>
+    <p:sldId id="276" r:id="rId15"/>
+    <p:sldId id="263" r:id="rId16"/>
   </p:sldIdLst>
   <p:sldSz cx="12192000" cy="6858000"/>
   <p:notesSz cx="6858000" cy="9144000"/>
@@ -205,7 +214,7 @@
           <a:p>
             <a:fld id="{64842430-D212-4A2D-9268-FB7D9B780FC0}" type="datetimeFigureOut">
               <a:rPr lang="en-US" smtClean="0"/>
-              <a:t>3/16/2016</a:t>
+              <a:t>4/22/2016</a:t>
             </a:fld>
             <a:endParaRPr lang="en-US"/>
           </a:p>
@@ -660,7 +669,7 @@
           <a:p>
             <a:fld id="{76E59958-3B60-4691-AE17-C513178CB0BF}" type="slidenum">
               <a:rPr lang="en-US" smtClean="0"/>
-              <a:t>2</a:t>
+              <a:t>6</a:t>
             </a:fld>
             <a:endParaRPr lang="en-US"/>
           </a:p>
@@ -975,7 +984,7 @@
           <a:p>
             <a:fld id="{76E59958-3B60-4691-AE17-C513178CB0BF}" type="slidenum">
               <a:rPr lang="en-US" smtClean="0"/>
-              <a:t>3</a:t>
+              <a:t>12</a:t>
             </a:fld>
             <a:endParaRPr lang="en-US"/>
           </a:p>
@@ -1316,7 +1325,7 @@
           <a:p>
             <a:fld id="{76E59958-3B60-4691-AE17-C513178CB0BF}" type="slidenum">
               <a:rPr lang="en-US" smtClean="0"/>
-              <a:t>4</a:t>
+              <a:t>13</a:t>
             </a:fld>
             <a:endParaRPr lang="en-US"/>
           </a:p>
@@ -1400,91 +1409,7 @@
           <a:p>
             <a:fld id="{76E59958-3B60-4691-AE17-C513178CB0BF}" type="slidenum">
               <a:rPr lang="en-US" smtClean="0"/>
-              <a:t>5</a:t>
-            </a:fld>
-            <a:endParaRPr lang="en-US"/>
-          </a:p>
-        </p:txBody>
-      </p:sp>
-    </p:spTree>
-    <p:extLst>
-      <p:ext uri="{BB962C8B-B14F-4D97-AF65-F5344CB8AC3E}">
-        <p14:creationId xmlns:p14="http://schemas.microsoft.com/office/powerpoint/2010/main" val="3316172763"/>
-      </p:ext>
-    </p:extLst>
-  </p:cSld>
-  <p:clrMapOvr>
-    <a:masterClrMapping/>
-  </p:clrMapOvr>
-</p:notes>
-</file>
-
-<file path=ppt/notesSlides/notesSlide6.xml><?xml version="1.0" encoding="utf-8"?>
-<p:notes xmlns:a="http://schemas.openxmlformats.org/drawingml/2006/main" xmlns:r="http://schemas.openxmlformats.org/officeDocument/2006/relationships" xmlns:p="http://schemas.openxmlformats.org/presentationml/2006/main">
-  <p:cSld>
-    <p:spTree>
-      <p:nvGrpSpPr>
-        <p:cNvPr id="1" name=""/>
-        <p:cNvGrpSpPr/>
-        <p:nvPr/>
-      </p:nvGrpSpPr>
-      <p:grpSpPr>
-        <a:xfrm>
-          <a:off x="0" y="0"/>
-          <a:ext cx="0" cy="0"/>
-          <a:chOff x="0" y="0"/>
-          <a:chExt cx="0" cy="0"/>
-        </a:xfrm>
-      </p:grpSpPr>
-      <p:sp>
-        <p:nvSpPr>
-          <p:cNvPr id="2" name="Slide Image Placeholder 1"/>
-          <p:cNvSpPr>
-            <a:spLocks noGrp="1" noRot="1" noChangeAspect="1"/>
-          </p:cNvSpPr>
-          <p:nvPr>
-            <p:ph type="sldImg"/>
-          </p:nvPr>
-        </p:nvSpPr>
-        <p:spPr/>
-      </p:sp>
-      <p:sp>
-        <p:nvSpPr>
-          <p:cNvPr id="3" name="Notes Placeholder 2"/>
-          <p:cNvSpPr>
-            <a:spLocks noGrp="1"/>
-          </p:cNvSpPr>
-          <p:nvPr>
-            <p:ph type="body" idx="1"/>
-          </p:nvPr>
-        </p:nvSpPr>
-        <p:spPr/>
-        <p:txBody>
-          <a:bodyPr/>
-          <a:lstStyle/>
-          <a:p>
-            <a:endParaRPr lang="en-US"/>
-          </a:p>
-        </p:txBody>
-      </p:sp>
-      <p:sp>
-        <p:nvSpPr>
-          <p:cNvPr id="4" name="Slide Number Placeholder 3"/>
-          <p:cNvSpPr>
-            <a:spLocks noGrp="1"/>
-          </p:cNvSpPr>
-          <p:nvPr>
-            <p:ph type="sldNum" sz="quarter" idx="10"/>
-          </p:nvPr>
-        </p:nvSpPr>
-        <p:spPr/>
-        <p:txBody>
-          <a:bodyPr/>
-          <a:lstStyle/>
-          <a:p>
-            <a:fld id="{76E59958-3B60-4691-AE17-C513178CB0BF}" type="slidenum">
-              <a:rPr lang="en-US" smtClean="0"/>
-              <a:t>6</a:t>
+              <a:t>15</a:t>
             </a:fld>
             <a:endParaRPr lang="en-US"/>
           </a:p>
@@ -1699,7 +1624,7 @@
           <a:p>
             <a:fld id="{ECD19FB2-3AAB-4D03-B13A-2960828C78E3}" type="datetimeFigureOut">
               <a:rPr lang="en-US" dirty="0"/>
-              <a:t>3/16/2016</a:t>
+              <a:t>4/22/2016</a:t>
             </a:fld>
             <a:endParaRPr lang="en-US" dirty="0"/>
           </a:p>
@@ -1976,7 +1901,7 @@
           <a:p>
             <a:fld id="{1B80C674-7DFC-42FE-B9CD-82963CDB1557}" type="datetimeFigureOut">
               <a:rPr lang="en-US" dirty="0"/>
-              <a:t>3/16/2016</a:t>
+              <a:t>4/22/2016</a:t>
             </a:fld>
             <a:endParaRPr lang="en-US" dirty="0"/>
           </a:p>
@@ -2163,7 +2088,7 @@
           <a:p>
             <a:fld id="{2076456F-F47D-4F25-8053-2A695DA0CA7D}" type="datetimeFigureOut">
               <a:rPr lang="en-US" dirty="0"/>
-              <a:t>3/16/2016</a:t>
+              <a:t>4/22/2016</a:t>
             </a:fld>
             <a:endParaRPr lang="en-US" dirty="0"/>
           </a:p>
@@ -2419,7 +2344,7 @@
           <a:p>
             <a:fld id="{5D6C7379-69CC-4837-9905-BEBA22830C8A}" type="datetimeFigureOut">
               <a:rPr lang="en-US" dirty="0"/>
-              <a:t>3/16/2016</a:t>
+              <a:t>4/22/2016</a:t>
             </a:fld>
             <a:endParaRPr lang="en-US" dirty="0"/>
           </a:p>
@@ -2840,7 +2765,7 @@
           <a:p>
             <a:fld id="{49EB8B7E-8AEE-4F10-BFEE-C999AD004D36}" type="datetimeFigureOut">
               <a:rPr lang="en-US" dirty="0"/>
-              <a:t>3/16/2016</a:t>
+              <a:t>4/22/2016</a:t>
             </a:fld>
             <a:endParaRPr lang="en-US" dirty="0"/>
           </a:p>
@@ -3381,7 +3306,7 @@
           <a:p>
             <a:fld id="{8668F3F9-58BC-440B-B37B-805B9055EF92}" type="datetimeFigureOut">
               <a:rPr lang="en-US" dirty="0"/>
-              <a:t>3/16/2016</a:t>
+              <a:t>4/22/2016</a:t>
             </a:fld>
             <a:endParaRPr lang="en-US" dirty="0"/>
           </a:p>
@@ -4207,7 +4132,7 @@
           <a:p>
             <a:fld id="{0D5A53AF-48EA-489D-8260-9DCAB666386A}" type="datetimeFigureOut">
               <a:rPr lang="en-US" dirty="0"/>
-              <a:t>3/16/2016</a:t>
+              <a:t>4/22/2016</a:t>
             </a:fld>
             <a:endParaRPr lang="en-US" dirty="0"/>
           </a:p>
@@ -4372,7 +4297,7 @@
           <a:p>
             <a:fld id="{0DED02AE-B9A4-47BD-AF8E-97E16144138B}" type="datetimeFigureOut">
               <a:rPr lang="en-US" dirty="0"/>
-              <a:t>3/16/2016</a:t>
+              <a:t>4/22/2016</a:t>
             </a:fld>
             <a:endParaRPr lang="en-US" dirty="0"/>
           </a:p>
@@ -4547,7 +4472,7 @@
           <a:p>
             <a:fld id="{CF0FD78B-DB02-4362-BCDC-98A55456977C}" type="datetimeFigureOut">
               <a:rPr lang="en-US" dirty="0"/>
-              <a:t>3/16/2016</a:t>
+              <a:t>4/22/2016</a:t>
             </a:fld>
             <a:endParaRPr lang="en-US" dirty="0"/>
           </a:p>
@@ -4712,7 +4637,7 @@
           <a:p>
             <a:fld id="{99916976-5D93-46E4-A98A-FAD63E4D0EA8}" type="datetimeFigureOut">
               <a:rPr lang="en-US" dirty="0"/>
-              <a:t>3/16/2016</a:t>
+              <a:t>4/22/2016</a:t>
             </a:fld>
             <a:endParaRPr lang="en-US" dirty="0"/>
           </a:p>
@@ -4964,7 +4889,7 @@
           <a:p>
             <a:fld id="{0F39F4F5-F4D2-4D2A-AB60-88D37ADCB869}" type="datetimeFigureOut">
               <a:rPr lang="en-US" dirty="0"/>
-              <a:t>3/16/2016</a:t>
+              <a:t>4/22/2016</a:t>
             </a:fld>
             <a:endParaRPr lang="en-US" dirty="0"/>
           </a:p>
@@ -5191,7 +5116,7 @@
           <a:p>
             <a:fld id="{D23BC6CE-6D1E-47E5-8859-F31AC5380EB2}" type="datetimeFigureOut">
               <a:rPr lang="en-US" dirty="0"/>
-              <a:t>3/16/2016</a:t>
+              <a:t>4/22/2016</a:t>
             </a:fld>
             <a:endParaRPr lang="en-US" dirty="0"/>
           </a:p>
@@ -5579,7 +5504,7 @@
           <a:p>
             <a:fld id="{B1B4E7C4-4DA4-404D-9965-B13F2DD7D8BF}" type="datetimeFigureOut">
               <a:rPr lang="en-US" dirty="0"/>
-              <a:t>3/16/2016</a:t>
+              <a:t>4/22/2016</a:t>
             </a:fld>
             <a:endParaRPr lang="en-US" dirty="0"/>
           </a:p>
@@ -5692,7 +5617,7 @@
           <a:p>
             <a:fld id="{476FB7AA-4A53-424F-AD41-70827B6504BA}" type="datetimeFigureOut">
               <a:rPr lang="en-US" dirty="0"/>
-              <a:t>3/16/2016</a:t>
+              <a:t>4/22/2016</a:t>
             </a:fld>
             <a:endParaRPr lang="en-US" dirty="0"/>
           </a:p>
@@ -5782,7 +5707,7 @@
           <a:p>
             <a:fld id="{E7884882-FB12-4BC8-9960-9AD8104D7FAE}" type="datetimeFigureOut">
               <a:rPr lang="en-US" dirty="0"/>
-              <a:t>3/16/2016</a:t>
+              <a:t>4/22/2016</a:t>
             </a:fld>
             <a:endParaRPr lang="en-US" dirty="0"/>
           </a:p>
@@ -6050,7 +5975,7 @@
           <a:p>
             <a:fld id="{F7D1BD23-6E54-4D9D-AD88-A2813C73CC25}" type="datetimeFigureOut">
               <a:rPr lang="en-US" dirty="0"/>
-              <a:t>3/16/2016</a:t>
+              <a:t>4/22/2016</a:t>
             </a:fld>
             <a:endParaRPr lang="en-US" dirty="0"/>
           </a:p>
@@ -6326,7 +6251,7 @@
           <a:p>
             <a:fld id="{1471A834-4F3C-4AF9-9C74-05EC35A0F292}" type="datetimeFigureOut">
               <a:rPr lang="en-US" dirty="0"/>
-              <a:t>3/16/2016</a:t>
+              <a:t>4/22/2016</a:t>
             </a:fld>
             <a:endParaRPr lang="en-US" dirty="0"/>
           </a:p>
@@ -6561,7 +6486,7 @@
           <a:p>
             <a:fld id="{51CF1133-3259-4C45-BABA-5B62D9C6F78D}" type="datetimeFigureOut">
               <a:rPr lang="en-US" dirty="0"/>
-              <a:t>3/16/2016</a:t>
+              <a:t>4/22/2016</a:t>
             </a:fld>
             <a:endParaRPr lang="en-US" dirty="0"/>
           </a:p>
@@ -7138,9 +7063,10 @@
           <a:lstStyle/>
           <a:p>
             <a:r>
-              <a:rPr lang="en-US" sz="6000" dirty="0"/>
-              <a:t>Triggers &amp; Refactoring</a:t>
-            </a:r>
+              <a:rPr lang="en-US" sz="6000" dirty="0" smtClean="0"/>
+              <a:t>Refactoring Databases</a:t>
+            </a:r>
+            <a:endParaRPr lang="en-US" sz="6000" dirty="0"/>
           </a:p>
         </p:txBody>
       </p:sp>
@@ -7161,21 +7087,26 @@
           <a:p>
             <a:r>
               <a:rPr lang="en-US" dirty="0" smtClean="0"/>
-              <a:t>Rob Vatz</a:t>
+              <a:t>Or: Evolutionary Database Design</a:t>
             </a:r>
           </a:p>
           <a:p>
             <a:r>
               <a:rPr lang="en-US" dirty="0" smtClean="0"/>
-              <a:t>Email : </a:t>
-            </a:r>
-            <a:r>
-              <a:rPr lang="en-US" dirty="0" smtClean="0">
-                <a:hlinkClick r:id="rId3"/>
-              </a:rPr>
-              <a:t>rob.vatz@sceneralabs.com</a:t>
-            </a:r>
-            <a:endParaRPr lang="en-US" dirty="0" smtClean="0"/>
+              <a:t>Or: Continuous Delivery and database maintenance</a:t>
+            </a:r>
+          </a:p>
+          <a:p>
+            <a:r>
+              <a:rPr lang="en-US" dirty="0" smtClean="0"/>
+              <a:t>Or: DevOps for DBAs</a:t>
+            </a:r>
+          </a:p>
+          <a:p>
+            <a:r>
+              <a:rPr lang="en-US" dirty="0" smtClean="0"/>
+              <a:t>Or: How I learned to like triggers</a:t>
+            </a:r>
           </a:p>
           <a:p>
             <a:endParaRPr lang="en-US" dirty="0"/>
@@ -7202,7 +7133,1267 @@
 </p:sld>
 </file>
 
+<file path=ppt/slides/slide10.xml><?xml version="1.0" encoding="utf-8"?>
+<p:sld xmlns:a="http://schemas.openxmlformats.org/drawingml/2006/main" xmlns:r="http://schemas.openxmlformats.org/officeDocument/2006/relationships" xmlns:p="http://schemas.openxmlformats.org/presentationml/2006/main">
+  <p:cSld>
+    <p:spTree>
+      <p:nvGrpSpPr>
+        <p:cNvPr id="1" name=""/>
+        <p:cNvGrpSpPr/>
+        <p:nvPr/>
+      </p:nvGrpSpPr>
+      <p:grpSpPr>
+        <a:xfrm>
+          <a:off x="0" y="0"/>
+          <a:ext cx="0" cy="0"/>
+          <a:chOff x="0" y="0"/>
+          <a:chExt cx="0" cy="0"/>
+        </a:xfrm>
+      </p:grpSpPr>
+      <p:sp>
+        <p:nvSpPr>
+          <p:cNvPr id="2" name="Title 1"/>
+          <p:cNvSpPr>
+            <a:spLocks noGrp="1"/>
+          </p:cNvSpPr>
+          <p:nvPr>
+            <p:ph type="title"/>
+          </p:nvPr>
+        </p:nvSpPr>
+        <p:spPr/>
+        <p:txBody>
+          <a:bodyPr/>
+          <a:lstStyle/>
+          <a:p>
+            <a:r>
+              <a:rPr lang="en-US" dirty="0" smtClean="0"/>
+              <a:t>Contract</a:t>
+            </a:r>
+            <a:endParaRPr lang="en-US" dirty="0"/>
+          </a:p>
+        </p:txBody>
+      </p:sp>
+      <p:sp>
+        <p:nvSpPr>
+          <p:cNvPr id="3" name="Content Placeholder 2"/>
+          <p:cNvSpPr>
+            <a:spLocks noGrp="1"/>
+          </p:cNvSpPr>
+          <p:nvPr>
+            <p:ph idx="1"/>
+          </p:nvPr>
+        </p:nvSpPr>
+        <p:spPr/>
+        <p:txBody>
+          <a:bodyPr/>
+          <a:lstStyle/>
+          <a:p>
+            <a:r>
+              <a:rPr lang="en-US" dirty="0" smtClean="0"/>
+              <a:t>Remove tables</a:t>
+            </a:r>
+          </a:p>
+          <a:p>
+            <a:r>
+              <a:rPr lang="en-US" dirty="0" smtClean="0"/>
+              <a:t>Remove columns</a:t>
+            </a:r>
+          </a:p>
+          <a:p>
+            <a:r>
+              <a:rPr lang="en-US" dirty="0" smtClean="0"/>
+              <a:t>Remove </a:t>
+            </a:r>
+            <a:r>
+              <a:rPr lang="en-US" dirty="0" smtClean="0"/>
+              <a:t>DEFAULT constraints</a:t>
+            </a:r>
+          </a:p>
+          <a:p>
+            <a:r>
+              <a:rPr lang="en-US" dirty="0" smtClean="0"/>
+              <a:t>Add UNIQUE, FOREIGN KEY, PRIMARY KEY constraints</a:t>
+            </a:r>
+          </a:p>
+          <a:p>
+            <a:r>
+              <a:rPr lang="en-US" dirty="0" smtClean="0"/>
+              <a:t>Add CHECK constraints</a:t>
+            </a:r>
+            <a:endParaRPr lang="en-US" dirty="0"/>
+          </a:p>
+        </p:txBody>
+      </p:sp>
+    </p:spTree>
+    <p:extLst>
+      <p:ext uri="{BB962C8B-B14F-4D97-AF65-F5344CB8AC3E}">
+        <p14:creationId xmlns:p14="http://schemas.microsoft.com/office/powerpoint/2010/main" val="1981384698"/>
+      </p:ext>
+    </p:extLst>
+  </p:cSld>
+  <p:clrMapOvr>
+    <a:masterClrMapping/>
+  </p:clrMapOvr>
+  <p:timing>
+    <p:tnLst>
+      <p:par>
+        <p:cTn id="1" dur="indefinite" restart="never" nodeType="tmRoot"/>
+      </p:par>
+    </p:tnLst>
+  </p:timing>
+</p:sld>
+</file>
+
+<file path=ppt/slides/slide11.xml><?xml version="1.0" encoding="utf-8"?>
+<p:sld xmlns:a="http://schemas.openxmlformats.org/drawingml/2006/main" xmlns:r="http://schemas.openxmlformats.org/officeDocument/2006/relationships" xmlns:p="http://schemas.openxmlformats.org/presentationml/2006/main">
+  <p:cSld>
+    <p:spTree>
+      <p:nvGrpSpPr>
+        <p:cNvPr id="1" name=""/>
+        <p:cNvGrpSpPr/>
+        <p:nvPr/>
+      </p:nvGrpSpPr>
+      <p:grpSpPr>
+        <a:xfrm>
+          <a:off x="0" y="0"/>
+          <a:ext cx="0" cy="0"/>
+          <a:chOff x="0" y="0"/>
+          <a:chExt cx="0" cy="0"/>
+        </a:xfrm>
+      </p:grpSpPr>
+      <p:sp>
+        <p:nvSpPr>
+          <p:cNvPr id="2" name="Title 1"/>
+          <p:cNvSpPr>
+            <a:spLocks noGrp="1"/>
+          </p:cNvSpPr>
+          <p:nvPr>
+            <p:ph type="title"/>
+          </p:nvPr>
+        </p:nvSpPr>
+        <p:spPr/>
+        <p:txBody>
+          <a:bodyPr/>
+          <a:lstStyle/>
+          <a:p>
+            <a:r>
+              <a:rPr lang="en-US" dirty="0" smtClean="0"/>
+              <a:t>Triggers: what and why</a:t>
+            </a:r>
+            <a:endParaRPr lang="en-US" dirty="0"/>
+          </a:p>
+        </p:txBody>
+      </p:sp>
+      <p:sp>
+        <p:nvSpPr>
+          <p:cNvPr id="3" name="Content Placeholder 2"/>
+          <p:cNvSpPr>
+            <a:spLocks noGrp="1"/>
+          </p:cNvSpPr>
+          <p:nvPr>
+            <p:ph idx="1"/>
+          </p:nvPr>
+        </p:nvSpPr>
+        <p:spPr/>
+        <p:txBody>
+          <a:bodyPr/>
+          <a:lstStyle/>
+          <a:p>
+            <a:r>
+              <a:rPr lang="en-US" dirty="0" smtClean="0"/>
+              <a:t>Triggers are stored procedures that run after or instead of DML or DDL.</a:t>
+            </a:r>
+          </a:p>
+          <a:p>
+            <a:r>
+              <a:rPr lang="en-US" dirty="0" smtClean="0"/>
+              <a:t>Why? Refactoring databases, updatable views</a:t>
+            </a:r>
+            <a:r>
+              <a:rPr lang="en-US" dirty="0"/>
+              <a:t>.</a:t>
+            </a:r>
+            <a:endParaRPr lang="en-US" dirty="0" smtClean="0"/>
+          </a:p>
+          <a:p>
+            <a:r>
+              <a:rPr lang="en-US" dirty="0"/>
+              <a:t>Why not? Hidden performance problems</a:t>
+            </a:r>
+            <a:endParaRPr lang="en-US" dirty="0" smtClean="0"/>
+          </a:p>
+          <a:p>
+            <a:pPr marL="0" indent="0">
+              <a:buNone/>
+            </a:pPr>
+            <a:endParaRPr lang="en-US" dirty="0"/>
+          </a:p>
+        </p:txBody>
+      </p:sp>
+    </p:spTree>
+    <p:extLst>
+      <p:ext uri="{BB962C8B-B14F-4D97-AF65-F5344CB8AC3E}">
+        <p14:creationId xmlns:p14="http://schemas.microsoft.com/office/powerpoint/2010/main" val="4239816334"/>
+      </p:ext>
+    </p:extLst>
+  </p:cSld>
+  <p:clrMapOvr>
+    <a:masterClrMapping/>
+  </p:clrMapOvr>
+  <p:timing>
+    <p:tnLst>
+      <p:par>
+        <p:cTn id="1" dur="indefinite" restart="never" nodeType="tmRoot"/>
+      </p:par>
+    </p:tnLst>
+  </p:timing>
+</p:sld>
+</file>
+
+<file path=ppt/slides/slide12.xml><?xml version="1.0" encoding="utf-8"?>
+<p:sld xmlns:a="http://schemas.openxmlformats.org/drawingml/2006/main" xmlns:r="http://schemas.openxmlformats.org/officeDocument/2006/relationships" xmlns:p="http://schemas.openxmlformats.org/presentationml/2006/main">
+  <p:cSld>
+    <p:spTree>
+      <p:nvGrpSpPr>
+        <p:cNvPr id="1" name=""/>
+        <p:cNvGrpSpPr/>
+        <p:nvPr/>
+      </p:nvGrpSpPr>
+      <p:grpSpPr>
+        <a:xfrm>
+          <a:off x="0" y="0"/>
+          <a:ext cx="0" cy="0"/>
+          <a:chOff x="0" y="0"/>
+          <a:chExt cx="0" cy="0"/>
+        </a:xfrm>
+      </p:grpSpPr>
+      <p:sp>
+        <p:nvSpPr>
+          <p:cNvPr id="2" name="Title 1"/>
+          <p:cNvSpPr>
+            <a:spLocks noGrp="1"/>
+          </p:cNvSpPr>
+          <p:nvPr>
+            <p:ph type="title"/>
+          </p:nvPr>
+        </p:nvSpPr>
+        <p:spPr/>
+        <p:txBody>
+          <a:bodyPr/>
+          <a:lstStyle/>
+          <a:p>
+            <a:r>
+              <a:rPr lang="en-US" dirty="0" smtClean="0"/>
+              <a:t>Demo</a:t>
+            </a:r>
+            <a:endParaRPr lang="en-US" dirty="0"/>
+          </a:p>
+        </p:txBody>
+      </p:sp>
+      <p:sp>
+        <p:nvSpPr>
+          <p:cNvPr id="3" name="Content Placeholder 2"/>
+          <p:cNvSpPr>
+            <a:spLocks noGrp="1"/>
+          </p:cNvSpPr>
+          <p:nvPr>
+            <p:ph idx="1"/>
+          </p:nvPr>
+        </p:nvSpPr>
+        <p:spPr/>
+        <p:txBody>
+          <a:bodyPr/>
+          <a:lstStyle/>
+          <a:p>
+            <a:endParaRPr lang="en-US" dirty="0"/>
+          </a:p>
+        </p:txBody>
+      </p:sp>
+    </p:spTree>
+    <p:extLst>
+      <p:ext uri="{BB962C8B-B14F-4D97-AF65-F5344CB8AC3E}">
+        <p14:creationId xmlns:p14="http://schemas.microsoft.com/office/powerpoint/2010/main" val="609649797"/>
+      </p:ext>
+    </p:extLst>
+  </p:cSld>
+  <p:clrMapOvr>
+    <a:masterClrMapping/>
+  </p:clrMapOvr>
+  <p:timing>
+    <p:tnLst>
+      <p:par>
+        <p:cTn id="1" dur="indefinite" restart="never" nodeType="tmRoot"/>
+      </p:par>
+    </p:tnLst>
+  </p:timing>
+</p:sld>
+</file>
+
+<file path=ppt/slides/slide13.xml><?xml version="1.0" encoding="utf-8"?>
+<p:sld xmlns:a="http://schemas.openxmlformats.org/drawingml/2006/main" xmlns:r="http://schemas.openxmlformats.org/officeDocument/2006/relationships" xmlns:p="http://schemas.openxmlformats.org/presentationml/2006/main">
+  <p:cSld>
+    <p:spTree>
+      <p:nvGrpSpPr>
+        <p:cNvPr id="1" name=""/>
+        <p:cNvGrpSpPr/>
+        <p:nvPr/>
+      </p:nvGrpSpPr>
+      <p:grpSpPr>
+        <a:xfrm>
+          <a:off x="0" y="0"/>
+          <a:ext cx="0" cy="0"/>
+          <a:chOff x="0" y="0"/>
+          <a:chExt cx="0" cy="0"/>
+        </a:xfrm>
+      </p:grpSpPr>
+      <p:sp>
+        <p:nvSpPr>
+          <p:cNvPr id="2" name="Title 1"/>
+          <p:cNvSpPr>
+            <a:spLocks noGrp="1"/>
+          </p:cNvSpPr>
+          <p:nvPr>
+            <p:ph type="title"/>
+          </p:nvPr>
+        </p:nvSpPr>
+        <p:spPr/>
+        <p:txBody>
+          <a:bodyPr/>
+          <a:lstStyle/>
+          <a:p>
+            <a:r>
+              <a:rPr lang="en-US" dirty="0" smtClean="0"/>
+              <a:t>Lessons Learned</a:t>
+            </a:r>
+            <a:endParaRPr lang="en-US" dirty="0"/>
+          </a:p>
+        </p:txBody>
+      </p:sp>
+      <p:sp>
+        <p:nvSpPr>
+          <p:cNvPr id="3" name="Content Placeholder 2"/>
+          <p:cNvSpPr>
+            <a:spLocks noGrp="1"/>
+          </p:cNvSpPr>
+          <p:nvPr>
+            <p:ph idx="1"/>
+          </p:nvPr>
+        </p:nvSpPr>
+        <p:spPr/>
+        <p:txBody>
+          <a:bodyPr/>
+          <a:lstStyle/>
+          <a:p>
+            <a:r>
+              <a:rPr lang="en-US" dirty="0"/>
+              <a:t>SET </a:t>
+            </a:r>
+            <a:r>
+              <a:rPr lang="en-US" dirty="0" smtClean="0"/>
+              <a:t>RECURSIVE_TRIGGERS OFF/ON</a:t>
+            </a:r>
+          </a:p>
+          <a:p>
+            <a:r>
+              <a:rPr lang="en-US" dirty="0" smtClean="0"/>
+              <a:t>Triggers execute even if table contents doesn’t change</a:t>
+            </a:r>
+          </a:p>
+          <a:p>
+            <a:r>
+              <a:rPr lang="en-US" dirty="0" smtClean="0"/>
+              <a:t>Testing is painful, especially setup, so…</a:t>
+            </a:r>
+          </a:p>
+          <a:p>
+            <a:r>
+              <a:rPr lang="en-US" dirty="0" smtClean="0"/>
+              <a:t>Have a test script</a:t>
+            </a:r>
+          </a:p>
+          <a:p>
+            <a:r>
+              <a:rPr lang="en-US" dirty="0" smtClean="0"/>
+              <a:t>Use version control</a:t>
+            </a:r>
+          </a:p>
+          <a:p>
+            <a:endParaRPr lang="en-US" dirty="0"/>
+          </a:p>
+        </p:txBody>
+      </p:sp>
+    </p:spTree>
+    <p:extLst>
+      <p:ext uri="{BB962C8B-B14F-4D97-AF65-F5344CB8AC3E}">
+        <p14:creationId xmlns:p14="http://schemas.microsoft.com/office/powerpoint/2010/main" val="3523844589"/>
+      </p:ext>
+    </p:extLst>
+  </p:cSld>
+  <p:clrMapOvr>
+    <a:masterClrMapping/>
+  </p:clrMapOvr>
+  <p:timing>
+    <p:tnLst>
+      <p:par>
+        <p:cTn id="1" dur="indefinite" restart="never" nodeType="tmRoot"/>
+      </p:par>
+    </p:tnLst>
+  </p:timing>
+</p:sld>
+</file>
+
+<file path=ppt/slides/slide14.xml><?xml version="1.0" encoding="utf-8"?>
+<p:sld xmlns:a="http://schemas.openxmlformats.org/drawingml/2006/main" xmlns:r="http://schemas.openxmlformats.org/officeDocument/2006/relationships" xmlns:p="http://schemas.openxmlformats.org/presentationml/2006/main">
+  <p:cSld>
+    <p:spTree>
+      <p:nvGrpSpPr>
+        <p:cNvPr id="1" name=""/>
+        <p:cNvGrpSpPr/>
+        <p:nvPr/>
+      </p:nvGrpSpPr>
+      <p:grpSpPr>
+        <a:xfrm>
+          <a:off x="0" y="0"/>
+          <a:ext cx="0" cy="0"/>
+          <a:chOff x="0" y="0"/>
+          <a:chExt cx="0" cy="0"/>
+        </a:xfrm>
+      </p:grpSpPr>
+      <p:sp>
+        <p:nvSpPr>
+          <p:cNvPr id="2" name="Title 1"/>
+          <p:cNvSpPr>
+            <a:spLocks noGrp="1"/>
+          </p:cNvSpPr>
+          <p:nvPr>
+            <p:ph type="title"/>
+          </p:nvPr>
+        </p:nvSpPr>
+        <p:spPr/>
+        <p:txBody>
+          <a:bodyPr/>
+          <a:lstStyle/>
+          <a:p>
+            <a:r>
+              <a:rPr lang="en-US" dirty="0" smtClean="0"/>
+              <a:t>References</a:t>
+            </a:r>
+            <a:endParaRPr lang="en-US" dirty="0"/>
+          </a:p>
+        </p:txBody>
+      </p:sp>
+      <p:sp>
+        <p:nvSpPr>
+          <p:cNvPr id="3" name="Content Placeholder 2"/>
+          <p:cNvSpPr>
+            <a:spLocks noGrp="1"/>
+          </p:cNvSpPr>
+          <p:nvPr>
+            <p:ph idx="1"/>
+          </p:nvPr>
+        </p:nvSpPr>
+        <p:spPr/>
+        <p:txBody>
+          <a:bodyPr>
+            <a:normAutofit fontScale="92500" lnSpcReduction="10000"/>
+          </a:bodyPr>
+          <a:lstStyle/>
+          <a:p>
+            <a:r>
+              <a:rPr lang="en-US" dirty="0" smtClean="0"/>
+              <a:t>Evolutionary </a:t>
+            </a:r>
+            <a:r>
+              <a:rPr lang="en-US" dirty="0"/>
+              <a:t>Database Design: </a:t>
+            </a:r>
+            <a:r>
+              <a:rPr lang="en-US" dirty="0">
+                <a:hlinkClick r:id="rId2"/>
+              </a:rPr>
+              <a:t>http://</a:t>
+            </a:r>
+            <a:r>
+              <a:rPr lang="en-US" dirty="0" smtClean="0">
+                <a:hlinkClick r:id="rId2"/>
+              </a:rPr>
+              <a:t>martinfowler.com/articles/evodb.html</a:t>
+            </a:r>
+            <a:r>
+              <a:rPr lang="en-US" dirty="0" smtClean="0"/>
+              <a:t> </a:t>
+            </a:r>
+          </a:p>
+          <a:p>
+            <a:r>
+              <a:rPr lang="en-US" dirty="0" smtClean="0"/>
+              <a:t>Expand/Contract pattern: </a:t>
+            </a:r>
+            <a:r>
+              <a:rPr lang="en-US" dirty="0">
+                <a:hlinkClick r:id="rId3"/>
+              </a:rPr>
+              <a:t>http://</a:t>
+            </a:r>
+            <a:r>
+              <a:rPr lang="en-US" dirty="0" smtClean="0">
+                <a:hlinkClick r:id="rId3"/>
+              </a:rPr>
+              <a:t>martinfowler.com/bliki/ParallelChange.html</a:t>
+            </a:r>
+            <a:r>
+              <a:rPr lang="en-US" dirty="0" smtClean="0"/>
+              <a:t> </a:t>
+            </a:r>
+          </a:p>
+          <a:p>
+            <a:r>
+              <a:rPr lang="en-US" dirty="0" smtClean="0"/>
+              <a:t>Refactoring </a:t>
+            </a:r>
+            <a:r>
+              <a:rPr lang="en-US" dirty="0"/>
+              <a:t>Databases </a:t>
+            </a:r>
+            <a:r>
+              <a:rPr lang="en-US" dirty="0" smtClean="0"/>
+              <a:t>book</a:t>
+            </a:r>
+          </a:p>
+          <a:p>
+            <a:r>
+              <a:rPr lang="en-US" dirty="0" smtClean="0"/>
+              <a:t>Etsy </a:t>
+            </a:r>
+            <a:r>
+              <a:rPr lang="en-US" dirty="0"/>
+              <a:t>50 deployments/day: </a:t>
+            </a:r>
+            <a:r>
+              <a:rPr lang="en-US" dirty="0">
+                <a:hlinkClick r:id="rId4"/>
+              </a:rPr>
+              <a:t>http://</a:t>
+            </a:r>
+            <a:r>
+              <a:rPr lang="en-US" dirty="0" smtClean="0">
+                <a:hlinkClick r:id="rId4"/>
+              </a:rPr>
+              <a:t>www.infoq.com/news/2014/03/etsy-deploy-50-times-a-day</a:t>
+            </a:r>
+            <a:endParaRPr lang="en-US" dirty="0" smtClean="0"/>
+          </a:p>
+          <a:p>
+            <a:r>
+              <a:rPr lang="en-US" dirty="0">
+                <a:hlinkClick r:id="rId5"/>
+              </a:rPr>
+              <a:t>http://</a:t>
+            </a:r>
+            <a:r>
+              <a:rPr lang="en-US" dirty="0" smtClean="0">
+                <a:hlinkClick r:id="rId5"/>
+              </a:rPr>
+              <a:t>www.slideshare.net/beamrider9/continuous-deployment-at-etsy-a-tale-of-two-approaches</a:t>
+            </a:r>
+            <a:endParaRPr lang="en-US" dirty="0" smtClean="0"/>
+          </a:p>
+          <a:p>
+            <a:r>
+              <a:rPr lang="en-US" dirty="0">
+                <a:hlinkClick r:id="rId6"/>
+              </a:rPr>
+              <a:t>https://www.simple-talk.com/sql/database-administration/continuous-delivery-and-the-database</a:t>
+            </a:r>
+            <a:r>
+              <a:rPr lang="en-US" dirty="0" smtClean="0">
+                <a:hlinkClick r:id="rId6"/>
+              </a:rPr>
+              <a:t>/</a:t>
+            </a:r>
+            <a:r>
+              <a:rPr lang="en-US" dirty="0" smtClean="0"/>
+              <a:t> </a:t>
+            </a:r>
+            <a:endParaRPr lang="en-US" dirty="0"/>
+          </a:p>
+          <a:p>
+            <a:endParaRPr lang="en-US" dirty="0"/>
+          </a:p>
+        </p:txBody>
+      </p:sp>
+    </p:spTree>
+    <p:extLst>
+      <p:ext uri="{BB962C8B-B14F-4D97-AF65-F5344CB8AC3E}">
+        <p14:creationId xmlns:p14="http://schemas.microsoft.com/office/powerpoint/2010/main" val="1040678401"/>
+      </p:ext>
+    </p:extLst>
+  </p:cSld>
+  <p:clrMapOvr>
+    <a:masterClrMapping/>
+  </p:clrMapOvr>
+  <p:timing>
+    <p:tnLst>
+      <p:par>
+        <p:cTn id="1" dur="indefinite" restart="never" nodeType="tmRoot"/>
+      </p:par>
+    </p:tnLst>
+  </p:timing>
+</p:sld>
+</file>
+
+<file path=ppt/slides/slide15.xml><?xml version="1.0" encoding="utf-8"?>
+<p:sld xmlns:a="http://schemas.openxmlformats.org/drawingml/2006/main" xmlns:r="http://schemas.openxmlformats.org/officeDocument/2006/relationships" xmlns:p="http://schemas.openxmlformats.org/presentationml/2006/main">
+  <p:cSld>
+    <p:spTree>
+      <p:nvGrpSpPr>
+        <p:cNvPr id="1" name=""/>
+        <p:cNvGrpSpPr/>
+        <p:nvPr/>
+      </p:nvGrpSpPr>
+      <p:grpSpPr>
+        <a:xfrm>
+          <a:off x="0" y="0"/>
+          <a:ext cx="0" cy="0"/>
+          <a:chOff x="0" y="0"/>
+          <a:chExt cx="0" cy="0"/>
+        </a:xfrm>
+      </p:grpSpPr>
+      <p:sp>
+        <p:nvSpPr>
+          <p:cNvPr id="2" name="Title 1"/>
+          <p:cNvSpPr>
+            <a:spLocks noGrp="1"/>
+          </p:cNvSpPr>
+          <p:nvPr>
+            <p:ph type="title"/>
+          </p:nvPr>
+        </p:nvSpPr>
+        <p:spPr/>
+        <p:txBody>
+          <a:bodyPr/>
+          <a:lstStyle/>
+          <a:p>
+            <a:r>
+              <a:rPr lang="en-US" dirty="0" smtClean="0"/>
+              <a:t>Questions?</a:t>
+            </a:r>
+            <a:endParaRPr lang="en-US" dirty="0"/>
+          </a:p>
+        </p:txBody>
+      </p:sp>
+      <p:sp>
+        <p:nvSpPr>
+          <p:cNvPr id="3" name="Content Placeholder 2"/>
+          <p:cNvSpPr>
+            <a:spLocks noGrp="1"/>
+          </p:cNvSpPr>
+          <p:nvPr>
+            <p:ph idx="1"/>
+          </p:nvPr>
+        </p:nvSpPr>
+        <p:spPr/>
+        <p:txBody>
+          <a:bodyPr/>
+          <a:lstStyle/>
+          <a:p>
+            <a:pPr marL="0" indent="0">
+              <a:buNone/>
+            </a:pPr>
+            <a:endParaRPr lang="en-US" dirty="0"/>
+          </a:p>
+          <a:p>
+            <a:pPr marL="0" indent="0">
+              <a:buNone/>
+            </a:pPr>
+            <a:endParaRPr lang="en-US" dirty="0"/>
+          </a:p>
+        </p:txBody>
+      </p:sp>
+    </p:spTree>
+    <p:extLst>
+      <p:ext uri="{BB962C8B-B14F-4D97-AF65-F5344CB8AC3E}">
+        <p14:creationId xmlns:p14="http://schemas.microsoft.com/office/powerpoint/2010/main" val="3067436373"/>
+      </p:ext>
+    </p:extLst>
+  </p:cSld>
+  <p:clrMapOvr>
+    <a:masterClrMapping/>
+  </p:clrMapOvr>
+  <p:timing>
+    <p:tnLst>
+      <p:par>
+        <p:cTn id="1" dur="indefinite" restart="never" nodeType="tmRoot"/>
+      </p:par>
+    </p:tnLst>
+  </p:timing>
+</p:sld>
+</file>
+
 <file path=ppt/slides/slide2.xml><?xml version="1.0" encoding="utf-8"?>
+<p:sld xmlns:a="http://schemas.openxmlformats.org/drawingml/2006/main" xmlns:r="http://schemas.openxmlformats.org/officeDocument/2006/relationships" xmlns:p="http://schemas.openxmlformats.org/presentationml/2006/main">
+  <p:cSld>
+    <p:spTree>
+      <p:nvGrpSpPr>
+        <p:cNvPr id="1" name=""/>
+        <p:cNvGrpSpPr/>
+        <p:nvPr/>
+      </p:nvGrpSpPr>
+      <p:grpSpPr>
+        <a:xfrm>
+          <a:off x="0" y="0"/>
+          <a:ext cx="0" cy="0"/>
+          <a:chOff x="0" y="0"/>
+          <a:chExt cx="0" cy="0"/>
+        </a:xfrm>
+      </p:grpSpPr>
+      <p:sp>
+        <p:nvSpPr>
+          <p:cNvPr id="2" name="Title 1"/>
+          <p:cNvSpPr>
+            <a:spLocks noGrp="1"/>
+          </p:cNvSpPr>
+          <p:nvPr>
+            <p:ph type="title"/>
+          </p:nvPr>
+        </p:nvSpPr>
+        <p:spPr/>
+        <p:txBody>
+          <a:bodyPr/>
+          <a:lstStyle/>
+          <a:p>
+            <a:r>
+              <a:rPr lang="en-US" dirty="0" smtClean="0"/>
+              <a:t>Who am I?</a:t>
+            </a:r>
+            <a:endParaRPr lang="en-US" dirty="0"/>
+          </a:p>
+        </p:txBody>
+      </p:sp>
+      <p:sp>
+        <p:nvSpPr>
+          <p:cNvPr id="3" name="Content Placeholder 2"/>
+          <p:cNvSpPr>
+            <a:spLocks noGrp="1"/>
+          </p:cNvSpPr>
+          <p:nvPr>
+            <p:ph idx="1"/>
+          </p:nvPr>
+        </p:nvSpPr>
+        <p:spPr/>
+        <p:txBody>
+          <a:bodyPr/>
+          <a:lstStyle/>
+          <a:p>
+            <a:r>
+              <a:rPr lang="en-US" dirty="0" smtClean="0"/>
+              <a:t>Rob Vatz</a:t>
+            </a:r>
+          </a:p>
+          <a:p>
+            <a:r>
+              <a:rPr lang="en-US" dirty="0" smtClean="0"/>
+              <a:t>Email: </a:t>
+            </a:r>
+            <a:r>
+              <a:rPr lang="en-US" dirty="0" smtClean="0">
+                <a:hlinkClick r:id="rId2"/>
+              </a:rPr>
+              <a:t>rob.vatz@sceneralabs.com</a:t>
+            </a:r>
+            <a:endParaRPr lang="en-US" dirty="0" smtClean="0"/>
+          </a:p>
+          <a:p>
+            <a:r>
+              <a:rPr lang="en-US" dirty="0" smtClean="0"/>
+              <a:t>Twitter @</a:t>
+            </a:r>
+            <a:r>
+              <a:rPr lang="en-US" dirty="0" err="1" smtClean="0"/>
+              <a:t>robvatz</a:t>
+            </a:r>
+            <a:endParaRPr lang="en-US" dirty="0" smtClean="0"/>
+          </a:p>
+          <a:p>
+            <a:r>
+              <a:rPr lang="en-US" dirty="0" smtClean="0"/>
+              <a:t>Hobbies: Hammered Dulcimer, Aikido</a:t>
+            </a:r>
+          </a:p>
+          <a:p>
+            <a:endParaRPr lang="en-US" dirty="0" smtClean="0"/>
+          </a:p>
+        </p:txBody>
+      </p:sp>
+      <p:pic>
+        <p:nvPicPr>
+          <p:cNvPr id="4" name="Picture 3"/>
+          <p:cNvPicPr>
+            <a:picLocks noChangeAspect="1"/>
+          </p:cNvPicPr>
+          <p:nvPr/>
+        </p:nvPicPr>
+        <p:blipFill>
+          <a:blip r:embed="rId3">
+            <a:extLst>
+              <a:ext uri="{28A0092B-C50C-407E-A947-70E740481C1C}">
+                <a14:useLocalDpi xmlns:a14="http://schemas.microsoft.com/office/drawing/2010/main" val="0"/>
+              </a:ext>
+            </a:extLst>
+          </a:blip>
+          <a:stretch>
+            <a:fillRect/>
+          </a:stretch>
+        </p:blipFill>
+        <p:spPr>
+          <a:xfrm>
+            <a:off x="1354832" y="4049380"/>
+            <a:ext cx="2381582" cy="1790950"/>
+          </a:xfrm>
+          <a:prstGeom prst="rect">
+            <a:avLst/>
+          </a:prstGeom>
+        </p:spPr>
+      </p:pic>
+    </p:spTree>
+    <p:extLst>
+      <p:ext uri="{BB962C8B-B14F-4D97-AF65-F5344CB8AC3E}">
+        <p14:creationId xmlns:p14="http://schemas.microsoft.com/office/powerpoint/2010/main" val="603695361"/>
+      </p:ext>
+    </p:extLst>
+  </p:cSld>
+  <p:clrMapOvr>
+    <a:masterClrMapping/>
+  </p:clrMapOvr>
+  <p:timing>
+    <p:tnLst>
+      <p:par>
+        <p:cTn id="1" dur="indefinite" restart="never" nodeType="tmRoot"/>
+      </p:par>
+    </p:tnLst>
+  </p:timing>
+</p:sld>
+</file>
+
+<file path=ppt/slides/slide3.xml><?xml version="1.0" encoding="utf-8"?>
+<p:sld xmlns:a="http://schemas.openxmlformats.org/drawingml/2006/main" xmlns:r="http://schemas.openxmlformats.org/officeDocument/2006/relationships" xmlns:p="http://schemas.openxmlformats.org/presentationml/2006/main">
+  <p:cSld>
+    <p:spTree>
+      <p:nvGrpSpPr>
+        <p:cNvPr id="1" name=""/>
+        <p:cNvGrpSpPr/>
+        <p:nvPr/>
+      </p:nvGrpSpPr>
+      <p:grpSpPr>
+        <a:xfrm>
+          <a:off x="0" y="0"/>
+          <a:ext cx="0" cy="0"/>
+          <a:chOff x="0" y="0"/>
+          <a:chExt cx="0" cy="0"/>
+        </a:xfrm>
+      </p:grpSpPr>
+      <p:sp>
+        <p:nvSpPr>
+          <p:cNvPr id="2" name="Title 1"/>
+          <p:cNvSpPr>
+            <a:spLocks noGrp="1"/>
+          </p:cNvSpPr>
+          <p:nvPr>
+            <p:ph type="title"/>
+          </p:nvPr>
+        </p:nvSpPr>
+        <p:spPr/>
+        <p:txBody>
+          <a:bodyPr/>
+          <a:lstStyle/>
+          <a:p>
+            <a:r>
+              <a:rPr lang="en-US" dirty="0" smtClean="0"/>
+              <a:t>Overview</a:t>
+            </a:r>
+            <a:endParaRPr lang="en-US" dirty="0"/>
+          </a:p>
+        </p:txBody>
+      </p:sp>
+      <p:sp>
+        <p:nvSpPr>
+          <p:cNvPr id="3" name="Content Placeholder 2"/>
+          <p:cNvSpPr>
+            <a:spLocks noGrp="1"/>
+          </p:cNvSpPr>
+          <p:nvPr>
+            <p:ph idx="1"/>
+          </p:nvPr>
+        </p:nvSpPr>
+        <p:spPr/>
+        <p:txBody>
+          <a:bodyPr/>
+          <a:lstStyle/>
+          <a:p>
+            <a:r>
+              <a:rPr lang="en-US" dirty="0" smtClean="0"/>
+              <a:t>Why Evolutionary Database Design</a:t>
+            </a:r>
+          </a:p>
+          <a:p>
+            <a:r>
+              <a:rPr lang="en-US" dirty="0" smtClean="0"/>
+              <a:t>Main </a:t>
+            </a:r>
+            <a:r>
+              <a:rPr lang="en-US" dirty="0" smtClean="0"/>
+              <a:t>strategy</a:t>
+            </a:r>
+          </a:p>
+          <a:p>
+            <a:r>
+              <a:rPr lang="en-US" dirty="0"/>
+              <a:t>Triggers: what and why</a:t>
+            </a:r>
+          </a:p>
+          <a:p>
+            <a:r>
+              <a:rPr lang="en-US" dirty="0" smtClean="0"/>
+              <a:t>Demo</a:t>
+            </a:r>
+            <a:r>
+              <a:rPr lang="en-US" dirty="0" smtClean="0"/>
+              <a:t>: using triggers</a:t>
+            </a:r>
+          </a:p>
+          <a:p>
+            <a:r>
+              <a:rPr lang="en-US" dirty="0" smtClean="0"/>
+              <a:t>Lessons learned</a:t>
+            </a:r>
+          </a:p>
+          <a:p>
+            <a:endParaRPr lang="en-US" dirty="0"/>
+          </a:p>
+        </p:txBody>
+      </p:sp>
+    </p:spTree>
+    <p:extLst>
+      <p:ext uri="{BB962C8B-B14F-4D97-AF65-F5344CB8AC3E}">
+        <p14:creationId xmlns:p14="http://schemas.microsoft.com/office/powerpoint/2010/main" val="4288871856"/>
+      </p:ext>
+    </p:extLst>
+  </p:cSld>
+  <p:clrMapOvr>
+    <a:masterClrMapping/>
+  </p:clrMapOvr>
+  <p:timing>
+    <p:tnLst>
+      <p:par>
+        <p:cTn id="1" dur="indefinite" restart="never" nodeType="tmRoot"/>
+      </p:par>
+    </p:tnLst>
+  </p:timing>
+</p:sld>
+</file>
+
+<file path=ppt/slides/slide4.xml><?xml version="1.0" encoding="utf-8"?>
+<p:sld xmlns:a="http://schemas.openxmlformats.org/drawingml/2006/main" xmlns:r="http://schemas.openxmlformats.org/officeDocument/2006/relationships" xmlns:p="http://schemas.openxmlformats.org/presentationml/2006/main">
+  <p:cSld>
+    <p:spTree>
+      <p:nvGrpSpPr>
+        <p:cNvPr id="1" name=""/>
+        <p:cNvGrpSpPr/>
+        <p:nvPr/>
+      </p:nvGrpSpPr>
+      <p:grpSpPr>
+        <a:xfrm>
+          <a:off x="0" y="0"/>
+          <a:ext cx="0" cy="0"/>
+          <a:chOff x="0" y="0"/>
+          <a:chExt cx="0" cy="0"/>
+        </a:xfrm>
+      </p:grpSpPr>
+      <p:sp>
+        <p:nvSpPr>
+          <p:cNvPr id="2" name="Title 1"/>
+          <p:cNvSpPr>
+            <a:spLocks noGrp="1"/>
+          </p:cNvSpPr>
+          <p:nvPr>
+            <p:ph type="title"/>
+          </p:nvPr>
+        </p:nvSpPr>
+        <p:spPr/>
+        <p:txBody>
+          <a:bodyPr/>
+          <a:lstStyle/>
+          <a:p>
+            <a:r>
+              <a:rPr lang="en-US" dirty="0" smtClean="0"/>
+              <a:t>Why</a:t>
+            </a:r>
+            <a:endParaRPr lang="en-US" dirty="0"/>
+          </a:p>
+        </p:txBody>
+      </p:sp>
+      <p:sp>
+        <p:nvSpPr>
+          <p:cNvPr id="3" name="Content Placeholder 2"/>
+          <p:cNvSpPr>
+            <a:spLocks noGrp="1"/>
+          </p:cNvSpPr>
+          <p:nvPr>
+            <p:ph idx="1"/>
+          </p:nvPr>
+        </p:nvSpPr>
+        <p:spPr/>
+        <p:txBody>
+          <a:bodyPr/>
+          <a:lstStyle/>
+          <a:p>
+            <a:r>
+              <a:rPr lang="en-US" dirty="0" smtClean="0"/>
+              <a:t>Agile / Lean Development: frequent small changes to software. Assume unstable requirements.</a:t>
+            </a:r>
+          </a:p>
+          <a:p>
+            <a:r>
+              <a:rPr lang="en-US" dirty="0"/>
+              <a:t>Continuous </a:t>
+            </a:r>
+            <a:r>
+              <a:rPr lang="en-US" dirty="0" smtClean="0"/>
+              <a:t>Delivery: automated delivery / deployment to production</a:t>
+            </a:r>
+          </a:p>
+          <a:p>
+            <a:r>
+              <a:rPr lang="en-US" dirty="0"/>
+              <a:t>Repeatable server builds.</a:t>
+            </a:r>
+          </a:p>
+          <a:p>
+            <a:r>
+              <a:rPr lang="en-US" dirty="0" smtClean="0"/>
+              <a:t>“</a:t>
+            </a:r>
+            <a:r>
+              <a:rPr lang="en-US" dirty="0" smtClean="0"/>
+              <a:t>Infrastructure as code”. Puppet / Chef / </a:t>
+            </a:r>
+            <a:r>
+              <a:rPr lang="en-US" dirty="0" err="1" smtClean="0"/>
+              <a:t>Ansible</a:t>
+            </a:r>
+            <a:endParaRPr lang="en-US" dirty="0" smtClean="0"/>
+          </a:p>
+          <a:p>
+            <a:r>
+              <a:rPr lang="en-US" dirty="0" smtClean="0"/>
+              <a:t>Etsy</a:t>
+            </a:r>
+            <a:r>
+              <a:rPr lang="en-US" dirty="0" smtClean="0"/>
+              <a:t>: 50 deployments per day.</a:t>
+            </a:r>
+            <a:endParaRPr lang="en-US" dirty="0"/>
+          </a:p>
+        </p:txBody>
+      </p:sp>
+    </p:spTree>
+    <p:extLst>
+      <p:ext uri="{BB962C8B-B14F-4D97-AF65-F5344CB8AC3E}">
+        <p14:creationId xmlns:p14="http://schemas.microsoft.com/office/powerpoint/2010/main" val="767168735"/>
+      </p:ext>
+    </p:extLst>
+  </p:cSld>
+  <p:clrMapOvr>
+    <a:masterClrMapping/>
+  </p:clrMapOvr>
+  <p:timing>
+    <p:tnLst>
+      <p:par>
+        <p:cTn id="1" dur="indefinite" restart="never" nodeType="tmRoot"/>
+      </p:par>
+    </p:tnLst>
+  </p:timing>
+</p:sld>
+</file>
+
+<file path=ppt/slides/slide5.xml><?xml version="1.0" encoding="utf-8"?>
+<p:sld xmlns:a="http://schemas.openxmlformats.org/drawingml/2006/main" xmlns:r="http://schemas.openxmlformats.org/officeDocument/2006/relationships" xmlns:p="http://schemas.openxmlformats.org/presentationml/2006/main">
+  <p:cSld>
+    <p:spTree>
+      <p:nvGrpSpPr>
+        <p:cNvPr id="1" name=""/>
+        <p:cNvGrpSpPr/>
+        <p:nvPr/>
+      </p:nvGrpSpPr>
+      <p:grpSpPr>
+        <a:xfrm>
+          <a:off x="0" y="0"/>
+          <a:ext cx="0" cy="0"/>
+          <a:chOff x="0" y="0"/>
+          <a:chExt cx="0" cy="0"/>
+        </a:xfrm>
+      </p:grpSpPr>
+      <p:sp>
+        <p:nvSpPr>
+          <p:cNvPr id="2" name="Title 1"/>
+          <p:cNvSpPr>
+            <a:spLocks noGrp="1"/>
+          </p:cNvSpPr>
+          <p:nvPr>
+            <p:ph type="title"/>
+          </p:nvPr>
+        </p:nvSpPr>
+        <p:spPr/>
+        <p:txBody>
+          <a:bodyPr/>
+          <a:lstStyle/>
+          <a:p>
+            <a:r>
+              <a:rPr lang="en-US" dirty="0" smtClean="0"/>
+              <a:t>Challenges</a:t>
+            </a:r>
+            <a:endParaRPr lang="en-US" dirty="0"/>
+          </a:p>
+        </p:txBody>
+      </p:sp>
+      <p:sp>
+        <p:nvSpPr>
+          <p:cNvPr id="3" name="Content Placeholder 2"/>
+          <p:cNvSpPr>
+            <a:spLocks noGrp="1"/>
+          </p:cNvSpPr>
+          <p:nvPr>
+            <p:ph idx="1"/>
+          </p:nvPr>
+        </p:nvSpPr>
+        <p:spPr/>
+        <p:txBody>
+          <a:bodyPr>
+            <a:normAutofit fontScale="92500" lnSpcReduction="20000"/>
+          </a:bodyPr>
+          <a:lstStyle/>
+          <a:p>
+            <a:r>
+              <a:rPr lang="en-US" dirty="0" smtClean="0"/>
+              <a:t>Can’t just delete the data and rebuild DB</a:t>
+            </a:r>
+          </a:p>
+          <a:p>
+            <a:r>
+              <a:rPr lang="en-US" dirty="0" smtClean="0"/>
+              <a:t>Database</a:t>
+            </a:r>
+          </a:p>
+          <a:p>
+            <a:pPr lvl="1"/>
+            <a:r>
+              <a:rPr lang="en-US" dirty="0" smtClean="0"/>
+              <a:t>Replication </a:t>
+            </a:r>
+            <a:r>
+              <a:rPr lang="en-US" dirty="0"/>
+              <a:t>/ Mirroring</a:t>
+            </a:r>
+          </a:p>
+          <a:p>
+            <a:pPr lvl="1"/>
+            <a:r>
+              <a:rPr lang="en-US" dirty="0" smtClean="0"/>
+              <a:t>SSIS &amp; SQL Agent.</a:t>
+            </a:r>
+          </a:p>
+          <a:p>
+            <a:pPr lvl="1"/>
+            <a:r>
+              <a:rPr lang="en-US" dirty="0" smtClean="0"/>
+              <a:t>Cross-database queries and views.  Snapshots.</a:t>
+            </a:r>
+          </a:p>
+          <a:p>
+            <a:pPr lvl="1"/>
+            <a:r>
+              <a:rPr lang="en-US" dirty="0" smtClean="0"/>
+              <a:t>Instance level dependencies: logins, linked servers, alerts, policies.</a:t>
+            </a:r>
+          </a:p>
+          <a:p>
+            <a:pPr lvl="1"/>
+            <a:r>
+              <a:rPr lang="en-US" dirty="0" smtClean="0"/>
+              <a:t>Documentation</a:t>
+            </a:r>
+          </a:p>
+          <a:p>
+            <a:pPr lvl="1"/>
+            <a:r>
+              <a:rPr lang="en-US" dirty="0" smtClean="0"/>
+              <a:t>Static data, e.g., valid value table contents</a:t>
+            </a:r>
+          </a:p>
+          <a:p>
+            <a:pPr lvl="1"/>
+            <a:r>
+              <a:rPr lang="en-US" dirty="0"/>
+              <a:t>Stored procedures</a:t>
+            </a:r>
+          </a:p>
+          <a:p>
+            <a:r>
+              <a:rPr lang="en-US" dirty="0" smtClean="0"/>
+              <a:t>Outside database</a:t>
+            </a:r>
+          </a:p>
+          <a:p>
+            <a:pPr lvl="1"/>
+            <a:r>
+              <a:rPr lang="en-US" dirty="0"/>
+              <a:t>Code</a:t>
+            </a:r>
+          </a:p>
+          <a:p>
+            <a:pPr lvl="1"/>
+            <a:r>
+              <a:rPr lang="en-US" dirty="0" smtClean="0"/>
+              <a:t>PowerShell </a:t>
+            </a:r>
+            <a:r>
+              <a:rPr lang="en-US" dirty="0" smtClean="0"/>
+              <a:t>queries</a:t>
+            </a:r>
+          </a:p>
+          <a:p>
+            <a:pPr lvl="1"/>
+            <a:r>
+              <a:rPr lang="en-US" dirty="0" smtClean="0"/>
+              <a:t>Ad-hoc </a:t>
+            </a:r>
+            <a:r>
+              <a:rPr lang="en-US" dirty="0" smtClean="0"/>
+              <a:t>queries</a:t>
+            </a:r>
+          </a:p>
+          <a:p>
+            <a:endParaRPr lang="en-US" dirty="0" smtClean="0"/>
+          </a:p>
+          <a:p>
+            <a:endParaRPr lang="en-US" dirty="0"/>
+          </a:p>
+        </p:txBody>
+      </p:sp>
+    </p:spTree>
+    <p:extLst>
+      <p:ext uri="{BB962C8B-B14F-4D97-AF65-F5344CB8AC3E}">
+        <p14:creationId xmlns:p14="http://schemas.microsoft.com/office/powerpoint/2010/main" val="538114792"/>
+      </p:ext>
+    </p:extLst>
+  </p:cSld>
+  <p:clrMapOvr>
+    <a:masterClrMapping/>
+  </p:clrMapOvr>
+</p:sld>
+</file>
+
+<file path=ppt/slides/slide6.xml><?xml version="1.0" encoding="utf-8"?>
 <p:sld xmlns:a="http://schemas.openxmlformats.org/drawingml/2006/main" xmlns:r="http://schemas.openxmlformats.org/officeDocument/2006/relationships" xmlns:p="http://schemas.openxmlformats.org/presentationml/2006/main">
   <p:cSld>
     <p:spTree>
@@ -7305,7 +8496,7 @@
 </p:sld>
 </file>
 
-<file path=ppt/slides/slide3.xml><?xml version="1.0" encoding="utf-8"?>
+<file path=ppt/slides/slide7.xml><?xml version="1.0" encoding="utf-8"?>
 <p:sld xmlns:a="http://schemas.openxmlformats.org/drawingml/2006/main" xmlns:r="http://schemas.openxmlformats.org/officeDocument/2006/relationships" xmlns:p="http://schemas.openxmlformats.org/presentationml/2006/main">
   <p:cSld>
     <p:spTree>
@@ -7339,7 +8530,7 @@
           <a:p>
             <a:r>
               <a:rPr lang="en-US" dirty="0" smtClean="0"/>
-              <a:t>Demo</a:t>
+              <a:t>Refactoring Database</a:t>
             </a:r>
             <a:endParaRPr lang="en-US" dirty="0"/>
           </a:p>
@@ -7359,6 +8550,39 @@
         <p:txBody>
           <a:bodyPr/>
           <a:lstStyle/>
+          <a:p>
+            <a:r>
+              <a:rPr lang="en-US" dirty="0" smtClean="0"/>
+              <a:t>Expand</a:t>
+            </a:r>
+          </a:p>
+          <a:p>
+            <a:r>
+              <a:rPr lang="en-US" dirty="0" smtClean="0"/>
+              <a:t>Convert/copy data and add triggers</a:t>
+            </a:r>
+          </a:p>
+          <a:p>
+            <a:r>
+              <a:rPr lang="en-US" dirty="0" smtClean="0"/>
+              <a:t>Migrate</a:t>
+            </a:r>
+          </a:p>
+          <a:p>
+            <a:r>
+              <a:rPr lang="en-US" dirty="0" smtClean="0"/>
+              <a:t>Remove triggers</a:t>
+            </a:r>
+          </a:p>
+          <a:p>
+            <a:r>
+              <a:rPr lang="en-US" dirty="0" smtClean="0"/>
+              <a:t>Contract</a:t>
+            </a:r>
+          </a:p>
+          <a:p>
+            <a:endParaRPr lang="en-US" dirty="0"/>
+          </a:p>
           <a:p>
             <a:endParaRPr lang="en-US" dirty="0"/>
           </a:p>
@@ -7367,7 +8591,7 @@
     </p:spTree>
     <p:extLst>
       <p:ext uri="{BB962C8B-B14F-4D97-AF65-F5344CB8AC3E}">
-        <p14:creationId xmlns:p14="http://schemas.microsoft.com/office/powerpoint/2010/main" val="609649797"/>
+        <p14:creationId xmlns:p14="http://schemas.microsoft.com/office/powerpoint/2010/main" val="728331893"/>
       </p:ext>
     </p:extLst>
   </p:cSld>
@@ -7384,7 +8608,7 @@
 </p:sld>
 </file>
 
-<file path=ppt/slides/slide4.xml><?xml version="1.0" encoding="utf-8"?>
+<file path=ppt/slides/slide8.xml><?xml version="1.0" encoding="utf-8"?>
 <p:sld xmlns:a="http://schemas.openxmlformats.org/drawingml/2006/main" xmlns:r="http://schemas.openxmlformats.org/officeDocument/2006/relationships" xmlns:p="http://schemas.openxmlformats.org/presentationml/2006/main">
   <p:cSld>
     <p:spTree>
@@ -7418,7 +8642,7 @@
           <a:p>
             <a:r>
               <a:rPr lang="en-US" dirty="0" smtClean="0"/>
-              <a:t>Lessons Learned</a:t>
+              <a:t>Expand</a:t>
             </a:r>
             <a:endParaRPr lang="en-US" dirty="0"/>
           </a:p>
@@ -7440,39 +8664,33 @@
           <a:lstStyle/>
           <a:p>
             <a:r>
-              <a:rPr lang="en-US" dirty="0"/>
-              <a:t>SET </a:t>
-            </a:r>
-            <a:r>
               <a:rPr lang="en-US" dirty="0" smtClean="0"/>
-              <a:t>RECURSIVE_TRIGGERS OFF/ON</a:t>
+              <a:t>Add tables</a:t>
             </a:r>
           </a:p>
           <a:p>
             <a:r>
               <a:rPr lang="en-US" dirty="0" smtClean="0"/>
-              <a:t>Triggers execute even if table contents doesn’t change</a:t>
+              <a:t>Add columns</a:t>
             </a:r>
           </a:p>
           <a:p>
             <a:r>
               <a:rPr lang="en-US" dirty="0" smtClean="0"/>
-              <a:t>Testing is painful, especially setup, so…</a:t>
+              <a:t>Add DEFAULT constraints</a:t>
             </a:r>
           </a:p>
           <a:p>
             <a:r>
               <a:rPr lang="en-US" dirty="0" smtClean="0"/>
-              <a:t>Have a test script</a:t>
+              <a:t>Remove UNIQUE, FOREIGN KEY, PRIMARY KEY constraints</a:t>
             </a:r>
           </a:p>
           <a:p>
             <a:r>
               <a:rPr lang="en-US" dirty="0" smtClean="0"/>
-              <a:t>Use version control</a:t>
-            </a:r>
-          </a:p>
-          <a:p>
+              <a:t>Remove CHECK constraints</a:t>
+            </a:r>
             <a:endParaRPr lang="en-US" dirty="0"/>
           </a:p>
         </p:txBody>
@@ -7480,7 +8698,7 @@
     </p:spTree>
     <p:extLst>
       <p:ext uri="{BB962C8B-B14F-4D97-AF65-F5344CB8AC3E}">
-        <p14:creationId xmlns:p14="http://schemas.microsoft.com/office/powerpoint/2010/main" val="3523844589"/>
+        <p14:creationId xmlns:p14="http://schemas.microsoft.com/office/powerpoint/2010/main" val="3375899932"/>
       </p:ext>
     </p:extLst>
   </p:cSld>
@@ -7497,7 +8715,7 @@
 </p:sld>
 </file>
 
-<file path=ppt/slides/slide5.xml><?xml version="1.0" encoding="utf-8"?>
+<file path=ppt/slides/slide9.xml><?xml version="1.0" encoding="utf-8"?>
 <p:sld xmlns:a="http://schemas.openxmlformats.org/drawingml/2006/main" xmlns:r="http://schemas.openxmlformats.org/officeDocument/2006/relationships" xmlns:p="http://schemas.openxmlformats.org/presentationml/2006/main">
   <p:cSld>
     <p:spTree>
@@ -7531,7 +8749,7 @@
           <a:p>
             <a:r>
               <a:rPr lang="en-US" dirty="0" smtClean="0"/>
-              <a:t>References</a:t>
+              <a:t>Migrate</a:t>
             </a:r>
             <a:endParaRPr lang="en-US" dirty="0"/>
           </a:p>
@@ -7549,56 +8767,24 @@
         </p:nvSpPr>
         <p:spPr/>
         <p:txBody>
-          <a:bodyPr>
-            <a:normAutofit/>
-          </a:bodyPr>
+          <a:bodyPr/>
           <a:lstStyle/>
           <a:p>
             <a:r>
               <a:rPr lang="en-US" dirty="0" smtClean="0"/>
-              <a:t>Evolutionary </a:t>
-            </a:r>
-            <a:r>
-              <a:rPr lang="en-US" dirty="0"/>
-              <a:t>Database Design: </a:t>
-            </a:r>
-            <a:r>
-              <a:rPr lang="en-US" dirty="0">
-                <a:hlinkClick r:id="rId3"/>
-              </a:rPr>
-              <a:t>http://</a:t>
-            </a:r>
-            <a:r>
-              <a:rPr lang="en-US" dirty="0" smtClean="0">
-                <a:hlinkClick r:id="rId3"/>
-              </a:rPr>
-              <a:t>martinfowler.com/articles/evodb.html</a:t>
-            </a:r>
+              <a:t>Change stored procedures and functions to use new version</a:t>
+            </a:r>
+          </a:p>
+          <a:p>
             <a:r>
               <a:rPr lang="en-US" dirty="0" smtClean="0"/>
-              <a:t> </a:t>
-            </a:r>
-          </a:p>
-          <a:p>
-            <a:endParaRPr lang="en-US" dirty="0" smtClean="0"/>
-          </a:p>
-          <a:p>
-            <a:r>
-              <a:rPr lang="en-US" dirty="0" smtClean="0"/>
-              <a:t>Refactoring </a:t>
-            </a:r>
-            <a:r>
-              <a:rPr lang="en-US" dirty="0"/>
-              <a:t>Databases book</a:t>
+              <a:t>Developers change code to use new version</a:t>
             </a:r>
           </a:p>
           <a:p>
             <a:pPr marL="0" indent="0">
               <a:buNone/>
             </a:pPr>
-            <a:endParaRPr lang="en-US" dirty="0"/>
-          </a:p>
-          <a:p>
             <a:endParaRPr lang="en-US" dirty="0"/>
           </a:p>
         </p:txBody>
@@ -7606,95 +8792,7 @@
     </p:spTree>
     <p:extLst>
       <p:ext uri="{BB962C8B-B14F-4D97-AF65-F5344CB8AC3E}">
-        <p14:creationId xmlns:p14="http://schemas.microsoft.com/office/powerpoint/2010/main" val="2258765297"/>
-      </p:ext>
-    </p:extLst>
-  </p:cSld>
-  <p:clrMapOvr>
-    <a:masterClrMapping/>
-  </p:clrMapOvr>
-  <p:timing>
-    <p:tnLst>
-      <p:par>
-        <p:cTn id="1" dur="indefinite" restart="never" nodeType="tmRoot"/>
-      </p:par>
-    </p:tnLst>
-  </p:timing>
-</p:sld>
-</file>
-
-<file path=ppt/slides/slide6.xml><?xml version="1.0" encoding="utf-8"?>
-<p:sld xmlns:a="http://schemas.openxmlformats.org/drawingml/2006/main" xmlns:r="http://schemas.openxmlformats.org/officeDocument/2006/relationships" xmlns:p="http://schemas.openxmlformats.org/presentationml/2006/main">
-  <p:cSld>
-    <p:spTree>
-      <p:nvGrpSpPr>
-        <p:cNvPr id="1" name=""/>
-        <p:cNvGrpSpPr/>
-        <p:nvPr/>
-      </p:nvGrpSpPr>
-      <p:grpSpPr>
-        <a:xfrm>
-          <a:off x="0" y="0"/>
-          <a:ext cx="0" cy="0"/>
-          <a:chOff x="0" y="0"/>
-          <a:chExt cx="0" cy="0"/>
-        </a:xfrm>
-      </p:grpSpPr>
-      <p:sp>
-        <p:nvSpPr>
-          <p:cNvPr id="2" name="Title 1"/>
-          <p:cNvSpPr>
-            <a:spLocks noGrp="1"/>
-          </p:cNvSpPr>
-          <p:nvPr>
-            <p:ph type="title"/>
-          </p:nvPr>
-        </p:nvSpPr>
-        <p:spPr/>
-        <p:txBody>
-          <a:bodyPr/>
-          <a:lstStyle/>
-          <a:p>
-            <a:r>
-              <a:rPr lang="en-US" dirty="0" smtClean="0"/>
-              <a:t>Questions?</a:t>
-            </a:r>
-            <a:endParaRPr lang="en-US" dirty="0"/>
-          </a:p>
-        </p:txBody>
-      </p:sp>
-      <p:sp>
-        <p:nvSpPr>
-          <p:cNvPr id="3" name="Content Placeholder 2"/>
-          <p:cNvSpPr>
-            <a:spLocks noGrp="1"/>
-          </p:cNvSpPr>
-          <p:nvPr>
-            <p:ph idx="1"/>
-          </p:nvPr>
-        </p:nvSpPr>
-        <p:spPr/>
-        <p:txBody>
-          <a:bodyPr/>
-          <a:lstStyle/>
-          <a:p>
-            <a:pPr marL="0" indent="0">
-              <a:buNone/>
-            </a:pPr>
-            <a:endParaRPr lang="en-US" dirty="0"/>
-          </a:p>
-          <a:p>
-            <a:pPr marL="0" indent="0">
-              <a:buNone/>
-            </a:pPr>
-            <a:endParaRPr lang="en-US" dirty="0"/>
-          </a:p>
-        </p:txBody>
-      </p:sp>
-    </p:spTree>
-    <p:extLst>
-      <p:ext uri="{BB962C8B-B14F-4D97-AF65-F5344CB8AC3E}">
-        <p14:creationId xmlns:p14="http://schemas.microsoft.com/office/powerpoint/2010/main" val="3067436373"/>
+        <p14:creationId xmlns:p14="http://schemas.microsoft.com/office/powerpoint/2010/main" val="1267879671"/>
       </p:ext>
     </p:extLst>
   </p:cSld>

</xml_diff>

<commit_message>
Begin working on tests for split-table
</commit_message>
<xml_diff>
--- a/Triggers & Refactoring.pptx
+++ b/Triggers & Refactoring.pptx
@@ -5,7 +5,7 @@
     <p:sldMasterId id="2147483648" r:id="rId1"/>
   </p:sldMasterIdLst>
   <p:notesMasterIdLst>
-    <p:notesMasterId r:id="rId17"/>
+    <p:notesMasterId r:id="rId18"/>
   </p:notesMasterIdLst>
   <p:sldIdLst>
     <p:sldId id="269" r:id="rId2"/>
@@ -14,15 +14,16 @@
     <p:sldId id="278" r:id="rId5"/>
     <p:sldId id="279" r:id="rId6"/>
     <p:sldId id="268" r:id="rId7"/>
-    <p:sldId id="272" r:id="rId8"/>
-    <p:sldId id="273" r:id="rId9"/>
-    <p:sldId id="274" r:id="rId10"/>
-    <p:sldId id="275" r:id="rId11"/>
-    <p:sldId id="271" r:id="rId12"/>
-    <p:sldId id="260" r:id="rId13"/>
-    <p:sldId id="261" r:id="rId14"/>
-    <p:sldId id="276" r:id="rId15"/>
-    <p:sldId id="263" r:id="rId16"/>
+    <p:sldId id="281" r:id="rId8"/>
+    <p:sldId id="272" r:id="rId9"/>
+    <p:sldId id="273" r:id="rId10"/>
+    <p:sldId id="274" r:id="rId11"/>
+    <p:sldId id="275" r:id="rId12"/>
+    <p:sldId id="271" r:id="rId13"/>
+    <p:sldId id="260" r:id="rId14"/>
+    <p:sldId id="261" r:id="rId15"/>
+    <p:sldId id="276" r:id="rId16"/>
+    <p:sldId id="263" r:id="rId17"/>
   </p:sldIdLst>
   <p:sldSz cx="12192000" cy="6858000"/>
   <p:notesSz cx="6858000" cy="9144000"/>
@@ -214,7 +215,7 @@
           <a:p>
             <a:fld id="{64842430-D212-4A2D-9268-FB7D9B780FC0}" type="datetimeFigureOut">
               <a:rPr lang="en-US" smtClean="0"/>
-              <a:t>4/22/2016</a:t>
+              <a:t>4/29/2016</a:t>
             </a:fld>
             <a:endParaRPr lang="en-US"/>
           </a:p>
@@ -984,7 +985,7 @@
           <a:p>
             <a:fld id="{76E59958-3B60-4691-AE17-C513178CB0BF}" type="slidenum">
               <a:rPr lang="en-US" smtClean="0"/>
-              <a:t>12</a:t>
+              <a:t>13</a:t>
             </a:fld>
             <a:endParaRPr lang="en-US"/>
           </a:p>
@@ -1325,7 +1326,7 @@
           <a:p>
             <a:fld id="{76E59958-3B60-4691-AE17-C513178CB0BF}" type="slidenum">
               <a:rPr lang="en-US" smtClean="0"/>
-              <a:t>13</a:t>
+              <a:t>14</a:t>
             </a:fld>
             <a:endParaRPr lang="en-US"/>
           </a:p>
@@ -1409,7 +1410,7 @@
           <a:p>
             <a:fld id="{76E59958-3B60-4691-AE17-C513178CB0BF}" type="slidenum">
               <a:rPr lang="en-US" smtClean="0"/>
-              <a:t>15</a:t>
+              <a:t>16</a:t>
             </a:fld>
             <a:endParaRPr lang="en-US"/>
           </a:p>
@@ -1624,7 +1625,7 @@
           <a:p>
             <a:fld id="{ECD19FB2-3AAB-4D03-B13A-2960828C78E3}" type="datetimeFigureOut">
               <a:rPr lang="en-US" dirty="0"/>
-              <a:t>4/22/2016</a:t>
+              <a:t>4/29/2016</a:t>
             </a:fld>
             <a:endParaRPr lang="en-US" dirty="0"/>
           </a:p>
@@ -1901,7 +1902,7 @@
           <a:p>
             <a:fld id="{1B80C674-7DFC-42FE-B9CD-82963CDB1557}" type="datetimeFigureOut">
               <a:rPr lang="en-US" dirty="0"/>
-              <a:t>4/22/2016</a:t>
+              <a:t>4/29/2016</a:t>
             </a:fld>
             <a:endParaRPr lang="en-US" dirty="0"/>
           </a:p>
@@ -2088,7 +2089,7 @@
           <a:p>
             <a:fld id="{2076456F-F47D-4F25-8053-2A695DA0CA7D}" type="datetimeFigureOut">
               <a:rPr lang="en-US" dirty="0"/>
-              <a:t>4/22/2016</a:t>
+              <a:t>4/29/2016</a:t>
             </a:fld>
             <a:endParaRPr lang="en-US" dirty="0"/>
           </a:p>
@@ -2344,7 +2345,7 @@
           <a:p>
             <a:fld id="{5D6C7379-69CC-4837-9905-BEBA22830C8A}" type="datetimeFigureOut">
               <a:rPr lang="en-US" dirty="0"/>
-              <a:t>4/22/2016</a:t>
+              <a:t>4/29/2016</a:t>
             </a:fld>
             <a:endParaRPr lang="en-US" dirty="0"/>
           </a:p>
@@ -2765,7 +2766,7 @@
           <a:p>
             <a:fld id="{49EB8B7E-8AEE-4F10-BFEE-C999AD004D36}" type="datetimeFigureOut">
               <a:rPr lang="en-US" dirty="0"/>
-              <a:t>4/22/2016</a:t>
+              <a:t>4/29/2016</a:t>
             </a:fld>
             <a:endParaRPr lang="en-US" dirty="0"/>
           </a:p>
@@ -3306,7 +3307,7 @@
           <a:p>
             <a:fld id="{8668F3F9-58BC-440B-B37B-805B9055EF92}" type="datetimeFigureOut">
               <a:rPr lang="en-US" dirty="0"/>
-              <a:t>4/22/2016</a:t>
+              <a:t>4/29/2016</a:t>
             </a:fld>
             <a:endParaRPr lang="en-US" dirty="0"/>
           </a:p>
@@ -4132,7 +4133,7 @@
           <a:p>
             <a:fld id="{0D5A53AF-48EA-489D-8260-9DCAB666386A}" type="datetimeFigureOut">
               <a:rPr lang="en-US" dirty="0"/>
-              <a:t>4/22/2016</a:t>
+              <a:t>4/29/2016</a:t>
             </a:fld>
             <a:endParaRPr lang="en-US" dirty="0"/>
           </a:p>
@@ -4297,7 +4298,7 @@
           <a:p>
             <a:fld id="{0DED02AE-B9A4-47BD-AF8E-97E16144138B}" type="datetimeFigureOut">
               <a:rPr lang="en-US" dirty="0"/>
-              <a:t>4/22/2016</a:t>
+              <a:t>4/29/2016</a:t>
             </a:fld>
             <a:endParaRPr lang="en-US" dirty="0"/>
           </a:p>
@@ -4472,7 +4473,7 @@
           <a:p>
             <a:fld id="{CF0FD78B-DB02-4362-BCDC-98A55456977C}" type="datetimeFigureOut">
               <a:rPr lang="en-US" dirty="0"/>
-              <a:t>4/22/2016</a:t>
+              <a:t>4/29/2016</a:t>
             </a:fld>
             <a:endParaRPr lang="en-US" dirty="0"/>
           </a:p>
@@ -4637,7 +4638,7 @@
           <a:p>
             <a:fld id="{99916976-5D93-46E4-A98A-FAD63E4D0EA8}" type="datetimeFigureOut">
               <a:rPr lang="en-US" dirty="0"/>
-              <a:t>4/22/2016</a:t>
+              <a:t>4/29/2016</a:t>
             </a:fld>
             <a:endParaRPr lang="en-US" dirty="0"/>
           </a:p>
@@ -4889,7 +4890,7 @@
           <a:p>
             <a:fld id="{0F39F4F5-F4D2-4D2A-AB60-88D37ADCB869}" type="datetimeFigureOut">
               <a:rPr lang="en-US" dirty="0"/>
-              <a:t>4/22/2016</a:t>
+              <a:t>4/29/2016</a:t>
             </a:fld>
             <a:endParaRPr lang="en-US" dirty="0"/>
           </a:p>
@@ -5116,7 +5117,7 @@
           <a:p>
             <a:fld id="{D23BC6CE-6D1E-47E5-8859-F31AC5380EB2}" type="datetimeFigureOut">
               <a:rPr lang="en-US" dirty="0"/>
-              <a:t>4/22/2016</a:t>
+              <a:t>4/29/2016</a:t>
             </a:fld>
             <a:endParaRPr lang="en-US" dirty="0"/>
           </a:p>
@@ -5504,7 +5505,7 @@
           <a:p>
             <a:fld id="{B1B4E7C4-4DA4-404D-9965-B13F2DD7D8BF}" type="datetimeFigureOut">
               <a:rPr lang="en-US" dirty="0"/>
-              <a:t>4/22/2016</a:t>
+              <a:t>4/29/2016</a:t>
             </a:fld>
             <a:endParaRPr lang="en-US" dirty="0"/>
           </a:p>
@@ -5617,7 +5618,7 @@
           <a:p>
             <a:fld id="{476FB7AA-4A53-424F-AD41-70827B6504BA}" type="datetimeFigureOut">
               <a:rPr lang="en-US" dirty="0"/>
-              <a:t>4/22/2016</a:t>
+              <a:t>4/29/2016</a:t>
             </a:fld>
             <a:endParaRPr lang="en-US" dirty="0"/>
           </a:p>
@@ -5707,7 +5708,7 @@
           <a:p>
             <a:fld id="{E7884882-FB12-4BC8-9960-9AD8104D7FAE}" type="datetimeFigureOut">
               <a:rPr lang="en-US" dirty="0"/>
-              <a:t>4/22/2016</a:t>
+              <a:t>4/29/2016</a:t>
             </a:fld>
             <a:endParaRPr lang="en-US" dirty="0"/>
           </a:p>
@@ -5975,7 +5976,7 @@
           <a:p>
             <a:fld id="{F7D1BD23-6E54-4D9D-AD88-A2813C73CC25}" type="datetimeFigureOut">
               <a:rPr lang="en-US" dirty="0"/>
-              <a:t>4/22/2016</a:t>
+              <a:t>4/29/2016</a:t>
             </a:fld>
             <a:endParaRPr lang="en-US" dirty="0"/>
           </a:p>
@@ -6251,7 +6252,7 @@
           <a:p>
             <a:fld id="{1471A834-4F3C-4AF9-9C74-05EC35A0F292}" type="datetimeFigureOut">
               <a:rPr lang="en-US" dirty="0"/>
-              <a:t>4/22/2016</a:t>
+              <a:t>4/29/2016</a:t>
             </a:fld>
             <a:endParaRPr lang="en-US" dirty="0"/>
           </a:p>
@@ -6486,7 +6487,7 @@
           <a:p>
             <a:fld id="{51CF1133-3259-4C45-BABA-5B62D9C6F78D}" type="datetimeFigureOut">
               <a:rPr lang="en-US" dirty="0"/>
-              <a:t>4/22/2016</a:t>
+              <a:t>4/29/2016</a:t>
             </a:fld>
             <a:endParaRPr lang="en-US" dirty="0"/>
           </a:p>
@@ -7167,7 +7168,7 @@
           <a:p>
             <a:r>
               <a:rPr lang="en-US" dirty="0" smtClean="0"/>
-              <a:t>Contract</a:t>
+              <a:t>Migrate</a:t>
             </a:r>
             <a:endParaRPr lang="en-US" dirty="0"/>
           </a:p>
@@ -7190,36 +7191,30 @@
           <a:p>
             <a:r>
               <a:rPr lang="en-US" dirty="0" smtClean="0"/>
-              <a:t>Remove tables</a:t>
-            </a:r>
-          </a:p>
-          <a:p>
+              <a:t>Change stored procedures and functions to use new </a:t>
+            </a:r>
             <a:r>
               <a:rPr lang="en-US" dirty="0" smtClean="0"/>
-              <a:t>Remove columns</a:t>
+              <a:t>version</a:t>
             </a:r>
           </a:p>
           <a:p>
             <a:r>
               <a:rPr lang="en-US" dirty="0" smtClean="0"/>
-              <a:t>Remove </a:t>
-            </a:r>
+              <a:t>Change other database dependencies</a:t>
+            </a:r>
+            <a:endParaRPr lang="en-US" dirty="0" smtClean="0"/>
+          </a:p>
+          <a:p>
             <a:r>
               <a:rPr lang="en-US" dirty="0" smtClean="0"/>
-              <a:t>DEFAULT constraints</a:t>
-            </a:r>
-          </a:p>
-          <a:p>
-            <a:r>
-              <a:rPr lang="en-US" dirty="0" smtClean="0"/>
-              <a:t>Add UNIQUE, FOREIGN KEY, PRIMARY KEY constraints</a:t>
-            </a:r>
-          </a:p>
-          <a:p>
-            <a:r>
-              <a:rPr lang="en-US" dirty="0" smtClean="0"/>
-              <a:t>Add CHECK constraints</a:t>
-            </a:r>
+              <a:t>Developers change code to use new version</a:t>
+            </a:r>
+          </a:p>
+          <a:p>
+            <a:pPr marL="0" indent="0">
+              <a:buNone/>
+            </a:pPr>
             <a:endParaRPr lang="en-US" dirty="0"/>
           </a:p>
         </p:txBody>
@@ -7227,7 +7222,7 @@
     </p:spTree>
     <p:extLst>
       <p:ext uri="{BB962C8B-B14F-4D97-AF65-F5344CB8AC3E}">
-        <p14:creationId xmlns:p14="http://schemas.microsoft.com/office/powerpoint/2010/main" val="1981384698"/>
+        <p14:creationId xmlns:p14="http://schemas.microsoft.com/office/powerpoint/2010/main" val="1267879671"/>
       </p:ext>
     </p:extLst>
   </p:cSld>
@@ -7278,7 +7273,7 @@
           <a:p>
             <a:r>
               <a:rPr lang="en-US" dirty="0" smtClean="0"/>
-              <a:t>Triggers: what and why</a:t>
+              <a:t>Contract</a:t>
             </a:r>
             <a:endParaRPr lang="en-US" dirty="0"/>
           </a:p>
@@ -7301,31 +7296,32 @@
           <a:p>
             <a:r>
               <a:rPr lang="en-US" dirty="0" smtClean="0"/>
-              <a:t>Triggers are stored procedures that run after or instead of DML or DDL.</a:t>
+              <a:t>Remove tables</a:t>
             </a:r>
           </a:p>
           <a:p>
             <a:r>
               <a:rPr lang="en-US" dirty="0" smtClean="0"/>
-              <a:t>Why? Refactoring databases, updatable views</a:t>
-            </a:r>
-            <a:r>
-              <a:rPr lang="en-US" dirty="0"/>
-              <a:t>.</a:t>
-            </a:r>
-            <a:endParaRPr lang="en-US" dirty="0" smtClean="0"/>
-          </a:p>
-          <a:p>
-            <a:r>
-              <a:rPr lang="en-US" dirty="0"/>
-              <a:t>Why not? Hidden performance problems</a:t>
-            </a:r>
-            <a:endParaRPr lang="en-US" dirty="0" smtClean="0"/>
-          </a:p>
-          <a:p>
-            <a:pPr marL="0" indent="0">
-              <a:buNone/>
-            </a:pPr>
+              <a:t>Remove columns</a:t>
+            </a:r>
+          </a:p>
+          <a:p>
+            <a:r>
+              <a:rPr lang="en-US" dirty="0" smtClean="0"/>
+              <a:t>Remove DEFAULT constraints</a:t>
+            </a:r>
+          </a:p>
+          <a:p>
+            <a:r>
+              <a:rPr lang="en-US" dirty="0" smtClean="0"/>
+              <a:t>Add UNIQUE, FOREIGN KEY, PRIMARY KEY constraints</a:t>
+            </a:r>
+          </a:p>
+          <a:p>
+            <a:r>
+              <a:rPr lang="en-US" dirty="0" smtClean="0"/>
+              <a:t>Add CHECK constraints</a:t>
+            </a:r>
             <a:endParaRPr lang="en-US" dirty="0"/>
           </a:p>
         </p:txBody>
@@ -7333,7 +7329,7 @@
     </p:spTree>
     <p:extLst>
       <p:ext uri="{BB962C8B-B14F-4D97-AF65-F5344CB8AC3E}">
-        <p14:creationId xmlns:p14="http://schemas.microsoft.com/office/powerpoint/2010/main" val="4239816334"/>
+        <p14:creationId xmlns:p14="http://schemas.microsoft.com/office/powerpoint/2010/main" val="1981384698"/>
       </p:ext>
     </p:extLst>
   </p:cSld>
@@ -7384,7 +7380,7 @@
           <a:p>
             <a:r>
               <a:rPr lang="en-US" dirty="0" smtClean="0"/>
-              <a:t>Demo</a:t>
+              <a:t>Triggers: what and why</a:t>
             </a:r>
             <a:endParaRPr lang="en-US" dirty="0"/>
           </a:p>
@@ -7405,6 +7401,33 @@
           <a:bodyPr/>
           <a:lstStyle/>
           <a:p>
+            <a:r>
+              <a:rPr lang="en-US" dirty="0" smtClean="0"/>
+              <a:t>Triggers are stored procedures that run after or instead of DML or DDL.</a:t>
+            </a:r>
+          </a:p>
+          <a:p>
+            <a:r>
+              <a:rPr lang="en-US" dirty="0" smtClean="0"/>
+              <a:t>Why? Refactoring databases, updatable views</a:t>
+            </a:r>
+            <a:r>
+              <a:rPr lang="en-US" dirty="0"/>
+              <a:t>.</a:t>
+            </a:r>
+            <a:endParaRPr lang="en-US" dirty="0" smtClean="0"/>
+          </a:p>
+          <a:p>
+            <a:r>
+              <a:rPr lang="en-US" dirty="0"/>
+              <a:t>Why not? Hidden performance problems</a:t>
+            </a:r>
+            <a:endParaRPr lang="en-US" dirty="0" smtClean="0"/>
+          </a:p>
+          <a:p>
+            <a:pPr marL="0" indent="0">
+              <a:buNone/>
+            </a:pPr>
             <a:endParaRPr lang="en-US" dirty="0"/>
           </a:p>
         </p:txBody>
@@ -7412,7 +7435,7 @@
     </p:spTree>
     <p:extLst>
       <p:ext uri="{BB962C8B-B14F-4D97-AF65-F5344CB8AC3E}">
-        <p14:creationId xmlns:p14="http://schemas.microsoft.com/office/powerpoint/2010/main" val="609649797"/>
+        <p14:creationId xmlns:p14="http://schemas.microsoft.com/office/powerpoint/2010/main" val="4239816334"/>
       </p:ext>
     </p:extLst>
   </p:cSld>
@@ -7463,7 +7486,7 @@
           <a:p>
             <a:r>
               <a:rPr lang="en-US" dirty="0" smtClean="0"/>
-              <a:t>Lessons Learned</a:t>
+              <a:t>Demo</a:t>
             </a:r>
             <a:endParaRPr lang="en-US" dirty="0"/>
           </a:p>
@@ -7483,40 +7506,6 @@
         <p:txBody>
           <a:bodyPr/>
           <a:lstStyle/>
-          <a:p>
-            <a:r>
-              <a:rPr lang="en-US" dirty="0"/>
-              <a:t>SET </a:t>
-            </a:r>
-            <a:r>
-              <a:rPr lang="en-US" dirty="0" smtClean="0"/>
-              <a:t>RECURSIVE_TRIGGERS OFF/ON</a:t>
-            </a:r>
-          </a:p>
-          <a:p>
-            <a:r>
-              <a:rPr lang="en-US" dirty="0" smtClean="0"/>
-              <a:t>Triggers execute even if table contents doesn’t change</a:t>
-            </a:r>
-          </a:p>
-          <a:p>
-            <a:r>
-              <a:rPr lang="en-US" dirty="0" smtClean="0"/>
-              <a:t>Testing is painful, especially setup, so…</a:t>
-            </a:r>
-          </a:p>
-          <a:p>
-            <a:r>
-              <a:rPr lang="en-US" dirty="0" smtClean="0"/>
-              <a:t>Have a test script</a:t>
-            </a:r>
-          </a:p>
-          <a:p>
-            <a:r>
-              <a:rPr lang="en-US" dirty="0" smtClean="0"/>
-              <a:t>Use version control</a:t>
-            </a:r>
-          </a:p>
           <a:p>
             <a:endParaRPr lang="en-US" dirty="0"/>
           </a:p>
@@ -7525,7 +7514,7 @@
     </p:spTree>
     <p:extLst>
       <p:ext uri="{BB962C8B-B14F-4D97-AF65-F5344CB8AC3E}">
-        <p14:creationId xmlns:p14="http://schemas.microsoft.com/office/powerpoint/2010/main" val="3523844589"/>
+        <p14:creationId xmlns:p14="http://schemas.microsoft.com/office/powerpoint/2010/main" val="609649797"/>
       </p:ext>
     </p:extLst>
   </p:cSld>
@@ -7576,6 +7565,119 @@
           <a:p>
             <a:r>
               <a:rPr lang="en-US" dirty="0" smtClean="0"/>
+              <a:t>Lessons Learned</a:t>
+            </a:r>
+            <a:endParaRPr lang="en-US" dirty="0"/>
+          </a:p>
+        </p:txBody>
+      </p:sp>
+      <p:sp>
+        <p:nvSpPr>
+          <p:cNvPr id="3" name="Content Placeholder 2"/>
+          <p:cNvSpPr>
+            <a:spLocks noGrp="1"/>
+          </p:cNvSpPr>
+          <p:nvPr>
+            <p:ph idx="1"/>
+          </p:nvPr>
+        </p:nvSpPr>
+        <p:spPr/>
+        <p:txBody>
+          <a:bodyPr/>
+          <a:lstStyle/>
+          <a:p>
+            <a:r>
+              <a:rPr lang="en-US" dirty="0"/>
+              <a:t>SET </a:t>
+            </a:r>
+            <a:r>
+              <a:rPr lang="en-US" dirty="0" smtClean="0"/>
+              <a:t>RECURSIVE_TRIGGERS OFF/ON</a:t>
+            </a:r>
+          </a:p>
+          <a:p>
+            <a:r>
+              <a:rPr lang="en-US" dirty="0" smtClean="0"/>
+              <a:t>Triggers execute even if table contents doesn’t change</a:t>
+            </a:r>
+          </a:p>
+          <a:p>
+            <a:r>
+              <a:rPr lang="en-US" dirty="0" smtClean="0"/>
+              <a:t>Testing is painful, especially setup, so…</a:t>
+            </a:r>
+          </a:p>
+          <a:p>
+            <a:r>
+              <a:rPr lang="en-US" dirty="0" smtClean="0"/>
+              <a:t>Have a test script</a:t>
+            </a:r>
+          </a:p>
+          <a:p>
+            <a:r>
+              <a:rPr lang="en-US" dirty="0" smtClean="0"/>
+              <a:t>Use version control</a:t>
+            </a:r>
+          </a:p>
+          <a:p>
+            <a:endParaRPr lang="en-US" dirty="0"/>
+          </a:p>
+        </p:txBody>
+      </p:sp>
+    </p:spTree>
+    <p:extLst>
+      <p:ext uri="{BB962C8B-B14F-4D97-AF65-F5344CB8AC3E}">
+        <p14:creationId xmlns:p14="http://schemas.microsoft.com/office/powerpoint/2010/main" val="3523844589"/>
+      </p:ext>
+    </p:extLst>
+  </p:cSld>
+  <p:clrMapOvr>
+    <a:masterClrMapping/>
+  </p:clrMapOvr>
+  <p:timing>
+    <p:tnLst>
+      <p:par>
+        <p:cTn id="1" dur="indefinite" restart="never" nodeType="tmRoot"/>
+      </p:par>
+    </p:tnLst>
+  </p:timing>
+</p:sld>
+</file>
+
+<file path=ppt/slides/slide15.xml><?xml version="1.0" encoding="utf-8"?>
+<p:sld xmlns:a="http://schemas.openxmlformats.org/drawingml/2006/main" xmlns:r="http://schemas.openxmlformats.org/officeDocument/2006/relationships" xmlns:p="http://schemas.openxmlformats.org/presentationml/2006/main">
+  <p:cSld>
+    <p:spTree>
+      <p:nvGrpSpPr>
+        <p:cNvPr id="1" name=""/>
+        <p:cNvGrpSpPr/>
+        <p:nvPr/>
+      </p:nvGrpSpPr>
+      <p:grpSpPr>
+        <a:xfrm>
+          <a:off x="0" y="0"/>
+          <a:ext cx="0" cy="0"/>
+          <a:chOff x="0" y="0"/>
+          <a:chExt cx="0" cy="0"/>
+        </a:xfrm>
+      </p:grpSpPr>
+      <p:sp>
+        <p:nvSpPr>
+          <p:cNvPr id="2" name="Title 1"/>
+          <p:cNvSpPr>
+            <a:spLocks noGrp="1"/>
+          </p:cNvSpPr>
+          <p:nvPr>
+            <p:ph type="title"/>
+          </p:nvPr>
+        </p:nvSpPr>
+        <p:spPr/>
+        <p:txBody>
+          <a:bodyPr/>
+          <a:lstStyle/>
+          <a:p>
+            <a:r>
+              <a:rPr lang="en-US" dirty="0" smtClean="0"/>
               <a:t>References</a:t>
             </a:r>
             <a:endParaRPr lang="en-US" dirty="0"/>
@@ -7742,7 +7844,7 @@
 </p:sld>
 </file>
 
-<file path=ppt/slides/slide15.xml><?xml version="1.0" encoding="utf-8"?>
+<file path=ppt/slides/slide16.xml><?xml version="1.0" encoding="utf-8"?>
 <p:sld xmlns:a="http://schemas.openxmlformats.org/drawingml/2006/main" xmlns:r="http://schemas.openxmlformats.org/officeDocument/2006/relationships" xmlns:p="http://schemas.openxmlformats.org/presentationml/2006/main">
   <p:cSld>
     <p:spTree>
@@ -7927,7 +8029,7 @@
       </p:sp>
       <p:pic>
         <p:nvPicPr>
-          <p:cNvPr id="4" name="Picture 3"/>
+          <p:cNvPr id="5" name="Picture 4"/>
           <p:cNvPicPr>
             <a:picLocks noChangeAspect="1"/>
           </p:cNvPicPr>
@@ -7947,8 +8049,8 @@
         </p:blipFill>
         <p:spPr>
           <a:xfrm>
-            <a:off x="1354832" y="4049380"/>
-            <a:ext cx="2381582" cy="1790950"/>
+            <a:off x="7477072" y="3739062"/>
+            <a:ext cx="4115661" cy="2747204"/>
           </a:xfrm>
           <a:prstGeom prst="rect">
             <a:avLst/>
@@ -8038,11 +8140,7 @@
           <a:p>
             <a:r>
               <a:rPr lang="en-US" dirty="0" smtClean="0"/>
-              <a:t>Main </a:t>
-            </a:r>
-            <a:r>
-              <a:rPr lang="en-US" dirty="0" smtClean="0"/>
-              <a:t>strategy</a:t>
+              <a:t>Main strategy</a:t>
             </a:r>
           </a:p>
           <a:p>
@@ -8054,11 +8152,7 @@
           <a:p>
             <a:r>
               <a:rPr lang="en-US" dirty="0" smtClean="0"/>
-              <a:t>Demo</a:t>
-            </a:r>
-            <a:r>
-              <a:rPr lang="en-US" dirty="0" smtClean="0"/>
-              <a:t>: using triggers</a:t>
+              <a:t>Demo: using triggers</a:t>
             </a:r>
           </a:p>
           <a:p>
@@ -8149,33 +8243,29 @@
           <a:p>
             <a:r>
               <a:rPr lang="en-US" dirty="0" smtClean="0"/>
+              <a:t>Continuous Delivery: automated delivery / deployment to production</a:t>
+            </a:r>
+          </a:p>
+          <a:p>
+            <a:r>
+              <a:rPr lang="en-US" dirty="0"/>
               <a:t>Agile / Lean Development: frequent small changes to software. Assume unstable requirements.</a:t>
             </a:r>
           </a:p>
           <a:p>
             <a:r>
+              <a:rPr lang="en-US" dirty="0" smtClean="0"/>
+              <a:t>Repeatable </a:t>
+            </a:r>
+            <a:r>
               <a:rPr lang="en-US" dirty="0"/>
-              <a:t>Continuous </a:t>
-            </a:r>
+              <a:t>server builds.</a:t>
+            </a:r>
+          </a:p>
+          <a:p>
             <a:r>
               <a:rPr lang="en-US" dirty="0" smtClean="0"/>
-              <a:t>Delivery: automated delivery / deployment to production</a:t>
-            </a:r>
-          </a:p>
-          <a:p>
-            <a:r>
-              <a:rPr lang="en-US" dirty="0"/>
-              <a:t>Repeatable server builds.</a:t>
-            </a:r>
-          </a:p>
-          <a:p>
-            <a:r>
-              <a:rPr lang="en-US" dirty="0" smtClean="0"/>
-              <a:t>“</a:t>
-            </a:r>
-            <a:r>
-              <a:rPr lang="en-US" dirty="0" smtClean="0"/>
-              <a:t>Infrastructure as code”. Puppet / Chef / </a:t>
+              <a:t>“Infrastructure as code”. Puppet / Chef / </a:t>
             </a:r>
             <a:r>
               <a:rPr lang="en-US" dirty="0" err="1" smtClean="0"/>
@@ -8186,11 +8276,7 @@
           <a:p>
             <a:r>
               <a:rPr lang="en-US" dirty="0" smtClean="0"/>
-              <a:t>Etsy</a:t>
-            </a:r>
-            <a:r>
-              <a:rPr lang="en-US" dirty="0" smtClean="0"/>
-              <a:t>: 50 deployments per day.</a:t>
+              <a:t>Etsy: 50 deployments per day.</a:t>
             </a:r>
             <a:endParaRPr lang="en-US" dirty="0"/>
           </a:p>
@@ -8281,7 +8367,7 @@
           <a:p>
             <a:r>
               <a:rPr lang="en-US" dirty="0" smtClean="0"/>
-              <a:t>Database</a:t>
+              <a:t>Database Dependencies</a:t>
             </a:r>
           </a:p>
           <a:p>
@@ -8340,7 +8426,7 @@
           <a:p>
             <a:r>
               <a:rPr lang="en-US" dirty="0" smtClean="0"/>
-              <a:t>Outside database</a:t>
+              <a:t>Other Dependencies</a:t>
             </a:r>
           </a:p>
           <a:p>
@@ -8354,22 +8440,14 @@
             <a:pPr lvl="1"/>
             <a:r>
               <a:rPr lang="en-US" dirty="0" smtClean="0"/>
-              <a:t>PowerShell </a:t>
-            </a:r>
+              <a:t>PowerShell queries</a:t>
+            </a:r>
+          </a:p>
+          <a:p>
+            <a:pPr lvl="1"/>
             <a:r>
               <a:rPr lang="en-US" dirty="0" smtClean="0"/>
-              <a:t>queries</a:t>
-            </a:r>
-          </a:p>
-          <a:p>
-            <a:pPr lvl="1"/>
-            <a:r>
-              <a:rPr lang="en-US" dirty="0" smtClean="0"/>
-              <a:t>Ad-hoc </a:t>
-            </a:r>
-            <a:r>
-              <a:rPr lang="en-US" dirty="0" smtClean="0"/>
-              <a:t>queries</a:t>
+              <a:t>Ad-hoc queries</a:t>
             </a:r>
           </a:p>
           <a:p>
@@ -8530,7 +8608,15 @@
           <a:p>
             <a:r>
               <a:rPr lang="en-US" dirty="0" smtClean="0"/>
-              <a:t>Refactoring Database</a:t>
+              <a:t>Sample </a:t>
+            </a:r>
+            <a:r>
+              <a:rPr lang="en-US" dirty="0" err="1" smtClean="0"/>
+              <a:t>Refactorings</a:t>
+            </a:r>
+            <a:r>
+              <a:rPr lang="en-US" dirty="0" smtClean="0"/>
+              <a:t> (70 in all)</a:t>
             </a:r>
             <a:endParaRPr lang="en-US" dirty="0"/>
           </a:p>
@@ -8543,45 +8629,128 @@
             <a:spLocks noGrp="1"/>
           </p:cNvSpPr>
           <p:nvPr>
-            <p:ph idx="1"/>
-          </p:nvPr>
-        </p:nvSpPr>
-        <p:spPr/>
-        <p:txBody>
-          <a:bodyPr/>
-          <a:lstStyle/>
-          <a:p>
+            <p:ph sz="half" idx="1"/>
+          </p:nvPr>
+        </p:nvSpPr>
+        <p:spPr/>
+        <p:txBody>
+          <a:bodyPr/>
+          <a:lstStyle/>
+          <a:p>
+            <a:r>
+              <a:rPr lang="en-US" dirty="0"/>
+              <a:t>Add Foreign Key Constraint</a:t>
+            </a:r>
+          </a:p>
+          <a:p>
+            <a:r>
+              <a:rPr lang="en-US" dirty="0"/>
+              <a:t>Add Lookup Table</a:t>
+            </a:r>
+          </a:p>
+          <a:p>
+            <a:r>
+              <a:rPr lang="en-US" dirty="0"/>
+              <a:t>Add Parameter to SP</a:t>
+            </a:r>
+          </a:p>
+          <a:p>
+            <a:r>
+              <a:rPr lang="en-US" dirty="0"/>
+              <a:t>Add Standard Codes</a:t>
+            </a:r>
+          </a:p>
+          <a:p>
+            <a:r>
+              <a:rPr lang="en-US" dirty="0"/>
+              <a:t>Drop Column</a:t>
+            </a:r>
+          </a:p>
+          <a:p>
+            <a:r>
+              <a:rPr lang="en-US" dirty="0"/>
+              <a:t>Drop Default Value</a:t>
+            </a:r>
+          </a:p>
+          <a:p>
+            <a:r>
+              <a:rPr lang="en-US" dirty="0"/>
+              <a:t>Drop </a:t>
+            </a:r>
             <a:r>
               <a:rPr lang="en-US" dirty="0" smtClean="0"/>
-              <a:t>Expand</a:t>
-            </a:r>
+              <a:t>Non-</a:t>
+            </a:r>
+            <a:r>
+              <a:rPr lang="en-US" dirty="0" err="1" smtClean="0"/>
+              <a:t>Nullable</a:t>
+            </a:r>
+            <a:endParaRPr lang="en-US" dirty="0"/>
           </a:p>
           <a:p>
             <a:r>
               <a:rPr lang="en-US" dirty="0" smtClean="0"/>
-              <a:t>Convert/copy data and add triggers</a:t>
-            </a:r>
-          </a:p>
+              <a:t>Introduce Cascading Delete</a:t>
+            </a:r>
+            <a:endParaRPr lang="en-US" dirty="0"/>
+          </a:p>
+        </p:txBody>
+      </p:sp>
+      <p:sp>
+        <p:nvSpPr>
+          <p:cNvPr id="4" name="Content Placeholder 3"/>
+          <p:cNvSpPr>
+            <a:spLocks noGrp="1"/>
+          </p:cNvSpPr>
+          <p:nvPr>
+            <p:ph sz="half" idx="2"/>
+          </p:nvPr>
+        </p:nvSpPr>
+        <p:spPr/>
+        <p:txBody>
+          <a:bodyPr/>
+          <a:lstStyle/>
           <a:p>
             <a:r>
               <a:rPr lang="en-US" dirty="0" smtClean="0"/>
-              <a:t>Migrate</a:t>
+              <a:t>Introduce Column Constraint</a:t>
             </a:r>
           </a:p>
           <a:p>
             <a:r>
               <a:rPr lang="en-US" dirty="0" smtClean="0"/>
-              <a:t>Remove triggers</a:t>
+              <a:t>Introduce Surrogate Key</a:t>
             </a:r>
           </a:p>
           <a:p>
             <a:r>
               <a:rPr lang="en-US" dirty="0" smtClean="0"/>
-              <a:t>Contract</a:t>
-            </a:r>
-          </a:p>
-          <a:p>
-            <a:endParaRPr lang="en-US" dirty="0"/>
+              <a:t>Move Column</a:t>
+            </a:r>
+          </a:p>
+          <a:p>
+            <a:r>
+              <a:rPr lang="en-US" dirty="0" smtClean="0"/>
+              <a:t>Rename Column</a:t>
+            </a:r>
+          </a:p>
+          <a:p>
+            <a:r>
+              <a:rPr lang="en-US" dirty="0" smtClean="0"/>
+              <a:t>Rename Table</a:t>
+            </a:r>
+          </a:p>
+          <a:p>
+            <a:r>
+              <a:rPr lang="en-US" dirty="0" smtClean="0"/>
+              <a:t>Replace One-to-Many with Associative Table</a:t>
+            </a:r>
+          </a:p>
+          <a:p>
+            <a:r>
+              <a:rPr lang="en-US" dirty="0" smtClean="0"/>
+              <a:t>Split Table</a:t>
+            </a:r>
           </a:p>
           <a:p>
             <a:endParaRPr lang="en-US" dirty="0"/>
@@ -8591,20 +8760,13 @@
     </p:spTree>
     <p:extLst>
       <p:ext uri="{BB962C8B-B14F-4D97-AF65-F5344CB8AC3E}">
-        <p14:creationId xmlns:p14="http://schemas.microsoft.com/office/powerpoint/2010/main" val="728331893"/>
+        <p14:creationId xmlns:p14="http://schemas.microsoft.com/office/powerpoint/2010/main" val="4157999418"/>
       </p:ext>
     </p:extLst>
   </p:cSld>
   <p:clrMapOvr>
     <a:masterClrMapping/>
   </p:clrMapOvr>
-  <p:timing>
-    <p:tnLst>
-      <p:par>
-        <p:cTn id="1" dur="indefinite" restart="never" nodeType="tmRoot"/>
-      </p:par>
-    </p:tnLst>
-  </p:timing>
 </p:sld>
 </file>
 
@@ -8642,55 +8804,60 @@
           <a:p>
             <a:r>
               <a:rPr lang="en-US" dirty="0" smtClean="0"/>
+              <a:t>Refactoring Database</a:t>
+            </a:r>
+            <a:endParaRPr lang="en-US" dirty="0"/>
+          </a:p>
+        </p:txBody>
+      </p:sp>
+      <p:sp>
+        <p:nvSpPr>
+          <p:cNvPr id="3" name="Content Placeholder 2"/>
+          <p:cNvSpPr>
+            <a:spLocks noGrp="1"/>
+          </p:cNvSpPr>
+          <p:nvPr>
+            <p:ph idx="1"/>
+          </p:nvPr>
+        </p:nvSpPr>
+        <p:spPr/>
+        <p:txBody>
+          <a:bodyPr/>
+          <a:lstStyle/>
+          <a:p>
+            <a:r>
+              <a:rPr lang="en-US" dirty="0" smtClean="0"/>
               <a:t>Expand</a:t>
             </a:r>
-            <a:endParaRPr lang="en-US" dirty="0"/>
-          </a:p>
-        </p:txBody>
-      </p:sp>
-      <p:sp>
-        <p:nvSpPr>
-          <p:cNvPr id="3" name="Content Placeholder 2"/>
-          <p:cNvSpPr>
-            <a:spLocks noGrp="1"/>
-          </p:cNvSpPr>
-          <p:nvPr>
-            <p:ph idx="1"/>
-          </p:nvPr>
-        </p:nvSpPr>
-        <p:spPr/>
-        <p:txBody>
-          <a:bodyPr/>
-          <a:lstStyle/>
+          </a:p>
           <a:p>
             <a:r>
               <a:rPr lang="en-US" dirty="0" smtClean="0"/>
-              <a:t>Add tables</a:t>
+              <a:t>Convert/copy data and add triggers</a:t>
             </a:r>
           </a:p>
           <a:p>
             <a:r>
               <a:rPr lang="en-US" dirty="0" smtClean="0"/>
-              <a:t>Add columns</a:t>
+              <a:t>Migrate</a:t>
             </a:r>
           </a:p>
           <a:p>
             <a:r>
               <a:rPr lang="en-US" dirty="0" smtClean="0"/>
-              <a:t>Add DEFAULT constraints</a:t>
+              <a:t>Remove triggers</a:t>
             </a:r>
           </a:p>
           <a:p>
             <a:r>
               <a:rPr lang="en-US" dirty="0" smtClean="0"/>
-              <a:t>Remove UNIQUE, FOREIGN KEY, PRIMARY KEY constraints</a:t>
-            </a:r>
-          </a:p>
-          <a:p>
-            <a:r>
-              <a:rPr lang="en-US" dirty="0" smtClean="0"/>
-              <a:t>Remove CHECK constraints</a:t>
-            </a:r>
+              <a:t>Contract</a:t>
+            </a:r>
+          </a:p>
+          <a:p>
+            <a:endParaRPr lang="en-US" dirty="0"/>
+          </a:p>
+          <a:p>
             <a:endParaRPr lang="en-US" dirty="0"/>
           </a:p>
         </p:txBody>
@@ -8698,7 +8865,7 @@
     </p:spTree>
     <p:extLst>
       <p:ext uri="{BB962C8B-B14F-4D97-AF65-F5344CB8AC3E}">
-        <p14:creationId xmlns:p14="http://schemas.microsoft.com/office/powerpoint/2010/main" val="3375899932"/>
+        <p14:creationId xmlns:p14="http://schemas.microsoft.com/office/powerpoint/2010/main" val="728331893"/>
       </p:ext>
     </p:extLst>
   </p:cSld>
@@ -8749,7 +8916,7 @@
           <a:p>
             <a:r>
               <a:rPr lang="en-US" dirty="0" smtClean="0"/>
-              <a:t>Migrate</a:t>
+              <a:t>Expand</a:t>
             </a:r>
             <a:endParaRPr lang="en-US" dirty="0"/>
           </a:p>
@@ -8772,19 +8939,32 @@
           <a:p>
             <a:r>
               <a:rPr lang="en-US" dirty="0" smtClean="0"/>
-              <a:t>Change stored procedures and functions to use new version</a:t>
+              <a:t>Add tables</a:t>
             </a:r>
           </a:p>
           <a:p>
             <a:r>
               <a:rPr lang="en-US" dirty="0" smtClean="0"/>
-              <a:t>Developers change code to use new version</a:t>
-            </a:r>
-          </a:p>
-          <a:p>
-            <a:pPr marL="0" indent="0">
-              <a:buNone/>
-            </a:pPr>
+              <a:t>Add columns</a:t>
+            </a:r>
+          </a:p>
+          <a:p>
+            <a:r>
+              <a:rPr lang="en-US" dirty="0" smtClean="0"/>
+              <a:t>Add DEFAULT constraints</a:t>
+            </a:r>
+          </a:p>
+          <a:p>
+            <a:r>
+              <a:rPr lang="en-US" dirty="0" smtClean="0"/>
+              <a:t>Remove UNIQUE, FOREIGN KEY, PRIMARY KEY constraints</a:t>
+            </a:r>
+          </a:p>
+          <a:p>
+            <a:r>
+              <a:rPr lang="en-US" dirty="0" smtClean="0"/>
+              <a:t>Remove CHECK constraints</a:t>
+            </a:r>
             <a:endParaRPr lang="en-US" dirty="0"/>
           </a:p>
         </p:txBody>
@@ -8792,7 +8972,7 @@
     </p:spTree>
     <p:extLst>
       <p:ext uri="{BB962C8B-B14F-4D97-AF65-F5344CB8AC3E}">
-        <p14:creationId xmlns:p14="http://schemas.microsoft.com/office/powerpoint/2010/main" val="1267879671"/>
+        <p14:creationId xmlns:p14="http://schemas.microsoft.com/office/powerpoint/2010/main" val="3375899932"/>
       </p:ext>
     </p:extLst>
   </p:cSld>

</xml_diff>

<commit_message>
punctuation fixes to one slide
</commit_message>
<xml_diff>
--- a/Triggers & Refactoring.pptx
+++ b/Triggers & Refactoring.pptx
@@ -215,7 +215,7 @@
           <a:p>
             <a:fld id="{64842430-D212-4A2D-9268-FB7D9B780FC0}" type="datetimeFigureOut">
               <a:rPr lang="en-US" smtClean="0"/>
-              <a:t>4/29/2016</a:t>
+              <a:t>6/14/2016</a:t>
             </a:fld>
             <a:endParaRPr lang="en-US"/>
           </a:p>
@@ -646,8 +646,30 @@
           <a:lstStyle/>
           <a:p>
             <a:r>
+              <a:rPr lang="en-US" dirty="0" smtClean="0"/>
+              <a:t>Infrastructure as code.</a:t>
+            </a:r>
+            <a:r>
               <a:rPr lang="en-US" baseline="0" dirty="0" smtClean="0"/>
-              <a:t>So I looked at this book, Refactoring Databases. I learned from reading it that I was going to have to learn about triggers, You need triggers to keep the old version and the new version of the data in sync. I hadn’t used triggers before, so I created a test database to learn the concepts. </a:t>
+              <a:t> This means that infrastructure definition becomes </a:t>
+            </a:r>
+            <a:r>
+              <a:rPr lang="en-US" dirty="0" smtClean="0"/>
+              <a:t>version controlled, testable, repeatable</a:t>
+            </a:r>
+          </a:p>
+          <a:p>
+            <a:r>
+              <a:rPr lang="en-US" dirty="0" smtClean="0"/>
+              <a:t>Amazon: “thousands” </a:t>
+            </a:r>
+            <a:r>
+              <a:rPr lang="en-US" smtClean="0"/>
+              <a:t>of deployments</a:t>
+            </a:r>
+            <a:r>
+              <a:rPr lang="en-US" baseline="0" smtClean="0"/>
+              <a:t> per day</a:t>
             </a:r>
             <a:endParaRPr lang="en-US" dirty="0"/>
           </a:p>
@@ -670,7 +692,7 @@
           <a:p>
             <a:fld id="{76E59958-3B60-4691-AE17-C513178CB0BF}" type="slidenum">
               <a:rPr lang="en-US" smtClean="0"/>
-              <a:t>6</a:t>
+              <a:t>4</a:t>
             </a:fld>
             <a:endParaRPr lang="en-US"/>
           </a:p>
@@ -679,7 +701,7 @@
     </p:spTree>
     <p:extLst>
       <p:ext uri="{BB962C8B-B14F-4D97-AF65-F5344CB8AC3E}">
-        <p14:creationId xmlns:p14="http://schemas.microsoft.com/office/powerpoint/2010/main" val="4216211782"/>
+        <p14:creationId xmlns:p14="http://schemas.microsoft.com/office/powerpoint/2010/main" val="3582895650"/>
       </p:ext>
     </p:extLst>
   </p:cSld>
@@ -734,237 +756,10 @@
           <a:lstStyle/>
           <a:p>
             <a:r>
-              <a:rPr lang="en-US" dirty="0" smtClean="0"/>
-              <a:t>Run Setup, show OLD table,</a:t>
-            </a:r>
-            <a:r>
               <a:rPr lang="en-US" baseline="0" dirty="0" smtClean="0"/>
-              <a:t> </a:t>
-            </a:r>
-            <a:r>
-              <a:rPr lang="en-US" dirty="0" smtClean="0"/>
-              <a:t>Show</a:t>
-            </a:r>
-            <a:r>
-              <a:rPr lang="en-US" baseline="0" dirty="0" smtClean="0"/>
-              <a:t> goals of refactor, </a:t>
-            </a:r>
-          </a:p>
-          <a:p>
-            <a:r>
-              <a:rPr lang="en-US" sz="1200" kern="1200" baseline="0" dirty="0" smtClean="0">
-                <a:solidFill>
-                  <a:schemeClr val="tx1"/>
-                </a:solidFill>
-                <a:effectLst/>
-                <a:latin typeface="+mn-lt"/>
-                <a:ea typeface="+mn-ea"/>
-                <a:cs typeface="+mn-cs"/>
-              </a:rPr>
-              <a:t>Trigger features</a:t>
-            </a:r>
-            <a:endParaRPr lang="en-US" sz="1200" kern="1200" dirty="0" smtClean="0">
-              <a:solidFill>
-                <a:schemeClr val="tx1"/>
-              </a:solidFill>
-              <a:effectLst/>
-              <a:latin typeface="+mn-lt"/>
-              <a:ea typeface="+mn-ea"/>
-              <a:cs typeface="+mn-cs"/>
-            </a:endParaRPr>
-          </a:p>
-          <a:p>
-            <a:r>
-              <a:rPr lang="en-US" sz="1200" kern="1200" dirty="0" smtClean="0">
-                <a:solidFill>
-                  <a:schemeClr val="tx1"/>
-                </a:solidFill>
-                <a:effectLst/>
-                <a:latin typeface="+mn-lt"/>
-                <a:ea typeface="+mn-ea"/>
-                <a:cs typeface="+mn-cs"/>
-              </a:rPr>
-              <a:t>(Will talk about code at top of trigger later.)</a:t>
-            </a:r>
-          </a:p>
-          <a:p>
-            <a:endParaRPr lang="en-US" sz="1200" kern="1200" dirty="0" smtClean="0">
-              <a:solidFill>
-                <a:schemeClr val="tx1"/>
-              </a:solidFill>
-              <a:effectLst/>
-              <a:latin typeface="+mn-lt"/>
-              <a:ea typeface="+mn-ea"/>
-              <a:cs typeface="+mn-cs"/>
-            </a:endParaRPr>
-          </a:p>
-          <a:p>
-            <a:r>
-              <a:rPr lang="en-US" sz="1200" kern="1200" dirty="0" smtClean="0">
-                <a:solidFill>
-                  <a:schemeClr val="tx1"/>
-                </a:solidFill>
-                <a:effectLst/>
-                <a:latin typeface="+mn-lt"/>
-                <a:ea typeface="+mn-ea"/>
-                <a:cs typeface="+mn-cs"/>
-              </a:rPr>
-              <a:t>UPDATE(column),</a:t>
-            </a:r>
-            <a:r>
-              <a:rPr lang="en-US" sz="1200" kern="1200" baseline="0" dirty="0" smtClean="0">
-                <a:solidFill>
-                  <a:schemeClr val="tx1"/>
-                </a:solidFill>
-                <a:effectLst/>
-                <a:latin typeface="+mn-lt"/>
-                <a:ea typeface="+mn-ea"/>
-                <a:cs typeface="+mn-cs"/>
-              </a:rPr>
-              <a:t> inserted pseudo-table, deleted pseudo-table</a:t>
-            </a:r>
-          </a:p>
-          <a:p>
-            <a:endParaRPr lang="en-US" sz="1200" kern="1200" dirty="0" smtClean="0">
-              <a:solidFill>
-                <a:schemeClr val="tx1"/>
-              </a:solidFill>
-              <a:effectLst/>
-              <a:latin typeface="+mn-lt"/>
-              <a:ea typeface="+mn-ea"/>
-              <a:cs typeface="+mn-cs"/>
-            </a:endParaRPr>
-          </a:p>
-          <a:p>
-            <a:r>
-              <a:rPr lang="en-US" sz="1200" kern="1200" dirty="0" smtClean="0">
-                <a:solidFill>
-                  <a:schemeClr val="tx1"/>
-                </a:solidFill>
-                <a:latin typeface="+mn-lt"/>
-                <a:ea typeface="+mn-ea"/>
-                <a:cs typeface="+mn-cs"/>
-              </a:rPr>
-              <a:t>"WHERE </a:t>
-            </a:r>
-            <a:r>
-              <a:rPr lang="en-US" sz="1200" kern="1200" dirty="0" err="1" smtClean="0">
-                <a:solidFill>
-                  <a:schemeClr val="tx1"/>
-                </a:solidFill>
-                <a:latin typeface="+mn-lt"/>
-                <a:ea typeface="+mn-ea"/>
-                <a:cs typeface="+mn-cs"/>
-              </a:rPr>
-              <a:t>Customer.CustomerId</a:t>
-            </a:r>
-            <a:r>
-              <a:rPr lang="en-US" sz="1200" kern="1200" dirty="0" smtClean="0">
-                <a:solidFill>
-                  <a:schemeClr val="tx1"/>
-                </a:solidFill>
-                <a:latin typeface="+mn-lt"/>
-                <a:ea typeface="+mn-ea"/>
-                <a:cs typeface="+mn-cs"/>
-              </a:rPr>
-              <a:t> = </a:t>
-            </a:r>
-            <a:r>
-              <a:rPr lang="en-US" sz="1200" kern="1200" dirty="0" err="1" smtClean="0">
-                <a:solidFill>
-                  <a:schemeClr val="tx1"/>
-                </a:solidFill>
-                <a:latin typeface="+mn-lt"/>
-                <a:ea typeface="+mn-ea"/>
-                <a:cs typeface="+mn-cs"/>
-              </a:rPr>
-              <a:t>inserted.CustomerId</a:t>
-            </a:r>
-            <a:r>
-              <a:rPr lang="en-US" sz="1200" kern="1200" dirty="0" smtClean="0">
-                <a:solidFill>
-                  <a:schemeClr val="tx1"/>
-                </a:solidFill>
-                <a:latin typeface="+mn-lt"/>
-                <a:ea typeface="+mn-ea"/>
-                <a:cs typeface="+mn-cs"/>
-              </a:rPr>
-              <a:t>" clause to keep from changing every row. </a:t>
-            </a:r>
-          </a:p>
-          <a:p>
-            <a:endParaRPr lang="en-US" sz="1200" kern="1200" dirty="0" smtClean="0">
-              <a:solidFill>
-                <a:schemeClr val="tx1"/>
-              </a:solidFill>
-              <a:latin typeface="+mn-lt"/>
-              <a:ea typeface="+mn-ea"/>
-              <a:cs typeface="+mn-cs"/>
-            </a:endParaRPr>
-          </a:p>
-          <a:p>
-            <a:r>
-              <a:rPr lang="en-US" sz="1200" kern="1200" dirty="0" smtClean="0">
-                <a:solidFill>
-                  <a:schemeClr val="tx1"/>
-                </a:solidFill>
-                <a:latin typeface="+mn-lt"/>
-                <a:ea typeface="+mn-ea"/>
-                <a:cs typeface="+mn-cs"/>
-              </a:rPr>
-              <a:t>LEFT OUTER JOIN needed, so ISNULL(</a:t>
-            </a:r>
-            <a:r>
-              <a:rPr lang="en-US" sz="1200" kern="1200" dirty="0" err="1" smtClean="0">
-                <a:solidFill>
-                  <a:schemeClr val="tx1"/>
-                </a:solidFill>
-                <a:latin typeface="+mn-lt"/>
-                <a:ea typeface="+mn-ea"/>
-                <a:cs typeface="+mn-cs"/>
-              </a:rPr>
-              <a:t>deleted.column</a:t>
-            </a:r>
-            <a:r>
-              <a:rPr lang="en-US" sz="1200" kern="1200" dirty="0" smtClean="0">
-                <a:solidFill>
-                  <a:schemeClr val="tx1"/>
-                </a:solidFill>
-                <a:latin typeface="+mn-lt"/>
-                <a:ea typeface="+mn-ea"/>
-                <a:cs typeface="+mn-cs"/>
-              </a:rPr>
-              <a:t>,...) needed in WHERE clauses.</a:t>
-            </a:r>
-          </a:p>
-          <a:p>
-            <a:endParaRPr lang="en-US" sz="1200" kern="1200" dirty="0" smtClean="0">
-              <a:solidFill>
-                <a:schemeClr val="tx1"/>
-              </a:solidFill>
-              <a:latin typeface="+mn-lt"/>
-              <a:ea typeface="+mn-ea"/>
-              <a:cs typeface="+mn-cs"/>
-            </a:endParaRPr>
-          </a:p>
-          <a:p>
-            <a:r>
-              <a:rPr lang="en-US" sz="1200" kern="1200" dirty="0" smtClean="0">
-                <a:solidFill>
-                  <a:schemeClr val="tx1"/>
-                </a:solidFill>
-                <a:latin typeface="+mn-lt"/>
-                <a:ea typeface="+mn-ea"/>
-                <a:cs typeface="+mn-cs"/>
-              </a:rPr>
-              <a:t>Both needed to handle INSERT situation.</a:t>
-            </a:r>
-          </a:p>
-          <a:p>
-            <a:pPr marL="0" indent="0">
-              <a:buNone/>
-            </a:pPr>
-            <a:endParaRPr lang="en-US" baseline="0" dirty="0" smtClean="0"/>
+              <a:t>So I looked at this book, Refactoring Databases. I learned from reading it that I was going to have to learn about triggers, You need triggers to keep the old version and the new version of the data in sync. I hadn’t used triggers before, so I created a test database to learn the concepts. </a:t>
+            </a:r>
+            <a:endParaRPr lang="en-US" dirty="0"/>
           </a:p>
         </p:txBody>
       </p:sp>
@@ -985,7 +780,7 @@
           <a:p>
             <a:fld id="{76E59958-3B60-4691-AE17-C513178CB0BF}" type="slidenum">
               <a:rPr lang="en-US" smtClean="0"/>
-              <a:t>13</a:t>
+              <a:t>6</a:t>
             </a:fld>
             <a:endParaRPr lang="en-US"/>
           </a:p>
@@ -994,7 +789,7 @@
     </p:spTree>
     <p:extLst>
       <p:ext uri="{BB962C8B-B14F-4D97-AF65-F5344CB8AC3E}">
-        <p14:creationId xmlns:p14="http://schemas.microsoft.com/office/powerpoint/2010/main" val="1832093265"/>
+        <p14:creationId xmlns:p14="http://schemas.microsoft.com/office/powerpoint/2010/main" val="4216211782"/>
       </p:ext>
     </p:extLst>
   </p:cSld>
@@ -1048,6 +843,321 @@
           <a:bodyPr/>
           <a:lstStyle/>
           <a:p>
+            <a:r>
+              <a:rPr lang="en-US" dirty="0" smtClean="0"/>
+              <a:t>Run Setup, show OLD table,</a:t>
+            </a:r>
+            <a:r>
+              <a:rPr lang="en-US" baseline="0" dirty="0" smtClean="0"/>
+              <a:t> </a:t>
+            </a:r>
+            <a:r>
+              <a:rPr lang="en-US" dirty="0" smtClean="0"/>
+              <a:t>Show</a:t>
+            </a:r>
+            <a:r>
+              <a:rPr lang="en-US" baseline="0" dirty="0" smtClean="0"/>
+              <a:t> goals of refactor, </a:t>
+            </a:r>
+          </a:p>
+          <a:p>
+            <a:r>
+              <a:rPr lang="en-US" sz="1200" kern="1200" baseline="0" dirty="0" smtClean="0">
+                <a:solidFill>
+                  <a:schemeClr val="tx1"/>
+                </a:solidFill>
+                <a:effectLst/>
+                <a:latin typeface="+mn-lt"/>
+                <a:ea typeface="+mn-ea"/>
+                <a:cs typeface="+mn-cs"/>
+              </a:rPr>
+              <a:t>Trigger features</a:t>
+            </a:r>
+            <a:endParaRPr lang="en-US" sz="1200" kern="1200" dirty="0" smtClean="0">
+              <a:solidFill>
+                <a:schemeClr val="tx1"/>
+              </a:solidFill>
+              <a:effectLst/>
+              <a:latin typeface="+mn-lt"/>
+              <a:ea typeface="+mn-ea"/>
+              <a:cs typeface="+mn-cs"/>
+            </a:endParaRPr>
+          </a:p>
+          <a:p>
+            <a:r>
+              <a:rPr lang="en-US" sz="1200" kern="1200" dirty="0" smtClean="0">
+                <a:solidFill>
+                  <a:schemeClr val="tx1"/>
+                </a:solidFill>
+                <a:effectLst/>
+                <a:latin typeface="+mn-lt"/>
+                <a:ea typeface="+mn-ea"/>
+                <a:cs typeface="+mn-cs"/>
+              </a:rPr>
+              <a:t>(Will talk about code at top of trigger later.)</a:t>
+            </a:r>
+          </a:p>
+          <a:p>
+            <a:endParaRPr lang="en-US" sz="1200" kern="1200" dirty="0" smtClean="0">
+              <a:solidFill>
+                <a:schemeClr val="tx1"/>
+              </a:solidFill>
+              <a:effectLst/>
+              <a:latin typeface="+mn-lt"/>
+              <a:ea typeface="+mn-ea"/>
+              <a:cs typeface="+mn-cs"/>
+            </a:endParaRPr>
+          </a:p>
+          <a:p>
+            <a:r>
+              <a:rPr lang="en-US" sz="1200" kern="1200" dirty="0" smtClean="0">
+                <a:solidFill>
+                  <a:schemeClr val="tx1"/>
+                </a:solidFill>
+                <a:effectLst/>
+                <a:latin typeface="+mn-lt"/>
+                <a:ea typeface="+mn-ea"/>
+                <a:cs typeface="+mn-cs"/>
+              </a:rPr>
+              <a:t>UPDATE(column),</a:t>
+            </a:r>
+            <a:r>
+              <a:rPr lang="en-US" sz="1200" kern="1200" baseline="0" dirty="0" smtClean="0">
+                <a:solidFill>
+                  <a:schemeClr val="tx1"/>
+                </a:solidFill>
+                <a:effectLst/>
+                <a:latin typeface="+mn-lt"/>
+                <a:ea typeface="+mn-ea"/>
+                <a:cs typeface="+mn-cs"/>
+              </a:rPr>
+              <a:t> inserted pseudo-table, deleted pseudo-table</a:t>
+            </a:r>
+          </a:p>
+          <a:p>
+            <a:endParaRPr lang="en-US" sz="1200" kern="1200" dirty="0" smtClean="0">
+              <a:solidFill>
+                <a:schemeClr val="tx1"/>
+              </a:solidFill>
+              <a:effectLst/>
+              <a:latin typeface="+mn-lt"/>
+              <a:ea typeface="+mn-ea"/>
+              <a:cs typeface="+mn-cs"/>
+            </a:endParaRPr>
+          </a:p>
+          <a:p>
+            <a:r>
+              <a:rPr lang="en-US" sz="1200" kern="1200" dirty="0" smtClean="0">
+                <a:solidFill>
+                  <a:schemeClr val="tx1"/>
+                </a:solidFill>
+                <a:latin typeface="+mn-lt"/>
+                <a:ea typeface="+mn-ea"/>
+                <a:cs typeface="+mn-cs"/>
+              </a:rPr>
+              <a:t>"WHERE </a:t>
+            </a:r>
+            <a:r>
+              <a:rPr lang="en-US" sz="1200" kern="1200" dirty="0" err="1" smtClean="0">
+                <a:solidFill>
+                  <a:schemeClr val="tx1"/>
+                </a:solidFill>
+                <a:latin typeface="+mn-lt"/>
+                <a:ea typeface="+mn-ea"/>
+                <a:cs typeface="+mn-cs"/>
+              </a:rPr>
+              <a:t>Customer.CustomerId</a:t>
+            </a:r>
+            <a:r>
+              <a:rPr lang="en-US" sz="1200" kern="1200" dirty="0" smtClean="0">
+                <a:solidFill>
+                  <a:schemeClr val="tx1"/>
+                </a:solidFill>
+                <a:latin typeface="+mn-lt"/>
+                <a:ea typeface="+mn-ea"/>
+                <a:cs typeface="+mn-cs"/>
+              </a:rPr>
+              <a:t> = </a:t>
+            </a:r>
+            <a:r>
+              <a:rPr lang="en-US" sz="1200" kern="1200" dirty="0" err="1" smtClean="0">
+                <a:solidFill>
+                  <a:schemeClr val="tx1"/>
+                </a:solidFill>
+                <a:latin typeface="+mn-lt"/>
+                <a:ea typeface="+mn-ea"/>
+                <a:cs typeface="+mn-cs"/>
+              </a:rPr>
+              <a:t>inserted.CustomerId</a:t>
+            </a:r>
+            <a:r>
+              <a:rPr lang="en-US" sz="1200" kern="1200" dirty="0" smtClean="0">
+                <a:solidFill>
+                  <a:schemeClr val="tx1"/>
+                </a:solidFill>
+                <a:latin typeface="+mn-lt"/>
+                <a:ea typeface="+mn-ea"/>
+                <a:cs typeface="+mn-cs"/>
+              </a:rPr>
+              <a:t>" clause to keep from changing every row. </a:t>
+            </a:r>
+          </a:p>
+          <a:p>
+            <a:endParaRPr lang="en-US" sz="1200" kern="1200" dirty="0" smtClean="0">
+              <a:solidFill>
+                <a:schemeClr val="tx1"/>
+              </a:solidFill>
+              <a:latin typeface="+mn-lt"/>
+              <a:ea typeface="+mn-ea"/>
+              <a:cs typeface="+mn-cs"/>
+            </a:endParaRPr>
+          </a:p>
+          <a:p>
+            <a:r>
+              <a:rPr lang="en-US" sz="1200" kern="1200" dirty="0" smtClean="0">
+                <a:solidFill>
+                  <a:schemeClr val="tx1"/>
+                </a:solidFill>
+                <a:latin typeface="+mn-lt"/>
+                <a:ea typeface="+mn-ea"/>
+                <a:cs typeface="+mn-cs"/>
+              </a:rPr>
+              <a:t>LEFT OUTER JOIN needed, so ISNULL(</a:t>
+            </a:r>
+            <a:r>
+              <a:rPr lang="en-US" sz="1200" kern="1200" dirty="0" err="1" smtClean="0">
+                <a:solidFill>
+                  <a:schemeClr val="tx1"/>
+                </a:solidFill>
+                <a:latin typeface="+mn-lt"/>
+                <a:ea typeface="+mn-ea"/>
+                <a:cs typeface="+mn-cs"/>
+              </a:rPr>
+              <a:t>deleted.column</a:t>
+            </a:r>
+            <a:r>
+              <a:rPr lang="en-US" sz="1200" kern="1200" dirty="0" smtClean="0">
+                <a:solidFill>
+                  <a:schemeClr val="tx1"/>
+                </a:solidFill>
+                <a:latin typeface="+mn-lt"/>
+                <a:ea typeface="+mn-ea"/>
+                <a:cs typeface="+mn-cs"/>
+              </a:rPr>
+              <a:t>,...) needed in WHERE clauses.</a:t>
+            </a:r>
+          </a:p>
+          <a:p>
+            <a:endParaRPr lang="en-US" sz="1200" kern="1200" dirty="0" smtClean="0">
+              <a:solidFill>
+                <a:schemeClr val="tx1"/>
+              </a:solidFill>
+              <a:latin typeface="+mn-lt"/>
+              <a:ea typeface="+mn-ea"/>
+              <a:cs typeface="+mn-cs"/>
+            </a:endParaRPr>
+          </a:p>
+          <a:p>
+            <a:r>
+              <a:rPr lang="en-US" sz="1200" kern="1200" dirty="0" smtClean="0">
+                <a:solidFill>
+                  <a:schemeClr val="tx1"/>
+                </a:solidFill>
+                <a:latin typeface="+mn-lt"/>
+                <a:ea typeface="+mn-ea"/>
+                <a:cs typeface="+mn-cs"/>
+              </a:rPr>
+              <a:t>Both needed to handle INSERT situation.</a:t>
+            </a:r>
+          </a:p>
+          <a:p>
+            <a:pPr marL="0" indent="0">
+              <a:buNone/>
+            </a:pPr>
+            <a:endParaRPr lang="en-US" baseline="0" dirty="0" smtClean="0"/>
+          </a:p>
+        </p:txBody>
+      </p:sp>
+      <p:sp>
+        <p:nvSpPr>
+          <p:cNvPr id="4" name="Slide Number Placeholder 3"/>
+          <p:cNvSpPr>
+            <a:spLocks noGrp="1"/>
+          </p:cNvSpPr>
+          <p:nvPr>
+            <p:ph type="sldNum" sz="quarter" idx="10"/>
+          </p:nvPr>
+        </p:nvSpPr>
+        <p:spPr/>
+        <p:txBody>
+          <a:bodyPr/>
+          <a:lstStyle/>
+          <a:p>
+            <a:fld id="{76E59958-3B60-4691-AE17-C513178CB0BF}" type="slidenum">
+              <a:rPr lang="en-US" smtClean="0"/>
+              <a:t>13</a:t>
+            </a:fld>
+            <a:endParaRPr lang="en-US"/>
+          </a:p>
+        </p:txBody>
+      </p:sp>
+    </p:spTree>
+    <p:extLst>
+      <p:ext uri="{BB962C8B-B14F-4D97-AF65-F5344CB8AC3E}">
+        <p14:creationId xmlns:p14="http://schemas.microsoft.com/office/powerpoint/2010/main" val="1832093265"/>
+      </p:ext>
+    </p:extLst>
+  </p:cSld>
+  <p:clrMapOvr>
+    <a:masterClrMapping/>
+  </p:clrMapOvr>
+</p:notes>
+</file>
+
+<file path=ppt/notesSlides/notesSlide5.xml><?xml version="1.0" encoding="utf-8"?>
+<p:notes xmlns:a="http://schemas.openxmlformats.org/drawingml/2006/main" xmlns:r="http://schemas.openxmlformats.org/officeDocument/2006/relationships" xmlns:p="http://schemas.openxmlformats.org/presentationml/2006/main">
+  <p:cSld>
+    <p:spTree>
+      <p:nvGrpSpPr>
+        <p:cNvPr id="1" name=""/>
+        <p:cNvGrpSpPr/>
+        <p:nvPr/>
+      </p:nvGrpSpPr>
+      <p:grpSpPr>
+        <a:xfrm>
+          <a:off x="0" y="0"/>
+          <a:ext cx="0" cy="0"/>
+          <a:chOff x="0" y="0"/>
+          <a:chExt cx="0" cy="0"/>
+        </a:xfrm>
+      </p:grpSpPr>
+      <p:sp>
+        <p:nvSpPr>
+          <p:cNvPr id="2" name="Slide Image Placeholder 1"/>
+          <p:cNvSpPr>
+            <a:spLocks noGrp="1" noRot="1" noChangeAspect="1"/>
+          </p:cNvSpPr>
+          <p:nvPr>
+            <p:ph type="sldImg"/>
+          </p:nvPr>
+        </p:nvSpPr>
+        <p:spPr/>
+      </p:sp>
+      <p:sp>
+        <p:nvSpPr>
+          <p:cNvPr id="3" name="Notes Placeholder 2"/>
+          <p:cNvSpPr>
+            <a:spLocks noGrp="1"/>
+          </p:cNvSpPr>
+          <p:nvPr>
+            <p:ph type="body" idx="1"/>
+          </p:nvPr>
+        </p:nvSpPr>
+        <p:spPr/>
+        <p:txBody>
+          <a:bodyPr/>
+          <a:lstStyle/>
+          <a:p>
             <a:pPr marL="171450" indent="-171450">
               <a:buFont typeface="Arial" panose="020B0604020202020204" pitchFamily="34" charset="0"/>
               <a:buChar char="•"/>
@@ -1345,7 +1455,7 @@
 </p:notes>
 </file>
 
-<file path=ppt/notesSlides/notesSlide5.xml><?xml version="1.0" encoding="utf-8"?>
+<file path=ppt/notesSlides/notesSlide6.xml><?xml version="1.0" encoding="utf-8"?>
 <p:notes xmlns:a="http://schemas.openxmlformats.org/drawingml/2006/main" xmlns:r="http://schemas.openxmlformats.org/officeDocument/2006/relationships" xmlns:p="http://schemas.openxmlformats.org/presentationml/2006/main">
   <p:cSld>
     <p:spTree>
@@ -1625,7 +1735,7 @@
           <a:p>
             <a:fld id="{ECD19FB2-3AAB-4D03-B13A-2960828C78E3}" type="datetimeFigureOut">
               <a:rPr lang="en-US" dirty="0"/>
-              <a:t>4/29/2016</a:t>
+              <a:t>6/14/2016</a:t>
             </a:fld>
             <a:endParaRPr lang="en-US" dirty="0"/>
           </a:p>
@@ -1902,7 +2012,7 @@
           <a:p>
             <a:fld id="{1B80C674-7DFC-42FE-B9CD-82963CDB1557}" type="datetimeFigureOut">
               <a:rPr lang="en-US" dirty="0"/>
-              <a:t>4/29/2016</a:t>
+              <a:t>6/14/2016</a:t>
             </a:fld>
             <a:endParaRPr lang="en-US" dirty="0"/>
           </a:p>
@@ -2089,7 +2199,7 @@
           <a:p>
             <a:fld id="{2076456F-F47D-4F25-8053-2A695DA0CA7D}" type="datetimeFigureOut">
               <a:rPr lang="en-US" dirty="0"/>
-              <a:t>4/29/2016</a:t>
+              <a:t>6/14/2016</a:t>
             </a:fld>
             <a:endParaRPr lang="en-US" dirty="0"/>
           </a:p>
@@ -2345,7 +2455,7 @@
           <a:p>
             <a:fld id="{5D6C7379-69CC-4837-9905-BEBA22830C8A}" type="datetimeFigureOut">
               <a:rPr lang="en-US" dirty="0"/>
-              <a:t>4/29/2016</a:t>
+              <a:t>6/14/2016</a:t>
             </a:fld>
             <a:endParaRPr lang="en-US" dirty="0"/>
           </a:p>
@@ -2766,7 +2876,7 @@
           <a:p>
             <a:fld id="{49EB8B7E-8AEE-4F10-BFEE-C999AD004D36}" type="datetimeFigureOut">
               <a:rPr lang="en-US" dirty="0"/>
-              <a:t>4/29/2016</a:t>
+              <a:t>6/14/2016</a:t>
             </a:fld>
             <a:endParaRPr lang="en-US" dirty="0"/>
           </a:p>
@@ -3307,7 +3417,7 @@
           <a:p>
             <a:fld id="{8668F3F9-58BC-440B-B37B-805B9055EF92}" type="datetimeFigureOut">
               <a:rPr lang="en-US" dirty="0"/>
-              <a:t>4/29/2016</a:t>
+              <a:t>6/14/2016</a:t>
             </a:fld>
             <a:endParaRPr lang="en-US" dirty="0"/>
           </a:p>
@@ -4133,7 +4243,7 @@
           <a:p>
             <a:fld id="{0D5A53AF-48EA-489D-8260-9DCAB666386A}" type="datetimeFigureOut">
               <a:rPr lang="en-US" dirty="0"/>
-              <a:t>4/29/2016</a:t>
+              <a:t>6/14/2016</a:t>
             </a:fld>
             <a:endParaRPr lang="en-US" dirty="0"/>
           </a:p>
@@ -4298,7 +4408,7 @@
           <a:p>
             <a:fld id="{0DED02AE-B9A4-47BD-AF8E-97E16144138B}" type="datetimeFigureOut">
               <a:rPr lang="en-US" dirty="0"/>
-              <a:t>4/29/2016</a:t>
+              <a:t>6/14/2016</a:t>
             </a:fld>
             <a:endParaRPr lang="en-US" dirty="0"/>
           </a:p>
@@ -4473,7 +4583,7 @@
           <a:p>
             <a:fld id="{CF0FD78B-DB02-4362-BCDC-98A55456977C}" type="datetimeFigureOut">
               <a:rPr lang="en-US" dirty="0"/>
-              <a:t>4/29/2016</a:t>
+              <a:t>6/14/2016</a:t>
             </a:fld>
             <a:endParaRPr lang="en-US" dirty="0"/>
           </a:p>
@@ -4638,7 +4748,7 @@
           <a:p>
             <a:fld id="{99916976-5D93-46E4-A98A-FAD63E4D0EA8}" type="datetimeFigureOut">
               <a:rPr lang="en-US" dirty="0"/>
-              <a:t>4/29/2016</a:t>
+              <a:t>6/14/2016</a:t>
             </a:fld>
             <a:endParaRPr lang="en-US" dirty="0"/>
           </a:p>
@@ -4890,7 +5000,7 @@
           <a:p>
             <a:fld id="{0F39F4F5-F4D2-4D2A-AB60-88D37ADCB869}" type="datetimeFigureOut">
               <a:rPr lang="en-US" dirty="0"/>
-              <a:t>4/29/2016</a:t>
+              <a:t>6/14/2016</a:t>
             </a:fld>
             <a:endParaRPr lang="en-US" dirty="0"/>
           </a:p>
@@ -5117,7 +5227,7 @@
           <a:p>
             <a:fld id="{D23BC6CE-6D1E-47E5-8859-F31AC5380EB2}" type="datetimeFigureOut">
               <a:rPr lang="en-US" dirty="0"/>
-              <a:t>4/29/2016</a:t>
+              <a:t>6/14/2016</a:t>
             </a:fld>
             <a:endParaRPr lang="en-US" dirty="0"/>
           </a:p>
@@ -5505,7 +5615,7 @@
           <a:p>
             <a:fld id="{B1B4E7C4-4DA4-404D-9965-B13F2DD7D8BF}" type="datetimeFigureOut">
               <a:rPr lang="en-US" dirty="0"/>
-              <a:t>4/29/2016</a:t>
+              <a:t>6/14/2016</a:t>
             </a:fld>
             <a:endParaRPr lang="en-US" dirty="0"/>
           </a:p>
@@ -5618,7 +5728,7 @@
           <a:p>
             <a:fld id="{476FB7AA-4A53-424F-AD41-70827B6504BA}" type="datetimeFigureOut">
               <a:rPr lang="en-US" dirty="0"/>
-              <a:t>4/29/2016</a:t>
+              <a:t>6/14/2016</a:t>
             </a:fld>
             <a:endParaRPr lang="en-US" dirty="0"/>
           </a:p>
@@ -5708,7 +5818,7 @@
           <a:p>
             <a:fld id="{E7884882-FB12-4BC8-9960-9AD8104D7FAE}" type="datetimeFigureOut">
               <a:rPr lang="en-US" dirty="0"/>
-              <a:t>4/29/2016</a:t>
+              <a:t>6/14/2016</a:t>
             </a:fld>
             <a:endParaRPr lang="en-US" dirty="0"/>
           </a:p>
@@ -5976,7 +6086,7 @@
           <a:p>
             <a:fld id="{F7D1BD23-6E54-4D9D-AD88-A2813C73CC25}" type="datetimeFigureOut">
               <a:rPr lang="en-US" dirty="0"/>
-              <a:t>4/29/2016</a:t>
+              <a:t>6/14/2016</a:t>
             </a:fld>
             <a:endParaRPr lang="en-US" dirty="0"/>
           </a:p>
@@ -6252,7 +6362,7 @@
           <a:p>
             <a:fld id="{1471A834-4F3C-4AF9-9C74-05EC35A0F292}" type="datetimeFigureOut">
               <a:rPr lang="en-US" dirty="0"/>
-              <a:t>4/29/2016</a:t>
+              <a:t>6/14/2016</a:t>
             </a:fld>
             <a:endParaRPr lang="en-US" dirty="0"/>
           </a:p>
@@ -6487,7 +6597,7 @@
           <a:p>
             <a:fld id="{51CF1133-3259-4C45-BABA-5B62D9C6F78D}" type="datetimeFigureOut">
               <a:rPr lang="en-US" dirty="0"/>
-              <a:t>4/29/2016</a:t>
+              <a:t>6/14/2016</a:t>
             </a:fld>
             <a:endParaRPr lang="en-US" dirty="0"/>
           </a:p>
@@ -7191,11 +7301,7 @@
           <a:p>
             <a:r>
               <a:rPr lang="en-US" dirty="0" smtClean="0"/>
-              <a:t>Change stored procedures and functions to use new </a:t>
-            </a:r>
-            <a:r>
-              <a:rPr lang="en-US" dirty="0" smtClean="0"/>
-              <a:t>version</a:t>
+              <a:t>Change stored procedures and functions to use new version</a:t>
             </a:r>
           </a:p>
           <a:p>
@@ -7203,7 +7309,6 @@
               <a:rPr lang="en-US" dirty="0" smtClean="0"/>
               <a:t>Change other database dependencies</a:t>
             </a:r>
-            <a:endParaRPr lang="en-US" dirty="0" smtClean="0"/>
           </a:p>
           <a:p>
             <a:r>
@@ -8249,23 +8354,30 @@
           <a:p>
             <a:r>
               <a:rPr lang="en-US" dirty="0"/>
-              <a:t>Agile / Lean Development: frequent small changes to software. Assume unstable requirements.</a:t>
-            </a:r>
-          </a:p>
-          <a:p>
-            <a:r>
-              <a:rPr lang="en-US" dirty="0" smtClean="0"/>
-              <a:t>Repeatable </a:t>
+              <a:t>Agile / Lean Development: frequent small changes to </a:t>
+            </a:r>
+            <a:r>
+              <a:rPr lang="en-US" dirty="0" smtClean="0"/>
+              <a:t>software - assume </a:t>
             </a:r>
             <a:r>
               <a:rPr lang="en-US" dirty="0"/>
-              <a:t>server builds.</a:t>
-            </a:r>
-          </a:p>
-          <a:p>
-            <a:r>
-              <a:rPr lang="en-US" dirty="0" smtClean="0"/>
-              <a:t>“Infrastructure as code”. Puppet / Chef / </a:t>
+              <a:t>unstable </a:t>
+            </a:r>
+            <a:r>
+              <a:rPr lang="en-US" dirty="0" smtClean="0"/>
+              <a:t>requirements</a:t>
+            </a:r>
+            <a:endParaRPr lang="en-US" dirty="0"/>
+          </a:p>
+          <a:p>
+            <a:r>
+              <a:rPr lang="en-US" dirty="0" smtClean="0"/>
+              <a:t>“</a:t>
+            </a:r>
+            <a:r>
+              <a:rPr lang="en-US" dirty="0" smtClean="0"/>
+              <a:t>Infrastructure as code”. Puppet / Chef / </a:t>
             </a:r>
             <a:r>
               <a:rPr lang="en-US" dirty="0" err="1" smtClean="0"/>
@@ -8275,8 +8387,23 @@
           </a:p>
           <a:p>
             <a:r>
-              <a:rPr lang="en-US" dirty="0" smtClean="0"/>
-              <a:t>Etsy: 50 deployments per day.</a:t>
+              <a:rPr lang="en-US" dirty="0"/>
+              <a:t>Repeatable server </a:t>
+            </a:r>
+            <a:r>
+              <a:rPr lang="en-US" dirty="0" smtClean="0"/>
+              <a:t>builds</a:t>
+            </a:r>
+            <a:endParaRPr lang="en-US" dirty="0"/>
+          </a:p>
+          <a:p>
+            <a:r>
+              <a:rPr lang="en-US" dirty="0" smtClean="0"/>
+              <a:t>Etsy</a:t>
+            </a:r>
+            <a:r>
+              <a:rPr lang="en-US" dirty="0" smtClean="0"/>
+              <a:t>: 50 deployments per day.</a:t>
             </a:r>
             <a:endParaRPr lang="en-US" dirty="0"/>
           </a:p>

</xml_diff>